<commit_message>
added slides for build units and technology stack
</commit_message>
<xml_diff>
--- a/docs/group4_Final_Presentation.pptx
+++ b/docs/group4_Final_Presentation.pptx
@@ -5,17 +5,19 @@
     <p:sldMasterId id="2147483660" r:id="rId1"/>
   </p:sldMasterIdLst>
   <p:notesMasterIdLst>
-    <p:notesMasterId r:id="rId7"/>
+    <p:notesMasterId r:id="rId9"/>
   </p:notesMasterIdLst>
   <p:handoutMasterIdLst>
-    <p:handoutMasterId r:id="rId8"/>
+    <p:handoutMasterId r:id="rId10"/>
   </p:handoutMasterIdLst>
   <p:sldIdLst>
     <p:sldId id="256" r:id="rId2"/>
     <p:sldId id="266" r:id="rId3"/>
     <p:sldId id="277" r:id="rId4"/>
     <p:sldId id="283" r:id="rId5"/>
-    <p:sldId id="263" r:id="rId6"/>
+    <p:sldId id="285" r:id="rId6"/>
+    <p:sldId id="263" r:id="rId7"/>
+    <p:sldId id="284" r:id="rId8"/>
   </p:sldIdLst>
   <p:sldSz cx="9144000" cy="6858000" type="screen4x3"/>
   <p:notesSz cx="6858000" cy="9144000"/>
@@ -199,7 +201,8 @@
           <a:p>
             <a:fld id="{B90D170F-C4DC-4970-8523-1EDF1DABFF2F}" type="datetimeFigureOut">
               <a:rPr lang="de-DE" smtClean="0"/>
-              <a:t>11.02.2013</a:t>
+              <a:pPr/>
+              <a:t>12.02.2013</a:t>
             </a:fld>
             <a:endParaRPr lang="de-DE"/>
           </a:p>
@@ -265,7 +268,8 @@
           <a:p>
             <a:fld id="{E9FE34E0-06B0-4097-BDB1-19F4CB9F3AF5}" type="slidenum">
               <a:rPr lang="de-DE" smtClean="0"/>
-              <a:t>‹#›</a:t>
+              <a:pPr/>
+              <a:t>‹Nr.›</a:t>
             </a:fld>
             <a:endParaRPr lang="de-DE"/>
           </a:p>
@@ -274,7 +278,7 @@
     </p:spTree>
     <p:extLst>
       <p:ext uri="{BB962C8B-B14F-4D97-AF65-F5344CB8AC3E}">
-        <p14:creationId xmlns:p14="http://schemas.microsoft.com/office/powerpoint/2010/main" val="3507328673"/>
+        <p14:creationId xmlns="" xmlns:p14="http://schemas.microsoft.com/office/powerpoint/2010/main" val="3507328673"/>
       </p:ext>
     </p:extLst>
   </p:cSld>
@@ -365,7 +369,7 @@
             <a:fld id="{208B6049-45AF-4855-985C-185012BA219A}" type="datetimeFigureOut">
               <a:rPr lang="de-DE" smtClean="0"/>
               <a:pPr/>
-              <a:t>11.02.2013</a:t>
+              <a:t>12.02.2013</a:t>
             </a:fld>
             <a:endParaRPr lang="de-DE"/>
           </a:p>
@@ -525,7 +529,7 @@
             <a:fld id="{659CEC5D-4A85-40E8-8CE8-2BEB4B481F32}" type="slidenum">
               <a:rPr lang="de-DE" smtClean="0"/>
               <a:pPr/>
-              <a:t>‹#›</a:t>
+              <a:t>‹Nr.›</a:t>
             </a:fld>
             <a:endParaRPr lang="de-DE"/>
           </a:p>
@@ -534,7 +538,7 @@
     </p:spTree>
     <p:extLst>
       <p:ext uri="{BB962C8B-B14F-4D97-AF65-F5344CB8AC3E}">
-        <p14:creationId xmlns:p14="http://schemas.microsoft.com/office/powerpoint/2010/main" val="1095461984"/>
+        <p14:creationId xmlns="" xmlns:p14="http://schemas.microsoft.com/office/powerpoint/2010/main" val="1095461984"/>
       </p:ext>
     </p:extLst>
   </p:cSld>
@@ -904,7 +908,7 @@
             <a:biLevel thresh="25000"/>
             <a:extLst>
               <a:ext uri="{28A0092B-C50C-407E-A947-70E740481C1C}">
-                <a14:useLocalDpi xmlns:a14="http://schemas.microsoft.com/office/drawing/2010/main" val="0"/>
+                <a14:useLocalDpi xmlns="" xmlns:a14="http://schemas.microsoft.com/office/drawing/2010/main" val="0"/>
               </a:ext>
             </a:extLst>
           </a:blip>
@@ -927,14 +931,14 @@
           </a:ln>
           <a:extLst>
             <a:ext uri="{909E8E84-426E-40DD-AFC4-6F175D3DCCD1}">
-              <a14:hiddenFill xmlns:a14="http://schemas.microsoft.com/office/drawing/2010/main">
+              <a14:hiddenFill xmlns="" xmlns:a14="http://schemas.microsoft.com/office/drawing/2010/main">
                 <a:solidFill>
                   <a:srgbClr val="FFFFFF"/>
                 </a:solidFill>
               </a14:hiddenFill>
             </a:ext>
             <a:ext uri="{91240B29-F687-4F45-9708-019B960494DF}">
-              <a14:hiddenLine xmlns:a14="http://schemas.microsoft.com/office/drawing/2010/main" w="9525">
+              <a14:hiddenLine xmlns="" xmlns:a14="http://schemas.microsoft.com/office/drawing/2010/main" w="9525">
                 <a:solidFill>
                   <a:srgbClr val="000000"/>
                 </a:solidFill>
@@ -1059,7 +1063,7 @@
     </p:spTree>
     <p:extLst>
       <p:ext uri="{BB962C8B-B14F-4D97-AF65-F5344CB8AC3E}">
-        <p14:creationId xmlns:p14="http://schemas.microsoft.com/office/powerpoint/2010/main" val="364360318"/>
+        <p14:creationId xmlns="" xmlns:p14="http://schemas.microsoft.com/office/powerpoint/2010/main" val="364360318"/>
       </p:ext>
     </p:extLst>
   </p:cSld>
@@ -1270,7 +1274,7 @@
             <a:fld id="{121E5A8C-2088-45D2-9D84-10B3EA412A4C}" type="slidenum">
               <a:rPr lang="de-DE" smtClean="0"/>
               <a:pPr/>
-              <a:t>‹#›</a:t>
+              <a:t>‹Nr.›</a:t>
             </a:fld>
             <a:endParaRPr lang="de-DE" dirty="0"/>
           </a:p>
@@ -1279,7 +1283,7 @@
     </p:spTree>
     <p:extLst>
       <p:ext uri="{BB962C8B-B14F-4D97-AF65-F5344CB8AC3E}">
-        <p14:creationId xmlns:p14="http://schemas.microsoft.com/office/powerpoint/2010/main" val="1803307076"/>
+        <p14:creationId xmlns="" xmlns:p14="http://schemas.microsoft.com/office/powerpoint/2010/main" val="1803307076"/>
       </p:ext>
     </p:extLst>
   </p:cSld>
@@ -1604,7 +1608,7 @@
             <a:fld id="{121E5A8C-2088-45D2-9D84-10B3EA412A4C}" type="slidenum">
               <a:rPr lang="de-DE" smtClean="0"/>
               <a:pPr/>
-              <a:t>‹#›</a:t>
+              <a:t>‹Nr.›</a:t>
             </a:fld>
             <a:endParaRPr lang="de-DE"/>
           </a:p>
@@ -1613,7 +1617,7 @@
     </p:spTree>
     <p:extLst>
       <p:ext uri="{BB962C8B-B14F-4D97-AF65-F5344CB8AC3E}">
-        <p14:creationId xmlns:p14="http://schemas.microsoft.com/office/powerpoint/2010/main" val="302666195"/>
+        <p14:creationId xmlns="" xmlns:p14="http://schemas.microsoft.com/office/powerpoint/2010/main" val="302666195"/>
       </p:ext>
     </p:extLst>
   </p:cSld>
@@ -1682,14 +1686,14 @@
           </a:ln>
           <a:extLst>
             <a:ext uri="{909E8E84-426E-40DD-AFC4-6F175D3DCCD1}">
-              <a14:hiddenFill xmlns:a14="http://schemas.microsoft.com/office/drawing/2010/main">
+              <a14:hiddenFill xmlns="" xmlns:a14="http://schemas.microsoft.com/office/drawing/2010/main">
                 <a:solidFill>
                   <a:srgbClr val="FFFFFF"/>
                 </a:solidFill>
               </a14:hiddenFill>
             </a:ext>
             <a:ext uri="{91240B29-F687-4F45-9708-019B960494DF}">
-              <a14:hiddenLine xmlns:a14="http://schemas.microsoft.com/office/drawing/2010/main" w="9525">
+              <a14:hiddenLine xmlns="" xmlns:a14="http://schemas.microsoft.com/office/drawing/2010/main" w="9525">
                 <a:solidFill>
                   <a:srgbClr val="000000"/>
                 </a:solidFill>
@@ -1740,14 +1744,14 @@
           </a:ln>
           <a:extLst>
             <a:ext uri="{909E8E84-426E-40DD-AFC4-6F175D3DCCD1}">
-              <a14:hiddenFill xmlns:a14="http://schemas.microsoft.com/office/drawing/2010/main">
+              <a14:hiddenFill xmlns="" xmlns:a14="http://schemas.microsoft.com/office/drawing/2010/main">
                 <a:solidFill>
                   <a:srgbClr val="FFFFFF"/>
                 </a:solidFill>
               </a14:hiddenFill>
             </a:ext>
             <a:ext uri="{91240B29-F687-4F45-9708-019B960494DF}">
-              <a14:hiddenLine xmlns:a14="http://schemas.microsoft.com/office/drawing/2010/main" w="9525">
+              <a14:hiddenLine xmlns="" xmlns:a14="http://schemas.microsoft.com/office/drawing/2010/main" w="9525">
                 <a:solidFill>
                   <a:srgbClr val="000000"/>
                 </a:solidFill>
@@ -1956,7 +1960,7 @@
             <a:fld id="{121E5A8C-2088-45D2-9D84-10B3EA412A4C}" type="slidenum">
               <a:rPr lang="de-DE" smtClean="0"/>
               <a:pPr/>
-              <a:t>‹#›</a:t>
+              <a:t>‹Nr.›</a:t>
             </a:fld>
             <a:endParaRPr lang="de-DE"/>
           </a:p>
@@ -2175,7 +2179,7 @@
             <a:biLevel thresh="25000"/>
             <a:extLst>
               <a:ext uri="{28A0092B-C50C-407E-A947-70E740481C1C}">
-                <a14:useLocalDpi xmlns:a14="http://schemas.microsoft.com/office/drawing/2010/main" val="0"/>
+                <a14:useLocalDpi xmlns="" xmlns:a14="http://schemas.microsoft.com/office/drawing/2010/main" val="0"/>
               </a:ext>
             </a:extLst>
           </a:blip>
@@ -2198,14 +2202,14 @@
           </a:ln>
           <a:extLst>
             <a:ext uri="{909E8E84-426E-40DD-AFC4-6F175D3DCCD1}">
-              <a14:hiddenFill xmlns:a14="http://schemas.microsoft.com/office/drawing/2010/main">
+              <a14:hiddenFill xmlns="" xmlns:a14="http://schemas.microsoft.com/office/drawing/2010/main">
                 <a:solidFill>
                   <a:srgbClr val="FFFFFF"/>
                 </a:solidFill>
               </a14:hiddenFill>
             </a:ext>
             <a:ext uri="{91240B29-F687-4F45-9708-019B960494DF}">
-              <a14:hiddenLine xmlns:a14="http://schemas.microsoft.com/office/drawing/2010/main" w="9525">
+              <a14:hiddenLine xmlns="" xmlns:a14="http://schemas.microsoft.com/office/drawing/2010/main" w="9525">
                 <a:solidFill>
                   <a:srgbClr val="000000"/>
                 </a:solidFill>
@@ -2274,7 +2278,7 @@
           <a:blip r:embed="rId6" cstate="print">
             <a:extLst>
               <a:ext uri="{28A0092B-C50C-407E-A947-70E740481C1C}">
-                <a14:useLocalDpi xmlns:a14="http://schemas.microsoft.com/office/drawing/2010/main" val="0"/>
+                <a14:useLocalDpi xmlns="" xmlns:a14="http://schemas.microsoft.com/office/drawing/2010/main" val="0"/>
               </a:ext>
             </a:extLst>
           </a:blip>
@@ -2294,7 +2298,7 @@
           <a:noFill/>
           <a:extLst>
             <a:ext uri="{909E8E84-426E-40DD-AFC4-6F175D3DCCD1}">
-              <a14:hiddenFill xmlns:a14="http://schemas.microsoft.com/office/drawing/2010/main">
+              <a14:hiddenFill xmlns="" xmlns:a14="http://schemas.microsoft.com/office/drawing/2010/main">
                 <a:solidFill>
                   <a:srgbClr val="FFFFFF"/>
                 </a:solidFill>
@@ -2875,15 +2879,7 @@
                   <a:schemeClr val="bg1"/>
                 </a:solidFill>
               </a:rPr>
-              <a:t> </a:t>
-            </a:r>
-            <a:r>
-              <a:rPr lang="de-DE" dirty="0" smtClean="0">
-                <a:solidFill>
-                  <a:schemeClr val="bg1"/>
-                </a:solidFill>
-              </a:rPr>
-              <a:t>– </a:t>
+              <a:t> – </a:t>
             </a:r>
             <a:r>
               <a:rPr lang="de-DE" dirty="0">
@@ -3057,17 +3053,7 @@
                   </a:schemeClr>
                 </a:solidFill>
               </a:rPr>
-              <a:t>25</a:t>
-            </a:r>
-            <a:r>
-              <a:rPr lang="de-DE" sz="1600" dirty="0" smtClean="0">
-                <a:solidFill>
-                  <a:schemeClr val="bg1">
-                    <a:lumMod val="75000"/>
-                  </a:schemeClr>
-                </a:solidFill>
-              </a:rPr>
-              <a:t>.02.2013</a:t>
+              <a:t>25.02.2013</a:t>
             </a:r>
             <a:endParaRPr lang="de-DE" sz="1600" dirty="0">
               <a:solidFill>
@@ -3091,7 +3077,7 @@
           <a:blip r:embed="rId2" cstate="print">
             <a:extLst>
               <a:ext uri="{28A0092B-C50C-407E-A947-70E740481C1C}">
-                <a14:useLocalDpi xmlns:a14="http://schemas.microsoft.com/office/drawing/2010/main" val="0"/>
+                <a14:useLocalDpi xmlns="" xmlns:a14="http://schemas.microsoft.com/office/drawing/2010/main" val="0"/>
               </a:ext>
             </a:extLst>
           </a:blip>
@@ -3111,7 +3097,7 @@
           <a:noFill/>
           <a:extLst>
             <a:ext uri="{909E8E84-426E-40DD-AFC4-6F175D3DCCD1}">
-              <a14:hiddenFill xmlns:a14="http://schemas.microsoft.com/office/drawing/2010/main">
+              <a14:hiddenFill xmlns="" xmlns:a14="http://schemas.microsoft.com/office/drawing/2010/main">
                 <a:solidFill>
                   <a:srgbClr val="FFFFFF"/>
                 </a:solidFill>
@@ -3123,7 +3109,7 @@
     </p:spTree>
     <p:extLst>
       <p:ext uri="{BB962C8B-B14F-4D97-AF65-F5344CB8AC3E}">
-        <p14:creationId xmlns:p14="http://schemas.microsoft.com/office/powerpoint/2010/main" val="2518694071"/>
+        <p14:creationId xmlns="" xmlns:p14="http://schemas.microsoft.com/office/powerpoint/2010/main" val="2518694071"/>
       </p:ext>
     </p:extLst>
   </p:cSld>
@@ -3418,22 +3404,7 @@
                   </a:outerShdw>
                 </a:effectLst>
               </a:rPr>
-              <a:t> </a:t>
-            </a:r>
-            <a:r>
-              <a:rPr lang="pl-PL" dirty="0" smtClean="0">
-                <a:solidFill>
-                  <a:srgbClr val="FF9900"/>
-                </a:solidFill>
-                <a:effectLst>
-                  <a:outerShdw blurRad="50800" dist="50800" dir="5400000" algn="t" rotWithShape="0">
-                    <a:schemeClr val="tx1">
-                      <a:alpha val="50000"/>
-                    </a:schemeClr>
-                  </a:outerShdw>
-                </a:effectLst>
-              </a:rPr>
-              <a:t>game</a:t>
+              <a:t> game</a:t>
             </a:r>
             <a:r>
               <a:rPr lang="de-DE" dirty="0" smtClean="0">
@@ -4124,14 +4095,14 @@
           </a:ln>
           <a:extLst>
             <a:ext uri="{909E8E84-426E-40DD-AFC4-6F175D3DCCD1}">
-              <a14:hiddenFill xmlns:a14="http://schemas.microsoft.com/office/drawing/2010/main">
+              <a14:hiddenFill xmlns="" xmlns:a14="http://schemas.microsoft.com/office/drawing/2010/main">
                 <a:solidFill>
                   <a:srgbClr val="FFFFFF"/>
                 </a:solidFill>
               </a14:hiddenFill>
             </a:ext>
             <a:ext uri="{91240B29-F687-4F45-9708-019B960494DF}">
-              <a14:hiddenLine xmlns:a14="http://schemas.microsoft.com/office/drawing/2010/main" w="9525">
+              <a14:hiddenLine xmlns="" xmlns:a14="http://schemas.microsoft.com/office/drawing/2010/main" w="9525">
                 <a:solidFill>
                   <a:srgbClr val="000000"/>
                 </a:solidFill>
@@ -4875,14 +4846,14 @@
           </a:ln>
           <a:extLst>
             <a:ext uri="{909E8E84-426E-40DD-AFC4-6F175D3DCCD1}">
-              <a14:hiddenFill xmlns:a14="http://schemas.microsoft.com/office/drawing/2010/main">
+              <a14:hiddenFill xmlns="" xmlns:a14="http://schemas.microsoft.com/office/drawing/2010/main">
                 <a:solidFill>
                   <a:srgbClr val="FFFFFF"/>
                 </a:solidFill>
               </a14:hiddenFill>
             </a:ext>
             <a:ext uri="{91240B29-F687-4F45-9708-019B960494DF}">
-              <a14:hiddenLine xmlns:a14="http://schemas.microsoft.com/office/drawing/2010/main" w="9525">
+              <a14:hiddenLine xmlns="" xmlns:a14="http://schemas.microsoft.com/office/drawing/2010/main" w="9525">
                 <a:solidFill>
                   <a:srgbClr val="000000"/>
                 </a:solidFill>
@@ -4967,7 +4938,7 @@
     </p:spTree>
     <p:extLst>
       <p:ext uri="{BB962C8B-B14F-4D97-AF65-F5344CB8AC3E}">
-        <p14:creationId xmlns:p14="http://schemas.microsoft.com/office/powerpoint/2010/main" val="514872292"/>
+        <p14:creationId xmlns="" xmlns:p14="http://schemas.microsoft.com/office/powerpoint/2010/main" val="514872292"/>
       </p:ext>
     </p:extLst>
   </p:cSld>
@@ -5107,14 +5078,14 @@
           </a:ln>
           <a:extLst>
             <a:ext uri="{909E8E84-426E-40DD-AFC4-6F175D3DCCD1}">
-              <a14:hiddenFill xmlns:a14="http://schemas.microsoft.com/office/drawing/2010/main">
+              <a14:hiddenFill xmlns="" xmlns:a14="http://schemas.microsoft.com/office/drawing/2010/main">
                 <a:solidFill>
                   <a:srgbClr val="FFFFFF"/>
                 </a:solidFill>
               </a14:hiddenFill>
             </a:ext>
             <a:ext uri="{91240B29-F687-4F45-9708-019B960494DF}">
-              <a14:hiddenLine xmlns:a14="http://schemas.microsoft.com/office/drawing/2010/main" w="9525">
+              <a14:hiddenLine xmlns="" xmlns:a14="http://schemas.microsoft.com/office/drawing/2010/main" w="9525">
                 <a:solidFill>
                   <a:srgbClr val="000000"/>
                 </a:solidFill>
@@ -6439,7 +6410,7 @@
           <p:nvPr/>
         </p:nvPicPr>
         <p:blipFill rotWithShape="1">
-          <a:blip r:embed="rId2">
+          <a:blip r:embed="rId2" cstate="print">
             <a:duotone>
               <a:prstClr val="black"/>
               <a:srgbClr val="FF9900">
@@ -6449,7 +6420,7 @@
             </a:duotone>
             <a:extLst>
               <a:ext uri="{BEBA8EAE-BF5A-486C-A8C5-ECC9F3942E4B}">
-                <a14:imgProps xmlns:a14="http://schemas.microsoft.com/office/drawing/2010/main">
+                <a14:imgProps xmlns="" xmlns:a14="http://schemas.microsoft.com/office/drawing/2010/main">
                   <a14:imgLayer r:embed="rId3">
                     <a14:imgEffect>
                       <a14:backgroundRemoval t="0" b="99474" l="0" r="100000"/>
@@ -6458,7 +6429,7 @@
                 </a14:imgProps>
               </a:ext>
               <a:ext uri="{28A0092B-C50C-407E-A947-70E740481C1C}">
-                <a14:useLocalDpi xmlns:a14="http://schemas.microsoft.com/office/drawing/2010/main" val="0"/>
+                <a14:useLocalDpi xmlns="" xmlns:a14="http://schemas.microsoft.com/office/drawing/2010/main" val="0"/>
               </a:ext>
             </a:extLst>
           </a:blip>
@@ -6476,7 +6447,7 @@
           <a:noFill/>
           <a:extLst>
             <a:ext uri="{909E8E84-426E-40DD-AFC4-6F175D3DCCD1}">
-              <a14:hiddenFill xmlns:a14="http://schemas.microsoft.com/office/drawing/2010/main">
+              <a14:hiddenFill xmlns="" xmlns:a14="http://schemas.microsoft.com/office/drawing/2010/main">
                 <a:solidFill>
                   <a:srgbClr val="FFFFFF"/>
                 </a:solidFill>
@@ -6488,7 +6459,7 @@
     </p:spTree>
     <p:extLst>
       <p:ext uri="{BB962C8B-B14F-4D97-AF65-F5344CB8AC3E}">
-        <p14:creationId xmlns:p14="http://schemas.microsoft.com/office/powerpoint/2010/main" val="599510323"/>
+        <p14:creationId xmlns="" xmlns:p14="http://schemas.microsoft.com/office/powerpoint/2010/main" val="599510323"/>
       </p:ext>
     </p:extLst>
   </p:cSld>
@@ -6690,14 +6661,14 @@
           </a:ln>
           <a:extLst>
             <a:ext uri="{909E8E84-426E-40DD-AFC4-6F175D3DCCD1}">
-              <a14:hiddenFill xmlns:a14="http://schemas.microsoft.com/office/drawing/2010/main">
+              <a14:hiddenFill xmlns="" xmlns:a14="http://schemas.microsoft.com/office/drawing/2010/main">
                 <a:solidFill>
                   <a:srgbClr val="FFFFFF"/>
                 </a:solidFill>
               </a14:hiddenFill>
             </a:ext>
             <a:ext uri="{91240B29-F687-4F45-9708-019B960494DF}">
-              <a14:hiddenLine xmlns:a14="http://schemas.microsoft.com/office/drawing/2010/main" w="9525">
+              <a14:hiddenLine xmlns="" xmlns:a14="http://schemas.microsoft.com/office/drawing/2010/main" w="9525">
                 <a:solidFill>
                   <a:srgbClr val="000000"/>
                 </a:solidFill>
@@ -7036,14 +7007,14 @@
           </a:ln>
           <a:extLst>
             <a:ext uri="{909E8E84-426E-40DD-AFC4-6F175D3DCCD1}">
-              <a14:hiddenFill xmlns:a14="http://schemas.microsoft.com/office/drawing/2010/main">
+              <a14:hiddenFill xmlns="" xmlns:a14="http://schemas.microsoft.com/office/drawing/2010/main">
                 <a:solidFill>
                   <a:srgbClr val="FFFFFF"/>
                 </a:solidFill>
               </a14:hiddenFill>
             </a:ext>
             <a:ext uri="{91240B29-F687-4F45-9708-019B960494DF}">
-              <a14:hiddenLine xmlns:a14="http://schemas.microsoft.com/office/drawing/2010/main" w="9525">
+              <a14:hiddenLine xmlns="" xmlns:a14="http://schemas.microsoft.com/office/drawing/2010/main" w="9525">
                 <a:solidFill>
                   <a:srgbClr val="000000"/>
                 </a:solidFill>
@@ -7407,14 +7378,14 @@
           </a:ln>
           <a:extLst>
             <a:ext uri="{909E8E84-426E-40DD-AFC4-6F175D3DCCD1}">
-              <a14:hiddenFill xmlns:a14="http://schemas.microsoft.com/office/drawing/2010/main">
+              <a14:hiddenFill xmlns="" xmlns:a14="http://schemas.microsoft.com/office/drawing/2010/main">
                 <a:solidFill>
                   <a:srgbClr val="FFFFFF"/>
                 </a:solidFill>
               </a14:hiddenFill>
             </a:ext>
             <a:ext uri="{91240B29-F687-4F45-9708-019B960494DF}">
-              <a14:hiddenLine xmlns:a14="http://schemas.microsoft.com/office/drawing/2010/main" w="9525">
+              <a14:hiddenLine xmlns="" xmlns:a14="http://schemas.microsoft.com/office/drawing/2010/main" w="9525">
                 <a:solidFill>
                   <a:srgbClr val="000000"/>
                 </a:solidFill>
@@ -7589,7 +7560,7 @@
     </p:spTree>
     <p:extLst>
       <p:ext uri="{BB962C8B-B14F-4D97-AF65-F5344CB8AC3E}">
-        <p14:creationId xmlns:p14="http://schemas.microsoft.com/office/powerpoint/2010/main" val="1759617674"/>
+        <p14:creationId xmlns="" xmlns:p14="http://schemas.microsoft.com/office/powerpoint/2010/main" val="1759617674"/>
       </p:ext>
     </p:extLst>
   </p:cSld>
@@ -7625,6 +7596,1059 @@
       </p:grpSpPr>
       <p:sp>
         <p:nvSpPr>
+          <p:cNvPr id="62" name="Rounded Rectangle 7"/>
+          <p:cNvSpPr/>
+          <p:nvPr/>
+        </p:nvSpPr>
+        <p:spPr bwMode="auto">
+          <a:xfrm>
+            <a:off x="179512" y="1556792"/>
+            <a:ext cx="8784976" cy="4680520"/>
+          </a:xfrm>
+          <a:prstGeom prst="roundRect">
+            <a:avLst>
+              <a:gd name="adj" fmla="val 13985"/>
+            </a:avLst>
+          </a:prstGeom>
+          <a:solidFill>
+            <a:srgbClr val="292929"/>
+          </a:solidFill>
+          <a:ln w="9525" cap="flat" cmpd="sng" algn="ctr">
+            <a:noFill/>
+            <a:prstDash val="solid"/>
+            <a:round/>
+            <a:headEnd type="none" w="med" len="med"/>
+            <a:tailEnd type="none" w="med" len="med"/>
+          </a:ln>
+          <a:effectLst>
+            <a:innerShdw blurRad="114300">
+              <a:prstClr val="black"/>
+            </a:innerShdw>
+          </a:effectLst>
+        </p:spPr>
+        <p:txBody>
+          <a:bodyPr vert="horz" wrap="square" lIns="91440" tIns="45720" rIns="91440" bIns="45720" numCol="1" rtlCol="0" anchor="t" anchorCtr="0" compatLnSpc="1">
+            <a:prstTxWarp prst="textNoShape">
+              <a:avLst/>
+            </a:prstTxWarp>
+          </a:bodyPr>
+          <a:lstStyle/>
+          <a:p>
+            <a:pPr algn="r" eaLnBrk="0" fontAlgn="base" hangingPunct="0">
+              <a:spcBef>
+                <a:spcPct val="0"/>
+              </a:spcBef>
+              <a:spcAft>
+                <a:spcPct val="0"/>
+              </a:spcAft>
+            </a:pPr>
+            <a:endParaRPr lang="de-DE" sz="2000">
+              <a:latin typeface="Arial" pitchFamily="34" charset="0"/>
+            </a:endParaRPr>
+          </a:p>
+        </p:txBody>
+      </p:sp>
+      <p:sp>
+        <p:nvSpPr>
+          <p:cNvPr id="2" name="Tytuł 1"/>
+          <p:cNvSpPr>
+            <a:spLocks noGrp="1"/>
+          </p:cNvSpPr>
+          <p:nvPr>
+            <p:ph type="title"/>
+          </p:nvPr>
+        </p:nvSpPr>
+        <p:spPr/>
+        <p:txBody>
+          <a:bodyPr/>
+          <a:lstStyle/>
+          <a:p>
+            <a:r>
+              <a:rPr lang="de-DE" smtClean="0">
+                <a:solidFill>
+                  <a:schemeClr val="bg1"/>
+                </a:solidFill>
+              </a:rPr>
+              <a:t>Technology Stack</a:t>
+            </a:r>
+            <a:endParaRPr lang="pl-PL" dirty="0">
+              <a:solidFill>
+                <a:schemeClr val="bg1"/>
+              </a:solidFill>
+            </a:endParaRPr>
+          </a:p>
+        </p:txBody>
+      </p:sp>
+      <p:sp>
+        <p:nvSpPr>
+          <p:cNvPr id="4" name="Symbol zastępczy daty 3"/>
+          <p:cNvSpPr>
+            <a:spLocks noGrp="1"/>
+          </p:cNvSpPr>
+          <p:nvPr>
+            <p:ph type="dt" sz="half" idx="10"/>
+          </p:nvPr>
+        </p:nvSpPr>
+        <p:spPr/>
+        <p:txBody>
+          <a:bodyPr/>
+          <a:lstStyle/>
+          <a:p>
+            <a:r>
+              <a:rPr lang="pl-PL" dirty="0" smtClean="0"/>
+              <a:t>19</a:t>
+            </a:r>
+            <a:r>
+              <a:rPr lang="de-DE" dirty="0" smtClean="0"/>
+              <a:t>.11.2012</a:t>
+            </a:r>
+            <a:endParaRPr lang="de-DE" dirty="0"/>
+          </a:p>
+        </p:txBody>
+      </p:sp>
+      <p:sp>
+        <p:nvSpPr>
+          <p:cNvPr id="5" name="Symbol zastępczy stopki 4"/>
+          <p:cNvSpPr>
+            <a:spLocks noGrp="1"/>
+          </p:cNvSpPr>
+          <p:nvPr>
+            <p:ph type="ftr" sz="quarter" idx="11"/>
+          </p:nvPr>
+        </p:nvSpPr>
+        <p:spPr/>
+        <p:txBody>
+          <a:bodyPr/>
+          <a:lstStyle/>
+          <a:p>
+            <a:r>
+              <a:rPr lang="de-DE" dirty="0" smtClean="0"/>
+              <a:t>Master Lab </a:t>
+            </a:r>
+            <a:r>
+              <a:rPr lang="de-DE" dirty="0" err="1" smtClean="0"/>
+              <a:t>Course</a:t>
+            </a:r>
+            <a:r>
+              <a:rPr lang="de-DE" dirty="0" smtClean="0"/>
+              <a:t> Web </a:t>
+            </a:r>
+            <a:r>
+              <a:rPr lang="de-DE" dirty="0" err="1" smtClean="0"/>
+              <a:t>Applications</a:t>
+            </a:r>
+            <a:endParaRPr lang="de-DE" dirty="0"/>
+          </a:p>
+        </p:txBody>
+      </p:sp>
+      <p:sp>
+        <p:nvSpPr>
+          <p:cNvPr id="6" name="Symbol zastępczy numeru slajdu 5"/>
+          <p:cNvSpPr>
+            <a:spLocks noGrp="1"/>
+          </p:cNvSpPr>
+          <p:nvPr>
+            <p:ph type="sldNum" sz="quarter" idx="12"/>
+          </p:nvPr>
+        </p:nvSpPr>
+        <p:spPr/>
+        <p:txBody>
+          <a:bodyPr/>
+          <a:lstStyle/>
+          <a:p>
+            <a:fld id="{121E5A8C-2088-45D2-9D84-10B3EA412A4C}" type="slidenum">
+              <a:rPr lang="de-DE" smtClean="0"/>
+              <a:pPr/>
+              <a:t>5</a:t>
+            </a:fld>
+            <a:endParaRPr lang="de-DE" dirty="0"/>
+          </a:p>
+        </p:txBody>
+      </p:sp>
+      <p:sp>
+        <p:nvSpPr>
+          <p:cNvPr id="13" name="Flussdiagramm: Magnetplattenspeicher 12"/>
+          <p:cNvSpPr/>
+          <p:nvPr/>
+        </p:nvSpPr>
+        <p:spPr bwMode="auto">
+          <a:xfrm>
+            <a:off x="2303748" y="5013176"/>
+            <a:ext cx="4536504" cy="1152128"/>
+          </a:xfrm>
+          <a:prstGeom prst="flowChartMagneticDisk">
+            <a:avLst/>
+          </a:prstGeom>
+          <a:solidFill>
+            <a:srgbClr val="292929"/>
+          </a:solidFill>
+          <a:ln w="25400" cap="flat" cmpd="sng" algn="ctr">
+            <a:solidFill>
+              <a:schemeClr val="bg1"/>
+            </a:solidFill>
+            <a:prstDash val="solid"/>
+            <a:round/>
+            <a:headEnd type="none" w="med" len="med"/>
+            <a:tailEnd type="none" w="med" len="med"/>
+          </a:ln>
+          <a:effectLst>
+            <a:outerShdw blurRad="50800" dist="38100" dir="18900000" algn="bl" rotWithShape="0">
+              <a:prstClr val="black">
+                <a:alpha val="40000"/>
+              </a:prstClr>
+            </a:outerShdw>
+          </a:effectLst>
+        </p:spPr>
+        <p:txBody>
+          <a:bodyPr vert="horz" wrap="square" lIns="91440" tIns="45720" rIns="91440" bIns="45720" numCol="1" rtlCol="0" anchor="ctr" anchorCtr="0" compatLnSpc="1">
+            <a:prstTxWarp prst="textNoShape">
+              <a:avLst/>
+            </a:prstTxWarp>
+          </a:bodyPr>
+          <a:lstStyle/>
+          <a:p>
+            <a:pPr marR="0" indent="0" algn="ctr" eaLnBrk="0" fontAlgn="base" hangingPunct="0">
+              <a:lnSpc>
+                <a:spcPct val="100000"/>
+              </a:lnSpc>
+              <a:spcBef>
+                <a:spcPct val="0"/>
+              </a:spcBef>
+              <a:spcAft>
+                <a:spcPct val="0"/>
+              </a:spcAft>
+              <a:buClrTx/>
+              <a:buSzTx/>
+              <a:buFontTx/>
+              <a:buNone/>
+              <a:tabLst/>
+            </a:pPr>
+            <a:endParaRPr lang="de-DE" sz="2000" smtClean="0">
+              <a:solidFill>
+                <a:schemeClr val="bg1"/>
+              </a:solidFill>
+              <a:latin typeface="Arial" pitchFamily="34" charset="0"/>
+            </a:endParaRPr>
+          </a:p>
+        </p:txBody>
+      </p:sp>
+      <p:pic>
+        <p:nvPicPr>
+          <p:cNvPr id="2051" name="Picture 3" descr="G:\WebAppLab\pi-puppids\docs\PoweredMongoDBgreen50.png"/>
+          <p:cNvPicPr>
+            <a:picLocks noChangeAspect="1" noChangeArrowheads="1"/>
+          </p:cNvPicPr>
+          <p:nvPr/>
+        </p:nvPicPr>
+        <p:blipFill>
+          <a:blip r:embed="rId2" cstate="print"/>
+          <a:srcRect/>
+          <a:stretch>
+            <a:fillRect/>
+          </a:stretch>
+        </p:blipFill>
+        <p:spPr bwMode="auto">
+          <a:xfrm>
+            <a:off x="3752850" y="5470996"/>
+            <a:ext cx="1638300" cy="622300"/>
+          </a:xfrm>
+          <a:prstGeom prst="rect">
+            <a:avLst/>
+          </a:prstGeom>
+          <a:noFill/>
+        </p:spPr>
+      </p:pic>
+      <p:sp>
+        <p:nvSpPr>
+          <p:cNvPr id="21" name="Abgerundetes Rechteck 20"/>
+          <p:cNvSpPr/>
+          <p:nvPr/>
+        </p:nvSpPr>
+        <p:spPr bwMode="auto">
+          <a:xfrm>
+            <a:off x="2411760" y="4365104"/>
+            <a:ext cx="4320480" cy="360040"/>
+          </a:xfrm>
+          <a:prstGeom prst="roundRect">
+            <a:avLst/>
+          </a:prstGeom>
+          <a:solidFill>
+            <a:srgbClr val="292929"/>
+          </a:solidFill>
+          <a:ln w="25400" cap="flat" cmpd="sng" algn="ctr">
+            <a:solidFill>
+              <a:schemeClr val="bg1"/>
+            </a:solidFill>
+            <a:prstDash val="solid"/>
+            <a:round/>
+            <a:headEnd type="none" w="med" len="med"/>
+            <a:tailEnd type="none" w="med" len="med"/>
+          </a:ln>
+          <a:effectLst>
+            <a:outerShdw blurRad="50800" dist="38100" dir="18900000" algn="bl" rotWithShape="0">
+              <a:prstClr val="black">
+                <a:alpha val="40000"/>
+              </a:prstClr>
+            </a:outerShdw>
+          </a:effectLst>
+        </p:spPr>
+        <p:txBody>
+          <a:bodyPr vert="horz" wrap="square" lIns="91440" tIns="45720" rIns="91440" bIns="45720" numCol="1" rtlCol="0" anchor="ctr" anchorCtr="0" compatLnSpc="1">
+            <a:prstTxWarp prst="textNoShape">
+              <a:avLst/>
+            </a:prstTxWarp>
+          </a:bodyPr>
+          <a:lstStyle/>
+          <a:p>
+            <a:pPr algn="ctr" eaLnBrk="0" fontAlgn="base" hangingPunct="0">
+              <a:spcBef>
+                <a:spcPct val="0"/>
+              </a:spcBef>
+              <a:spcAft>
+                <a:spcPct val="0"/>
+              </a:spcAft>
+            </a:pPr>
+            <a:r>
+              <a:rPr lang="de-DE" sz="2000" dirty="0" err="1" smtClean="0">
+                <a:solidFill>
+                  <a:srgbClr val="FF9900"/>
+                </a:solidFill>
+                <a:effectLst>
+                  <a:outerShdw blurRad="50800" dist="50800" dir="5400000" algn="t" rotWithShape="0">
+                    <a:schemeClr val="tx1">
+                      <a:alpha val="50000"/>
+                    </a:schemeClr>
+                  </a:outerShdw>
+                </a:effectLst>
+                <a:ea typeface="ＭＳ Ｐゴシック" pitchFamily="-65" charset="-128"/>
+                <a:cs typeface="ＭＳ Ｐゴシック" pitchFamily="18" charset="-128"/>
+              </a:rPr>
+              <a:t>morphia</a:t>
+            </a:r>
+            <a:endParaRPr lang="de-DE" sz="2400" dirty="0" err="1" smtClean="0">
+              <a:solidFill>
+                <a:srgbClr val="FF9900"/>
+              </a:solidFill>
+              <a:effectLst>
+                <a:outerShdw blurRad="50800" dist="50800" dir="5400000" algn="t" rotWithShape="0">
+                  <a:schemeClr val="tx1">
+                    <a:alpha val="50000"/>
+                  </a:schemeClr>
+                </a:outerShdw>
+              </a:effectLst>
+              <a:ea typeface="ＭＳ Ｐゴシック" pitchFamily="-65" charset="-128"/>
+              <a:cs typeface="ＭＳ Ｐゴシック" pitchFamily="18" charset="-128"/>
+            </a:endParaRPr>
+          </a:p>
+        </p:txBody>
+      </p:sp>
+      <p:cxnSp>
+        <p:nvCxnSpPr>
+          <p:cNvPr id="25" name="Gerade Verbindung 24"/>
+          <p:cNvCxnSpPr/>
+          <p:nvPr/>
+        </p:nvCxnSpPr>
+        <p:spPr bwMode="auto">
+          <a:xfrm>
+            <a:off x="4572000" y="4797152"/>
+            <a:ext cx="0" cy="144016"/>
+          </a:xfrm>
+          <a:prstGeom prst="line">
+            <a:avLst/>
+          </a:prstGeom>
+          <a:solidFill>
+            <a:schemeClr val="accent1"/>
+          </a:solidFill>
+          <a:ln w="25400" cap="rnd" cmpd="sng" algn="ctr">
+            <a:solidFill>
+              <a:schemeClr val="bg1"/>
+            </a:solidFill>
+            <a:prstDash val="solid"/>
+            <a:round/>
+            <a:headEnd type="none" w="med" len="med"/>
+            <a:tailEnd type="none" w="med" len="med"/>
+          </a:ln>
+          <a:effectLst/>
+        </p:spPr>
+      </p:cxnSp>
+      <p:grpSp>
+        <p:nvGrpSpPr>
+          <p:cNvPr id="33" name="Gruppieren 32"/>
+          <p:cNvGrpSpPr/>
+          <p:nvPr/>
+        </p:nvGrpSpPr>
+        <p:grpSpPr>
+          <a:xfrm>
+            <a:off x="3563888" y="2996952"/>
+            <a:ext cx="2016224" cy="806490"/>
+            <a:chOff x="3563888" y="3140968"/>
+            <a:chExt cx="2016224" cy="806490"/>
+          </a:xfrm>
+        </p:grpSpPr>
+        <p:sp>
+          <p:nvSpPr>
+            <p:cNvPr id="28" name="Abgerundetes Rechteck 27"/>
+            <p:cNvSpPr/>
+            <p:nvPr/>
+          </p:nvSpPr>
+          <p:spPr bwMode="auto">
+            <a:xfrm>
+              <a:off x="3563888" y="3140968"/>
+              <a:ext cx="2016224" cy="806490"/>
+            </a:xfrm>
+            <a:prstGeom prst="roundRect">
+              <a:avLst/>
+            </a:prstGeom>
+            <a:solidFill>
+              <a:schemeClr val="bg1">
+                <a:lumMod val="95000"/>
+              </a:schemeClr>
+            </a:solidFill>
+            <a:ln>
+              <a:noFill/>
+            </a:ln>
+            <a:effectLst>
+              <a:outerShdw blurRad="190500" algn="tl" rotWithShape="0">
+                <a:srgbClr val="000000">
+                  <a:alpha val="70000"/>
+                </a:srgbClr>
+              </a:outerShdw>
+            </a:effectLst>
+          </p:spPr>
+          <p:txBody>
+            <a:bodyPr vert="horz" wrap="square" lIns="91440" tIns="45720" rIns="91440" bIns="45720" numCol="1" rtlCol="0" anchor="t" anchorCtr="0" compatLnSpc="1">
+              <a:prstTxWarp prst="textNoShape">
+                <a:avLst/>
+              </a:prstTxWarp>
+            </a:bodyPr>
+            <a:lstStyle/>
+            <a:p>
+              <a:pPr marL="0" marR="0" indent="0" algn="r" defTabSz="914400" rtl="0" eaLnBrk="0" fontAlgn="base" latinLnBrk="0" hangingPunct="0">
+                <a:lnSpc>
+                  <a:spcPct val="100000"/>
+                </a:lnSpc>
+                <a:spcBef>
+                  <a:spcPct val="0"/>
+                </a:spcBef>
+                <a:spcAft>
+                  <a:spcPct val="0"/>
+                </a:spcAft>
+                <a:buClrTx/>
+                <a:buSzTx/>
+                <a:buFontTx/>
+                <a:buNone/>
+                <a:tabLst/>
+              </a:pPr>
+              <a:endParaRPr kumimoji="0" lang="de-DE" sz="2000" b="0" i="0" u="none" strike="noStrike" cap="none" normalizeH="0" baseline="0" smtClean="0">
+                <a:ln>
+                  <a:noFill/>
+                </a:ln>
+                <a:solidFill>
+                  <a:schemeClr val="tx1"/>
+                </a:solidFill>
+                <a:effectLst/>
+                <a:latin typeface="Arial" pitchFamily="34" charset="0"/>
+              </a:endParaRPr>
+            </a:p>
+          </p:txBody>
+        </p:sp>
+        <p:pic>
+          <p:nvPicPr>
+            <p:cNvPr id="2052" name="Picture 4" descr="G:\WebAppLab\pi-puppids\docs\play.png"/>
+            <p:cNvPicPr>
+              <a:picLocks noChangeAspect="1" noChangeArrowheads="1"/>
+            </p:cNvPicPr>
+            <p:nvPr/>
+          </p:nvPicPr>
+          <p:blipFill>
+            <a:blip r:embed="rId3" cstate="print"/>
+            <a:srcRect/>
+            <a:stretch>
+              <a:fillRect/>
+            </a:stretch>
+          </p:blipFill>
+          <p:spPr bwMode="auto">
+            <a:xfrm>
+              <a:off x="3674457" y="3237884"/>
+              <a:ext cx="1795087" cy="612659"/>
+            </a:xfrm>
+            <a:prstGeom prst="rect">
+              <a:avLst/>
+            </a:prstGeom>
+            <a:noFill/>
+          </p:spPr>
+        </p:pic>
+      </p:grpSp>
+      <p:cxnSp>
+        <p:nvCxnSpPr>
+          <p:cNvPr id="30" name="Gerade Verbindung 29"/>
+          <p:cNvCxnSpPr/>
+          <p:nvPr/>
+        </p:nvCxnSpPr>
+        <p:spPr bwMode="auto">
+          <a:xfrm>
+            <a:off x="4572000" y="3861048"/>
+            <a:ext cx="0" cy="432048"/>
+          </a:xfrm>
+          <a:prstGeom prst="line">
+            <a:avLst/>
+          </a:prstGeom>
+          <a:solidFill>
+            <a:schemeClr val="accent1"/>
+          </a:solidFill>
+          <a:ln w="25400" cap="rnd" cmpd="sng" algn="ctr">
+            <a:solidFill>
+              <a:schemeClr val="bg1"/>
+            </a:solidFill>
+            <a:prstDash val="solid"/>
+            <a:round/>
+            <a:headEnd type="none" w="med" len="med"/>
+            <a:tailEnd type="none" w="med" len="med"/>
+          </a:ln>
+          <a:effectLst/>
+        </p:spPr>
+      </p:cxnSp>
+      <p:pic>
+        <p:nvPicPr>
+          <p:cNvPr id="2053" name="Picture 5" descr="G:\WebAppLab\pi-puppids\docs\bootstrap.png"/>
+          <p:cNvPicPr>
+            <a:picLocks noChangeAspect="1" noChangeArrowheads="1"/>
+          </p:cNvPicPr>
+          <p:nvPr/>
+        </p:nvPicPr>
+        <p:blipFill>
+          <a:blip r:embed="rId4" cstate="print"/>
+          <a:srcRect/>
+          <a:stretch>
+            <a:fillRect/>
+          </a:stretch>
+        </p:blipFill>
+        <p:spPr bwMode="auto">
+          <a:xfrm>
+            <a:off x="5076056" y="1631107"/>
+            <a:ext cx="717773" cy="717773"/>
+          </a:xfrm>
+          <a:prstGeom prst="rect">
+            <a:avLst/>
+          </a:prstGeom>
+          <a:ln>
+            <a:noFill/>
+          </a:ln>
+          <a:effectLst>
+            <a:outerShdw blurRad="190500" algn="tl" rotWithShape="0">
+              <a:srgbClr val="000000">
+                <a:alpha val="70000"/>
+              </a:srgbClr>
+            </a:outerShdw>
+          </a:effectLst>
+        </p:spPr>
+      </p:pic>
+      <p:pic>
+        <p:nvPicPr>
+          <p:cNvPr id="2055" name="Picture 7" descr="G:\WebAppLab\pi-puppids\docs\jqueryUi.png"/>
+          <p:cNvPicPr>
+            <a:picLocks noChangeAspect="1" noChangeArrowheads="1"/>
+          </p:cNvPicPr>
+          <p:nvPr/>
+        </p:nvPicPr>
+        <p:blipFill>
+          <a:blip r:embed="rId5" cstate="print"/>
+          <a:srcRect/>
+          <a:stretch>
+            <a:fillRect/>
+          </a:stretch>
+        </p:blipFill>
+        <p:spPr bwMode="auto">
+          <a:xfrm>
+            <a:off x="1187624" y="1694582"/>
+            <a:ext cx="1956081" cy="510282"/>
+          </a:xfrm>
+          <a:prstGeom prst="rect">
+            <a:avLst/>
+          </a:prstGeom>
+          <a:ln>
+            <a:noFill/>
+          </a:ln>
+          <a:effectLst>
+            <a:outerShdw blurRad="190500" algn="tl" rotWithShape="0">
+              <a:srgbClr val="000000">
+                <a:alpha val="70000"/>
+              </a:srgbClr>
+            </a:outerShdw>
+          </a:effectLst>
+        </p:spPr>
+      </p:pic>
+      <p:pic>
+        <p:nvPicPr>
+          <p:cNvPr id="2056" name="Picture 8" descr="G:\WebAppLab\pi-puppids\docs\pnotify.png"/>
+          <p:cNvPicPr>
+            <a:picLocks noChangeAspect="1" noChangeArrowheads="1"/>
+          </p:cNvPicPr>
+          <p:nvPr/>
+        </p:nvPicPr>
+        <p:blipFill>
+          <a:blip r:embed="rId6" cstate="print"/>
+          <a:srcRect/>
+          <a:stretch>
+            <a:fillRect/>
+          </a:stretch>
+        </p:blipFill>
+        <p:spPr bwMode="auto">
+          <a:xfrm>
+            <a:off x="3707904" y="1773064"/>
+            <a:ext cx="431800" cy="431800"/>
+          </a:xfrm>
+          <a:prstGeom prst="rect">
+            <a:avLst/>
+          </a:prstGeom>
+          <a:ln>
+            <a:noFill/>
+          </a:ln>
+          <a:effectLst>
+            <a:outerShdw blurRad="190500" algn="tl" rotWithShape="0">
+              <a:srgbClr val="000000">
+                <a:alpha val="70000"/>
+              </a:srgbClr>
+            </a:outerShdw>
+          </a:effectLst>
+        </p:spPr>
+      </p:pic>
+      <p:grpSp>
+        <p:nvGrpSpPr>
+          <p:cNvPr id="40" name="Gruppieren 39"/>
+          <p:cNvGrpSpPr/>
+          <p:nvPr/>
+        </p:nvGrpSpPr>
+        <p:grpSpPr>
+          <a:xfrm>
+            <a:off x="6156176" y="1700808"/>
+            <a:ext cx="2304256" cy="590466"/>
+            <a:chOff x="4788024" y="1628800"/>
+            <a:chExt cx="2304256" cy="590466"/>
+          </a:xfrm>
+        </p:grpSpPr>
+        <p:sp>
+          <p:nvSpPr>
+            <p:cNvPr id="38" name="Abgerundetes Rechteck 37"/>
+            <p:cNvSpPr/>
+            <p:nvPr/>
+          </p:nvSpPr>
+          <p:spPr bwMode="auto">
+            <a:xfrm>
+              <a:off x="4788024" y="1628800"/>
+              <a:ext cx="2304256" cy="590466"/>
+            </a:xfrm>
+            <a:prstGeom prst="roundRect">
+              <a:avLst/>
+            </a:prstGeom>
+            <a:solidFill>
+              <a:schemeClr val="bg1">
+                <a:lumMod val="95000"/>
+              </a:schemeClr>
+            </a:solidFill>
+            <a:ln>
+              <a:noFill/>
+            </a:ln>
+            <a:effectLst>
+              <a:outerShdw blurRad="190500" algn="tl" rotWithShape="0">
+                <a:srgbClr val="000000">
+                  <a:alpha val="70000"/>
+                </a:srgbClr>
+              </a:outerShdw>
+            </a:effectLst>
+          </p:spPr>
+          <p:txBody>
+            <a:bodyPr vert="horz" wrap="square" lIns="91440" tIns="45720" rIns="91440" bIns="45720" numCol="1" rtlCol="0" anchor="t" anchorCtr="0" compatLnSpc="1">
+              <a:prstTxWarp prst="textNoShape">
+                <a:avLst/>
+              </a:prstTxWarp>
+            </a:bodyPr>
+            <a:lstStyle/>
+            <a:p>
+              <a:pPr marL="0" marR="0" indent="0" algn="r" defTabSz="914400" rtl="0" eaLnBrk="0" fontAlgn="base" latinLnBrk="0" hangingPunct="0">
+                <a:lnSpc>
+                  <a:spcPct val="100000"/>
+                </a:lnSpc>
+                <a:spcBef>
+                  <a:spcPct val="0"/>
+                </a:spcBef>
+                <a:spcAft>
+                  <a:spcPct val="0"/>
+                </a:spcAft>
+                <a:buClrTx/>
+                <a:buSzTx/>
+                <a:buFontTx/>
+                <a:buNone/>
+                <a:tabLst/>
+              </a:pPr>
+              <a:endParaRPr kumimoji="0" lang="de-DE" sz="2000" b="0" i="0" u="none" strike="noStrike" cap="none" normalizeH="0" baseline="0" smtClean="0">
+                <a:ln>
+                  <a:noFill/>
+                </a:ln>
+                <a:solidFill>
+                  <a:schemeClr val="tx1"/>
+                </a:solidFill>
+                <a:effectLst/>
+                <a:latin typeface="Arial" pitchFamily="34" charset="0"/>
+              </a:endParaRPr>
+            </a:p>
+          </p:txBody>
+        </p:sp>
+        <p:pic>
+          <p:nvPicPr>
+            <p:cNvPr id="2054" name="Picture 6" descr="G:\WebAppLab\pi-puppids\docs\coffescript.png"/>
+            <p:cNvPicPr>
+              <a:picLocks noChangeAspect="1" noChangeArrowheads="1"/>
+            </p:cNvPicPr>
+            <p:nvPr/>
+          </p:nvPicPr>
+          <p:blipFill>
+            <a:blip r:embed="rId7" cstate="print"/>
+            <a:srcRect/>
+            <a:stretch>
+              <a:fillRect/>
+            </a:stretch>
+          </p:blipFill>
+          <p:spPr bwMode="auto">
+            <a:xfrm>
+              <a:off x="4868590" y="1685908"/>
+              <a:ext cx="2143125" cy="476250"/>
+            </a:xfrm>
+            <a:prstGeom prst="rect">
+              <a:avLst/>
+            </a:prstGeom>
+            <a:noFill/>
+          </p:spPr>
+        </p:pic>
+      </p:grpSp>
+      <p:sp>
+        <p:nvSpPr>
+          <p:cNvPr id="41" name="Abgerundetes Rechteck 40"/>
+          <p:cNvSpPr/>
+          <p:nvPr/>
+        </p:nvSpPr>
+        <p:spPr bwMode="auto">
+          <a:xfrm>
+            <a:off x="6444208" y="3182496"/>
+            <a:ext cx="1008112" cy="432048"/>
+          </a:xfrm>
+          <a:prstGeom prst="roundRect">
+            <a:avLst/>
+          </a:prstGeom>
+          <a:solidFill>
+            <a:srgbClr val="292929"/>
+          </a:solidFill>
+          <a:ln w="25400" cap="flat" cmpd="sng" algn="ctr">
+            <a:solidFill>
+              <a:schemeClr val="bg1"/>
+            </a:solidFill>
+            <a:prstDash val="solid"/>
+            <a:round/>
+            <a:headEnd type="none" w="med" len="med"/>
+            <a:tailEnd type="none" w="med" len="med"/>
+          </a:ln>
+          <a:effectLst>
+            <a:outerShdw blurRad="50800" dist="38100" dir="18900000" algn="bl" rotWithShape="0">
+              <a:prstClr val="black">
+                <a:alpha val="40000"/>
+              </a:prstClr>
+            </a:outerShdw>
+          </a:effectLst>
+        </p:spPr>
+        <p:txBody>
+          <a:bodyPr vert="horz" wrap="square" lIns="91440" tIns="45720" rIns="91440" bIns="45720" numCol="1" rtlCol="0" anchor="ctr" anchorCtr="0" compatLnSpc="1">
+            <a:prstTxWarp prst="textNoShape">
+              <a:avLst/>
+            </a:prstTxWarp>
+          </a:bodyPr>
+          <a:lstStyle/>
+          <a:p>
+            <a:pPr algn="ctr" eaLnBrk="0" fontAlgn="base" hangingPunct="0">
+              <a:spcBef>
+                <a:spcPct val="0"/>
+              </a:spcBef>
+              <a:spcAft>
+                <a:spcPct val="0"/>
+              </a:spcAft>
+            </a:pPr>
+            <a:r>
+              <a:rPr lang="de-DE" sz="2000" dirty="0" err="1" smtClean="0">
+                <a:solidFill>
+                  <a:srgbClr val="FF9900"/>
+                </a:solidFill>
+                <a:effectLst>
+                  <a:outerShdw blurRad="50800" dist="50800" dir="5400000" algn="t" rotWithShape="0">
+                    <a:schemeClr val="tx1">
+                      <a:alpha val="50000"/>
+                    </a:schemeClr>
+                  </a:outerShdw>
+                </a:effectLst>
+                <a:ea typeface="ＭＳ Ｐゴシック" pitchFamily="-65" charset="-128"/>
+                <a:cs typeface="ＭＳ Ｐゴシック" pitchFamily="18" charset="-128"/>
+              </a:rPr>
+              <a:t>G</a:t>
+            </a:r>
+            <a:r>
+              <a:rPr lang="de-DE" sz="2000" smtClean="0">
+                <a:solidFill>
+                  <a:srgbClr val="FF9900"/>
+                </a:solidFill>
+                <a:effectLst>
+                  <a:outerShdw blurRad="50800" dist="50800" dir="5400000" algn="t" rotWithShape="0">
+                    <a:schemeClr val="tx1">
+                      <a:alpha val="50000"/>
+                    </a:schemeClr>
+                  </a:outerShdw>
+                </a:effectLst>
+                <a:ea typeface="ＭＳ Ｐゴシック" pitchFamily="-65" charset="-128"/>
+                <a:cs typeface="ＭＳ Ｐゴシック" pitchFamily="18" charset="-128"/>
+              </a:rPr>
+              <a:t>uice</a:t>
+            </a:r>
+          </a:p>
+        </p:txBody>
+      </p:sp>
+      <p:cxnSp>
+        <p:nvCxnSpPr>
+          <p:cNvPr id="43" name="Gerade Verbindung 42"/>
+          <p:cNvCxnSpPr>
+            <a:stCxn id="2055" idx="2"/>
+          </p:cNvCxnSpPr>
+          <p:nvPr/>
+        </p:nvCxnSpPr>
+        <p:spPr bwMode="auto">
+          <a:xfrm>
+            <a:off x="2165665" y="2204864"/>
+            <a:ext cx="1398223" cy="792088"/>
+          </a:xfrm>
+          <a:prstGeom prst="line">
+            <a:avLst/>
+          </a:prstGeom>
+          <a:solidFill>
+            <a:schemeClr val="accent1"/>
+          </a:solidFill>
+          <a:ln w="25400" cap="rnd" cmpd="sng" algn="ctr">
+            <a:solidFill>
+              <a:schemeClr val="bg1"/>
+            </a:solidFill>
+            <a:prstDash val="solid"/>
+            <a:round/>
+            <a:headEnd type="none" w="med" len="med"/>
+            <a:tailEnd type="none" w="med" len="med"/>
+          </a:ln>
+          <a:effectLst/>
+        </p:spPr>
+      </p:cxnSp>
+      <p:cxnSp>
+        <p:nvCxnSpPr>
+          <p:cNvPr id="46" name="Gerade Verbindung 45"/>
+          <p:cNvCxnSpPr/>
+          <p:nvPr/>
+        </p:nvCxnSpPr>
+        <p:spPr bwMode="auto">
+          <a:xfrm>
+            <a:off x="3923928" y="2276872"/>
+            <a:ext cx="144016" cy="648072"/>
+          </a:xfrm>
+          <a:prstGeom prst="line">
+            <a:avLst/>
+          </a:prstGeom>
+          <a:solidFill>
+            <a:schemeClr val="accent1"/>
+          </a:solidFill>
+          <a:ln w="25400" cap="rnd" cmpd="sng" algn="ctr">
+            <a:solidFill>
+              <a:schemeClr val="bg1"/>
+            </a:solidFill>
+            <a:prstDash val="solid"/>
+            <a:round/>
+            <a:headEnd type="none" w="med" len="med"/>
+            <a:tailEnd type="none" w="med" len="med"/>
+          </a:ln>
+          <a:effectLst/>
+        </p:spPr>
+      </p:cxnSp>
+      <p:cxnSp>
+        <p:nvCxnSpPr>
+          <p:cNvPr id="49" name="Gerade Verbindung 48"/>
+          <p:cNvCxnSpPr/>
+          <p:nvPr/>
+        </p:nvCxnSpPr>
+        <p:spPr bwMode="auto">
+          <a:xfrm flipH="1">
+            <a:off x="5076058" y="2420888"/>
+            <a:ext cx="216022" cy="504056"/>
+          </a:xfrm>
+          <a:prstGeom prst="line">
+            <a:avLst/>
+          </a:prstGeom>
+          <a:solidFill>
+            <a:schemeClr val="accent1"/>
+          </a:solidFill>
+          <a:ln w="25400" cap="rnd" cmpd="sng" algn="ctr">
+            <a:solidFill>
+              <a:schemeClr val="bg1"/>
+            </a:solidFill>
+            <a:prstDash val="solid"/>
+            <a:round/>
+            <a:headEnd type="none" w="med" len="med"/>
+            <a:tailEnd type="none" w="med" len="med"/>
+          </a:ln>
+          <a:effectLst/>
+        </p:spPr>
+      </p:cxnSp>
+      <p:cxnSp>
+        <p:nvCxnSpPr>
+          <p:cNvPr id="52" name="Gerade Verbindung 51"/>
+          <p:cNvCxnSpPr/>
+          <p:nvPr/>
+        </p:nvCxnSpPr>
+        <p:spPr bwMode="auto">
+          <a:xfrm flipH="1">
+            <a:off x="5580112" y="2348880"/>
+            <a:ext cx="720080" cy="648072"/>
+          </a:xfrm>
+          <a:prstGeom prst="line">
+            <a:avLst/>
+          </a:prstGeom>
+          <a:solidFill>
+            <a:schemeClr val="accent1"/>
+          </a:solidFill>
+          <a:ln w="25400" cap="rnd" cmpd="sng" algn="ctr">
+            <a:solidFill>
+              <a:schemeClr val="bg1"/>
+            </a:solidFill>
+            <a:prstDash val="solid"/>
+            <a:round/>
+            <a:headEnd type="none" w="med" len="med"/>
+            <a:tailEnd type="none" w="med" len="med"/>
+          </a:ln>
+          <a:effectLst/>
+        </p:spPr>
+      </p:cxnSp>
+      <p:cxnSp>
+        <p:nvCxnSpPr>
+          <p:cNvPr id="55" name="Gerade Verbindung 54"/>
+          <p:cNvCxnSpPr/>
+          <p:nvPr/>
+        </p:nvCxnSpPr>
+        <p:spPr bwMode="auto">
+          <a:xfrm flipH="1">
+            <a:off x="5652120" y="3419476"/>
+            <a:ext cx="720080" cy="0"/>
+          </a:xfrm>
+          <a:prstGeom prst="line">
+            <a:avLst/>
+          </a:prstGeom>
+          <a:solidFill>
+            <a:schemeClr val="accent1"/>
+          </a:solidFill>
+          <a:ln w="25400" cap="rnd" cmpd="sng" algn="ctr">
+            <a:solidFill>
+              <a:schemeClr val="bg1"/>
+            </a:solidFill>
+            <a:prstDash val="solid"/>
+            <a:round/>
+            <a:headEnd type="none" w="med" len="med"/>
+            <a:tailEnd type="none" w="med" len="med"/>
+          </a:ln>
+          <a:effectLst/>
+        </p:spPr>
+      </p:cxnSp>
+      <p:pic>
+        <p:nvPicPr>
+          <p:cNvPr id="2057" name="Picture 9" descr="G:\WebAppLab\pi-puppids\docs\akka.png"/>
+          <p:cNvPicPr>
+            <a:picLocks noChangeAspect="1" noChangeArrowheads="1"/>
+          </p:cNvPicPr>
+          <p:nvPr/>
+        </p:nvPicPr>
+        <p:blipFill>
+          <a:blip r:embed="rId8" cstate="print"/>
+          <a:srcRect/>
+          <a:stretch>
+            <a:fillRect/>
+          </a:stretch>
+        </p:blipFill>
+        <p:spPr bwMode="auto">
+          <a:xfrm>
+            <a:off x="1763688" y="3019812"/>
+            <a:ext cx="954081" cy="763265"/>
+          </a:xfrm>
+          <a:prstGeom prst="rect">
+            <a:avLst/>
+          </a:prstGeom>
+          <a:noFill/>
+        </p:spPr>
+      </p:pic>
+      <p:cxnSp>
+        <p:nvCxnSpPr>
+          <p:cNvPr id="59" name="Gerade Verbindung 58"/>
+          <p:cNvCxnSpPr/>
+          <p:nvPr/>
+        </p:nvCxnSpPr>
+        <p:spPr bwMode="auto">
+          <a:xfrm flipH="1">
+            <a:off x="2725983" y="3390326"/>
+            <a:ext cx="792089" cy="0"/>
+          </a:xfrm>
+          <a:prstGeom prst="line">
+            <a:avLst/>
+          </a:prstGeom>
+          <a:solidFill>
+            <a:schemeClr val="accent1"/>
+          </a:solidFill>
+          <a:ln w="25400" cap="rnd" cmpd="sng" algn="ctr">
+            <a:solidFill>
+              <a:schemeClr val="bg1"/>
+            </a:solidFill>
+            <a:prstDash val="solid"/>
+            <a:round/>
+            <a:headEnd type="none" w="med" len="med"/>
+            <a:tailEnd type="none" w="med" len="med"/>
+          </a:ln>
+          <a:effectLst/>
+        </p:spPr>
+      </p:cxnSp>
+    </p:spTree>
+    <p:extLst>
+      <p:ext uri="{BB962C8B-B14F-4D97-AF65-F5344CB8AC3E}">
+        <p14:creationId xmlns="" xmlns:p14="http://schemas.microsoft.com/office/powerpoint/2010/main" val="1759617674"/>
+      </p:ext>
+    </p:extLst>
+  </p:cSld>
+  <p:clrMapOvr>
+    <a:masterClrMapping/>
+  </p:clrMapOvr>
+  <p:timing>
+    <p:tnLst>
+      <p:par>
+        <p:cTn id="1" dur="indefinite" restart="never" nodeType="tmRoot"/>
+      </p:par>
+    </p:tnLst>
+  </p:timing>
+</p:sld>
+</file>
+
+<file path=ppt/slides/slide6.xml><?xml version="1.0" encoding="utf-8"?>
+<p:sld xmlns:a="http://schemas.openxmlformats.org/drawingml/2006/main" xmlns:r="http://schemas.openxmlformats.org/officeDocument/2006/relationships" xmlns:p="http://schemas.openxmlformats.org/presentationml/2006/main">
+  <p:cSld>
+    <p:spTree>
+      <p:nvGrpSpPr>
+        <p:cNvPr id="1" name=""/>
+        <p:cNvGrpSpPr/>
+        <p:nvPr/>
+      </p:nvGrpSpPr>
+      <p:grpSpPr>
+        <a:xfrm>
+          <a:off x="0" y="0"/>
+          <a:ext cx="0" cy="0"/>
+          <a:chOff x="0" y="0"/>
+          <a:chExt cx="0" cy="0"/>
+        </a:xfrm>
+      </p:grpSpPr>
+      <p:sp>
+        <p:nvSpPr>
           <p:cNvPr id="2" name="Tytuł 1"/>
           <p:cNvSpPr>
             <a:spLocks noGrp="1"/>
@@ -7724,7 +8748,7 @@
             <a:fld id="{121E5A8C-2088-45D2-9D84-10B3EA412A4C}" type="slidenum">
               <a:rPr lang="de-DE" smtClean="0"/>
               <a:pPr/>
-              <a:t>5</a:t>
+              <a:t>6</a:t>
             </a:fld>
             <a:endParaRPr lang="de-DE" dirty="0"/>
           </a:p>
@@ -7767,10 +8791,10 @@
           <p:nvPr/>
         </p:nvPicPr>
         <p:blipFill>
-          <a:blip r:embed="rId2">
+          <a:blip r:embed="rId2" cstate="print">
             <a:extLst>
               <a:ext uri="{28A0092B-C50C-407E-A947-70E740481C1C}">
-                <a14:useLocalDpi xmlns:a14="http://schemas.microsoft.com/office/drawing/2010/main" val="0"/>
+                <a14:useLocalDpi xmlns="" xmlns:a14="http://schemas.microsoft.com/office/drawing/2010/main" val="0"/>
               </a:ext>
             </a:extLst>
           </a:blip>
@@ -7795,14 +8819,14 @@
           </a:effectLst>
           <a:extLst>
             <a:ext uri="{909E8E84-426E-40DD-AFC4-6F175D3DCCD1}">
-              <a14:hiddenFill xmlns:a14="http://schemas.microsoft.com/office/drawing/2010/main">
+              <a14:hiddenFill xmlns="" xmlns:a14="http://schemas.microsoft.com/office/drawing/2010/main">
                 <a:solidFill>
                   <a:schemeClr val="accent1"/>
                 </a:solidFill>
               </a14:hiddenFill>
             </a:ext>
             <a:ext uri="{91240B29-F687-4F45-9708-019B960494DF}">
-              <a14:hiddenLine xmlns:a14="http://schemas.microsoft.com/office/drawing/2010/main" w="9525">
+              <a14:hiddenLine xmlns="" xmlns:a14="http://schemas.microsoft.com/office/drawing/2010/main" w="9525">
                 <a:solidFill>
                   <a:schemeClr val="tx1"/>
                 </a:solidFill>
@@ -7812,7 +8836,7 @@
               </a14:hiddenLine>
             </a:ext>
             <a:ext uri="{AF507438-7753-43E0-B8FC-AC1667EBCBE1}">
-              <a14:hiddenEffects xmlns:a14="http://schemas.microsoft.com/office/drawing/2010/main">
+              <a14:hiddenEffects xmlns="" xmlns:a14="http://schemas.microsoft.com/office/drawing/2010/main">
                 <a:effectLst>
                   <a:outerShdw dist="35921" dir="2700000" algn="ctr" rotWithShape="0">
                     <a:schemeClr val="bg2"/>
@@ -7832,10 +8856,10 @@
           <p:nvPr/>
         </p:nvPicPr>
         <p:blipFill>
-          <a:blip r:embed="rId3">
+          <a:blip r:embed="rId3" cstate="print">
             <a:extLst>
               <a:ext uri="{28A0092B-C50C-407E-A947-70E740481C1C}">
-                <a14:useLocalDpi xmlns:a14="http://schemas.microsoft.com/office/drawing/2010/main" val="0"/>
+                <a14:useLocalDpi xmlns="" xmlns:a14="http://schemas.microsoft.com/office/drawing/2010/main" val="0"/>
               </a:ext>
             </a:extLst>
           </a:blip>
@@ -7860,14 +8884,14 @@
           </a:effectLst>
           <a:extLst>
             <a:ext uri="{909E8E84-426E-40DD-AFC4-6F175D3DCCD1}">
-              <a14:hiddenFill xmlns:a14="http://schemas.microsoft.com/office/drawing/2010/main">
+              <a14:hiddenFill xmlns="" xmlns:a14="http://schemas.microsoft.com/office/drawing/2010/main">
                 <a:solidFill>
                   <a:schemeClr val="accent1"/>
                 </a:solidFill>
               </a14:hiddenFill>
             </a:ext>
             <a:ext uri="{91240B29-F687-4F45-9708-019B960494DF}">
-              <a14:hiddenLine xmlns:a14="http://schemas.microsoft.com/office/drawing/2010/main" w="9525">
+              <a14:hiddenLine xmlns="" xmlns:a14="http://schemas.microsoft.com/office/drawing/2010/main" w="9525">
                 <a:solidFill>
                   <a:schemeClr val="tx1"/>
                 </a:solidFill>
@@ -7877,7 +8901,7 @@
               </a14:hiddenLine>
             </a:ext>
             <a:ext uri="{AF507438-7753-43E0-B8FC-AC1667EBCBE1}">
-              <a14:hiddenEffects xmlns:a14="http://schemas.microsoft.com/office/drawing/2010/main">
+              <a14:hiddenEffects xmlns="" xmlns:a14="http://schemas.microsoft.com/office/drawing/2010/main">
                 <a:effectLst>
                   <a:outerShdw dist="35921" dir="2700000" algn="ctr" rotWithShape="0">
                     <a:schemeClr val="bg2"/>
@@ -7964,14 +8988,14 @@
           </a:ln>
           <a:extLst>
             <a:ext uri="{909E8E84-426E-40DD-AFC4-6F175D3DCCD1}">
-              <a14:hiddenFill xmlns:a14="http://schemas.microsoft.com/office/drawing/2010/main">
+              <a14:hiddenFill xmlns="" xmlns:a14="http://schemas.microsoft.com/office/drawing/2010/main">
                 <a:solidFill>
                   <a:srgbClr val="FFFFFF"/>
                 </a:solidFill>
               </a14:hiddenFill>
             </a:ext>
             <a:ext uri="{91240B29-F687-4F45-9708-019B960494DF}">
-              <a14:hiddenLine xmlns:a14="http://schemas.microsoft.com/office/drawing/2010/main" w="9525">
+              <a14:hiddenLine xmlns="" xmlns:a14="http://schemas.microsoft.com/office/drawing/2010/main" w="9525">
                 <a:solidFill>
                   <a:srgbClr val="000000"/>
                 </a:solidFill>
@@ -8249,6 +9273,567 @@
           </a:p>
         </p:txBody>
       </p:sp>
+    </p:spTree>
+  </p:cSld>
+  <p:clrMapOvr>
+    <a:masterClrMapping/>
+  </p:clrMapOvr>
+  <p:timing>
+    <p:tnLst>
+      <p:par>
+        <p:cTn id="1" dur="indefinite" restart="never" nodeType="tmRoot"/>
+      </p:par>
+    </p:tnLst>
+  </p:timing>
+</p:sld>
+</file>
+
+<file path=ppt/slides/slide7.xml><?xml version="1.0" encoding="utf-8"?>
+<p:sld xmlns:a="http://schemas.openxmlformats.org/drawingml/2006/main" xmlns:r="http://schemas.openxmlformats.org/officeDocument/2006/relationships" xmlns:p="http://schemas.openxmlformats.org/presentationml/2006/main">
+  <p:cSld>
+    <p:spTree>
+      <p:nvGrpSpPr>
+        <p:cNvPr id="1" name=""/>
+        <p:cNvGrpSpPr/>
+        <p:nvPr/>
+      </p:nvGrpSpPr>
+      <p:grpSpPr>
+        <a:xfrm>
+          <a:off x="0" y="0"/>
+          <a:ext cx="0" cy="0"/>
+          <a:chOff x="0" y="0"/>
+          <a:chExt cx="0" cy="0"/>
+        </a:xfrm>
+      </p:grpSpPr>
+      <p:sp>
+        <p:nvSpPr>
+          <p:cNvPr id="2" name="Tytuł 1"/>
+          <p:cNvSpPr>
+            <a:spLocks noGrp="1"/>
+          </p:cNvSpPr>
+          <p:nvPr>
+            <p:ph type="title"/>
+          </p:nvPr>
+        </p:nvSpPr>
+        <p:spPr>
+          <a:xfrm>
+            <a:off x="508000" y="914400"/>
+            <a:ext cx="7993090" cy="585774"/>
+          </a:xfrm>
+        </p:spPr>
+        <p:txBody>
+          <a:bodyPr/>
+          <a:lstStyle/>
+          <a:p>
+            <a:r>
+              <a:rPr lang="de-DE" dirty="0" err="1" smtClean="0">
+                <a:solidFill>
+                  <a:schemeClr val="bg1"/>
+                </a:solidFill>
+              </a:rPr>
+              <a:t>Use</a:t>
+            </a:r>
+            <a:r>
+              <a:rPr lang="de-DE" dirty="0" smtClean="0">
+                <a:solidFill>
+                  <a:schemeClr val="bg1"/>
+                </a:solidFill>
+              </a:rPr>
+              <a:t> Case </a:t>
+            </a:r>
+            <a:r>
+              <a:rPr lang="de-DE" smtClean="0">
+                <a:solidFill>
+                  <a:schemeClr val="bg1"/>
+                </a:solidFill>
+              </a:rPr>
+              <a:t>– Build Units</a:t>
+            </a:r>
+            <a:endParaRPr lang="pl-PL" dirty="0">
+              <a:solidFill>
+                <a:schemeClr val="bg1"/>
+              </a:solidFill>
+            </a:endParaRPr>
+          </a:p>
+        </p:txBody>
+      </p:sp>
+      <p:sp>
+        <p:nvSpPr>
+          <p:cNvPr id="5" name="Symbol zastępczy stopki 4"/>
+          <p:cNvSpPr>
+            <a:spLocks noGrp="1"/>
+          </p:cNvSpPr>
+          <p:nvPr>
+            <p:ph type="ftr" sz="quarter" idx="11"/>
+          </p:nvPr>
+        </p:nvSpPr>
+        <p:spPr/>
+        <p:txBody>
+          <a:bodyPr/>
+          <a:lstStyle/>
+          <a:p>
+            <a:r>
+              <a:rPr lang="de-DE" smtClean="0"/>
+              <a:t>Master Lab Course Web Applications</a:t>
+            </a:r>
+            <a:endParaRPr lang="de-DE" dirty="0"/>
+          </a:p>
+        </p:txBody>
+      </p:sp>
+      <p:sp>
+        <p:nvSpPr>
+          <p:cNvPr id="6" name="Symbol zastępczy numeru slajdu 5"/>
+          <p:cNvSpPr>
+            <a:spLocks noGrp="1"/>
+          </p:cNvSpPr>
+          <p:nvPr>
+            <p:ph type="sldNum" sz="quarter" idx="12"/>
+          </p:nvPr>
+        </p:nvSpPr>
+        <p:spPr/>
+        <p:txBody>
+          <a:bodyPr/>
+          <a:lstStyle/>
+          <a:p>
+            <a:fld id="{121E5A8C-2088-45D2-9D84-10B3EA412A4C}" type="slidenum">
+              <a:rPr lang="de-DE" smtClean="0"/>
+              <a:pPr/>
+              <a:t>7</a:t>
+            </a:fld>
+            <a:endParaRPr lang="de-DE" dirty="0"/>
+          </a:p>
+        </p:txBody>
+      </p:sp>
+      <p:sp>
+        <p:nvSpPr>
+          <p:cNvPr id="8" name="Symbol zastępczy daty 3"/>
+          <p:cNvSpPr>
+            <a:spLocks noGrp="1"/>
+          </p:cNvSpPr>
+          <p:nvPr>
+            <p:ph type="dt" sz="half" idx="10"/>
+          </p:nvPr>
+        </p:nvSpPr>
+        <p:spPr>
+          <a:xfrm>
+            <a:off x="508000" y="6400800"/>
+            <a:ext cx="1905000" cy="304800"/>
+          </a:xfrm>
+        </p:spPr>
+        <p:txBody>
+          <a:bodyPr/>
+          <a:lstStyle/>
+          <a:p>
+            <a:r>
+              <a:rPr lang="de-DE" smtClean="0"/>
+              <a:t>25.02.2013</a:t>
+            </a:r>
+            <a:endParaRPr lang="de-DE" dirty="0"/>
+          </a:p>
+        </p:txBody>
+      </p:sp>
+      <p:sp>
+        <p:nvSpPr>
+          <p:cNvPr id="9" name="Rounded Rectangle 8"/>
+          <p:cNvSpPr/>
+          <p:nvPr/>
+        </p:nvSpPr>
+        <p:spPr bwMode="auto">
+          <a:xfrm>
+            <a:off x="395536" y="1556792"/>
+            <a:ext cx="8136904" cy="1513639"/>
+          </a:xfrm>
+          <a:prstGeom prst="roundRect">
+            <a:avLst>
+              <a:gd name="adj" fmla="val 13985"/>
+            </a:avLst>
+          </a:prstGeom>
+          <a:solidFill>
+            <a:srgbClr val="292929"/>
+          </a:solidFill>
+          <a:ln w="9525" cap="flat" cmpd="sng" algn="ctr">
+            <a:noFill/>
+            <a:prstDash val="solid"/>
+            <a:round/>
+            <a:headEnd type="none" w="med" len="med"/>
+            <a:tailEnd type="none" w="med" len="med"/>
+          </a:ln>
+          <a:effectLst>
+            <a:innerShdw blurRad="114300">
+              <a:prstClr val="black"/>
+            </a:innerShdw>
+          </a:effectLst>
+        </p:spPr>
+        <p:txBody>
+          <a:bodyPr vert="horz" wrap="square" lIns="91440" tIns="45720" rIns="91440" bIns="45720" numCol="1" rtlCol="0" anchor="t" anchorCtr="0" compatLnSpc="1">
+            <a:prstTxWarp prst="textNoShape">
+              <a:avLst/>
+            </a:prstTxWarp>
+          </a:bodyPr>
+          <a:lstStyle/>
+          <a:p>
+            <a:pPr algn="r" eaLnBrk="0" fontAlgn="base" hangingPunct="0">
+              <a:spcBef>
+                <a:spcPct val="0"/>
+              </a:spcBef>
+              <a:spcAft>
+                <a:spcPct val="0"/>
+              </a:spcAft>
+            </a:pPr>
+            <a:endParaRPr lang="de-DE" sz="2000">
+              <a:latin typeface="Arial" pitchFamily="34" charset="0"/>
+            </a:endParaRPr>
+          </a:p>
+        </p:txBody>
+      </p:sp>
+      <p:sp>
+        <p:nvSpPr>
+          <p:cNvPr id="10" name="Symbol zastępczy zawartości 2"/>
+          <p:cNvSpPr txBox="1">
+            <a:spLocks/>
+          </p:cNvSpPr>
+          <p:nvPr/>
+        </p:nvSpPr>
+        <p:spPr bwMode="auto">
+          <a:xfrm>
+            <a:off x="430968" y="1809555"/>
+            <a:ext cx="8101472" cy="1008112"/>
+          </a:xfrm>
+          <a:prstGeom prst="rect">
+            <a:avLst/>
+          </a:prstGeom>
+          <a:noFill/>
+          <a:ln>
+            <a:noFill/>
+          </a:ln>
+          <a:extLst>
+            <a:ext uri="{909E8E84-426E-40DD-AFC4-6F175D3DCCD1}">
+              <a14:hiddenFill xmlns="" xmlns:a14="http://schemas.microsoft.com/office/drawing/2010/main">
+                <a:solidFill>
+                  <a:srgbClr val="FFFFFF"/>
+                </a:solidFill>
+              </a14:hiddenFill>
+            </a:ext>
+            <a:ext uri="{91240B29-F687-4F45-9708-019B960494DF}">
+              <a14:hiddenLine xmlns="" xmlns:a14="http://schemas.microsoft.com/office/drawing/2010/main" w="9525">
+                <a:solidFill>
+                  <a:srgbClr val="000000"/>
+                </a:solidFill>
+                <a:miter lim="800000"/>
+                <a:headEnd/>
+                <a:tailEnd/>
+              </a14:hiddenLine>
+            </a:ext>
+          </a:extLst>
+        </p:spPr>
+        <p:txBody>
+          <a:bodyPr vert="horz" wrap="square" lIns="91440" tIns="45720" rIns="91440" bIns="45720" numCol="1" anchor="t" anchorCtr="0" compatLnSpc="1">
+            <a:prstTxWarp prst="textNoShape">
+              <a:avLst/>
+            </a:prstTxWarp>
+          </a:bodyPr>
+          <a:lstStyle>
+            <a:lvl1pPr marL="342900" indent="-342900" algn="l" rtl="0" eaLnBrk="1" fontAlgn="base" hangingPunct="1">
+              <a:spcBef>
+                <a:spcPct val="20000"/>
+              </a:spcBef>
+              <a:spcAft>
+                <a:spcPct val="0"/>
+              </a:spcAft>
+              <a:buChar char="•"/>
+              <a:defRPr sz="2400">
+                <a:solidFill>
+                  <a:schemeClr val="bg1"/>
+                </a:solidFill>
+                <a:latin typeface="+mn-lt"/>
+                <a:ea typeface="ＭＳ Ｐゴシック" pitchFamily="-65" charset="-128"/>
+                <a:cs typeface="ＭＳ Ｐゴシック" pitchFamily="18" charset="-128"/>
+              </a:defRPr>
+            </a:lvl1pPr>
+            <a:lvl2pPr marL="742950" indent="-285750" algn="l" rtl="0" eaLnBrk="1" fontAlgn="base" hangingPunct="1">
+              <a:spcBef>
+                <a:spcPct val="20000"/>
+              </a:spcBef>
+              <a:spcAft>
+                <a:spcPct val="0"/>
+              </a:spcAft>
+              <a:buChar char="–"/>
+              <a:defRPr sz="2000">
+                <a:solidFill>
+                  <a:schemeClr val="bg1"/>
+                </a:solidFill>
+                <a:latin typeface="+mn-lt"/>
+                <a:ea typeface="ＭＳ Ｐゴシック" pitchFamily="-65" charset="-128"/>
+              </a:defRPr>
+            </a:lvl2pPr>
+            <a:lvl3pPr marL="1143000" indent="-228600" algn="l" rtl="0" eaLnBrk="1" fontAlgn="base" hangingPunct="1">
+              <a:spcBef>
+                <a:spcPct val="20000"/>
+              </a:spcBef>
+              <a:spcAft>
+                <a:spcPct val="0"/>
+              </a:spcAft>
+              <a:buChar char="•"/>
+              <a:defRPr sz="2000">
+                <a:solidFill>
+                  <a:schemeClr val="bg1"/>
+                </a:solidFill>
+                <a:latin typeface="+mn-lt"/>
+                <a:ea typeface="ＭＳ Ｐゴシック" pitchFamily="-65" charset="-128"/>
+              </a:defRPr>
+            </a:lvl3pPr>
+            <a:lvl4pPr marL="1562100" indent="-228600" algn="l" rtl="0" eaLnBrk="1" fontAlgn="base" hangingPunct="1">
+              <a:spcBef>
+                <a:spcPct val="20000"/>
+              </a:spcBef>
+              <a:spcAft>
+                <a:spcPct val="0"/>
+              </a:spcAft>
+              <a:buChar char="–"/>
+              <a:defRPr sz="2000">
+                <a:solidFill>
+                  <a:schemeClr val="bg1"/>
+                </a:solidFill>
+                <a:latin typeface="+mn-lt"/>
+                <a:ea typeface="ＭＳ Ｐゴシック" pitchFamily="-65" charset="-128"/>
+              </a:defRPr>
+            </a:lvl4pPr>
+            <a:lvl5pPr marL="1981200" indent="-228600" algn="l" rtl="0" eaLnBrk="1" fontAlgn="base" hangingPunct="1">
+              <a:spcBef>
+                <a:spcPct val="20000"/>
+              </a:spcBef>
+              <a:spcAft>
+                <a:spcPct val="0"/>
+              </a:spcAft>
+              <a:buChar char="»"/>
+              <a:defRPr sz="2000">
+                <a:solidFill>
+                  <a:schemeClr val="bg1"/>
+                </a:solidFill>
+                <a:latin typeface="+mn-lt"/>
+                <a:ea typeface="ＭＳ Ｐゴシック" pitchFamily="-65" charset="-128"/>
+              </a:defRPr>
+            </a:lvl5pPr>
+            <a:lvl6pPr marL="2438400" indent="-228600" algn="l" rtl="0" eaLnBrk="1" fontAlgn="base" hangingPunct="1">
+              <a:spcBef>
+                <a:spcPct val="20000"/>
+              </a:spcBef>
+              <a:spcAft>
+                <a:spcPct val="0"/>
+              </a:spcAft>
+              <a:buChar char="»"/>
+              <a:defRPr sz="1400">
+                <a:solidFill>
+                  <a:schemeClr val="tx1"/>
+                </a:solidFill>
+                <a:latin typeface="+mn-lt"/>
+              </a:defRPr>
+            </a:lvl6pPr>
+            <a:lvl7pPr marL="2895600" indent="-228600" algn="l" rtl="0" eaLnBrk="1" fontAlgn="base" hangingPunct="1">
+              <a:spcBef>
+                <a:spcPct val="20000"/>
+              </a:spcBef>
+              <a:spcAft>
+                <a:spcPct val="0"/>
+              </a:spcAft>
+              <a:buChar char="»"/>
+              <a:defRPr sz="1400">
+                <a:solidFill>
+                  <a:schemeClr val="tx1"/>
+                </a:solidFill>
+                <a:latin typeface="+mn-lt"/>
+              </a:defRPr>
+            </a:lvl7pPr>
+            <a:lvl8pPr marL="3352800" indent="-228600" algn="l" rtl="0" eaLnBrk="1" fontAlgn="base" hangingPunct="1">
+              <a:spcBef>
+                <a:spcPct val="20000"/>
+              </a:spcBef>
+              <a:spcAft>
+                <a:spcPct val="0"/>
+              </a:spcAft>
+              <a:buChar char="»"/>
+              <a:defRPr sz="1400">
+                <a:solidFill>
+                  <a:schemeClr val="tx1"/>
+                </a:solidFill>
+                <a:latin typeface="+mn-lt"/>
+              </a:defRPr>
+            </a:lvl8pPr>
+            <a:lvl9pPr marL="3810000" indent="-228600" algn="l" rtl="0" eaLnBrk="1" fontAlgn="base" hangingPunct="1">
+              <a:spcBef>
+                <a:spcPct val="20000"/>
+              </a:spcBef>
+              <a:spcAft>
+                <a:spcPct val="0"/>
+              </a:spcAft>
+              <a:buChar char="»"/>
+              <a:defRPr sz="1400">
+                <a:solidFill>
+                  <a:schemeClr val="tx1"/>
+                </a:solidFill>
+                <a:latin typeface="+mn-lt"/>
+              </a:defRPr>
+            </a:lvl9pPr>
+          </a:lstStyle>
+          <a:p>
+            <a:pPr>
+              <a:lnSpc>
+                <a:spcPct val="115000"/>
+              </a:lnSpc>
+              <a:spcAft>
+                <a:spcPts val="0"/>
+              </a:spcAft>
+            </a:pPr>
+            <a:r>
+              <a:rPr lang="en-US" sz="1600" smtClean="0"/>
+              <a:t>Players can use their resources to </a:t>
+            </a:r>
+            <a:r>
+              <a:rPr lang="en-US" sz="1600" smtClean="0">
+                <a:solidFill>
+                  <a:srgbClr val="FF9900"/>
+                </a:solidFill>
+              </a:rPr>
+              <a:t>build</a:t>
+            </a:r>
+            <a:r>
+              <a:rPr lang="en-US" sz="1600" smtClean="0"/>
+              <a:t> units</a:t>
+            </a:r>
+          </a:p>
+          <a:p>
+            <a:pPr>
+              <a:lnSpc>
+                <a:spcPct val="115000"/>
+              </a:lnSpc>
+              <a:spcAft>
+                <a:spcPts val="0"/>
+              </a:spcAft>
+            </a:pPr>
+            <a:r>
+              <a:rPr lang="en-US" sz="1600" smtClean="0"/>
+              <a:t>Total amount of units is </a:t>
+            </a:r>
+            <a:r>
+              <a:rPr lang="en-US" sz="1600" smtClean="0">
+                <a:solidFill>
+                  <a:srgbClr val="FF9900"/>
+                </a:solidFill>
+              </a:rPr>
+              <a:t>limited</a:t>
+            </a:r>
+            <a:r>
+              <a:rPr lang="en-US" sz="1600" smtClean="0"/>
+              <a:t> by the </a:t>
+            </a:r>
+            <a:r>
+              <a:rPr lang="en-US" sz="1600" smtClean="0">
+                <a:solidFill>
+                  <a:srgbClr val="FF9900"/>
+                </a:solidFill>
+              </a:rPr>
+              <a:t>food</a:t>
+            </a:r>
+            <a:r>
+              <a:rPr lang="en-US" sz="1600" smtClean="0"/>
+              <a:t> resource</a:t>
+            </a:r>
+          </a:p>
+          <a:p>
+            <a:pPr>
+              <a:lnSpc>
+                <a:spcPct val="115000"/>
+              </a:lnSpc>
+              <a:spcAft>
+                <a:spcPts val="0"/>
+              </a:spcAft>
+            </a:pPr>
+            <a:r>
+              <a:rPr lang="en-US" sz="1600" smtClean="0"/>
+              <a:t>Units live until they </a:t>
+            </a:r>
+            <a:r>
+              <a:rPr lang="en-US" sz="1600" smtClean="0">
+                <a:solidFill>
+                  <a:srgbClr val="FF9900"/>
+                </a:solidFill>
+              </a:rPr>
+              <a:t>fail</a:t>
+            </a:r>
+            <a:r>
+              <a:rPr lang="en-US" sz="1600" smtClean="0"/>
+              <a:t> at a conquering attempt</a:t>
+            </a:r>
+            <a:endParaRPr lang="en-US" sz="1600" dirty="0" smtClean="0"/>
+          </a:p>
+        </p:txBody>
+      </p:sp>
+      <p:pic>
+        <p:nvPicPr>
+          <p:cNvPr id="1026" name="Picture 2" descr="G:\WebAppLab\pi-puppids\docs\buildUnits.png"/>
+          <p:cNvPicPr>
+            <a:picLocks noChangeAspect="1" noChangeArrowheads="1"/>
+          </p:cNvPicPr>
+          <p:nvPr/>
+        </p:nvPicPr>
+        <p:blipFill>
+          <a:blip r:embed="rId2" cstate="print"/>
+          <a:srcRect/>
+          <a:stretch>
+            <a:fillRect/>
+          </a:stretch>
+        </p:blipFill>
+        <p:spPr bwMode="auto">
+          <a:xfrm>
+            <a:off x="3347864" y="3212976"/>
+            <a:ext cx="5328592" cy="2961314"/>
+          </a:xfrm>
+          <a:prstGeom prst="rect">
+            <a:avLst/>
+          </a:prstGeom>
+          <a:ln>
+            <a:noFill/>
+          </a:ln>
+          <a:effectLst>
+            <a:softEdge rad="112500"/>
+          </a:effectLst>
+        </p:spPr>
+      </p:pic>
+      <p:pic>
+        <p:nvPicPr>
+          <p:cNvPr id="1028" name="Picture 4" descr="G:\WebAppLab\pi-puppids\docs\unitTab.png"/>
+          <p:cNvPicPr>
+            <a:picLocks noChangeAspect="1" noChangeArrowheads="1"/>
+          </p:cNvPicPr>
+          <p:nvPr/>
+        </p:nvPicPr>
+        <p:blipFill>
+          <a:blip r:embed="rId3" cstate="print"/>
+          <a:srcRect/>
+          <a:stretch>
+            <a:fillRect/>
+          </a:stretch>
+        </p:blipFill>
+        <p:spPr bwMode="auto">
+          <a:xfrm>
+            <a:off x="435124" y="3356992"/>
+            <a:ext cx="2552700" cy="2609850"/>
+          </a:xfrm>
+          <a:prstGeom prst="rect">
+            <a:avLst/>
+          </a:prstGeom>
+          <a:ln>
+            <a:noFill/>
+          </a:ln>
+          <a:effectLst>
+            <a:outerShdw blurRad="190500" algn="tl" rotWithShape="0">
+              <a:srgbClr val="000000">
+                <a:alpha val="70000"/>
+              </a:srgbClr>
+            </a:outerShdw>
+          </a:effectLst>
+        </p:spPr>
+      </p:pic>
     </p:spTree>
   </p:cSld>
   <p:clrMapOvr>

</xml_diff>

<commit_message>
added slides describing the architecture
</commit_message>
<xml_diff>
--- a/docs/group4_Final_Presentation.pptx
+++ b/docs/group4_Final_Presentation.pptx
@@ -5,10 +5,10 @@
     <p:sldMasterId id="2147483660" r:id="rId1"/>
   </p:sldMasterIdLst>
   <p:notesMasterIdLst>
-    <p:notesMasterId r:id="rId10"/>
+    <p:notesMasterId r:id="rId12"/>
   </p:notesMasterIdLst>
   <p:handoutMasterIdLst>
-    <p:handoutMasterId r:id="rId11"/>
+    <p:handoutMasterId r:id="rId13"/>
   </p:handoutMasterIdLst>
   <p:sldIdLst>
     <p:sldId id="256" r:id="rId2"/>
@@ -17,8 +17,10 @@
     <p:sldId id="283" r:id="rId5"/>
     <p:sldId id="285" r:id="rId6"/>
     <p:sldId id="286" r:id="rId7"/>
-    <p:sldId id="263" r:id="rId8"/>
-    <p:sldId id="284" r:id="rId9"/>
+    <p:sldId id="287" r:id="rId8"/>
+    <p:sldId id="288" r:id="rId9"/>
+    <p:sldId id="263" r:id="rId10"/>
+    <p:sldId id="284" r:id="rId11"/>
   </p:sldIdLst>
   <p:sldSz cx="9144000" cy="6858000" type="screen4x3"/>
   <p:notesSz cx="6858000" cy="9144000"/>
@@ -203,7 +205,7 @@
             <a:fld id="{B90D170F-C4DC-4970-8523-1EDF1DABFF2F}" type="datetimeFigureOut">
               <a:rPr lang="de-DE" smtClean="0"/>
               <a:pPr/>
-              <a:t>12.02.2013</a:t>
+              <a:t>13.02.2013</a:t>
             </a:fld>
             <a:endParaRPr lang="de-DE"/>
           </a:p>
@@ -279,7 +281,7 @@
     </p:spTree>
     <p:extLst>
       <p:ext uri="{BB962C8B-B14F-4D97-AF65-F5344CB8AC3E}">
-        <p14:creationId xmlns="" xmlns:p14="http://schemas.microsoft.com/office/powerpoint/2010/main" val="3507328673"/>
+        <p14:creationId xmlns:p14="http://schemas.microsoft.com/office/powerpoint/2010/main" xmlns="" val="3507328673"/>
       </p:ext>
     </p:extLst>
   </p:cSld>
@@ -370,7 +372,7 @@
             <a:fld id="{208B6049-45AF-4855-985C-185012BA219A}" type="datetimeFigureOut">
               <a:rPr lang="de-DE" smtClean="0"/>
               <a:pPr/>
-              <a:t>12.02.2013</a:t>
+              <a:t>13.02.2013</a:t>
             </a:fld>
             <a:endParaRPr lang="de-DE"/>
           </a:p>
@@ -539,7 +541,7 @@
     </p:spTree>
     <p:extLst>
       <p:ext uri="{BB962C8B-B14F-4D97-AF65-F5344CB8AC3E}">
-        <p14:creationId xmlns="" xmlns:p14="http://schemas.microsoft.com/office/powerpoint/2010/main" val="1095461984"/>
+        <p14:creationId xmlns:p14="http://schemas.microsoft.com/office/powerpoint/2010/main" xmlns="" val="1095461984"/>
       </p:ext>
     </p:extLst>
   </p:cSld>
@@ -909,7 +911,7 @@
             <a:biLevel thresh="25000"/>
             <a:extLst>
               <a:ext uri="{28A0092B-C50C-407E-A947-70E740481C1C}">
-                <a14:useLocalDpi xmlns="" xmlns:a14="http://schemas.microsoft.com/office/drawing/2010/main" val="0"/>
+                <a14:useLocalDpi xmlns:a14="http://schemas.microsoft.com/office/drawing/2010/main" xmlns="" val="0"/>
               </a:ext>
             </a:extLst>
           </a:blip>
@@ -932,14 +934,14 @@
           </a:ln>
           <a:extLst>
             <a:ext uri="{909E8E84-426E-40DD-AFC4-6F175D3DCCD1}">
-              <a14:hiddenFill xmlns="" xmlns:a14="http://schemas.microsoft.com/office/drawing/2010/main">
+              <a14:hiddenFill xmlns:a14="http://schemas.microsoft.com/office/drawing/2010/main" xmlns="">
                 <a:solidFill>
                   <a:srgbClr val="FFFFFF"/>
                 </a:solidFill>
               </a14:hiddenFill>
             </a:ext>
             <a:ext uri="{91240B29-F687-4F45-9708-019B960494DF}">
-              <a14:hiddenLine xmlns="" xmlns:a14="http://schemas.microsoft.com/office/drawing/2010/main" w="9525">
+              <a14:hiddenLine xmlns:a14="http://schemas.microsoft.com/office/drawing/2010/main" xmlns="" w="9525">
                 <a:solidFill>
                   <a:srgbClr val="000000"/>
                 </a:solidFill>
@@ -1064,7 +1066,7 @@
     </p:spTree>
     <p:extLst>
       <p:ext uri="{BB962C8B-B14F-4D97-AF65-F5344CB8AC3E}">
-        <p14:creationId xmlns="" xmlns:p14="http://schemas.microsoft.com/office/powerpoint/2010/main" val="364360318"/>
+        <p14:creationId xmlns:p14="http://schemas.microsoft.com/office/powerpoint/2010/main" xmlns="" val="364360318"/>
       </p:ext>
     </p:extLst>
   </p:cSld>
@@ -1284,7 +1286,7 @@
     </p:spTree>
     <p:extLst>
       <p:ext uri="{BB962C8B-B14F-4D97-AF65-F5344CB8AC3E}">
-        <p14:creationId xmlns="" xmlns:p14="http://schemas.microsoft.com/office/powerpoint/2010/main" val="1803307076"/>
+        <p14:creationId xmlns:p14="http://schemas.microsoft.com/office/powerpoint/2010/main" xmlns="" val="1803307076"/>
       </p:ext>
     </p:extLst>
   </p:cSld>
@@ -1618,7 +1620,7 @@
     </p:spTree>
     <p:extLst>
       <p:ext uri="{BB962C8B-B14F-4D97-AF65-F5344CB8AC3E}">
-        <p14:creationId xmlns="" xmlns:p14="http://schemas.microsoft.com/office/powerpoint/2010/main" val="302666195"/>
+        <p14:creationId xmlns:p14="http://schemas.microsoft.com/office/powerpoint/2010/main" xmlns="" val="302666195"/>
       </p:ext>
     </p:extLst>
   </p:cSld>
@@ -1687,14 +1689,14 @@
           </a:ln>
           <a:extLst>
             <a:ext uri="{909E8E84-426E-40DD-AFC4-6F175D3DCCD1}">
-              <a14:hiddenFill xmlns="" xmlns:a14="http://schemas.microsoft.com/office/drawing/2010/main">
+              <a14:hiddenFill xmlns:a14="http://schemas.microsoft.com/office/drawing/2010/main" xmlns="">
                 <a:solidFill>
                   <a:srgbClr val="FFFFFF"/>
                 </a:solidFill>
               </a14:hiddenFill>
             </a:ext>
             <a:ext uri="{91240B29-F687-4F45-9708-019B960494DF}">
-              <a14:hiddenLine xmlns="" xmlns:a14="http://schemas.microsoft.com/office/drawing/2010/main" w="9525">
+              <a14:hiddenLine xmlns:a14="http://schemas.microsoft.com/office/drawing/2010/main" xmlns="" w="9525">
                 <a:solidFill>
                   <a:srgbClr val="000000"/>
                 </a:solidFill>
@@ -1745,14 +1747,14 @@
           </a:ln>
           <a:extLst>
             <a:ext uri="{909E8E84-426E-40DD-AFC4-6F175D3DCCD1}">
-              <a14:hiddenFill xmlns="" xmlns:a14="http://schemas.microsoft.com/office/drawing/2010/main">
+              <a14:hiddenFill xmlns:a14="http://schemas.microsoft.com/office/drawing/2010/main" xmlns="">
                 <a:solidFill>
                   <a:srgbClr val="FFFFFF"/>
                 </a:solidFill>
               </a14:hiddenFill>
             </a:ext>
             <a:ext uri="{91240B29-F687-4F45-9708-019B960494DF}">
-              <a14:hiddenLine xmlns="" xmlns:a14="http://schemas.microsoft.com/office/drawing/2010/main" w="9525">
+              <a14:hiddenLine xmlns:a14="http://schemas.microsoft.com/office/drawing/2010/main" xmlns="" w="9525">
                 <a:solidFill>
                   <a:srgbClr val="000000"/>
                 </a:solidFill>
@@ -2180,7 +2182,7 @@
             <a:biLevel thresh="25000"/>
             <a:extLst>
               <a:ext uri="{28A0092B-C50C-407E-A947-70E740481C1C}">
-                <a14:useLocalDpi xmlns="" xmlns:a14="http://schemas.microsoft.com/office/drawing/2010/main" val="0"/>
+                <a14:useLocalDpi xmlns:a14="http://schemas.microsoft.com/office/drawing/2010/main" xmlns="" val="0"/>
               </a:ext>
             </a:extLst>
           </a:blip>
@@ -2203,14 +2205,14 @@
           </a:ln>
           <a:extLst>
             <a:ext uri="{909E8E84-426E-40DD-AFC4-6F175D3DCCD1}">
-              <a14:hiddenFill xmlns="" xmlns:a14="http://schemas.microsoft.com/office/drawing/2010/main">
+              <a14:hiddenFill xmlns:a14="http://schemas.microsoft.com/office/drawing/2010/main" xmlns="">
                 <a:solidFill>
                   <a:srgbClr val="FFFFFF"/>
                 </a:solidFill>
               </a14:hiddenFill>
             </a:ext>
             <a:ext uri="{91240B29-F687-4F45-9708-019B960494DF}">
-              <a14:hiddenLine xmlns="" xmlns:a14="http://schemas.microsoft.com/office/drawing/2010/main" w="9525">
+              <a14:hiddenLine xmlns:a14="http://schemas.microsoft.com/office/drawing/2010/main" xmlns="" w="9525">
                 <a:solidFill>
                   <a:srgbClr val="000000"/>
                 </a:solidFill>
@@ -2279,7 +2281,7 @@
           <a:blip r:embed="rId6" cstate="print">
             <a:extLst>
               <a:ext uri="{28A0092B-C50C-407E-A947-70E740481C1C}">
-                <a14:useLocalDpi xmlns="" xmlns:a14="http://schemas.microsoft.com/office/drawing/2010/main" val="0"/>
+                <a14:useLocalDpi xmlns:a14="http://schemas.microsoft.com/office/drawing/2010/main" xmlns="" val="0"/>
               </a:ext>
             </a:extLst>
           </a:blip>
@@ -2299,7 +2301,7 @@
           <a:noFill/>
           <a:extLst>
             <a:ext uri="{909E8E84-426E-40DD-AFC4-6F175D3DCCD1}">
-              <a14:hiddenFill xmlns="" xmlns:a14="http://schemas.microsoft.com/office/drawing/2010/main">
+              <a14:hiddenFill xmlns:a14="http://schemas.microsoft.com/office/drawing/2010/main" xmlns="">
                 <a:solidFill>
                   <a:srgbClr val="FFFFFF"/>
                 </a:solidFill>
@@ -3078,7 +3080,7 @@
           <a:blip r:embed="rId2" cstate="print">
             <a:extLst>
               <a:ext uri="{28A0092B-C50C-407E-A947-70E740481C1C}">
-                <a14:useLocalDpi xmlns="" xmlns:a14="http://schemas.microsoft.com/office/drawing/2010/main" val="0"/>
+                <a14:useLocalDpi xmlns:a14="http://schemas.microsoft.com/office/drawing/2010/main" xmlns="" val="0"/>
               </a:ext>
             </a:extLst>
           </a:blip>
@@ -3098,7 +3100,7 @@
           <a:noFill/>
           <a:extLst>
             <a:ext uri="{909E8E84-426E-40DD-AFC4-6F175D3DCCD1}">
-              <a14:hiddenFill xmlns="" xmlns:a14="http://schemas.microsoft.com/office/drawing/2010/main">
+              <a14:hiddenFill xmlns:a14="http://schemas.microsoft.com/office/drawing/2010/main" xmlns="">
                 <a:solidFill>
                   <a:srgbClr val="FFFFFF"/>
                 </a:solidFill>
@@ -3110,9 +3112,570 @@
     </p:spTree>
     <p:extLst>
       <p:ext uri="{BB962C8B-B14F-4D97-AF65-F5344CB8AC3E}">
-        <p14:creationId xmlns="" xmlns:p14="http://schemas.microsoft.com/office/powerpoint/2010/main" val="2518694071"/>
+        <p14:creationId xmlns:p14="http://schemas.microsoft.com/office/powerpoint/2010/main" xmlns="" val="2518694071"/>
       </p:ext>
     </p:extLst>
+  </p:cSld>
+  <p:clrMapOvr>
+    <a:masterClrMapping/>
+  </p:clrMapOvr>
+  <p:timing>
+    <p:tnLst>
+      <p:par>
+        <p:cTn id="1" dur="indefinite" restart="never" nodeType="tmRoot"/>
+      </p:par>
+    </p:tnLst>
+  </p:timing>
+</p:sld>
+</file>
+
+<file path=ppt/slides/slide10.xml><?xml version="1.0" encoding="utf-8"?>
+<p:sld xmlns:a="http://schemas.openxmlformats.org/drawingml/2006/main" xmlns:r="http://schemas.openxmlformats.org/officeDocument/2006/relationships" xmlns:p="http://schemas.openxmlformats.org/presentationml/2006/main">
+  <p:cSld>
+    <p:spTree>
+      <p:nvGrpSpPr>
+        <p:cNvPr id="1" name=""/>
+        <p:cNvGrpSpPr/>
+        <p:nvPr/>
+      </p:nvGrpSpPr>
+      <p:grpSpPr>
+        <a:xfrm>
+          <a:off x="0" y="0"/>
+          <a:ext cx="0" cy="0"/>
+          <a:chOff x="0" y="0"/>
+          <a:chExt cx="0" cy="0"/>
+        </a:xfrm>
+      </p:grpSpPr>
+      <p:sp>
+        <p:nvSpPr>
+          <p:cNvPr id="2" name="Tytuł 1"/>
+          <p:cNvSpPr>
+            <a:spLocks noGrp="1"/>
+          </p:cNvSpPr>
+          <p:nvPr>
+            <p:ph type="title"/>
+          </p:nvPr>
+        </p:nvSpPr>
+        <p:spPr>
+          <a:xfrm>
+            <a:off x="508000" y="914400"/>
+            <a:ext cx="7993090" cy="585774"/>
+          </a:xfrm>
+        </p:spPr>
+        <p:txBody>
+          <a:bodyPr/>
+          <a:lstStyle/>
+          <a:p>
+            <a:r>
+              <a:rPr lang="de-DE" dirty="0" err="1" smtClean="0">
+                <a:solidFill>
+                  <a:schemeClr val="bg1"/>
+                </a:solidFill>
+              </a:rPr>
+              <a:t>Use</a:t>
+            </a:r>
+            <a:r>
+              <a:rPr lang="de-DE" dirty="0" smtClean="0">
+                <a:solidFill>
+                  <a:schemeClr val="bg1"/>
+                </a:solidFill>
+              </a:rPr>
+              <a:t> Case </a:t>
+            </a:r>
+            <a:r>
+              <a:rPr lang="de-DE" smtClean="0">
+                <a:solidFill>
+                  <a:schemeClr val="bg1"/>
+                </a:solidFill>
+              </a:rPr>
+              <a:t>– Build Units</a:t>
+            </a:r>
+            <a:endParaRPr lang="pl-PL" dirty="0">
+              <a:solidFill>
+                <a:schemeClr val="bg1"/>
+              </a:solidFill>
+            </a:endParaRPr>
+          </a:p>
+        </p:txBody>
+      </p:sp>
+      <p:sp>
+        <p:nvSpPr>
+          <p:cNvPr id="5" name="Symbol zastępczy stopki 4"/>
+          <p:cNvSpPr>
+            <a:spLocks noGrp="1"/>
+          </p:cNvSpPr>
+          <p:nvPr>
+            <p:ph type="ftr" sz="quarter" idx="11"/>
+          </p:nvPr>
+        </p:nvSpPr>
+        <p:spPr/>
+        <p:txBody>
+          <a:bodyPr/>
+          <a:lstStyle/>
+          <a:p>
+            <a:r>
+              <a:rPr lang="de-DE" smtClean="0"/>
+              <a:t>Master Lab Course Web Applications</a:t>
+            </a:r>
+            <a:endParaRPr lang="de-DE" dirty="0"/>
+          </a:p>
+        </p:txBody>
+      </p:sp>
+      <p:sp>
+        <p:nvSpPr>
+          <p:cNvPr id="6" name="Symbol zastępczy numeru slajdu 5"/>
+          <p:cNvSpPr>
+            <a:spLocks noGrp="1"/>
+          </p:cNvSpPr>
+          <p:nvPr>
+            <p:ph type="sldNum" sz="quarter" idx="12"/>
+          </p:nvPr>
+        </p:nvSpPr>
+        <p:spPr/>
+        <p:txBody>
+          <a:bodyPr/>
+          <a:lstStyle/>
+          <a:p>
+            <a:fld id="{121E5A8C-2088-45D2-9D84-10B3EA412A4C}" type="slidenum">
+              <a:rPr lang="de-DE" smtClean="0"/>
+              <a:pPr/>
+              <a:t>10</a:t>
+            </a:fld>
+            <a:endParaRPr lang="de-DE" dirty="0"/>
+          </a:p>
+        </p:txBody>
+      </p:sp>
+      <p:sp>
+        <p:nvSpPr>
+          <p:cNvPr id="8" name="Symbol zastępczy daty 3"/>
+          <p:cNvSpPr>
+            <a:spLocks noGrp="1"/>
+          </p:cNvSpPr>
+          <p:nvPr>
+            <p:ph type="dt" sz="half" idx="10"/>
+          </p:nvPr>
+        </p:nvSpPr>
+        <p:spPr>
+          <a:xfrm>
+            <a:off x="508000" y="6400800"/>
+            <a:ext cx="1905000" cy="304800"/>
+          </a:xfrm>
+        </p:spPr>
+        <p:txBody>
+          <a:bodyPr/>
+          <a:lstStyle/>
+          <a:p>
+            <a:r>
+              <a:rPr lang="de-DE" smtClean="0"/>
+              <a:t>25.02.2013</a:t>
+            </a:r>
+            <a:endParaRPr lang="de-DE" dirty="0"/>
+          </a:p>
+        </p:txBody>
+      </p:sp>
+      <p:sp>
+        <p:nvSpPr>
+          <p:cNvPr id="9" name="Rounded Rectangle 8"/>
+          <p:cNvSpPr/>
+          <p:nvPr/>
+        </p:nvSpPr>
+        <p:spPr bwMode="auto">
+          <a:xfrm>
+            <a:off x="395536" y="1556792"/>
+            <a:ext cx="8136904" cy="1513639"/>
+          </a:xfrm>
+          <a:prstGeom prst="roundRect">
+            <a:avLst>
+              <a:gd name="adj" fmla="val 13985"/>
+            </a:avLst>
+          </a:prstGeom>
+          <a:solidFill>
+            <a:srgbClr val="292929"/>
+          </a:solidFill>
+          <a:ln w="9525" cap="flat" cmpd="sng" algn="ctr">
+            <a:noFill/>
+            <a:prstDash val="solid"/>
+            <a:round/>
+            <a:headEnd type="none" w="med" len="med"/>
+            <a:tailEnd type="none" w="med" len="med"/>
+          </a:ln>
+          <a:effectLst>
+            <a:innerShdw blurRad="114300">
+              <a:prstClr val="black"/>
+            </a:innerShdw>
+          </a:effectLst>
+        </p:spPr>
+        <p:txBody>
+          <a:bodyPr vert="horz" wrap="square" lIns="91440" tIns="45720" rIns="91440" bIns="45720" numCol="1" rtlCol="0" anchor="t" anchorCtr="0" compatLnSpc="1">
+            <a:prstTxWarp prst="textNoShape">
+              <a:avLst/>
+            </a:prstTxWarp>
+          </a:bodyPr>
+          <a:lstStyle/>
+          <a:p>
+            <a:pPr algn="r" eaLnBrk="0" fontAlgn="base" hangingPunct="0">
+              <a:spcBef>
+                <a:spcPct val="0"/>
+              </a:spcBef>
+              <a:spcAft>
+                <a:spcPct val="0"/>
+              </a:spcAft>
+            </a:pPr>
+            <a:endParaRPr lang="de-DE" sz="2000">
+              <a:latin typeface="Arial" pitchFamily="34" charset="0"/>
+            </a:endParaRPr>
+          </a:p>
+        </p:txBody>
+      </p:sp>
+      <p:sp>
+        <p:nvSpPr>
+          <p:cNvPr id="10" name="Symbol zastępczy zawartości 2"/>
+          <p:cNvSpPr txBox="1">
+            <a:spLocks/>
+          </p:cNvSpPr>
+          <p:nvPr/>
+        </p:nvSpPr>
+        <p:spPr bwMode="auto">
+          <a:xfrm>
+            <a:off x="430968" y="1809555"/>
+            <a:ext cx="8101472" cy="1008112"/>
+          </a:xfrm>
+          <a:prstGeom prst="rect">
+            <a:avLst/>
+          </a:prstGeom>
+          <a:noFill/>
+          <a:ln>
+            <a:noFill/>
+          </a:ln>
+          <a:extLst>
+            <a:ext uri="{909E8E84-426E-40DD-AFC4-6F175D3DCCD1}">
+              <a14:hiddenFill xmlns:a14="http://schemas.microsoft.com/office/drawing/2010/main" xmlns="">
+                <a:solidFill>
+                  <a:srgbClr val="FFFFFF"/>
+                </a:solidFill>
+              </a14:hiddenFill>
+            </a:ext>
+            <a:ext uri="{91240B29-F687-4F45-9708-019B960494DF}">
+              <a14:hiddenLine xmlns:a14="http://schemas.microsoft.com/office/drawing/2010/main" xmlns="" w="9525">
+                <a:solidFill>
+                  <a:srgbClr val="000000"/>
+                </a:solidFill>
+                <a:miter lim="800000"/>
+                <a:headEnd/>
+                <a:tailEnd/>
+              </a14:hiddenLine>
+            </a:ext>
+          </a:extLst>
+        </p:spPr>
+        <p:txBody>
+          <a:bodyPr vert="horz" wrap="square" lIns="91440" tIns="45720" rIns="91440" bIns="45720" numCol="1" anchor="t" anchorCtr="0" compatLnSpc="1">
+            <a:prstTxWarp prst="textNoShape">
+              <a:avLst/>
+            </a:prstTxWarp>
+          </a:bodyPr>
+          <a:lstStyle>
+            <a:lvl1pPr marL="342900" indent="-342900" algn="l" rtl="0" eaLnBrk="1" fontAlgn="base" hangingPunct="1">
+              <a:spcBef>
+                <a:spcPct val="20000"/>
+              </a:spcBef>
+              <a:spcAft>
+                <a:spcPct val="0"/>
+              </a:spcAft>
+              <a:buChar char="•"/>
+              <a:defRPr sz="2400">
+                <a:solidFill>
+                  <a:schemeClr val="bg1"/>
+                </a:solidFill>
+                <a:latin typeface="+mn-lt"/>
+                <a:ea typeface="ＭＳ Ｐゴシック" pitchFamily="-65" charset="-128"/>
+                <a:cs typeface="ＭＳ Ｐゴシック" pitchFamily="18" charset="-128"/>
+              </a:defRPr>
+            </a:lvl1pPr>
+            <a:lvl2pPr marL="742950" indent="-285750" algn="l" rtl="0" eaLnBrk="1" fontAlgn="base" hangingPunct="1">
+              <a:spcBef>
+                <a:spcPct val="20000"/>
+              </a:spcBef>
+              <a:spcAft>
+                <a:spcPct val="0"/>
+              </a:spcAft>
+              <a:buChar char="–"/>
+              <a:defRPr sz="2000">
+                <a:solidFill>
+                  <a:schemeClr val="bg1"/>
+                </a:solidFill>
+                <a:latin typeface="+mn-lt"/>
+                <a:ea typeface="ＭＳ Ｐゴシック" pitchFamily="-65" charset="-128"/>
+              </a:defRPr>
+            </a:lvl2pPr>
+            <a:lvl3pPr marL="1143000" indent="-228600" algn="l" rtl="0" eaLnBrk="1" fontAlgn="base" hangingPunct="1">
+              <a:spcBef>
+                <a:spcPct val="20000"/>
+              </a:spcBef>
+              <a:spcAft>
+                <a:spcPct val="0"/>
+              </a:spcAft>
+              <a:buChar char="•"/>
+              <a:defRPr sz="2000">
+                <a:solidFill>
+                  <a:schemeClr val="bg1"/>
+                </a:solidFill>
+                <a:latin typeface="+mn-lt"/>
+                <a:ea typeface="ＭＳ Ｐゴシック" pitchFamily="-65" charset="-128"/>
+              </a:defRPr>
+            </a:lvl3pPr>
+            <a:lvl4pPr marL="1562100" indent="-228600" algn="l" rtl="0" eaLnBrk="1" fontAlgn="base" hangingPunct="1">
+              <a:spcBef>
+                <a:spcPct val="20000"/>
+              </a:spcBef>
+              <a:spcAft>
+                <a:spcPct val="0"/>
+              </a:spcAft>
+              <a:buChar char="–"/>
+              <a:defRPr sz="2000">
+                <a:solidFill>
+                  <a:schemeClr val="bg1"/>
+                </a:solidFill>
+                <a:latin typeface="+mn-lt"/>
+                <a:ea typeface="ＭＳ Ｐゴシック" pitchFamily="-65" charset="-128"/>
+              </a:defRPr>
+            </a:lvl4pPr>
+            <a:lvl5pPr marL="1981200" indent="-228600" algn="l" rtl="0" eaLnBrk="1" fontAlgn="base" hangingPunct="1">
+              <a:spcBef>
+                <a:spcPct val="20000"/>
+              </a:spcBef>
+              <a:spcAft>
+                <a:spcPct val="0"/>
+              </a:spcAft>
+              <a:buChar char="»"/>
+              <a:defRPr sz="2000">
+                <a:solidFill>
+                  <a:schemeClr val="bg1"/>
+                </a:solidFill>
+                <a:latin typeface="+mn-lt"/>
+                <a:ea typeface="ＭＳ Ｐゴシック" pitchFamily="-65" charset="-128"/>
+              </a:defRPr>
+            </a:lvl5pPr>
+            <a:lvl6pPr marL="2438400" indent="-228600" algn="l" rtl="0" eaLnBrk="1" fontAlgn="base" hangingPunct="1">
+              <a:spcBef>
+                <a:spcPct val="20000"/>
+              </a:spcBef>
+              <a:spcAft>
+                <a:spcPct val="0"/>
+              </a:spcAft>
+              <a:buChar char="»"/>
+              <a:defRPr sz="1400">
+                <a:solidFill>
+                  <a:schemeClr val="tx1"/>
+                </a:solidFill>
+                <a:latin typeface="+mn-lt"/>
+              </a:defRPr>
+            </a:lvl6pPr>
+            <a:lvl7pPr marL="2895600" indent="-228600" algn="l" rtl="0" eaLnBrk="1" fontAlgn="base" hangingPunct="1">
+              <a:spcBef>
+                <a:spcPct val="20000"/>
+              </a:spcBef>
+              <a:spcAft>
+                <a:spcPct val="0"/>
+              </a:spcAft>
+              <a:buChar char="»"/>
+              <a:defRPr sz="1400">
+                <a:solidFill>
+                  <a:schemeClr val="tx1"/>
+                </a:solidFill>
+                <a:latin typeface="+mn-lt"/>
+              </a:defRPr>
+            </a:lvl7pPr>
+            <a:lvl8pPr marL="3352800" indent="-228600" algn="l" rtl="0" eaLnBrk="1" fontAlgn="base" hangingPunct="1">
+              <a:spcBef>
+                <a:spcPct val="20000"/>
+              </a:spcBef>
+              <a:spcAft>
+                <a:spcPct val="0"/>
+              </a:spcAft>
+              <a:buChar char="»"/>
+              <a:defRPr sz="1400">
+                <a:solidFill>
+                  <a:schemeClr val="tx1"/>
+                </a:solidFill>
+                <a:latin typeface="+mn-lt"/>
+              </a:defRPr>
+            </a:lvl8pPr>
+            <a:lvl9pPr marL="3810000" indent="-228600" algn="l" rtl="0" eaLnBrk="1" fontAlgn="base" hangingPunct="1">
+              <a:spcBef>
+                <a:spcPct val="20000"/>
+              </a:spcBef>
+              <a:spcAft>
+                <a:spcPct val="0"/>
+              </a:spcAft>
+              <a:buChar char="»"/>
+              <a:defRPr sz="1400">
+                <a:solidFill>
+                  <a:schemeClr val="tx1"/>
+                </a:solidFill>
+                <a:latin typeface="+mn-lt"/>
+              </a:defRPr>
+            </a:lvl9pPr>
+          </a:lstStyle>
+          <a:p>
+            <a:pPr>
+              <a:lnSpc>
+                <a:spcPct val="115000"/>
+              </a:lnSpc>
+              <a:spcAft>
+                <a:spcPts val="0"/>
+              </a:spcAft>
+            </a:pPr>
+            <a:r>
+              <a:rPr lang="en-US" sz="1600" smtClean="0"/>
+              <a:t>Players can use their resources to </a:t>
+            </a:r>
+            <a:r>
+              <a:rPr lang="en-US" sz="1600" smtClean="0">
+                <a:solidFill>
+                  <a:srgbClr val="FF9900"/>
+                </a:solidFill>
+              </a:rPr>
+              <a:t>build</a:t>
+            </a:r>
+            <a:r>
+              <a:rPr lang="en-US" sz="1600" smtClean="0"/>
+              <a:t> units</a:t>
+            </a:r>
+          </a:p>
+          <a:p>
+            <a:pPr>
+              <a:lnSpc>
+                <a:spcPct val="115000"/>
+              </a:lnSpc>
+              <a:spcAft>
+                <a:spcPts val="0"/>
+              </a:spcAft>
+            </a:pPr>
+            <a:r>
+              <a:rPr lang="en-US" sz="1600" smtClean="0"/>
+              <a:t>Total amount of units is </a:t>
+            </a:r>
+            <a:r>
+              <a:rPr lang="en-US" sz="1600" smtClean="0">
+                <a:solidFill>
+                  <a:srgbClr val="FF9900"/>
+                </a:solidFill>
+              </a:rPr>
+              <a:t>limited</a:t>
+            </a:r>
+            <a:r>
+              <a:rPr lang="en-US" sz="1600" smtClean="0"/>
+              <a:t> by the </a:t>
+            </a:r>
+            <a:r>
+              <a:rPr lang="en-US" sz="1600" smtClean="0">
+                <a:solidFill>
+                  <a:srgbClr val="FF9900"/>
+                </a:solidFill>
+              </a:rPr>
+              <a:t>food</a:t>
+            </a:r>
+            <a:r>
+              <a:rPr lang="en-US" sz="1600" smtClean="0"/>
+              <a:t> resource</a:t>
+            </a:r>
+          </a:p>
+          <a:p>
+            <a:pPr>
+              <a:lnSpc>
+                <a:spcPct val="115000"/>
+              </a:lnSpc>
+              <a:spcAft>
+                <a:spcPts val="0"/>
+              </a:spcAft>
+            </a:pPr>
+            <a:r>
+              <a:rPr lang="en-US" sz="1600" smtClean="0"/>
+              <a:t>Units live until they </a:t>
+            </a:r>
+            <a:r>
+              <a:rPr lang="en-US" sz="1600" smtClean="0">
+                <a:solidFill>
+                  <a:srgbClr val="FF9900"/>
+                </a:solidFill>
+              </a:rPr>
+              <a:t>fail</a:t>
+            </a:r>
+            <a:r>
+              <a:rPr lang="en-US" sz="1600" smtClean="0"/>
+              <a:t> at a conquering attempt</a:t>
+            </a:r>
+            <a:endParaRPr lang="en-US" sz="1600" dirty="0" smtClean="0"/>
+          </a:p>
+        </p:txBody>
+      </p:sp>
+      <p:pic>
+        <p:nvPicPr>
+          <p:cNvPr id="1026" name="Picture 2" descr="G:\WebAppLab\pi-puppids\docs\buildUnits.png"/>
+          <p:cNvPicPr>
+            <a:picLocks noChangeAspect="1" noChangeArrowheads="1"/>
+          </p:cNvPicPr>
+          <p:nvPr/>
+        </p:nvPicPr>
+        <p:blipFill>
+          <a:blip r:embed="rId2" cstate="print"/>
+          <a:srcRect/>
+          <a:stretch>
+            <a:fillRect/>
+          </a:stretch>
+        </p:blipFill>
+        <p:spPr bwMode="auto">
+          <a:xfrm>
+            <a:off x="3347864" y="3212976"/>
+            <a:ext cx="5328592" cy="2961314"/>
+          </a:xfrm>
+          <a:prstGeom prst="rect">
+            <a:avLst/>
+          </a:prstGeom>
+          <a:ln>
+            <a:noFill/>
+          </a:ln>
+          <a:effectLst>
+            <a:softEdge rad="112500"/>
+          </a:effectLst>
+        </p:spPr>
+      </p:pic>
+      <p:pic>
+        <p:nvPicPr>
+          <p:cNvPr id="1028" name="Picture 4" descr="G:\WebAppLab\pi-puppids\docs\unitTab.png"/>
+          <p:cNvPicPr>
+            <a:picLocks noChangeAspect="1" noChangeArrowheads="1"/>
+          </p:cNvPicPr>
+          <p:nvPr/>
+        </p:nvPicPr>
+        <p:blipFill>
+          <a:blip r:embed="rId3" cstate="print"/>
+          <a:srcRect/>
+          <a:stretch>
+            <a:fillRect/>
+          </a:stretch>
+        </p:blipFill>
+        <p:spPr bwMode="auto">
+          <a:xfrm>
+            <a:off x="435124" y="3356992"/>
+            <a:ext cx="2552700" cy="2609850"/>
+          </a:xfrm>
+          <a:prstGeom prst="rect">
+            <a:avLst/>
+          </a:prstGeom>
+          <a:ln>
+            <a:noFill/>
+          </a:ln>
+          <a:effectLst>
+            <a:outerShdw blurRad="190500" algn="tl" rotWithShape="0">
+              <a:srgbClr val="000000">
+                <a:alpha val="70000"/>
+              </a:srgbClr>
+            </a:outerShdw>
+          </a:effectLst>
+        </p:spPr>
+      </p:pic>
+    </p:spTree>
   </p:cSld>
   <p:clrMapOvr>
     <a:masterClrMapping/>
@@ -4096,14 +4659,14 @@
           </a:ln>
           <a:extLst>
             <a:ext uri="{909E8E84-426E-40DD-AFC4-6F175D3DCCD1}">
-              <a14:hiddenFill xmlns="" xmlns:a14="http://schemas.microsoft.com/office/drawing/2010/main">
+              <a14:hiddenFill xmlns:a14="http://schemas.microsoft.com/office/drawing/2010/main" xmlns="">
                 <a:solidFill>
                   <a:srgbClr val="FFFFFF"/>
                 </a:solidFill>
               </a14:hiddenFill>
             </a:ext>
             <a:ext uri="{91240B29-F687-4F45-9708-019B960494DF}">
-              <a14:hiddenLine xmlns="" xmlns:a14="http://schemas.microsoft.com/office/drawing/2010/main" w="9525">
+              <a14:hiddenLine xmlns:a14="http://schemas.microsoft.com/office/drawing/2010/main" xmlns="" w="9525">
                 <a:solidFill>
                   <a:srgbClr val="000000"/>
                 </a:solidFill>
@@ -4847,14 +5410,14 @@
           </a:ln>
           <a:extLst>
             <a:ext uri="{909E8E84-426E-40DD-AFC4-6F175D3DCCD1}">
-              <a14:hiddenFill xmlns="" xmlns:a14="http://schemas.microsoft.com/office/drawing/2010/main">
+              <a14:hiddenFill xmlns:a14="http://schemas.microsoft.com/office/drawing/2010/main" xmlns="">
                 <a:solidFill>
                   <a:srgbClr val="FFFFFF"/>
                 </a:solidFill>
               </a14:hiddenFill>
             </a:ext>
             <a:ext uri="{91240B29-F687-4F45-9708-019B960494DF}">
-              <a14:hiddenLine xmlns="" xmlns:a14="http://schemas.microsoft.com/office/drawing/2010/main" w="9525">
+              <a14:hiddenLine xmlns:a14="http://schemas.microsoft.com/office/drawing/2010/main" xmlns="" w="9525">
                 <a:solidFill>
                   <a:srgbClr val="000000"/>
                 </a:solidFill>
@@ -4939,7 +5502,7 @@
     </p:spTree>
     <p:extLst>
       <p:ext uri="{BB962C8B-B14F-4D97-AF65-F5344CB8AC3E}">
-        <p14:creationId xmlns="" xmlns:p14="http://schemas.microsoft.com/office/powerpoint/2010/main" val="514872292"/>
+        <p14:creationId xmlns:p14="http://schemas.microsoft.com/office/powerpoint/2010/main" xmlns="" val="514872292"/>
       </p:ext>
     </p:extLst>
   </p:cSld>
@@ -5079,14 +5642,14 @@
           </a:ln>
           <a:extLst>
             <a:ext uri="{909E8E84-426E-40DD-AFC4-6F175D3DCCD1}">
-              <a14:hiddenFill xmlns="" xmlns:a14="http://schemas.microsoft.com/office/drawing/2010/main">
+              <a14:hiddenFill xmlns:a14="http://schemas.microsoft.com/office/drawing/2010/main" xmlns="">
                 <a:solidFill>
                   <a:srgbClr val="FFFFFF"/>
                 </a:solidFill>
               </a14:hiddenFill>
             </a:ext>
             <a:ext uri="{91240B29-F687-4F45-9708-019B960494DF}">
-              <a14:hiddenLine xmlns="" xmlns:a14="http://schemas.microsoft.com/office/drawing/2010/main" w="9525">
+              <a14:hiddenLine xmlns:a14="http://schemas.microsoft.com/office/drawing/2010/main" xmlns="" w="9525">
                 <a:solidFill>
                   <a:srgbClr val="000000"/>
                 </a:solidFill>
@@ -6421,7 +6984,7 @@
             </a:duotone>
             <a:extLst>
               <a:ext uri="{BEBA8EAE-BF5A-486C-A8C5-ECC9F3942E4B}">
-                <a14:imgProps xmlns="" xmlns:a14="http://schemas.microsoft.com/office/drawing/2010/main">
+                <a14:imgProps xmlns:a14="http://schemas.microsoft.com/office/drawing/2010/main" xmlns="">
                   <a14:imgLayer r:embed="rId3">
                     <a14:imgEffect>
                       <a14:backgroundRemoval t="0" b="99474" l="0" r="100000"/>
@@ -6430,7 +6993,7 @@
                 </a14:imgProps>
               </a:ext>
               <a:ext uri="{28A0092B-C50C-407E-A947-70E740481C1C}">
-                <a14:useLocalDpi xmlns="" xmlns:a14="http://schemas.microsoft.com/office/drawing/2010/main" val="0"/>
+                <a14:useLocalDpi xmlns:a14="http://schemas.microsoft.com/office/drawing/2010/main" xmlns="" val="0"/>
               </a:ext>
             </a:extLst>
           </a:blip>
@@ -6448,7 +7011,7 @@
           <a:noFill/>
           <a:extLst>
             <a:ext uri="{909E8E84-426E-40DD-AFC4-6F175D3DCCD1}">
-              <a14:hiddenFill xmlns="" xmlns:a14="http://schemas.microsoft.com/office/drawing/2010/main">
+              <a14:hiddenFill xmlns:a14="http://schemas.microsoft.com/office/drawing/2010/main" xmlns="">
                 <a:solidFill>
                   <a:srgbClr val="FFFFFF"/>
                 </a:solidFill>
@@ -6460,7 +7023,7 @@
     </p:spTree>
     <p:extLst>
       <p:ext uri="{BB962C8B-B14F-4D97-AF65-F5344CB8AC3E}">
-        <p14:creationId xmlns="" xmlns:p14="http://schemas.microsoft.com/office/powerpoint/2010/main" val="599510323"/>
+        <p14:creationId xmlns:p14="http://schemas.microsoft.com/office/powerpoint/2010/main" xmlns="" val="599510323"/>
       </p:ext>
     </p:extLst>
   </p:cSld>
@@ -6662,14 +7225,14 @@
           </a:ln>
           <a:extLst>
             <a:ext uri="{909E8E84-426E-40DD-AFC4-6F175D3DCCD1}">
-              <a14:hiddenFill xmlns="" xmlns:a14="http://schemas.microsoft.com/office/drawing/2010/main">
+              <a14:hiddenFill xmlns:a14="http://schemas.microsoft.com/office/drawing/2010/main" xmlns="">
                 <a:solidFill>
                   <a:srgbClr val="FFFFFF"/>
                 </a:solidFill>
               </a14:hiddenFill>
             </a:ext>
             <a:ext uri="{91240B29-F687-4F45-9708-019B960494DF}">
-              <a14:hiddenLine xmlns="" xmlns:a14="http://schemas.microsoft.com/office/drawing/2010/main" w="9525">
+              <a14:hiddenLine xmlns:a14="http://schemas.microsoft.com/office/drawing/2010/main" xmlns="" w="9525">
                 <a:solidFill>
                   <a:srgbClr val="000000"/>
                 </a:solidFill>
@@ -7008,14 +7571,14 @@
           </a:ln>
           <a:extLst>
             <a:ext uri="{909E8E84-426E-40DD-AFC4-6F175D3DCCD1}">
-              <a14:hiddenFill xmlns="" xmlns:a14="http://schemas.microsoft.com/office/drawing/2010/main">
+              <a14:hiddenFill xmlns:a14="http://schemas.microsoft.com/office/drawing/2010/main" xmlns="">
                 <a:solidFill>
                   <a:srgbClr val="FFFFFF"/>
                 </a:solidFill>
               </a14:hiddenFill>
             </a:ext>
             <a:ext uri="{91240B29-F687-4F45-9708-019B960494DF}">
-              <a14:hiddenLine xmlns="" xmlns:a14="http://schemas.microsoft.com/office/drawing/2010/main" w="9525">
+              <a14:hiddenLine xmlns:a14="http://schemas.microsoft.com/office/drawing/2010/main" xmlns="" w="9525">
                 <a:solidFill>
                   <a:srgbClr val="000000"/>
                 </a:solidFill>
@@ -7379,14 +7942,14 @@
           </a:ln>
           <a:extLst>
             <a:ext uri="{909E8E84-426E-40DD-AFC4-6F175D3DCCD1}">
-              <a14:hiddenFill xmlns="" xmlns:a14="http://schemas.microsoft.com/office/drawing/2010/main">
+              <a14:hiddenFill xmlns:a14="http://schemas.microsoft.com/office/drawing/2010/main" xmlns="">
                 <a:solidFill>
                   <a:srgbClr val="FFFFFF"/>
                 </a:solidFill>
               </a14:hiddenFill>
             </a:ext>
             <a:ext uri="{91240B29-F687-4F45-9708-019B960494DF}">
-              <a14:hiddenLine xmlns="" xmlns:a14="http://schemas.microsoft.com/office/drawing/2010/main" w="9525">
+              <a14:hiddenLine xmlns:a14="http://schemas.microsoft.com/office/drawing/2010/main" xmlns="" w="9525">
                 <a:solidFill>
                   <a:srgbClr val="000000"/>
                 </a:solidFill>
@@ -7561,7 +8124,7 @@
     </p:spTree>
     <p:extLst>
       <p:ext uri="{BB962C8B-B14F-4D97-AF65-F5344CB8AC3E}">
-        <p14:creationId xmlns="" xmlns:p14="http://schemas.microsoft.com/office/powerpoint/2010/main" val="1759617674"/>
+        <p14:creationId xmlns:p14="http://schemas.microsoft.com/office/powerpoint/2010/main" xmlns="" val="1759617674"/>
       </p:ext>
     </p:extLst>
   </p:cSld>
@@ -8614,7 +9177,7 @@
     </p:spTree>
     <p:extLst>
       <p:ext uri="{BB962C8B-B14F-4D97-AF65-F5344CB8AC3E}">
-        <p14:creationId xmlns="" xmlns:p14="http://schemas.microsoft.com/office/powerpoint/2010/main" val="1759617674"/>
+        <p14:creationId xmlns:p14="http://schemas.microsoft.com/office/powerpoint/2010/main" xmlns="" val="1759617674"/>
       </p:ext>
     </p:extLst>
   </p:cSld>
@@ -8841,14 +9404,14 @@
           </a:ln>
           <a:extLst>
             <a:ext uri="{909E8E84-426E-40DD-AFC4-6F175D3DCCD1}">
-              <a14:hiddenFill xmlns="" xmlns:a14="http://schemas.microsoft.com/office/drawing/2010/main">
+              <a14:hiddenFill xmlns:a14="http://schemas.microsoft.com/office/drawing/2010/main" xmlns="">
                 <a:solidFill>
                   <a:srgbClr val="FFFFFF"/>
                 </a:solidFill>
               </a14:hiddenFill>
             </a:ext>
             <a:ext uri="{91240B29-F687-4F45-9708-019B960494DF}">
-              <a14:hiddenLine xmlns="" xmlns:a14="http://schemas.microsoft.com/office/drawing/2010/main" w="9525">
+              <a14:hiddenLine xmlns:a14="http://schemas.microsoft.com/office/drawing/2010/main" xmlns="" w="9525">
                 <a:solidFill>
                   <a:srgbClr val="000000"/>
                 </a:solidFill>
@@ -9015,19 +9578,7 @@
             </a:r>
             <a:r>
               <a:rPr lang="en-US" smtClean="0"/>
-              <a:t>Java </a:t>
-            </a:r>
-            <a:r>
-              <a:rPr lang="en-US" smtClean="0"/>
-              <a:t>objects </a:t>
-            </a:r>
-            <a:r>
-              <a:rPr lang="en-US" smtClean="0"/>
-              <a:t>to/from </a:t>
-            </a:r>
-            <a:r>
-              <a:rPr lang="en-US" smtClean="0"/>
-              <a:t>MongoDB</a:t>
+              <a:t>Java objects to/from MongoDB</a:t>
             </a:r>
           </a:p>
           <a:p>
@@ -9087,27 +9638,19 @@
           <a:p>
             <a:r>
               <a:rPr lang="en-US" smtClean="0"/>
-              <a:t>Pines Notify: </a:t>
+              <a:t>Pines Notify: JavaScript </a:t>
+            </a:r>
+            <a:r>
+              <a:rPr lang="en-US" smtClean="0">
+                <a:solidFill>
+                  <a:srgbClr val="FF9900"/>
+                </a:solidFill>
+              </a:rPr>
+              <a:t>notifications</a:t>
             </a:r>
             <a:r>
               <a:rPr lang="en-US" smtClean="0"/>
-              <a:t>JavaScript </a:t>
-            </a:r>
-            <a:r>
-              <a:rPr lang="en-US" smtClean="0">
-                <a:solidFill>
-                  <a:srgbClr val="FF9900"/>
-                </a:solidFill>
-              </a:rPr>
-              <a:t>notifications</a:t>
-            </a:r>
-            <a:r>
-              <a:rPr lang="en-US" smtClean="0"/>
-              <a:t> </a:t>
-            </a:r>
-            <a:r>
-              <a:rPr lang="en-US" smtClean="0"/>
-              <a:t>for Bootstrap</a:t>
+              <a:t> for Bootstrap</a:t>
             </a:r>
           </a:p>
           <a:p>
@@ -9152,7 +9695,7 @@
     </p:spTree>
     <p:extLst>
       <p:ext uri="{BB962C8B-B14F-4D97-AF65-F5344CB8AC3E}">
-        <p14:creationId xmlns="" xmlns:p14="http://schemas.microsoft.com/office/powerpoint/2010/main" val="1759617674"/>
+        <p14:creationId xmlns:p14="http://schemas.microsoft.com/office/powerpoint/2010/main" xmlns="" val="1759617674"/>
       </p:ext>
     </p:extLst>
   </p:cSld>
@@ -9188,6 +9731,2873 @@
       </p:grpSpPr>
       <p:sp>
         <p:nvSpPr>
+          <p:cNvPr id="62" name="Rounded Rectangle 7"/>
+          <p:cNvSpPr/>
+          <p:nvPr/>
+        </p:nvSpPr>
+        <p:spPr bwMode="auto">
+          <a:xfrm>
+            <a:off x="179512" y="1556792"/>
+            <a:ext cx="8784976" cy="4680520"/>
+          </a:xfrm>
+          <a:prstGeom prst="roundRect">
+            <a:avLst>
+              <a:gd name="adj" fmla="val 13985"/>
+            </a:avLst>
+          </a:prstGeom>
+          <a:solidFill>
+            <a:srgbClr val="292929"/>
+          </a:solidFill>
+          <a:ln w="9525" cap="flat" cmpd="sng" algn="ctr">
+            <a:noFill/>
+            <a:prstDash val="solid"/>
+            <a:round/>
+            <a:headEnd type="none" w="med" len="med"/>
+            <a:tailEnd type="none" w="med" len="med"/>
+          </a:ln>
+          <a:effectLst>
+            <a:innerShdw blurRad="114300">
+              <a:prstClr val="black"/>
+            </a:innerShdw>
+          </a:effectLst>
+        </p:spPr>
+        <p:txBody>
+          <a:bodyPr vert="horz" wrap="square" lIns="91440" tIns="45720" rIns="91440" bIns="45720" numCol="1" rtlCol="0" anchor="t" anchorCtr="0" compatLnSpc="1">
+            <a:prstTxWarp prst="textNoShape">
+              <a:avLst/>
+            </a:prstTxWarp>
+          </a:bodyPr>
+          <a:lstStyle/>
+          <a:p>
+            <a:pPr algn="r" eaLnBrk="0" fontAlgn="base" hangingPunct="0">
+              <a:spcBef>
+                <a:spcPct val="0"/>
+              </a:spcBef>
+              <a:spcAft>
+                <a:spcPct val="0"/>
+              </a:spcAft>
+            </a:pPr>
+            <a:endParaRPr lang="de-DE" sz="2000">
+              <a:latin typeface="Arial" pitchFamily="34" charset="0"/>
+            </a:endParaRPr>
+          </a:p>
+        </p:txBody>
+      </p:sp>
+      <p:sp>
+        <p:nvSpPr>
+          <p:cNvPr id="2" name="Tytuł 1"/>
+          <p:cNvSpPr>
+            <a:spLocks noGrp="1"/>
+          </p:cNvSpPr>
+          <p:nvPr>
+            <p:ph type="title"/>
+          </p:nvPr>
+        </p:nvSpPr>
+        <p:spPr/>
+        <p:txBody>
+          <a:bodyPr/>
+          <a:lstStyle/>
+          <a:p>
+            <a:r>
+              <a:rPr lang="de-DE" smtClean="0">
+                <a:solidFill>
+                  <a:schemeClr val="bg1"/>
+                </a:solidFill>
+              </a:rPr>
+              <a:t>Architecture</a:t>
+            </a:r>
+            <a:endParaRPr lang="pl-PL" dirty="0">
+              <a:solidFill>
+                <a:schemeClr val="bg1"/>
+              </a:solidFill>
+            </a:endParaRPr>
+          </a:p>
+        </p:txBody>
+      </p:sp>
+      <p:sp>
+        <p:nvSpPr>
+          <p:cNvPr id="4" name="Symbol zastępczy daty 3"/>
+          <p:cNvSpPr>
+            <a:spLocks noGrp="1"/>
+          </p:cNvSpPr>
+          <p:nvPr>
+            <p:ph type="dt" sz="half" idx="10"/>
+          </p:nvPr>
+        </p:nvSpPr>
+        <p:spPr/>
+        <p:txBody>
+          <a:bodyPr/>
+          <a:lstStyle/>
+          <a:p>
+            <a:r>
+              <a:rPr lang="pl-PL" dirty="0" smtClean="0"/>
+              <a:t>19</a:t>
+            </a:r>
+            <a:r>
+              <a:rPr lang="de-DE" dirty="0" smtClean="0"/>
+              <a:t>.11.2012</a:t>
+            </a:r>
+            <a:endParaRPr lang="de-DE" dirty="0"/>
+          </a:p>
+        </p:txBody>
+      </p:sp>
+      <p:sp>
+        <p:nvSpPr>
+          <p:cNvPr id="5" name="Symbol zastępczy stopki 4"/>
+          <p:cNvSpPr>
+            <a:spLocks noGrp="1"/>
+          </p:cNvSpPr>
+          <p:nvPr>
+            <p:ph type="ftr" sz="quarter" idx="11"/>
+          </p:nvPr>
+        </p:nvSpPr>
+        <p:spPr/>
+        <p:txBody>
+          <a:bodyPr/>
+          <a:lstStyle/>
+          <a:p>
+            <a:r>
+              <a:rPr lang="de-DE" dirty="0" smtClean="0"/>
+              <a:t>Master Lab </a:t>
+            </a:r>
+            <a:r>
+              <a:rPr lang="de-DE" dirty="0" err="1" smtClean="0"/>
+              <a:t>Course</a:t>
+            </a:r>
+            <a:r>
+              <a:rPr lang="de-DE" dirty="0" smtClean="0"/>
+              <a:t> Web </a:t>
+            </a:r>
+            <a:r>
+              <a:rPr lang="de-DE" dirty="0" err="1" smtClean="0"/>
+              <a:t>Applications</a:t>
+            </a:r>
+            <a:endParaRPr lang="de-DE" dirty="0"/>
+          </a:p>
+        </p:txBody>
+      </p:sp>
+      <p:sp>
+        <p:nvSpPr>
+          <p:cNvPr id="6" name="Symbol zastępczy numeru slajdu 5"/>
+          <p:cNvSpPr>
+            <a:spLocks noGrp="1"/>
+          </p:cNvSpPr>
+          <p:nvPr>
+            <p:ph type="sldNum" sz="quarter" idx="12"/>
+          </p:nvPr>
+        </p:nvSpPr>
+        <p:spPr/>
+        <p:txBody>
+          <a:bodyPr/>
+          <a:lstStyle/>
+          <a:p>
+            <a:fld id="{121E5A8C-2088-45D2-9D84-10B3EA412A4C}" type="slidenum">
+              <a:rPr lang="de-DE" smtClean="0"/>
+              <a:pPr/>
+              <a:t>7</a:t>
+            </a:fld>
+            <a:endParaRPr lang="de-DE" dirty="0"/>
+          </a:p>
+        </p:txBody>
+      </p:sp>
+      <p:sp>
+        <p:nvSpPr>
+          <p:cNvPr id="8" name="Abgerundetes Rechteck 7"/>
+          <p:cNvSpPr/>
+          <p:nvPr/>
+        </p:nvSpPr>
+        <p:spPr bwMode="auto">
+          <a:xfrm>
+            <a:off x="2411760" y="2924944"/>
+            <a:ext cx="1152128" cy="576064"/>
+          </a:xfrm>
+          <a:prstGeom prst="roundRect">
+            <a:avLst/>
+          </a:prstGeom>
+          <a:solidFill>
+            <a:srgbClr val="292929"/>
+          </a:solidFill>
+          <a:ln w="25400" cap="flat" cmpd="sng" algn="ctr">
+            <a:solidFill>
+              <a:schemeClr val="bg1"/>
+            </a:solidFill>
+            <a:prstDash val="solid"/>
+            <a:round/>
+            <a:headEnd type="none" w="med" len="med"/>
+            <a:tailEnd type="none" w="med" len="med"/>
+          </a:ln>
+          <a:effectLst>
+            <a:outerShdw blurRad="50800" dist="38100" dir="18900000" algn="bl" rotWithShape="0">
+              <a:prstClr val="black">
+                <a:alpha val="40000"/>
+              </a:prstClr>
+            </a:outerShdw>
+          </a:effectLst>
+        </p:spPr>
+        <p:txBody>
+          <a:bodyPr vert="horz" wrap="square" lIns="91440" tIns="45720" rIns="91440" bIns="45720" numCol="1" rtlCol="0" anchor="ctr" anchorCtr="0" compatLnSpc="1">
+            <a:prstTxWarp prst="textNoShape">
+              <a:avLst/>
+            </a:prstTxWarp>
+          </a:bodyPr>
+          <a:lstStyle/>
+          <a:p>
+            <a:pPr marR="0" indent="0" algn="ctr" eaLnBrk="0" fontAlgn="base" hangingPunct="0">
+              <a:lnSpc>
+                <a:spcPct val="100000"/>
+              </a:lnSpc>
+              <a:spcBef>
+                <a:spcPct val="0"/>
+              </a:spcBef>
+              <a:spcAft>
+                <a:spcPct val="0"/>
+              </a:spcAft>
+              <a:buClrTx/>
+              <a:buSzTx/>
+              <a:buFontTx/>
+              <a:buNone/>
+              <a:tabLst/>
+            </a:pPr>
+            <a:r>
+              <a:rPr lang="de-DE" sz="1600" dirty="0" err="1" smtClean="0">
+                <a:solidFill>
+                  <a:srgbClr val="FF9900"/>
+                </a:solidFill>
+                <a:effectLst>
+                  <a:outerShdw blurRad="50800" dist="50800" dir="5400000" algn="t" rotWithShape="0">
+                    <a:schemeClr val="tx1">
+                      <a:alpha val="50000"/>
+                    </a:schemeClr>
+                  </a:outerShdw>
+                </a:effectLst>
+                <a:ea typeface="ＭＳ Ｐゴシック" pitchFamily="-65" charset="-128"/>
+                <a:cs typeface="ＭＳ Ｐゴシック" pitchFamily="18" charset="-128"/>
+              </a:rPr>
+              <a:t>Controller</a:t>
+            </a:r>
+            <a:endParaRPr lang="de-DE" sz="2000" dirty="0" err="1" smtClean="0">
+              <a:solidFill>
+                <a:srgbClr val="FF9900"/>
+              </a:solidFill>
+              <a:effectLst>
+                <a:outerShdw blurRad="50800" dist="50800" dir="5400000" algn="t" rotWithShape="0">
+                  <a:schemeClr val="tx1">
+                    <a:alpha val="50000"/>
+                  </a:schemeClr>
+                </a:outerShdw>
+              </a:effectLst>
+              <a:ea typeface="ＭＳ Ｐゴシック" pitchFamily="-65" charset="-128"/>
+              <a:cs typeface="ＭＳ Ｐゴシック" pitchFamily="18" charset="-128"/>
+            </a:endParaRPr>
+          </a:p>
+        </p:txBody>
+      </p:sp>
+      <p:sp>
+        <p:nvSpPr>
+          <p:cNvPr id="9" name="Abgerundetes Rechteck 8"/>
+          <p:cNvSpPr/>
+          <p:nvPr/>
+        </p:nvSpPr>
+        <p:spPr bwMode="auto">
+          <a:xfrm>
+            <a:off x="683568" y="2924944"/>
+            <a:ext cx="1152128" cy="576064"/>
+          </a:xfrm>
+          <a:prstGeom prst="roundRect">
+            <a:avLst/>
+          </a:prstGeom>
+          <a:solidFill>
+            <a:srgbClr val="292929"/>
+          </a:solidFill>
+          <a:ln w="25400" cap="flat" cmpd="sng" algn="ctr">
+            <a:solidFill>
+              <a:schemeClr val="bg1"/>
+            </a:solidFill>
+            <a:prstDash val="solid"/>
+            <a:round/>
+            <a:headEnd type="none" w="med" len="med"/>
+            <a:tailEnd type="none" w="med" len="med"/>
+          </a:ln>
+          <a:effectLst>
+            <a:outerShdw blurRad="50800" dist="38100" dir="18900000" algn="bl" rotWithShape="0">
+              <a:prstClr val="black">
+                <a:alpha val="40000"/>
+              </a:prstClr>
+            </a:outerShdw>
+          </a:effectLst>
+        </p:spPr>
+        <p:txBody>
+          <a:bodyPr vert="horz" wrap="square" lIns="91440" tIns="45720" rIns="91440" bIns="45720" numCol="1" rtlCol="0" anchor="ctr" anchorCtr="0" compatLnSpc="1">
+            <a:prstTxWarp prst="textNoShape">
+              <a:avLst/>
+            </a:prstTxWarp>
+          </a:bodyPr>
+          <a:lstStyle/>
+          <a:p>
+            <a:pPr marR="0" indent="0" algn="ctr" eaLnBrk="0" fontAlgn="base" hangingPunct="0">
+              <a:lnSpc>
+                <a:spcPct val="100000"/>
+              </a:lnSpc>
+              <a:spcBef>
+                <a:spcPct val="0"/>
+              </a:spcBef>
+              <a:spcAft>
+                <a:spcPct val="0"/>
+              </a:spcAft>
+              <a:buClrTx/>
+              <a:buSzTx/>
+              <a:buFontTx/>
+              <a:buNone/>
+              <a:tabLst/>
+            </a:pPr>
+            <a:r>
+              <a:rPr lang="de-DE" sz="2000" smtClean="0">
+                <a:solidFill>
+                  <a:srgbClr val="FF9900"/>
+                </a:solidFill>
+                <a:effectLst>
+                  <a:outerShdw blurRad="50800" dist="50800" dir="5400000" algn="t" rotWithShape="0">
+                    <a:schemeClr val="tx1">
+                      <a:alpha val="50000"/>
+                    </a:schemeClr>
+                  </a:outerShdw>
+                </a:effectLst>
+                <a:ea typeface="ＭＳ Ｐゴシック" pitchFamily="-65" charset="-128"/>
+                <a:cs typeface="ＭＳ Ｐゴシック" pitchFamily="18" charset="-128"/>
+              </a:rPr>
+              <a:t>Model</a:t>
+            </a:r>
+            <a:endParaRPr lang="de-DE" sz="2000" dirty="0" err="1" smtClean="0">
+              <a:solidFill>
+                <a:srgbClr val="FF9900"/>
+              </a:solidFill>
+              <a:effectLst>
+                <a:outerShdw blurRad="50800" dist="50800" dir="5400000" algn="t" rotWithShape="0">
+                  <a:schemeClr val="tx1">
+                    <a:alpha val="50000"/>
+                  </a:schemeClr>
+                </a:outerShdw>
+              </a:effectLst>
+              <a:ea typeface="ＭＳ Ｐゴシック" pitchFamily="-65" charset="-128"/>
+              <a:cs typeface="ＭＳ Ｐゴシック" pitchFamily="18" charset="-128"/>
+            </a:endParaRPr>
+          </a:p>
+        </p:txBody>
+      </p:sp>
+      <p:sp>
+        <p:nvSpPr>
+          <p:cNvPr id="10" name="Abgerundetes Rechteck 9"/>
+          <p:cNvSpPr/>
+          <p:nvPr/>
+        </p:nvSpPr>
+        <p:spPr bwMode="auto">
+          <a:xfrm>
+            <a:off x="2411760" y="1772816"/>
+            <a:ext cx="1152128" cy="576064"/>
+          </a:xfrm>
+          <a:prstGeom prst="roundRect">
+            <a:avLst/>
+          </a:prstGeom>
+          <a:solidFill>
+            <a:srgbClr val="292929"/>
+          </a:solidFill>
+          <a:ln w="25400" cap="flat" cmpd="sng" algn="ctr">
+            <a:solidFill>
+              <a:schemeClr val="bg1"/>
+            </a:solidFill>
+            <a:prstDash val="solid"/>
+            <a:round/>
+            <a:headEnd type="none" w="med" len="med"/>
+            <a:tailEnd type="none" w="med" len="med"/>
+          </a:ln>
+          <a:effectLst>
+            <a:outerShdw blurRad="50800" dist="38100" dir="18900000" algn="bl" rotWithShape="0">
+              <a:prstClr val="black">
+                <a:alpha val="40000"/>
+              </a:prstClr>
+            </a:outerShdw>
+          </a:effectLst>
+        </p:spPr>
+        <p:txBody>
+          <a:bodyPr vert="horz" wrap="square" lIns="91440" tIns="45720" rIns="91440" bIns="45720" numCol="1" rtlCol="0" anchor="ctr" anchorCtr="0" compatLnSpc="1">
+            <a:prstTxWarp prst="textNoShape">
+              <a:avLst/>
+            </a:prstTxWarp>
+          </a:bodyPr>
+          <a:lstStyle/>
+          <a:p>
+            <a:pPr marR="0" indent="0" algn="ctr" eaLnBrk="0" fontAlgn="base" hangingPunct="0">
+              <a:lnSpc>
+                <a:spcPct val="100000"/>
+              </a:lnSpc>
+              <a:spcBef>
+                <a:spcPct val="0"/>
+              </a:spcBef>
+              <a:spcAft>
+                <a:spcPct val="0"/>
+              </a:spcAft>
+              <a:buClrTx/>
+              <a:buSzTx/>
+              <a:buFontTx/>
+              <a:buNone/>
+              <a:tabLst/>
+            </a:pPr>
+            <a:r>
+              <a:rPr lang="de-DE" sz="2000" smtClean="0">
+                <a:solidFill>
+                  <a:srgbClr val="FF9900"/>
+                </a:solidFill>
+                <a:effectLst>
+                  <a:outerShdw blurRad="50800" dist="50800" dir="5400000" algn="t" rotWithShape="0">
+                    <a:schemeClr val="tx1">
+                      <a:alpha val="50000"/>
+                    </a:schemeClr>
+                  </a:outerShdw>
+                </a:effectLst>
+                <a:ea typeface="ＭＳ Ｐゴシック" pitchFamily="-65" charset="-128"/>
+                <a:cs typeface="ＭＳ Ｐゴシック" pitchFamily="18" charset="-128"/>
+              </a:rPr>
+              <a:t>View</a:t>
+            </a:r>
+            <a:endParaRPr lang="de-DE" sz="2000" dirty="0" err="1" smtClean="0">
+              <a:solidFill>
+                <a:srgbClr val="FF9900"/>
+              </a:solidFill>
+              <a:effectLst>
+                <a:outerShdw blurRad="50800" dist="50800" dir="5400000" algn="t" rotWithShape="0">
+                  <a:schemeClr val="tx1">
+                    <a:alpha val="50000"/>
+                  </a:schemeClr>
+                </a:outerShdw>
+              </a:effectLst>
+              <a:ea typeface="ＭＳ Ｐゴシック" pitchFamily="-65" charset="-128"/>
+              <a:cs typeface="ＭＳ Ｐゴシック" pitchFamily="18" charset="-128"/>
+            </a:endParaRPr>
+          </a:p>
+        </p:txBody>
+      </p:sp>
+      <p:sp>
+        <p:nvSpPr>
+          <p:cNvPr id="12" name="Abgerundetes Rechteck 11"/>
+          <p:cNvSpPr/>
+          <p:nvPr/>
+        </p:nvSpPr>
+        <p:spPr bwMode="auto">
+          <a:xfrm>
+            <a:off x="2411760" y="4077072"/>
+            <a:ext cx="1152128" cy="576064"/>
+          </a:xfrm>
+          <a:prstGeom prst="roundRect">
+            <a:avLst/>
+          </a:prstGeom>
+          <a:solidFill>
+            <a:srgbClr val="292929"/>
+          </a:solidFill>
+          <a:ln w="25400" cap="flat" cmpd="sng" algn="ctr">
+            <a:solidFill>
+              <a:schemeClr val="bg1"/>
+            </a:solidFill>
+            <a:prstDash val="solid"/>
+            <a:round/>
+            <a:headEnd type="none" w="med" len="med"/>
+            <a:tailEnd type="none" w="med" len="med"/>
+          </a:ln>
+          <a:effectLst>
+            <a:outerShdw blurRad="50800" dist="38100" dir="18900000" algn="bl" rotWithShape="0">
+              <a:prstClr val="black">
+                <a:alpha val="40000"/>
+              </a:prstClr>
+            </a:outerShdw>
+          </a:effectLst>
+        </p:spPr>
+        <p:txBody>
+          <a:bodyPr vert="horz" wrap="square" lIns="91440" tIns="45720" rIns="91440" bIns="45720" numCol="1" rtlCol="0" anchor="ctr" anchorCtr="0" compatLnSpc="1">
+            <a:prstTxWarp prst="textNoShape">
+              <a:avLst/>
+            </a:prstTxWarp>
+          </a:bodyPr>
+          <a:lstStyle/>
+          <a:p>
+            <a:pPr marR="0" indent="0" algn="ctr" eaLnBrk="0" fontAlgn="base" hangingPunct="0">
+              <a:lnSpc>
+                <a:spcPct val="100000"/>
+              </a:lnSpc>
+              <a:spcBef>
+                <a:spcPct val="0"/>
+              </a:spcBef>
+              <a:spcAft>
+                <a:spcPct val="0"/>
+              </a:spcAft>
+              <a:buClrTx/>
+              <a:buSzTx/>
+              <a:buFontTx/>
+              <a:buNone/>
+              <a:tabLst/>
+            </a:pPr>
+            <a:r>
+              <a:rPr lang="de-DE" sz="2000" smtClean="0">
+                <a:solidFill>
+                  <a:srgbClr val="FF9900"/>
+                </a:solidFill>
+                <a:effectLst>
+                  <a:outerShdw blurRad="50800" dist="50800" dir="5400000" algn="t" rotWithShape="0">
+                    <a:schemeClr val="tx1">
+                      <a:alpha val="50000"/>
+                    </a:schemeClr>
+                  </a:outerShdw>
+                </a:effectLst>
+                <a:ea typeface="ＭＳ Ｐゴシック" pitchFamily="-65" charset="-128"/>
+                <a:cs typeface="ＭＳ Ｐゴシック" pitchFamily="18" charset="-128"/>
+              </a:rPr>
+              <a:t>Service</a:t>
+            </a:r>
+            <a:endParaRPr lang="de-DE" sz="2000" dirty="0" err="1" smtClean="0">
+              <a:solidFill>
+                <a:srgbClr val="FF9900"/>
+              </a:solidFill>
+              <a:effectLst>
+                <a:outerShdw blurRad="50800" dist="50800" dir="5400000" algn="t" rotWithShape="0">
+                  <a:schemeClr val="tx1">
+                    <a:alpha val="50000"/>
+                  </a:schemeClr>
+                </a:outerShdw>
+              </a:effectLst>
+              <a:ea typeface="ＭＳ Ｐゴシック" pitchFamily="-65" charset="-128"/>
+              <a:cs typeface="ＭＳ Ｐゴシック" pitchFamily="18" charset="-128"/>
+            </a:endParaRPr>
+          </a:p>
+        </p:txBody>
+      </p:sp>
+      <p:sp>
+        <p:nvSpPr>
+          <p:cNvPr id="13" name="Abgerundetes Rechteck 12"/>
+          <p:cNvSpPr/>
+          <p:nvPr/>
+        </p:nvSpPr>
+        <p:spPr bwMode="auto">
+          <a:xfrm>
+            <a:off x="683568" y="4077072"/>
+            <a:ext cx="1152128" cy="576064"/>
+          </a:xfrm>
+          <a:prstGeom prst="roundRect">
+            <a:avLst/>
+          </a:prstGeom>
+          <a:solidFill>
+            <a:srgbClr val="292929"/>
+          </a:solidFill>
+          <a:ln w="25400" cap="flat" cmpd="sng" algn="ctr">
+            <a:solidFill>
+              <a:schemeClr val="bg1"/>
+            </a:solidFill>
+            <a:prstDash val="solid"/>
+            <a:round/>
+            <a:headEnd type="none" w="med" len="med"/>
+            <a:tailEnd type="none" w="med" len="med"/>
+          </a:ln>
+          <a:effectLst>
+            <a:outerShdw blurRad="50800" dist="38100" dir="18900000" algn="bl" rotWithShape="0">
+              <a:prstClr val="black">
+                <a:alpha val="40000"/>
+              </a:prstClr>
+            </a:outerShdw>
+          </a:effectLst>
+        </p:spPr>
+        <p:txBody>
+          <a:bodyPr vert="horz" wrap="square" lIns="91440" tIns="45720" rIns="91440" bIns="45720" numCol="1" rtlCol="0" anchor="ctr" anchorCtr="0" compatLnSpc="1">
+            <a:prstTxWarp prst="textNoShape">
+              <a:avLst/>
+            </a:prstTxWarp>
+          </a:bodyPr>
+          <a:lstStyle/>
+          <a:p>
+            <a:pPr marR="0" indent="0" algn="ctr" eaLnBrk="0" fontAlgn="base" hangingPunct="0">
+              <a:lnSpc>
+                <a:spcPct val="100000"/>
+              </a:lnSpc>
+              <a:spcBef>
+                <a:spcPct val="0"/>
+              </a:spcBef>
+              <a:spcAft>
+                <a:spcPct val="0"/>
+              </a:spcAft>
+              <a:buClrTx/>
+              <a:buSzTx/>
+              <a:buFontTx/>
+              <a:buNone/>
+              <a:tabLst/>
+            </a:pPr>
+            <a:r>
+              <a:rPr lang="de-DE" sz="2000" smtClean="0">
+                <a:solidFill>
+                  <a:srgbClr val="FF9900"/>
+                </a:solidFill>
+                <a:effectLst>
+                  <a:outerShdw blurRad="50800" dist="50800" dir="5400000" algn="t" rotWithShape="0">
+                    <a:schemeClr val="tx1">
+                      <a:alpha val="50000"/>
+                    </a:schemeClr>
+                  </a:outerShdw>
+                </a:effectLst>
+                <a:ea typeface="ＭＳ Ｐゴシック" pitchFamily="-65" charset="-128"/>
+                <a:cs typeface="ＭＳ Ｐゴシック" pitchFamily="18" charset="-128"/>
+              </a:rPr>
+              <a:t>DAO</a:t>
+            </a:r>
+            <a:endParaRPr lang="de-DE" sz="2000" dirty="0" err="1" smtClean="0">
+              <a:solidFill>
+                <a:srgbClr val="FF9900"/>
+              </a:solidFill>
+              <a:effectLst>
+                <a:outerShdw blurRad="50800" dist="50800" dir="5400000" algn="t" rotWithShape="0">
+                  <a:schemeClr val="tx1">
+                    <a:alpha val="50000"/>
+                  </a:schemeClr>
+                </a:outerShdw>
+              </a:effectLst>
+              <a:ea typeface="ＭＳ Ｐゴシック" pitchFamily="-65" charset="-128"/>
+              <a:cs typeface="ＭＳ Ｐゴシック" pitchFamily="18" charset="-128"/>
+            </a:endParaRPr>
+          </a:p>
+        </p:txBody>
+      </p:sp>
+      <p:sp>
+        <p:nvSpPr>
+          <p:cNvPr id="14" name="Abgerundetes Rechteck 13"/>
+          <p:cNvSpPr/>
+          <p:nvPr/>
+        </p:nvSpPr>
+        <p:spPr bwMode="auto">
+          <a:xfrm>
+            <a:off x="1547664" y="5229200"/>
+            <a:ext cx="1152128" cy="576064"/>
+          </a:xfrm>
+          <a:prstGeom prst="roundRect">
+            <a:avLst/>
+          </a:prstGeom>
+          <a:solidFill>
+            <a:srgbClr val="292929"/>
+          </a:solidFill>
+          <a:ln w="25400" cap="flat" cmpd="sng" algn="ctr">
+            <a:solidFill>
+              <a:schemeClr val="bg1"/>
+            </a:solidFill>
+            <a:prstDash val="solid"/>
+            <a:round/>
+            <a:headEnd type="none" w="med" len="med"/>
+            <a:tailEnd type="none" w="med" len="med"/>
+          </a:ln>
+          <a:effectLst>
+            <a:outerShdw blurRad="50800" dist="38100" dir="18900000" algn="bl" rotWithShape="0">
+              <a:prstClr val="black">
+                <a:alpha val="40000"/>
+              </a:prstClr>
+            </a:outerShdw>
+          </a:effectLst>
+        </p:spPr>
+        <p:txBody>
+          <a:bodyPr vert="horz" wrap="square" lIns="91440" tIns="45720" rIns="91440" bIns="45720" numCol="1" rtlCol="0" anchor="ctr" anchorCtr="0" compatLnSpc="1">
+            <a:prstTxWarp prst="textNoShape">
+              <a:avLst/>
+            </a:prstTxWarp>
+          </a:bodyPr>
+          <a:lstStyle/>
+          <a:p>
+            <a:pPr marR="0" indent="0" algn="ctr" eaLnBrk="0" fontAlgn="base" hangingPunct="0">
+              <a:lnSpc>
+                <a:spcPct val="100000"/>
+              </a:lnSpc>
+              <a:spcBef>
+                <a:spcPct val="0"/>
+              </a:spcBef>
+              <a:spcAft>
+                <a:spcPct val="0"/>
+              </a:spcAft>
+              <a:buClrTx/>
+              <a:buSzTx/>
+              <a:buFontTx/>
+              <a:buNone/>
+              <a:tabLst/>
+            </a:pPr>
+            <a:r>
+              <a:rPr lang="de-DE" sz="2000" smtClean="0">
+                <a:solidFill>
+                  <a:srgbClr val="FF9900"/>
+                </a:solidFill>
+                <a:effectLst>
+                  <a:outerShdw blurRad="50800" dist="50800" dir="5400000" algn="t" rotWithShape="0">
+                    <a:schemeClr val="tx1">
+                      <a:alpha val="50000"/>
+                    </a:schemeClr>
+                  </a:outerShdw>
+                </a:effectLst>
+                <a:ea typeface="ＭＳ Ｐゴシック" pitchFamily="-65" charset="-128"/>
+                <a:cs typeface="ＭＳ Ｐゴシック" pitchFamily="18" charset="-128"/>
+              </a:rPr>
+              <a:t>Actor</a:t>
+            </a:r>
+            <a:endParaRPr lang="de-DE" sz="2000" dirty="0" err="1" smtClean="0">
+              <a:solidFill>
+                <a:srgbClr val="FF9900"/>
+              </a:solidFill>
+              <a:effectLst>
+                <a:outerShdw blurRad="50800" dist="50800" dir="5400000" algn="t" rotWithShape="0">
+                  <a:schemeClr val="tx1">
+                    <a:alpha val="50000"/>
+                  </a:schemeClr>
+                </a:outerShdw>
+              </a:effectLst>
+              <a:ea typeface="ＭＳ Ｐゴシック" pitchFamily="-65" charset="-128"/>
+              <a:cs typeface="ＭＳ Ｐゴシック" pitchFamily="18" charset="-128"/>
+            </a:endParaRPr>
+          </a:p>
+        </p:txBody>
+      </p:sp>
+      <p:cxnSp>
+        <p:nvCxnSpPr>
+          <p:cNvPr id="17" name="Gerade Verbindung mit Pfeil 16"/>
+          <p:cNvCxnSpPr>
+            <a:stCxn id="8" idx="0"/>
+            <a:endCxn id="10" idx="2"/>
+          </p:cNvCxnSpPr>
+          <p:nvPr/>
+        </p:nvCxnSpPr>
+        <p:spPr bwMode="auto">
+          <a:xfrm flipV="1">
+            <a:off x="2987824" y="2348880"/>
+            <a:ext cx="0" cy="576064"/>
+          </a:xfrm>
+          <a:prstGeom prst="straightConnector1">
+            <a:avLst/>
+          </a:prstGeom>
+          <a:solidFill>
+            <a:schemeClr val="accent1"/>
+          </a:solidFill>
+          <a:ln w="25400" cap="flat" cmpd="sng" algn="ctr">
+            <a:solidFill>
+              <a:schemeClr val="bg1"/>
+            </a:solidFill>
+            <a:prstDash val="solid"/>
+            <a:round/>
+            <a:headEnd type="triangle" w="med" len="med"/>
+            <a:tailEnd type="triangle"/>
+          </a:ln>
+          <a:effectLst/>
+        </p:spPr>
+      </p:cxnSp>
+      <p:cxnSp>
+        <p:nvCxnSpPr>
+          <p:cNvPr id="18" name="Gerade Verbindung mit Pfeil 17"/>
+          <p:cNvCxnSpPr>
+            <a:stCxn id="9" idx="3"/>
+            <a:endCxn id="8" idx="1"/>
+          </p:cNvCxnSpPr>
+          <p:nvPr/>
+        </p:nvCxnSpPr>
+        <p:spPr bwMode="auto">
+          <a:xfrm>
+            <a:off x="1835696" y="3212976"/>
+            <a:ext cx="576064" cy="0"/>
+          </a:xfrm>
+          <a:prstGeom prst="straightConnector1">
+            <a:avLst/>
+          </a:prstGeom>
+          <a:solidFill>
+            <a:schemeClr val="accent1"/>
+          </a:solidFill>
+          <a:ln w="25400" cap="flat" cmpd="sng" algn="ctr">
+            <a:solidFill>
+              <a:schemeClr val="bg1"/>
+            </a:solidFill>
+            <a:prstDash val="solid"/>
+            <a:round/>
+            <a:headEnd type="triangle" w="med" len="med"/>
+            <a:tailEnd type="none"/>
+          </a:ln>
+          <a:effectLst/>
+        </p:spPr>
+      </p:cxnSp>
+      <p:cxnSp>
+        <p:nvCxnSpPr>
+          <p:cNvPr id="22" name="Gerade Verbindung mit Pfeil 21"/>
+          <p:cNvCxnSpPr>
+            <a:stCxn id="8" idx="2"/>
+            <a:endCxn id="12" idx="0"/>
+          </p:cNvCxnSpPr>
+          <p:nvPr/>
+        </p:nvCxnSpPr>
+        <p:spPr bwMode="auto">
+          <a:xfrm>
+            <a:off x="2987824" y="3501008"/>
+            <a:ext cx="0" cy="576064"/>
+          </a:xfrm>
+          <a:prstGeom prst="straightConnector1">
+            <a:avLst/>
+          </a:prstGeom>
+          <a:solidFill>
+            <a:schemeClr val="accent1"/>
+          </a:solidFill>
+          <a:ln w="25400" cap="flat" cmpd="sng" algn="ctr">
+            <a:solidFill>
+              <a:schemeClr val="bg1"/>
+            </a:solidFill>
+            <a:prstDash val="solid"/>
+            <a:round/>
+            <a:headEnd type="none" w="med" len="med"/>
+            <a:tailEnd type="triangle"/>
+          </a:ln>
+          <a:effectLst/>
+        </p:spPr>
+      </p:cxnSp>
+      <p:cxnSp>
+        <p:nvCxnSpPr>
+          <p:cNvPr id="25" name="Gerade Verbindung mit Pfeil 24"/>
+          <p:cNvCxnSpPr>
+            <a:stCxn id="13" idx="3"/>
+            <a:endCxn id="12" idx="1"/>
+          </p:cNvCxnSpPr>
+          <p:nvPr/>
+        </p:nvCxnSpPr>
+        <p:spPr bwMode="auto">
+          <a:xfrm>
+            <a:off x="1835696" y="4365104"/>
+            <a:ext cx="576064" cy="0"/>
+          </a:xfrm>
+          <a:prstGeom prst="straightConnector1">
+            <a:avLst/>
+          </a:prstGeom>
+          <a:solidFill>
+            <a:schemeClr val="accent1"/>
+          </a:solidFill>
+          <a:ln w="25400" cap="flat" cmpd="sng" algn="ctr">
+            <a:solidFill>
+              <a:schemeClr val="bg1"/>
+            </a:solidFill>
+            <a:prstDash val="solid"/>
+            <a:round/>
+            <a:headEnd type="triangle" w="med" len="med"/>
+            <a:tailEnd type="none"/>
+          </a:ln>
+          <a:effectLst/>
+        </p:spPr>
+      </p:cxnSp>
+      <p:cxnSp>
+        <p:nvCxnSpPr>
+          <p:cNvPr id="28" name="Gerade Verbindung mit Pfeil 27"/>
+          <p:cNvCxnSpPr>
+            <a:stCxn id="13" idx="2"/>
+            <a:endCxn id="14" idx="0"/>
+          </p:cNvCxnSpPr>
+          <p:nvPr/>
+        </p:nvCxnSpPr>
+        <p:spPr bwMode="auto">
+          <a:xfrm>
+            <a:off x="1259632" y="4653136"/>
+            <a:ext cx="864096" cy="576064"/>
+          </a:xfrm>
+          <a:prstGeom prst="straightConnector1">
+            <a:avLst/>
+          </a:prstGeom>
+          <a:solidFill>
+            <a:schemeClr val="accent1"/>
+          </a:solidFill>
+          <a:ln w="25400" cap="flat" cmpd="sng" algn="ctr">
+            <a:solidFill>
+              <a:schemeClr val="bg1"/>
+            </a:solidFill>
+            <a:prstDash val="solid"/>
+            <a:round/>
+            <a:headEnd type="triangle" w="med" len="med"/>
+            <a:tailEnd type="none"/>
+          </a:ln>
+          <a:effectLst/>
+        </p:spPr>
+      </p:cxnSp>
+      <p:cxnSp>
+        <p:nvCxnSpPr>
+          <p:cNvPr id="32" name="Gerade Verbindung mit Pfeil 31"/>
+          <p:cNvCxnSpPr>
+            <a:stCxn id="12" idx="2"/>
+            <a:endCxn id="14" idx="0"/>
+          </p:cNvCxnSpPr>
+          <p:nvPr/>
+        </p:nvCxnSpPr>
+        <p:spPr bwMode="auto">
+          <a:xfrm flipH="1">
+            <a:off x="2123728" y="4653136"/>
+            <a:ext cx="864096" cy="576064"/>
+          </a:xfrm>
+          <a:prstGeom prst="straightConnector1">
+            <a:avLst/>
+          </a:prstGeom>
+          <a:solidFill>
+            <a:schemeClr val="accent1"/>
+          </a:solidFill>
+          <a:ln w="25400" cap="flat" cmpd="sng" algn="ctr">
+            <a:solidFill>
+              <a:schemeClr val="bg1"/>
+            </a:solidFill>
+            <a:prstDash val="solid"/>
+            <a:round/>
+            <a:headEnd type="triangle" w="med" len="med"/>
+            <a:tailEnd type="none"/>
+          </a:ln>
+          <a:effectLst/>
+        </p:spPr>
+      </p:cxnSp>
+      <p:cxnSp>
+        <p:nvCxnSpPr>
+          <p:cNvPr id="35" name="Gerade Verbindung mit Pfeil 34"/>
+          <p:cNvCxnSpPr/>
+          <p:nvPr/>
+        </p:nvCxnSpPr>
+        <p:spPr bwMode="auto">
+          <a:xfrm flipV="1">
+            <a:off x="1835696" y="3429000"/>
+            <a:ext cx="576064" cy="648072"/>
+          </a:xfrm>
+          <a:prstGeom prst="straightConnector1">
+            <a:avLst/>
+          </a:prstGeom>
+          <a:solidFill>
+            <a:schemeClr val="accent1"/>
+          </a:solidFill>
+          <a:ln w="25400" cap="flat" cmpd="sng" algn="ctr">
+            <a:solidFill>
+              <a:schemeClr val="bg1"/>
+            </a:solidFill>
+            <a:prstDash val="solid"/>
+            <a:round/>
+            <a:headEnd type="triangle" w="med" len="med"/>
+            <a:tailEnd type="none"/>
+          </a:ln>
+          <a:effectLst/>
+        </p:spPr>
+      </p:cxnSp>
+      <p:cxnSp>
+        <p:nvCxnSpPr>
+          <p:cNvPr id="38" name="Gerade Verbindung mit Pfeil 37"/>
+          <p:cNvCxnSpPr>
+            <a:stCxn id="9" idx="2"/>
+            <a:endCxn id="13" idx="0"/>
+          </p:cNvCxnSpPr>
+          <p:nvPr/>
+        </p:nvCxnSpPr>
+        <p:spPr bwMode="auto">
+          <a:xfrm>
+            <a:off x="1259632" y="3501008"/>
+            <a:ext cx="0" cy="576064"/>
+          </a:xfrm>
+          <a:prstGeom prst="straightConnector1">
+            <a:avLst/>
+          </a:prstGeom>
+          <a:solidFill>
+            <a:schemeClr val="accent1"/>
+          </a:solidFill>
+          <a:ln w="25400" cap="flat" cmpd="sng" algn="ctr">
+            <a:solidFill>
+              <a:schemeClr val="bg1"/>
+            </a:solidFill>
+            <a:prstDash val="solid"/>
+            <a:round/>
+            <a:headEnd type="triangle" w="med" len="med"/>
+            <a:tailEnd type="none"/>
+          </a:ln>
+          <a:effectLst/>
+        </p:spPr>
+      </p:cxnSp>
+      <p:sp>
+        <p:nvSpPr>
+          <p:cNvPr id="45" name="Inhaltsplatzhalter 2"/>
+          <p:cNvSpPr txBox="1">
+            <a:spLocks/>
+          </p:cNvSpPr>
+          <p:nvPr/>
+        </p:nvSpPr>
+        <p:spPr bwMode="auto">
+          <a:xfrm>
+            <a:off x="3851920" y="1556792"/>
+            <a:ext cx="4896544" cy="4680520"/>
+          </a:xfrm>
+          <a:prstGeom prst="rect">
+            <a:avLst/>
+          </a:prstGeom>
+          <a:noFill/>
+          <a:ln>
+            <a:noFill/>
+          </a:ln>
+          <a:extLst>
+            <a:ext uri="{909E8E84-426E-40DD-AFC4-6F175D3DCCD1}">
+              <a14:hiddenFill xmlns:a14="http://schemas.microsoft.com/office/drawing/2010/main" xmlns="">
+                <a:solidFill>
+                  <a:srgbClr val="FFFFFF"/>
+                </a:solidFill>
+              </a14:hiddenFill>
+            </a:ext>
+            <a:ext uri="{91240B29-F687-4F45-9708-019B960494DF}">
+              <a14:hiddenLine xmlns:a14="http://schemas.microsoft.com/office/drawing/2010/main" xmlns="" w="9525">
+                <a:solidFill>
+                  <a:srgbClr val="000000"/>
+                </a:solidFill>
+                <a:miter lim="800000"/>
+                <a:headEnd/>
+                <a:tailEnd/>
+              </a14:hiddenLine>
+            </a:ext>
+          </a:extLst>
+        </p:spPr>
+        <p:txBody>
+          <a:bodyPr vert="horz" wrap="square" lIns="91440" tIns="45720" rIns="91440" bIns="45720" numCol="1" anchor="ctr" anchorCtr="0" compatLnSpc="1">
+            <a:prstTxWarp prst="textNoShape">
+              <a:avLst/>
+            </a:prstTxWarp>
+          </a:bodyPr>
+          <a:lstStyle>
+            <a:lvl1pPr marL="342900" indent="-342900" fontAlgn="base">
+              <a:spcBef>
+                <a:spcPct val="20000"/>
+              </a:spcBef>
+              <a:spcAft>
+                <a:spcPct val="0"/>
+              </a:spcAft>
+              <a:buChar char="•"/>
+              <a:defRPr sz="2400">
+                <a:solidFill>
+                  <a:schemeClr val="bg1"/>
+                </a:solidFill>
+                <a:effectLst>
+                  <a:outerShdw blurRad="50800" dist="50800" dir="5400000" algn="t" rotWithShape="0">
+                    <a:schemeClr val="tx1">
+                      <a:alpha val="50000"/>
+                    </a:schemeClr>
+                  </a:outerShdw>
+                </a:effectLst>
+                <a:ea typeface="ＭＳ Ｐゴシック" pitchFamily="-65" charset="-128"/>
+                <a:cs typeface="ＭＳ Ｐゴシック" pitchFamily="18" charset="-128"/>
+              </a:defRPr>
+            </a:lvl1pPr>
+            <a:lvl2pPr marL="742950" indent="-285750" fontAlgn="base">
+              <a:spcBef>
+                <a:spcPct val="20000"/>
+              </a:spcBef>
+              <a:spcAft>
+                <a:spcPct val="0"/>
+              </a:spcAft>
+              <a:buChar char="–"/>
+              <a:defRPr sz="2000">
+                <a:ea typeface="ＭＳ Ｐゴシック" pitchFamily="-65" charset="-128"/>
+              </a:defRPr>
+            </a:lvl2pPr>
+            <a:lvl3pPr marL="1143000" indent="-228600" fontAlgn="base">
+              <a:spcBef>
+                <a:spcPct val="20000"/>
+              </a:spcBef>
+              <a:spcAft>
+                <a:spcPct val="0"/>
+              </a:spcAft>
+              <a:buChar char="•"/>
+              <a:defRPr sz="2000">
+                <a:ea typeface="ＭＳ Ｐゴシック" pitchFamily="-65" charset="-128"/>
+              </a:defRPr>
+            </a:lvl3pPr>
+            <a:lvl4pPr marL="1562100" indent="-228600" fontAlgn="base">
+              <a:spcBef>
+                <a:spcPct val="20000"/>
+              </a:spcBef>
+              <a:spcAft>
+                <a:spcPct val="0"/>
+              </a:spcAft>
+              <a:buChar char="–"/>
+              <a:defRPr sz="2000">
+                <a:ea typeface="ＭＳ Ｐゴシック" pitchFamily="-65" charset="-128"/>
+              </a:defRPr>
+            </a:lvl4pPr>
+            <a:lvl5pPr marL="1981200" indent="-228600" fontAlgn="base">
+              <a:spcBef>
+                <a:spcPct val="20000"/>
+              </a:spcBef>
+              <a:spcAft>
+                <a:spcPct val="0"/>
+              </a:spcAft>
+              <a:buChar char="»"/>
+              <a:defRPr sz="2000">
+                <a:ea typeface="ＭＳ Ｐゴシック" pitchFamily="-65" charset="-128"/>
+              </a:defRPr>
+            </a:lvl5pPr>
+            <a:lvl6pPr marL="2438400" indent="-228600" fontAlgn="base">
+              <a:spcBef>
+                <a:spcPct val="20000"/>
+              </a:spcBef>
+              <a:spcAft>
+                <a:spcPct val="0"/>
+              </a:spcAft>
+              <a:buChar char="»"/>
+              <a:defRPr sz="1400"/>
+            </a:lvl6pPr>
+            <a:lvl7pPr marL="2895600" indent="-228600" fontAlgn="base">
+              <a:spcBef>
+                <a:spcPct val="20000"/>
+              </a:spcBef>
+              <a:spcAft>
+                <a:spcPct val="0"/>
+              </a:spcAft>
+              <a:buChar char="»"/>
+              <a:defRPr sz="1400"/>
+            </a:lvl7pPr>
+            <a:lvl8pPr marL="3352800" indent="-228600" fontAlgn="base">
+              <a:spcBef>
+                <a:spcPct val="20000"/>
+              </a:spcBef>
+              <a:spcAft>
+                <a:spcPct val="0"/>
+              </a:spcAft>
+              <a:buChar char="»"/>
+              <a:defRPr sz="1400"/>
+            </a:lvl8pPr>
+            <a:lvl9pPr marL="3810000" indent="-228600" fontAlgn="base">
+              <a:spcBef>
+                <a:spcPct val="20000"/>
+              </a:spcBef>
+              <a:spcAft>
+                <a:spcPct val="0"/>
+              </a:spcAft>
+              <a:buChar char="»"/>
+              <a:defRPr sz="1400"/>
+            </a:lvl9pPr>
+          </a:lstStyle>
+          <a:p>
+            <a:r>
+              <a:rPr lang="de-DE" sz="2000" smtClean="0"/>
+              <a:t>Services: Encapsulate </a:t>
+            </a:r>
+            <a:r>
+              <a:rPr lang="de-DE" sz="2000" smtClean="0">
+                <a:solidFill>
+                  <a:srgbClr val="FF9900"/>
+                </a:solidFill>
+              </a:rPr>
+              <a:t>business logic</a:t>
+            </a:r>
+          </a:p>
+          <a:p>
+            <a:r>
+              <a:rPr lang="de-DE" sz="2000" smtClean="0"/>
+              <a:t>DAOs: </a:t>
+            </a:r>
+            <a:r>
+              <a:rPr lang="de-DE" sz="2000" smtClean="0">
+                <a:solidFill>
+                  <a:srgbClr val="FF9900"/>
+                </a:solidFill>
+              </a:rPr>
+              <a:t>Abstract</a:t>
+            </a:r>
+            <a:r>
+              <a:rPr lang="de-DE" sz="2000" smtClean="0"/>
+              <a:t> from the database</a:t>
+            </a:r>
+          </a:p>
+          <a:p>
+            <a:r>
+              <a:rPr lang="de-DE" sz="2000" smtClean="0"/>
+              <a:t>Views: User interface </a:t>
+            </a:r>
+            <a:r>
+              <a:rPr lang="de-DE" sz="2000" smtClean="0">
+                <a:solidFill>
+                  <a:srgbClr val="FF9900"/>
+                </a:solidFill>
+              </a:rPr>
+              <a:t>templates</a:t>
+            </a:r>
+          </a:p>
+          <a:p>
+            <a:r>
+              <a:rPr lang="de-DE" sz="2000" smtClean="0"/>
+              <a:t>Models: Represent </a:t>
+            </a:r>
+            <a:r>
+              <a:rPr lang="de-DE" sz="2000" smtClean="0">
+                <a:solidFill>
+                  <a:srgbClr val="FF9900"/>
+                </a:solidFill>
+              </a:rPr>
+              <a:t>entities</a:t>
+            </a:r>
+          </a:p>
+          <a:p>
+            <a:r>
+              <a:rPr lang="de-DE" sz="2000" smtClean="0"/>
+              <a:t>Controller: </a:t>
+            </a:r>
+            <a:r>
+              <a:rPr lang="de-DE" sz="2000" smtClean="0">
+                <a:solidFill>
+                  <a:srgbClr val="FF9900"/>
+                </a:solidFill>
+              </a:rPr>
+              <a:t>Connect</a:t>
+            </a:r>
+            <a:r>
+              <a:rPr lang="de-DE" sz="2000" smtClean="0"/>
+              <a:t> business logic, data storage and representation</a:t>
+            </a:r>
+          </a:p>
+          <a:p>
+            <a:r>
+              <a:rPr lang="de-DE" sz="2000" smtClean="0"/>
+              <a:t>Actors: Carry out </a:t>
+            </a:r>
+            <a:r>
+              <a:rPr lang="de-DE" sz="2000" smtClean="0">
+                <a:solidFill>
+                  <a:srgbClr val="FF9900"/>
+                </a:solidFill>
+              </a:rPr>
+              <a:t>concurrent</a:t>
+            </a:r>
+            <a:r>
+              <a:rPr lang="de-DE" sz="2000" smtClean="0"/>
+              <a:t> and </a:t>
+            </a:r>
+            <a:r>
+              <a:rPr lang="de-DE" sz="2000" smtClean="0">
+                <a:solidFill>
+                  <a:srgbClr val="FF9900"/>
+                </a:solidFill>
+              </a:rPr>
+              <a:t>asynchronous</a:t>
+            </a:r>
+            <a:r>
+              <a:rPr lang="de-DE" sz="2000" smtClean="0"/>
+              <a:t> actions</a:t>
+            </a:r>
+            <a:endParaRPr lang="de-DE" sz="2000" dirty="0"/>
+          </a:p>
+        </p:txBody>
+      </p:sp>
+    </p:spTree>
+    <p:extLst>
+      <p:ext uri="{BB962C8B-B14F-4D97-AF65-F5344CB8AC3E}">
+        <p14:creationId xmlns:p14="http://schemas.microsoft.com/office/powerpoint/2010/main" xmlns="" val="1759617674"/>
+      </p:ext>
+    </p:extLst>
+  </p:cSld>
+  <p:clrMapOvr>
+    <a:masterClrMapping/>
+  </p:clrMapOvr>
+  <p:timing>
+    <p:tnLst>
+      <p:par>
+        <p:cTn id="1" dur="indefinite" restart="never" nodeType="tmRoot"/>
+      </p:par>
+    </p:tnLst>
+  </p:timing>
+</p:sld>
+</file>
+
+<file path=ppt/slides/slide8.xml><?xml version="1.0" encoding="utf-8"?>
+<p:sld xmlns:a="http://schemas.openxmlformats.org/drawingml/2006/main" xmlns:r="http://schemas.openxmlformats.org/officeDocument/2006/relationships" xmlns:p="http://schemas.openxmlformats.org/presentationml/2006/main">
+  <p:cSld>
+    <p:spTree>
+      <p:nvGrpSpPr>
+        <p:cNvPr id="1" name=""/>
+        <p:cNvGrpSpPr/>
+        <p:nvPr/>
+      </p:nvGrpSpPr>
+      <p:grpSpPr>
+        <a:xfrm>
+          <a:off x="0" y="0"/>
+          <a:ext cx="0" cy="0"/>
+          <a:chOff x="0" y="0"/>
+          <a:chExt cx="0" cy="0"/>
+        </a:xfrm>
+      </p:grpSpPr>
+      <p:sp>
+        <p:nvSpPr>
+          <p:cNvPr id="62" name="Rounded Rectangle 7"/>
+          <p:cNvSpPr/>
+          <p:nvPr/>
+        </p:nvSpPr>
+        <p:spPr bwMode="auto">
+          <a:xfrm>
+            <a:off x="179512" y="1556792"/>
+            <a:ext cx="8784976" cy="4680520"/>
+          </a:xfrm>
+          <a:prstGeom prst="roundRect">
+            <a:avLst>
+              <a:gd name="adj" fmla="val 13985"/>
+            </a:avLst>
+          </a:prstGeom>
+          <a:solidFill>
+            <a:srgbClr val="292929"/>
+          </a:solidFill>
+          <a:ln w="9525" cap="flat" cmpd="sng" algn="ctr">
+            <a:noFill/>
+            <a:prstDash val="solid"/>
+            <a:round/>
+            <a:headEnd type="none" w="med" len="med"/>
+            <a:tailEnd type="none" w="med" len="med"/>
+          </a:ln>
+          <a:effectLst>
+            <a:innerShdw blurRad="114300">
+              <a:prstClr val="black"/>
+            </a:innerShdw>
+          </a:effectLst>
+        </p:spPr>
+        <p:txBody>
+          <a:bodyPr vert="horz" wrap="square" lIns="91440" tIns="45720" rIns="91440" bIns="45720" numCol="1" rtlCol="0" anchor="t" anchorCtr="0" compatLnSpc="1">
+            <a:prstTxWarp prst="textNoShape">
+              <a:avLst/>
+            </a:prstTxWarp>
+          </a:bodyPr>
+          <a:lstStyle/>
+          <a:p>
+            <a:pPr algn="r" eaLnBrk="0" fontAlgn="base" hangingPunct="0">
+              <a:spcBef>
+                <a:spcPct val="0"/>
+              </a:spcBef>
+              <a:spcAft>
+                <a:spcPct val="0"/>
+              </a:spcAft>
+            </a:pPr>
+            <a:endParaRPr lang="de-DE" sz="2000">
+              <a:latin typeface="Arial" pitchFamily="34" charset="0"/>
+            </a:endParaRPr>
+          </a:p>
+        </p:txBody>
+      </p:sp>
+      <p:sp>
+        <p:nvSpPr>
+          <p:cNvPr id="2" name="Tytuł 1"/>
+          <p:cNvSpPr>
+            <a:spLocks noGrp="1"/>
+          </p:cNvSpPr>
+          <p:nvPr>
+            <p:ph type="title"/>
+          </p:nvPr>
+        </p:nvSpPr>
+        <p:spPr/>
+        <p:txBody>
+          <a:bodyPr/>
+          <a:lstStyle/>
+          <a:p>
+            <a:r>
+              <a:rPr lang="de-DE" smtClean="0">
+                <a:solidFill>
+                  <a:schemeClr val="bg1"/>
+                </a:solidFill>
+              </a:rPr>
+              <a:t>Architecture example: Conquering</a:t>
+            </a:r>
+            <a:endParaRPr lang="pl-PL" dirty="0">
+              <a:solidFill>
+                <a:schemeClr val="bg1"/>
+              </a:solidFill>
+            </a:endParaRPr>
+          </a:p>
+        </p:txBody>
+      </p:sp>
+      <p:sp>
+        <p:nvSpPr>
+          <p:cNvPr id="4" name="Symbol zastępczy daty 3"/>
+          <p:cNvSpPr>
+            <a:spLocks noGrp="1"/>
+          </p:cNvSpPr>
+          <p:nvPr>
+            <p:ph type="dt" sz="half" idx="10"/>
+          </p:nvPr>
+        </p:nvSpPr>
+        <p:spPr/>
+        <p:txBody>
+          <a:bodyPr/>
+          <a:lstStyle/>
+          <a:p>
+            <a:r>
+              <a:rPr lang="pl-PL" dirty="0" smtClean="0"/>
+              <a:t>19</a:t>
+            </a:r>
+            <a:r>
+              <a:rPr lang="de-DE" dirty="0" smtClean="0"/>
+              <a:t>.11.2012</a:t>
+            </a:r>
+            <a:endParaRPr lang="de-DE" dirty="0"/>
+          </a:p>
+        </p:txBody>
+      </p:sp>
+      <p:sp>
+        <p:nvSpPr>
+          <p:cNvPr id="5" name="Symbol zastępczy stopki 4"/>
+          <p:cNvSpPr>
+            <a:spLocks noGrp="1"/>
+          </p:cNvSpPr>
+          <p:nvPr>
+            <p:ph type="ftr" sz="quarter" idx="11"/>
+          </p:nvPr>
+        </p:nvSpPr>
+        <p:spPr/>
+        <p:txBody>
+          <a:bodyPr/>
+          <a:lstStyle/>
+          <a:p>
+            <a:r>
+              <a:rPr lang="de-DE" dirty="0" smtClean="0"/>
+              <a:t>Master Lab </a:t>
+            </a:r>
+            <a:r>
+              <a:rPr lang="de-DE" dirty="0" err="1" smtClean="0"/>
+              <a:t>Course</a:t>
+            </a:r>
+            <a:r>
+              <a:rPr lang="de-DE" dirty="0" smtClean="0"/>
+              <a:t> Web </a:t>
+            </a:r>
+            <a:r>
+              <a:rPr lang="de-DE" dirty="0" err="1" smtClean="0"/>
+              <a:t>Applications</a:t>
+            </a:r>
+            <a:endParaRPr lang="de-DE" dirty="0"/>
+          </a:p>
+        </p:txBody>
+      </p:sp>
+      <p:sp>
+        <p:nvSpPr>
+          <p:cNvPr id="6" name="Symbol zastępczy numeru slajdu 5"/>
+          <p:cNvSpPr>
+            <a:spLocks noGrp="1"/>
+          </p:cNvSpPr>
+          <p:nvPr>
+            <p:ph type="sldNum" sz="quarter" idx="12"/>
+          </p:nvPr>
+        </p:nvSpPr>
+        <p:spPr/>
+        <p:txBody>
+          <a:bodyPr/>
+          <a:lstStyle/>
+          <a:p>
+            <a:fld id="{121E5A8C-2088-45D2-9D84-10B3EA412A4C}" type="slidenum">
+              <a:rPr lang="de-DE" smtClean="0"/>
+              <a:pPr/>
+              <a:t>8</a:t>
+            </a:fld>
+            <a:endParaRPr lang="de-DE" dirty="0"/>
+          </a:p>
+        </p:txBody>
+      </p:sp>
+      <p:sp>
+        <p:nvSpPr>
+          <p:cNvPr id="8" name="Abgerundetes Rechteck 7"/>
+          <p:cNvSpPr/>
+          <p:nvPr/>
+        </p:nvSpPr>
+        <p:spPr bwMode="auto">
+          <a:xfrm>
+            <a:off x="1259632" y="2852936"/>
+            <a:ext cx="1152128" cy="576064"/>
+          </a:xfrm>
+          <a:prstGeom prst="roundRect">
+            <a:avLst/>
+          </a:prstGeom>
+          <a:solidFill>
+            <a:srgbClr val="292929"/>
+          </a:solidFill>
+          <a:ln w="25400" cap="flat" cmpd="sng" algn="ctr">
+            <a:solidFill>
+              <a:schemeClr val="bg1"/>
+            </a:solidFill>
+            <a:prstDash val="solid"/>
+            <a:round/>
+            <a:headEnd type="none" w="med" len="med"/>
+            <a:tailEnd type="none" w="med" len="med"/>
+          </a:ln>
+          <a:effectLst>
+            <a:outerShdw blurRad="50800" dist="38100" dir="18900000" algn="bl" rotWithShape="0">
+              <a:prstClr val="black">
+                <a:alpha val="40000"/>
+              </a:prstClr>
+            </a:outerShdw>
+          </a:effectLst>
+        </p:spPr>
+        <p:txBody>
+          <a:bodyPr vert="horz" wrap="square" lIns="91440" tIns="45720" rIns="91440" bIns="45720" numCol="1" rtlCol="0" anchor="ctr" anchorCtr="0" compatLnSpc="1">
+            <a:prstTxWarp prst="textNoShape">
+              <a:avLst/>
+            </a:prstTxWarp>
+          </a:bodyPr>
+          <a:lstStyle/>
+          <a:p>
+            <a:pPr marR="0" indent="0" algn="ctr" eaLnBrk="0" fontAlgn="base" hangingPunct="0">
+              <a:lnSpc>
+                <a:spcPct val="100000"/>
+              </a:lnSpc>
+              <a:spcBef>
+                <a:spcPct val="0"/>
+              </a:spcBef>
+              <a:spcAft>
+                <a:spcPct val="0"/>
+              </a:spcAft>
+              <a:buClrTx/>
+              <a:buSzTx/>
+              <a:buFontTx/>
+              <a:buNone/>
+              <a:tabLst/>
+            </a:pPr>
+            <a:r>
+              <a:rPr lang="de-DE" sz="1600" smtClean="0">
+                <a:solidFill>
+                  <a:srgbClr val="FF9900"/>
+                </a:solidFill>
+                <a:effectLst>
+                  <a:outerShdw blurRad="50800" dist="50800" dir="5400000" algn="t" rotWithShape="0">
+                    <a:schemeClr val="tx1">
+                      <a:alpha val="50000"/>
+                    </a:schemeClr>
+                  </a:outerShdw>
+                </a:effectLst>
+                <a:ea typeface="ＭＳ Ｐゴシック" pitchFamily="-65" charset="-128"/>
+                <a:cs typeface="ＭＳ Ｐゴシック" pitchFamily="18" charset="-128"/>
+              </a:rPr>
+              <a:t>ConquerController</a:t>
+            </a:r>
+            <a:endParaRPr lang="de-DE" sz="2000" dirty="0" err="1" smtClean="0">
+              <a:solidFill>
+                <a:srgbClr val="FF9900"/>
+              </a:solidFill>
+              <a:effectLst>
+                <a:outerShdw blurRad="50800" dist="50800" dir="5400000" algn="t" rotWithShape="0">
+                  <a:schemeClr val="tx1">
+                    <a:alpha val="50000"/>
+                  </a:schemeClr>
+                </a:outerShdw>
+              </a:effectLst>
+              <a:ea typeface="ＭＳ Ｐゴシック" pitchFamily="-65" charset="-128"/>
+              <a:cs typeface="ＭＳ Ｐゴシック" pitchFamily="18" charset="-128"/>
+            </a:endParaRPr>
+          </a:p>
+        </p:txBody>
+      </p:sp>
+      <p:sp>
+        <p:nvSpPr>
+          <p:cNvPr id="10" name="Abgerundetes Rechteck 9"/>
+          <p:cNvSpPr/>
+          <p:nvPr/>
+        </p:nvSpPr>
+        <p:spPr bwMode="auto">
+          <a:xfrm>
+            <a:off x="1259632" y="1772816"/>
+            <a:ext cx="1152128" cy="576064"/>
+          </a:xfrm>
+          <a:prstGeom prst="roundRect">
+            <a:avLst/>
+          </a:prstGeom>
+          <a:solidFill>
+            <a:srgbClr val="292929"/>
+          </a:solidFill>
+          <a:ln w="25400" cap="flat" cmpd="sng" algn="ctr">
+            <a:solidFill>
+              <a:schemeClr val="bg1"/>
+            </a:solidFill>
+            <a:prstDash val="solid"/>
+            <a:round/>
+            <a:headEnd type="none" w="med" len="med"/>
+            <a:tailEnd type="none" w="med" len="med"/>
+          </a:ln>
+          <a:effectLst>
+            <a:outerShdw blurRad="50800" dist="38100" dir="18900000" algn="bl" rotWithShape="0">
+              <a:prstClr val="black">
+                <a:alpha val="40000"/>
+              </a:prstClr>
+            </a:outerShdw>
+          </a:effectLst>
+        </p:spPr>
+        <p:txBody>
+          <a:bodyPr vert="horz" wrap="square" lIns="91440" tIns="45720" rIns="91440" bIns="45720" numCol="1" rtlCol="0" anchor="ctr" anchorCtr="0" compatLnSpc="1">
+            <a:prstTxWarp prst="textNoShape">
+              <a:avLst/>
+            </a:prstTxWarp>
+          </a:bodyPr>
+          <a:lstStyle/>
+          <a:p>
+            <a:pPr marR="0" indent="0" algn="ctr" eaLnBrk="0" fontAlgn="base" hangingPunct="0">
+              <a:lnSpc>
+                <a:spcPct val="100000"/>
+              </a:lnSpc>
+              <a:spcBef>
+                <a:spcPct val="0"/>
+              </a:spcBef>
+              <a:spcAft>
+                <a:spcPct val="0"/>
+              </a:spcAft>
+              <a:buClrTx/>
+              <a:buSzTx/>
+              <a:buFontTx/>
+              <a:buNone/>
+              <a:tabLst/>
+            </a:pPr>
+            <a:r>
+              <a:rPr lang="de-DE" sz="2000" smtClean="0">
+                <a:solidFill>
+                  <a:srgbClr val="FF9900"/>
+                </a:solidFill>
+                <a:effectLst>
+                  <a:outerShdw blurRad="50800" dist="50800" dir="5400000" algn="t" rotWithShape="0">
+                    <a:schemeClr val="tx1">
+                      <a:alpha val="50000"/>
+                    </a:schemeClr>
+                  </a:outerShdw>
+                </a:effectLst>
+                <a:ea typeface="ＭＳ Ｐゴシック" pitchFamily="-65" charset="-128"/>
+                <a:cs typeface="ＭＳ Ｐゴシック" pitchFamily="18" charset="-128"/>
+              </a:rPr>
+              <a:t>index</a:t>
+            </a:r>
+            <a:endParaRPr lang="de-DE" sz="2000" dirty="0" err="1" smtClean="0">
+              <a:solidFill>
+                <a:srgbClr val="FF9900"/>
+              </a:solidFill>
+              <a:effectLst>
+                <a:outerShdw blurRad="50800" dist="50800" dir="5400000" algn="t" rotWithShape="0">
+                  <a:schemeClr val="tx1">
+                    <a:alpha val="50000"/>
+                  </a:schemeClr>
+                </a:outerShdw>
+              </a:effectLst>
+              <a:ea typeface="ＭＳ Ｐゴシック" pitchFamily="-65" charset="-128"/>
+              <a:cs typeface="ＭＳ Ｐゴシック" pitchFamily="18" charset="-128"/>
+            </a:endParaRPr>
+          </a:p>
+        </p:txBody>
+      </p:sp>
+      <p:cxnSp>
+        <p:nvCxnSpPr>
+          <p:cNvPr id="17" name="Gerade Verbindung mit Pfeil 16"/>
+          <p:cNvCxnSpPr>
+            <a:stCxn id="8" idx="0"/>
+            <a:endCxn id="10" idx="2"/>
+          </p:cNvCxnSpPr>
+          <p:nvPr/>
+        </p:nvCxnSpPr>
+        <p:spPr bwMode="auto">
+          <a:xfrm flipV="1">
+            <a:off x="1835696" y="2348880"/>
+            <a:ext cx="0" cy="504056"/>
+          </a:xfrm>
+          <a:prstGeom prst="straightConnector1">
+            <a:avLst/>
+          </a:prstGeom>
+          <a:solidFill>
+            <a:schemeClr val="accent1"/>
+          </a:solidFill>
+          <a:ln w="25400" cap="flat" cmpd="sng" algn="ctr">
+            <a:solidFill>
+              <a:schemeClr val="bg1"/>
+            </a:solidFill>
+            <a:prstDash val="solid"/>
+            <a:round/>
+            <a:headEnd type="triangle" w="med" len="med"/>
+            <a:tailEnd type="triangle"/>
+          </a:ln>
+          <a:effectLst/>
+        </p:spPr>
+      </p:cxnSp>
+      <p:sp>
+        <p:nvSpPr>
+          <p:cNvPr id="45" name="Inhaltsplatzhalter 2"/>
+          <p:cNvSpPr txBox="1">
+            <a:spLocks/>
+          </p:cNvSpPr>
+          <p:nvPr/>
+        </p:nvSpPr>
+        <p:spPr bwMode="auto">
+          <a:xfrm>
+            <a:off x="5148064" y="1772816"/>
+            <a:ext cx="3672408" cy="4248472"/>
+          </a:xfrm>
+          <a:prstGeom prst="rect">
+            <a:avLst/>
+          </a:prstGeom>
+          <a:noFill/>
+          <a:ln>
+            <a:noFill/>
+          </a:ln>
+          <a:extLst>
+            <a:ext uri="{909E8E84-426E-40DD-AFC4-6F175D3DCCD1}">
+              <a14:hiddenFill xmlns:a14="http://schemas.microsoft.com/office/drawing/2010/main" xmlns="">
+                <a:solidFill>
+                  <a:srgbClr val="FFFFFF"/>
+                </a:solidFill>
+              </a14:hiddenFill>
+            </a:ext>
+            <a:ext uri="{91240B29-F687-4F45-9708-019B960494DF}">
+              <a14:hiddenLine xmlns:a14="http://schemas.microsoft.com/office/drawing/2010/main" xmlns="" w="9525">
+                <a:solidFill>
+                  <a:srgbClr val="000000"/>
+                </a:solidFill>
+                <a:miter lim="800000"/>
+                <a:headEnd/>
+                <a:tailEnd/>
+              </a14:hiddenLine>
+            </a:ext>
+          </a:extLst>
+        </p:spPr>
+        <p:txBody>
+          <a:bodyPr vert="horz" wrap="square" lIns="91440" tIns="45720" rIns="91440" bIns="45720" numCol="1" anchor="ctr" anchorCtr="0" compatLnSpc="1">
+            <a:prstTxWarp prst="textNoShape">
+              <a:avLst/>
+            </a:prstTxWarp>
+          </a:bodyPr>
+          <a:lstStyle>
+            <a:lvl1pPr marL="342900" indent="-342900" fontAlgn="base">
+              <a:spcBef>
+                <a:spcPct val="20000"/>
+              </a:spcBef>
+              <a:spcAft>
+                <a:spcPct val="0"/>
+              </a:spcAft>
+              <a:buChar char="•"/>
+              <a:defRPr sz="2400">
+                <a:solidFill>
+                  <a:schemeClr val="bg1"/>
+                </a:solidFill>
+                <a:effectLst>
+                  <a:outerShdw blurRad="50800" dist="50800" dir="5400000" algn="t" rotWithShape="0">
+                    <a:schemeClr val="tx1">
+                      <a:alpha val="50000"/>
+                    </a:schemeClr>
+                  </a:outerShdw>
+                </a:effectLst>
+                <a:ea typeface="ＭＳ Ｐゴシック" pitchFamily="-65" charset="-128"/>
+                <a:cs typeface="ＭＳ Ｐゴシック" pitchFamily="18" charset="-128"/>
+              </a:defRPr>
+            </a:lvl1pPr>
+            <a:lvl2pPr marL="742950" indent="-285750" fontAlgn="base">
+              <a:spcBef>
+                <a:spcPct val="20000"/>
+              </a:spcBef>
+              <a:spcAft>
+                <a:spcPct val="0"/>
+              </a:spcAft>
+              <a:buChar char="–"/>
+              <a:defRPr sz="2000">
+                <a:ea typeface="ＭＳ Ｐゴシック" pitchFamily="-65" charset="-128"/>
+              </a:defRPr>
+            </a:lvl2pPr>
+            <a:lvl3pPr marL="1143000" indent="-228600" fontAlgn="base">
+              <a:spcBef>
+                <a:spcPct val="20000"/>
+              </a:spcBef>
+              <a:spcAft>
+                <a:spcPct val="0"/>
+              </a:spcAft>
+              <a:buChar char="•"/>
+              <a:defRPr sz="2000">
+                <a:ea typeface="ＭＳ Ｐゴシック" pitchFamily="-65" charset="-128"/>
+              </a:defRPr>
+            </a:lvl3pPr>
+            <a:lvl4pPr marL="1562100" indent="-228600" fontAlgn="base">
+              <a:spcBef>
+                <a:spcPct val="20000"/>
+              </a:spcBef>
+              <a:spcAft>
+                <a:spcPct val="0"/>
+              </a:spcAft>
+              <a:buChar char="–"/>
+              <a:defRPr sz="2000">
+                <a:ea typeface="ＭＳ Ｐゴシック" pitchFamily="-65" charset="-128"/>
+              </a:defRPr>
+            </a:lvl4pPr>
+            <a:lvl5pPr marL="1981200" indent="-228600" fontAlgn="base">
+              <a:spcBef>
+                <a:spcPct val="20000"/>
+              </a:spcBef>
+              <a:spcAft>
+                <a:spcPct val="0"/>
+              </a:spcAft>
+              <a:buChar char="»"/>
+              <a:defRPr sz="2000">
+                <a:ea typeface="ＭＳ Ｐゴシック" pitchFamily="-65" charset="-128"/>
+              </a:defRPr>
+            </a:lvl5pPr>
+            <a:lvl6pPr marL="2438400" indent="-228600" fontAlgn="base">
+              <a:spcBef>
+                <a:spcPct val="20000"/>
+              </a:spcBef>
+              <a:spcAft>
+                <a:spcPct val="0"/>
+              </a:spcAft>
+              <a:buChar char="»"/>
+              <a:defRPr sz="1400"/>
+            </a:lvl6pPr>
+            <a:lvl7pPr marL="2895600" indent="-228600" fontAlgn="base">
+              <a:spcBef>
+                <a:spcPct val="20000"/>
+              </a:spcBef>
+              <a:spcAft>
+                <a:spcPct val="0"/>
+              </a:spcAft>
+              <a:buChar char="»"/>
+              <a:defRPr sz="1400"/>
+            </a:lvl7pPr>
+            <a:lvl8pPr marL="3352800" indent="-228600" fontAlgn="base">
+              <a:spcBef>
+                <a:spcPct val="20000"/>
+              </a:spcBef>
+              <a:spcAft>
+                <a:spcPct val="0"/>
+              </a:spcAft>
+              <a:buChar char="»"/>
+              <a:defRPr sz="1400"/>
+            </a:lvl8pPr>
+            <a:lvl9pPr marL="3810000" indent="-228600" fontAlgn="base">
+              <a:spcBef>
+                <a:spcPct val="20000"/>
+              </a:spcBef>
+              <a:spcAft>
+                <a:spcPct val="0"/>
+              </a:spcAft>
+              <a:buChar char="»"/>
+              <a:defRPr sz="1400"/>
+            </a:lvl9pPr>
+          </a:lstStyle>
+          <a:p>
+            <a:endParaRPr lang="de-DE" sz="2000" dirty="0"/>
+          </a:p>
+        </p:txBody>
+      </p:sp>
+      <p:sp>
+        <p:nvSpPr>
+          <p:cNvPr id="23" name="Abgerundetes Rechteck 22"/>
+          <p:cNvSpPr/>
+          <p:nvPr/>
+        </p:nvSpPr>
+        <p:spPr bwMode="auto">
+          <a:xfrm>
+            <a:off x="1187624" y="4869160"/>
+            <a:ext cx="1296144" cy="576064"/>
+          </a:xfrm>
+          <a:prstGeom prst="roundRect">
+            <a:avLst/>
+          </a:prstGeom>
+          <a:solidFill>
+            <a:srgbClr val="292929"/>
+          </a:solidFill>
+          <a:ln w="25400" cap="flat" cmpd="sng" algn="ctr">
+            <a:solidFill>
+              <a:schemeClr val="bg1"/>
+            </a:solidFill>
+            <a:prstDash val="solid"/>
+            <a:round/>
+            <a:headEnd type="none" w="med" len="med"/>
+            <a:tailEnd type="none" w="med" len="med"/>
+          </a:ln>
+          <a:effectLst>
+            <a:outerShdw blurRad="50800" dist="38100" dir="18900000" algn="bl" rotWithShape="0">
+              <a:prstClr val="black">
+                <a:alpha val="40000"/>
+              </a:prstClr>
+            </a:outerShdw>
+          </a:effectLst>
+        </p:spPr>
+        <p:txBody>
+          <a:bodyPr vert="horz" wrap="square" lIns="91440" tIns="45720" rIns="91440" bIns="45720" numCol="1" rtlCol="0" anchor="ctr" anchorCtr="0" compatLnSpc="1">
+            <a:prstTxWarp prst="textNoShape">
+              <a:avLst/>
+            </a:prstTxWarp>
+          </a:bodyPr>
+          <a:lstStyle/>
+          <a:p>
+            <a:pPr marR="0" indent="0" algn="ctr" eaLnBrk="0" fontAlgn="base" hangingPunct="0">
+              <a:lnSpc>
+                <a:spcPct val="100000"/>
+              </a:lnSpc>
+              <a:spcBef>
+                <a:spcPct val="0"/>
+              </a:spcBef>
+              <a:spcAft>
+                <a:spcPct val="0"/>
+              </a:spcAft>
+              <a:buClrTx/>
+              <a:buSzTx/>
+              <a:buFontTx/>
+              <a:buNone/>
+              <a:tabLst/>
+            </a:pPr>
+            <a:r>
+              <a:rPr lang="de-DE" sz="1600" smtClean="0">
+                <a:solidFill>
+                  <a:srgbClr val="FF9900"/>
+                </a:solidFill>
+                <a:effectLst>
+                  <a:outerShdw blurRad="50800" dist="50800" dir="5400000" algn="t" rotWithShape="0">
+                    <a:schemeClr val="tx1">
+                      <a:alpha val="50000"/>
+                    </a:schemeClr>
+                  </a:outerShdw>
+                </a:effectLst>
+                <a:ea typeface="ＭＳ Ｐゴシック" pitchFamily="-65" charset="-128"/>
+                <a:cs typeface="ＭＳ Ｐゴシック" pitchFamily="18" charset="-128"/>
+              </a:rPr>
+              <a:t>Conquering</a:t>
+            </a:r>
+            <a:br>
+              <a:rPr lang="de-DE" sz="1600" smtClean="0">
+                <a:solidFill>
+                  <a:srgbClr val="FF9900"/>
+                </a:solidFill>
+                <a:effectLst>
+                  <a:outerShdw blurRad="50800" dist="50800" dir="5400000" algn="t" rotWithShape="0">
+                    <a:schemeClr val="tx1">
+                      <a:alpha val="50000"/>
+                    </a:schemeClr>
+                  </a:outerShdw>
+                </a:effectLst>
+                <a:ea typeface="ＭＳ Ｐゴシック" pitchFamily="-65" charset="-128"/>
+                <a:cs typeface="ＭＳ Ｐゴシック" pitchFamily="18" charset="-128"/>
+              </a:rPr>
+            </a:br>
+            <a:r>
+              <a:rPr lang="de-DE" sz="1600" smtClean="0">
+                <a:solidFill>
+                  <a:srgbClr val="FF9900"/>
+                </a:solidFill>
+                <a:effectLst>
+                  <a:outerShdw blurRad="50800" dist="50800" dir="5400000" algn="t" rotWithShape="0">
+                    <a:schemeClr val="tx1">
+                      <a:alpha val="50000"/>
+                    </a:schemeClr>
+                  </a:outerShdw>
+                </a:effectLst>
+                <a:ea typeface="ＭＳ Ｐゴシック" pitchFamily="-65" charset="-128"/>
+                <a:cs typeface="ＭＳ Ｐゴシック" pitchFamily="18" charset="-128"/>
+              </a:rPr>
+              <a:t>Service</a:t>
+            </a:r>
+            <a:endParaRPr lang="de-DE" dirty="0" err="1" smtClean="0">
+              <a:solidFill>
+                <a:srgbClr val="FF9900"/>
+              </a:solidFill>
+              <a:effectLst>
+                <a:outerShdw blurRad="50800" dist="50800" dir="5400000" algn="t" rotWithShape="0">
+                  <a:schemeClr val="tx1">
+                    <a:alpha val="50000"/>
+                  </a:schemeClr>
+                </a:outerShdw>
+              </a:effectLst>
+              <a:ea typeface="ＭＳ Ｐゴシック" pitchFamily="-65" charset="-128"/>
+              <a:cs typeface="ＭＳ Ｐゴシック" pitchFamily="18" charset="-128"/>
+            </a:endParaRPr>
+          </a:p>
+        </p:txBody>
+      </p:sp>
+      <p:sp>
+        <p:nvSpPr>
+          <p:cNvPr id="24" name="Abgerundetes Rechteck 23"/>
+          <p:cNvSpPr/>
+          <p:nvPr/>
+        </p:nvSpPr>
+        <p:spPr bwMode="auto">
+          <a:xfrm>
+            <a:off x="1979712" y="3861048"/>
+            <a:ext cx="1584176" cy="576064"/>
+          </a:xfrm>
+          <a:prstGeom prst="roundRect">
+            <a:avLst/>
+          </a:prstGeom>
+          <a:solidFill>
+            <a:srgbClr val="292929"/>
+          </a:solidFill>
+          <a:ln w="25400" cap="flat" cmpd="sng" algn="ctr">
+            <a:solidFill>
+              <a:schemeClr val="bg1"/>
+            </a:solidFill>
+            <a:prstDash val="solid"/>
+            <a:round/>
+            <a:headEnd type="none" w="med" len="med"/>
+            <a:tailEnd type="none" w="med" len="med"/>
+          </a:ln>
+          <a:effectLst>
+            <a:outerShdw blurRad="50800" dist="38100" dir="18900000" algn="bl" rotWithShape="0">
+              <a:prstClr val="black">
+                <a:alpha val="40000"/>
+              </a:prstClr>
+            </a:outerShdw>
+          </a:effectLst>
+        </p:spPr>
+        <p:txBody>
+          <a:bodyPr vert="horz" wrap="square" lIns="91440" tIns="45720" rIns="91440" bIns="45720" numCol="1" rtlCol="0" anchor="ctr" anchorCtr="0" compatLnSpc="1">
+            <a:prstTxWarp prst="textNoShape">
+              <a:avLst/>
+            </a:prstTxWarp>
+          </a:bodyPr>
+          <a:lstStyle/>
+          <a:p>
+            <a:pPr marR="0" indent="0" algn="ctr" eaLnBrk="0" fontAlgn="base" hangingPunct="0">
+              <a:lnSpc>
+                <a:spcPct val="100000"/>
+              </a:lnSpc>
+              <a:spcBef>
+                <a:spcPct val="0"/>
+              </a:spcBef>
+              <a:spcAft>
+                <a:spcPct val="0"/>
+              </a:spcAft>
+              <a:buClrTx/>
+              <a:buSzTx/>
+              <a:buFontTx/>
+              <a:buNone/>
+              <a:tabLst/>
+            </a:pPr>
+            <a:r>
+              <a:rPr lang="de-DE" sz="1600" smtClean="0">
+                <a:solidFill>
+                  <a:srgbClr val="FF9900"/>
+                </a:solidFill>
+                <a:effectLst>
+                  <a:outerShdw blurRad="50800" dist="50800" dir="5400000" algn="t" rotWithShape="0">
+                    <a:schemeClr val="tx1">
+                      <a:alpha val="50000"/>
+                    </a:schemeClr>
+                  </a:outerShdw>
+                </a:effectLst>
+                <a:ea typeface="ＭＳ Ｐゴシック" pitchFamily="-65" charset="-128"/>
+                <a:cs typeface="ＭＳ Ｐゴシック" pitchFamily="18" charset="-128"/>
+              </a:rPr>
+              <a:t>Authentication</a:t>
+            </a:r>
+            <a:br>
+              <a:rPr lang="de-DE" sz="1600" smtClean="0">
+                <a:solidFill>
+                  <a:srgbClr val="FF9900"/>
+                </a:solidFill>
+                <a:effectLst>
+                  <a:outerShdw blurRad="50800" dist="50800" dir="5400000" algn="t" rotWithShape="0">
+                    <a:schemeClr val="tx1">
+                      <a:alpha val="50000"/>
+                    </a:schemeClr>
+                  </a:outerShdw>
+                </a:effectLst>
+                <a:ea typeface="ＭＳ Ｐゴシック" pitchFamily="-65" charset="-128"/>
+                <a:cs typeface="ＭＳ Ｐゴシック" pitchFamily="18" charset="-128"/>
+              </a:rPr>
+            </a:br>
+            <a:r>
+              <a:rPr lang="de-DE" sz="1600" smtClean="0">
+                <a:solidFill>
+                  <a:srgbClr val="FF9900"/>
+                </a:solidFill>
+                <a:effectLst>
+                  <a:outerShdw blurRad="50800" dist="50800" dir="5400000" algn="t" rotWithShape="0">
+                    <a:schemeClr val="tx1">
+                      <a:alpha val="50000"/>
+                    </a:schemeClr>
+                  </a:outerShdw>
+                </a:effectLst>
+                <a:ea typeface="ＭＳ Ｐゴシック" pitchFamily="-65" charset="-128"/>
+                <a:cs typeface="ＭＳ Ｐゴシック" pitchFamily="18" charset="-128"/>
+              </a:rPr>
+              <a:t>Service</a:t>
+            </a:r>
+            <a:endParaRPr lang="de-DE" dirty="0" err="1" smtClean="0">
+              <a:solidFill>
+                <a:srgbClr val="FF9900"/>
+              </a:solidFill>
+              <a:effectLst>
+                <a:outerShdw blurRad="50800" dist="50800" dir="5400000" algn="t" rotWithShape="0">
+                  <a:schemeClr val="tx1">
+                    <a:alpha val="50000"/>
+                  </a:schemeClr>
+                </a:outerShdw>
+              </a:effectLst>
+              <a:ea typeface="ＭＳ Ｐゴシック" pitchFamily="-65" charset="-128"/>
+              <a:cs typeface="ＭＳ Ｐゴシック" pitchFamily="18" charset="-128"/>
+            </a:endParaRPr>
+          </a:p>
+        </p:txBody>
+      </p:sp>
+      <p:sp>
+        <p:nvSpPr>
+          <p:cNvPr id="26" name="Abgerundetes Rechteck 25"/>
+          <p:cNvSpPr/>
+          <p:nvPr/>
+        </p:nvSpPr>
+        <p:spPr bwMode="auto">
+          <a:xfrm>
+            <a:off x="323528" y="3861048"/>
+            <a:ext cx="1296144" cy="576064"/>
+          </a:xfrm>
+          <a:prstGeom prst="roundRect">
+            <a:avLst/>
+          </a:prstGeom>
+          <a:solidFill>
+            <a:srgbClr val="292929"/>
+          </a:solidFill>
+          <a:ln w="25400" cap="flat" cmpd="sng" algn="ctr">
+            <a:solidFill>
+              <a:schemeClr val="bg1"/>
+            </a:solidFill>
+            <a:prstDash val="solid"/>
+            <a:round/>
+            <a:headEnd type="none" w="med" len="med"/>
+            <a:tailEnd type="none" w="med" len="med"/>
+          </a:ln>
+          <a:effectLst>
+            <a:outerShdw blurRad="50800" dist="38100" dir="18900000" algn="bl" rotWithShape="0">
+              <a:prstClr val="black">
+                <a:alpha val="40000"/>
+              </a:prstClr>
+            </a:outerShdw>
+          </a:effectLst>
+        </p:spPr>
+        <p:txBody>
+          <a:bodyPr vert="horz" wrap="square" lIns="91440" tIns="45720" rIns="91440" bIns="45720" numCol="1" rtlCol="0" anchor="ctr" anchorCtr="0" compatLnSpc="1">
+            <a:prstTxWarp prst="textNoShape">
+              <a:avLst/>
+            </a:prstTxWarp>
+          </a:bodyPr>
+          <a:lstStyle/>
+          <a:p>
+            <a:pPr marR="0" indent="0" algn="ctr" eaLnBrk="0" fontAlgn="base" hangingPunct="0">
+              <a:lnSpc>
+                <a:spcPct val="100000"/>
+              </a:lnSpc>
+              <a:spcBef>
+                <a:spcPct val="0"/>
+              </a:spcBef>
+              <a:spcAft>
+                <a:spcPct val="0"/>
+              </a:spcAft>
+              <a:buClrTx/>
+              <a:buSzTx/>
+              <a:buFontTx/>
+              <a:buNone/>
+              <a:tabLst/>
+            </a:pPr>
+            <a:r>
+              <a:rPr lang="de-DE" sz="1600" smtClean="0">
+                <a:solidFill>
+                  <a:srgbClr val="FF9900"/>
+                </a:solidFill>
+                <a:effectLst>
+                  <a:outerShdw blurRad="50800" dist="50800" dir="5400000" algn="t" rotWithShape="0">
+                    <a:schemeClr val="tx1">
+                      <a:alpha val="50000"/>
+                    </a:schemeClr>
+                  </a:outerShdw>
+                </a:effectLst>
+                <a:ea typeface="ＭＳ Ｐゴシック" pitchFamily="-65" charset="-128"/>
+                <a:cs typeface="ＭＳ Ｐゴシック" pitchFamily="18" charset="-128"/>
+              </a:rPr>
+              <a:t>Notification</a:t>
+            </a:r>
+            <a:br>
+              <a:rPr lang="de-DE" sz="1600" smtClean="0">
+                <a:solidFill>
+                  <a:srgbClr val="FF9900"/>
+                </a:solidFill>
+                <a:effectLst>
+                  <a:outerShdw blurRad="50800" dist="50800" dir="5400000" algn="t" rotWithShape="0">
+                    <a:schemeClr val="tx1">
+                      <a:alpha val="50000"/>
+                    </a:schemeClr>
+                  </a:outerShdw>
+                </a:effectLst>
+                <a:ea typeface="ＭＳ Ｐゴシック" pitchFamily="-65" charset="-128"/>
+                <a:cs typeface="ＭＳ Ｐゴシック" pitchFamily="18" charset="-128"/>
+              </a:rPr>
+            </a:br>
+            <a:r>
+              <a:rPr lang="de-DE" sz="1600" smtClean="0">
+                <a:solidFill>
+                  <a:srgbClr val="FF9900"/>
+                </a:solidFill>
+                <a:effectLst>
+                  <a:outerShdw blurRad="50800" dist="50800" dir="5400000" algn="t" rotWithShape="0">
+                    <a:schemeClr val="tx1">
+                      <a:alpha val="50000"/>
+                    </a:schemeClr>
+                  </a:outerShdw>
+                </a:effectLst>
+                <a:ea typeface="ＭＳ Ｐゴシック" pitchFamily="-65" charset="-128"/>
+                <a:cs typeface="ＭＳ Ｐゴシック" pitchFamily="18" charset="-128"/>
+              </a:rPr>
+              <a:t>Service</a:t>
+            </a:r>
+            <a:endParaRPr lang="de-DE" dirty="0" err="1" smtClean="0">
+              <a:solidFill>
+                <a:srgbClr val="FF9900"/>
+              </a:solidFill>
+              <a:effectLst>
+                <a:outerShdw blurRad="50800" dist="50800" dir="5400000" algn="t" rotWithShape="0">
+                  <a:schemeClr val="tx1">
+                    <a:alpha val="50000"/>
+                  </a:schemeClr>
+                </a:outerShdw>
+              </a:effectLst>
+              <a:ea typeface="ＭＳ Ｐゴシック" pitchFamily="-65" charset="-128"/>
+              <a:cs typeface="ＭＳ Ｐゴシック" pitchFamily="18" charset="-128"/>
+            </a:endParaRPr>
+          </a:p>
+        </p:txBody>
+      </p:sp>
+      <p:cxnSp>
+        <p:nvCxnSpPr>
+          <p:cNvPr id="30" name="Gerade Verbindung mit Pfeil 29"/>
+          <p:cNvCxnSpPr>
+            <a:stCxn id="26" idx="0"/>
+            <a:endCxn id="8" idx="2"/>
+          </p:cNvCxnSpPr>
+          <p:nvPr/>
+        </p:nvCxnSpPr>
+        <p:spPr bwMode="auto">
+          <a:xfrm flipV="1">
+            <a:off x="971600" y="3429000"/>
+            <a:ext cx="864096" cy="432048"/>
+          </a:xfrm>
+          <a:prstGeom prst="straightConnector1">
+            <a:avLst/>
+          </a:prstGeom>
+          <a:solidFill>
+            <a:schemeClr val="accent1"/>
+          </a:solidFill>
+          <a:ln w="25400" cap="flat" cmpd="sng" algn="ctr">
+            <a:solidFill>
+              <a:schemeClr val="bg1"/>
+            </a:solidFill>
+            <a:prstDash val="solid"/>
+            <a:round/>
+            <a:headEnd type="triangle" w="med" len="med"/>
+            <a:tailEnd type="none"/>
+          </a:ln>
+          <a:effectLst/>
+        </p:spPr>
+      </p:cxnSp>
+      <p:cxnSp>
+        <p:nvCxnSpPr>
+          <p:cNvPr id="34" name="Gerade Verbindung mit Pfeil 33"/>
+          <p:cNvCxnSpPr>
+            <a:stCxn id="23" idx="0"/>
+            <a:endCxn id="8" idx="2"/>
+          </p:cNvCxnSpPr>
+          <p:nvPr/>
+        </p:nvCxnSpPr>
+        <p:spPr bwMode="auto">
+          <a:xfrm flipV="1">
+            <a:off x="1835696" y="3429000"/>
+            <a:ext cx="0" cy="1440160"/>
+          </a:xfrm>
+          <a:prstGeom prst="straightConnector1">
+            <a:avLst/>
+          </a:prstGeom>
+          <a:solidFill>
+            <a:schemeClr val="accent1"/>
+          </a:solidFill>
+          <a:ln w="25400" cap="flat" cmpd="sng" algn="ctr">
+            <a:solidFill>
+              <a:schemeClr val="bg1"/>
+            </a:solidFill>
+            <a:prstDash val="solid"/>
+            <a:round/>
+            <a:headEnd type="triangle" w="med" len="med"/>
+            <a:tailEnd type="none"/>
+          </a:ln>
+          <a:effectLst/>
+        </p:spPr>
+      </p:cxnSp>
+      <p:cxnSp>
+        <p:nvCxnSpPr>
+          <p:cNvPr id="39" name="Gerade Verbindung mit Pfeil 38"/>
+          <p:cNvCxnSpPr>
+            <a:stCxn id="24" idx="0"/>
+            <a:endCxn id="8" idx="2"/>
+          </p:cNvCxnSpPr>
+          <p:nvPr/>
+        </p:nvCxnSpPr>
+        <p:spPr bwMode="auto">
+          <a:xfrm flipH="1" flipV="1">
+            <a:off x="1835696" y="3429000"/>
+            <a:ext cx="936104" cy="432048"/>
+          </a:xfrm>
+          <a:prstGeom prst="straightConnector1">
+            <a:avLst/>
+          </a:prstGeom>
+          <a:solidFill>
+            <a:schemeClr val="accent1"/>
+          </a:solidFill>
+          <a:ln w="25400" cap="flat" cmpd="sng" algn="ctr">
+            <a:solidFill>
+              <a:schemeClr val="bg1"/>
+            </a:solidFill>
+            <a:prstDash val="solid"/>
+            <a:round/>
+            <a:headEnd type="triangle" w="med" len="med"/>
+            <a:tailEnd type="none"/>
+          </a:ln>
+          <a:effectLst/>
+        </p:spPr>
+      </p:cxnSp>
+      <p:sp>
+        <p:nvSpPr>
+          <p:cNvPr id="42" name="Abgerundetes Rechteck 41"/>
+          <p:cNvSpPr/>
+          <p:nvPr/>
+        </p:nvSpPr>
+        <p:spPr bwMode="auto">
+          <a:xfrm>
+            <a:off x="2627784" y="4869160"/>
+            <a:ext cx="1152128" cy="576064"/>
+          </a:xfrm>
+          <a:prstGeom prst="roundRect">
+            <a:avLst/>
+          </a:prstGeom>
+          <a:solidFill>
+            <a:srgbClr val="292929"/>
+          </a:solidFill>
+          <a:ln w="25400" cap="flat" cmpd="sng" algn="ctr">
+            <a:solidFill>
+              <a:schemeClr val="bg1"/>
+            </a:solidFill>
+            <a:prstDash val="solid"/>
+            <a:round/>
+            <a:headEnd type="none" w="med" len="med"/>
+            <a:tailEnd type="none" w="med" len="med"/>
+          </a:ln>
+          <a:effectLst>
+            <a:outerShdw blurRad="50800" dist="38100" dir="18900000" algn="bl" rotWithShape="0">
+              <a:prstClr val="black">
+                <a:alpha val="40000"/>
+              </a:prstClr>
+            </a:outerShdw>
+          </a:effectLst>
+        </p:spPr>
+        <p:txBody>
+          <a:bodyPr vert="horz" wrap="square" lIns="91440" tIns="45720" rIns="91440" bIns="45720" numCol="1" rtlCol="0" anchor="ctr" anchorCtr="0" compatLnSpc="1">
+            <a:prstTxWarp prst="textNoShape">
+              <a:avLst/>
+            </a:prstTxWarp>
+          </a:bodyPr>
+          <a:lstStyle/>
+          <a:p>
+            <a:pPr marR="0" indent="0" algn="ctr" eaLnBrk="0" fontAlgn="base" hangingPunct="0">
+              <a:lnSpc>
+                <a:spcPct val="100000"/>
+              </a:lnSpc>
+              <a:spcBef>
+                <a:spcPct val="0"/>
+              </a:spcBef>
+              <a:spcAft>
+                <a:spcPct val="0"/>
+              </a:spcAft>
+              <a:buClrTx/>
+              <a:buSzTx/>
+              <a:buFontTx/>
+              <a:buNone/>
+              <a:tabLst/>
+            </a:pPr>
+            <a:r>
+              <a:rPr lang="de-DE" sz="1600" smtClean="0">
+                <a:solidFill>
+                  <a:srgbClr val="FF9900"/>
+                </a:solidFill>
+                <a:effectLst>
+                  <a:outerShdw blurRad="50800" dist="50800" dir="5400000" algn="t" rotWithShape="0">
+                    <a:schemeClr val="tx1">
+                      <a:alpha val="50000"/>
+                    </a:schemeClr>
+                  </a:outerShdw>
+                </a:effectLst>
+                <a:ea typeface="ＭＳ Ｐゴシック" pitchFamily="-65" charset="-128"/>
+                <a:cs typeface="ＭＳ Ｐゴシック" pitchFamily="18" charset="-128"/>
+              </a:rPr>
+              <a:t>Player</a:t>
+            </a:r>
+            <a:br>
+              <a:rPr lang="de-DE" sz="1600" smtClean="0">
+                <a:solidFill>
+                  <a:srgbClr val="FF9900"/>
+                </a:solidFill>
+                <a:effectLst>
+                  <a:outerShdw blurRad="50800" dist="50800" dir="5400000" algn="t" rotWithShape="0">
+                    <a:schemeClr val="tx1">
+                      <a:alpha val="50000"/>
+                    </a:schemeClr>
+                  </a:outerShdw>
+                </a:effectLst>
+                <a:ea typeface="ＭＳ Ｐゴシック" pitchFamily="-65" charset="-128"/>
+                <a:cs typeface="ＭＳ Ｐゴシック" pitchFamily="18" charset="-128"/>
+              </a:rPr>
+            </a:br>
+            <a:r>
+              <a:rPr lang="de-DE" sz="1600" smtClean="0">
+                <a:solidFill>
+                  <a:srgbClr val="FF9900"/>
+                </a:solidFill>
+                <a:effectLst>
+                  <a:outerShdw blurRad="50800" dist="50800" dir="5400000" algn="t" rotWithShape="0">
+                    <a:schemeClr val="tx1">
+                      <a:alpha val="50000"/>
+                    </a:schemeClr>
+                  </a:outerShdw>
+                </a:effectLst>
+                <a:ea typeface="ＭＳ Ｐゴシック" pitchFamily="-65" charset="-128"/>
+                <a:cs typeface="ＭＳ Ｐゴシック" pitchFamily="18" charset="-128"/>
+              </a:rPr>
+              <a:t>DAO</a:t>
+            </a:r>
+            <a:endParaRPr lang="de-DE" sz="2000" dirty="0" err="1" smtClean="0">
+              <a:solidFill>
+                <a:srgbClr val="FF9900"/>
+              </a:solidFill>
+              <a:effectLst>
+                <a:outerShdw blurRad="50800" dist="50800" dir="5400000" algn="t" rotWithShape="0">
+                  <a:schemeClr val="tx1">
+                    <a:alpha val="50000"/>
+                  </a:schemeClr>
+                </a:outerShdw>
+              </a:effectLst>
+              <a:ea typeface="ＭＳ Ｐゴシック" pitchFamily="-65" charset="-128"/>
+              <a:cs typeface="ＭＳ Ｐゴシック" pitchFamily="18" charset="-128"/>
+            </a:endParaRPr>
+          </a:p>
+        </p:txBody>
+      </p:sp>
+      <p:cxnSp>
+        <p:nvCxnSpPr>
+          <p:cNvPr id="43" name="Gerade Verbindung mit Pfeil 42"/>
+          <p:cNvCxnSpPr>
+            <a:stCxn id="42" idx="0"/>
+            <a:endCxn id="24" idx="2"/>
+          </p:cNvCxnSpPr>
+          <p:nvPr/>
+        </p:nvCxnSpPr>
+        <p:spPr bwMode="auto">
+          <a:xfrm flipH="1" flipV="1">
+            <a:off x="2771800" y="4437112"/>
+            <a:ext cx="432048" cy="432048"/>
+          </a:xfrm>
+          <a:prstGeom prst="straightConnector1">
+            <a:avLst/>
+          </a:prstGeom>
+          <a:solidFill>
+            <a:schemeClr val="accent1"/>
+          </a:solidFill>
+          <a:ln w="25400" cap="flat" cmpd="sng" algn="ctr">
+            <a:solidFill>
+              <a:schemeClr val="bg1"/>
+            </a:solidFill>
+            <a:prstDash val="solid"/>
+            <a:round/>
+            <a:headEnd type="triangle" w="med" len="med"/>
+            <a:tailEnd type="none"/>
+          </a:ln>
+          <a:effectLst/>
+        </p:spPr>
+      </p:cxnSp>
+      <p:cxnSp>
+        <p:nvCxnSpPr>
+          <p:cNvPr id="47" name="Gerade Verbindung mit Pfeil 46"/>
+          <p:cNvCxnSpPr>
+            <a:endCxn id="23" idx="2"/>
+          </p:cNvCxnSpPr>
+          <p:nvPr/>
+        </p:nvCxnSpPr>
+        <p:spPr bwMode="auto">
+          <a:xfrm flipV="1">
+            <a:off x="1835696" y="5445224"/>
+            <a:ext cx="0" cy="432048"/>
+          </a:xfrm>
+          <a:prstGeom prst="straightConnector1">
+            <a:avLst/>
+          </a:prstGeom>
+          <a:solidFill>
+            <a:schemeClr val="accent1"/>
+          </a:solidFill>
+          <a:ln w="25400" cap="flat" cmpd="sng" algn="ctr">
+            <a:solidFill>
+              <a:schemeClr val="bg1"/>
+            </a:solidFill>
+            <a:prstDash val="dash"/>
+            <a:round/>
+            <a:headEnd type="none" w="med" len="med"/>
+            <a:tailEnd type="none"/>
+          </a:ln>
+          <a:effectLst/>
+        </p:spPr>
+      </p:cxnSp>
+      <p:cxnSp>
+        <p:nvCxnSpPr>
+          <p:cNvPr id="50" name="Gerade Verbindung mit Pfeil 49"/>
+          <p:cNvCxnSpPr>
+            <a:endCxn id="26" idx="2"/>
+          </p:cNvCxnSpPr>
+          <p:nvPr/>
+        </p:nvCxnSpPr>
+        <p:spPr bwMode="auto">
+          <a:xfrm flipV="1">
+            <a:off x="971600" y="4437112"/>
+            <a:ext cx="0" cy="432048"/>
+          </a:xfrm>
+          <a:prstGeom prst="straightConnector1">
+            <a:avLst/>
+          </a:prstGeom>
+          <a:solidFill>
+            <a:schemeClr val="accent1"/>
+          </a:solidFill>
+          <a:ln w="25400" cap="flat" cmpd="sng" algn="ctr">
+            <a:solidFill>
+              <a:schemeClr val="bg1"/>
+            </a:solidFill>
+            <a:prstDash val="dash"/>
+            <a:round/>
+            <a:headEnd type="none" w="med" len="med"/>
+            <a:tailEnd type="none"/>
+          </a:ln>
+          <a:effectLst/>
+        </p:spPr>
+      </p:cxnSp>
+      <p:cxnSp>
+        <p:nvCxnSpPr>
+          <p:cNvPr id="53" name="Gerade Verbindung mit Pfeil 52"/>
+          <p:cNvCxnSpPr>
+            <a:endCxn id="42" idx="2"/>
+          </p:cNvCxnSpPr>
+          <p:nvPr/>
+        </p:nvCxnSpPr>
+        <p:spPr bwMode="auto">
+          <a:xfrm flipV="1">
+            <a:off x="3203848" y="5445224"/>
+            <a:ext cx="0" cy="432048"/>
+          </a:xfrm>
+          <a:prstGeom prst="straightConnector1">
+            <a:avLst/>
+          </a:prstGeom>
+          <a:solidFill>
+            <a:schemeClr val="accent1"/>
+          </a:solidFill>
+          <a:ln w="25400" cap="flat" cmpd="sng" algn="ctr">
+            <a:solidFill>
+              <a:schemeClr val="bg1"/>
+            </a:solidFill>
+            <a:prstDash val="dash"/>
+            <a:round/>
+            <a:headEnd type="none" w="med" len="med"/>
+            <a:tailEnd type="none"/>
+          </a:ln>
+          <a:effectLst/>
+        </p:spPr>
+      </p:cxnSp>
+      <p:sp>
+        <p:nvSpPr>
+          <p:cNvPr id="57" name="Inhaltsplatzhalter 2"/>
+          <p:cNvSpPr txBox="1">
+            <a:spLocks/>
+          </p:cNvSpPr>
+          <p:nvPr/>
+        </p:nvSpPr>
+        <p:spPr bwMode="auto">
+          <a:xfrm>
+            <a:off x="3851920" y="1556792"/>
+            <a:ext cx="4896544" cy="4680520"/>
+          </a:xfrm>
+          <a:prstGeom prst="rect">
+            <a:avLst/>
+          </a:prstGeom>
+          <a:noFill/>
+          <a:ln>
+            <a:noFill/>
+          </a:ln>
+          <a:extLst>
+            <a:ext uri="{909E8E84-426E-40DD-AFC4-6F175D3DCCD1}">
+              <a14:hiddenFill xmlns:a14="http://schemas.microsoft.com/office/drawing/2010/main" xmlns="">
+                <a:solidFill>
+                  <a:srgbClr val="FFFFFF"/>
+                </a:solidFill>
+              </a14:hiddenFill>
+            </a:ext>
+            <a:ext uri="{91240B29-F687-4F45-9708-019B960494DF}">
+              <a14:hiddenLine xmlns:a14="http://schemas.microsoft.com/office/drawing/2010/main" xmlns="" w="9525">
+                <a:solidFill>
+                  <a:srgbClr val="000000"/>
+                </a:solidFill>
+                <a:miter lim="800000"/>
+                <a:headEnd/>
+                <a:tailEnd/>
+              </a14:hiddenLine>
+            </a:ext>
+          </a:extLst>
+        </p:spPr>
+        <p:txBody>
+          <a:bodyPr vert="horz" wrap="square" lIns="91440" tIns="45720" rIns="91440" bIns="45720" numCol="1" anchor="ctr" anchorCtr="0" compatLnSpc="1">
+            <a:prstTxWarp prst="textNoShape">
+              <a:avLst/>
+            </a:prstTxWarp>
+          </a:bodyPr>
+          <a:lstStyle>
+            <a:lvl1pPr marL="342900" indent="-342900" fontAlgn="base">
+              <a:spcBef>
+                <a:spcPct val="20000"/>
+              </a:spcBef>
+              <a:spcAft>
+                <a:spcPct val="0"/>
+              </a:spcAft>
+              <a:buChar char="•"/>
+              <a:defRPr sz="2400">
+                <a:solidFill>
+                  <a:schemeClr val="bg1"/>
+                </a:solidFill>
+                <a:effectLst>
+                  <a:outerShdw blurRad="50800" dist="50800" dir="5400000" algn="t" rotWithShape="0">
+                    <a:schemeClr val="tx1">
+                      <a:alpha val="50000"/>
+                    </a:schemeClr>
+                  </a:outerShdw>
+                </a:effectLst>
+                <a:ea typeface="ＭＳ Ｐゴシック" pitchFamily="-65" charset="-128"/>
+                <a:cs typeface="ＭＳ Ｐゴシック" pitchFamily="18" charset="-128"/>
+              </a:defRPr>
+            </a:lvl1pPr>
+            <a:lvl2pPr marL="742950" indent="-285750" fontAlgn="base">
+              <a:spcBef>
+                <a:spcPct val="20000"/>
+              </a:spcBef>
+              <a:spcAft>
+                <a:spcPct val="0"/>
+              </a:spcAft>
+              <a:buChar char="–"/>
+              <a:defRPr sz="2000">
+                <a:ea typeface="ＭＳ Ｐゴシック" pitchFamily="-65" charset="-128"/>
+              </a:defRPr>
+            </a:lvl2pPr>
+            <a:lvl3pPr marL="1143000" indent="-228600" fontAlgn="base">
+              <a:spcBef>
+                <a:spcPct val="20000"/>
+              </a:spcBef>
+              <a:spcAft>
+                <a:spcPct val="0"/>
+              </a:spcAft>
+              <a:buChar char="•"/>
+              <a:defRPr sz="2000">
+                <a:ea typeface="ＭＳ Ｐゴシック" pitchFamily="-65" charset="-128"/>
+              </a:defRPr>
+            </a:lvl3pPr>
+            <a:lvl4pPr marL="1562100" indent="-228600" fontAlgn="base">
+              <a:spcBef>
+                <a:spcPct val="20000"/>
+              </a:spcBef>
+              <a:spcAft>
+                <a:spcPct val="0"/>
+              </a:spcAft>
+              <a:buChar char="–"/>
+              <a:defRPr sz="2000">
+                <a:ea typeface="ＭＳ Ｐゴシック" pitchFamily="-65" charset="-128"/>
+              </a:defRPr>
+            </a:lvl4pPr>
+            <a:lvl5pPr marL="1981200" indent="-228600" fontAlgn="base">
+              <a:spcBef>
+                <a:spcPct val="20000"/>
+              </a:spcBef>
+              <a:spcAft>
+                <a:spcPct val="0"/>
+              </a:spcAft>
+              <a:buChar char="»"/>
+              <a:defRPr sz="2000">
+                <a:ea typeface="ＭＳ Ｐゴシック" pitchFamily="-65" charset="-128"/>
+              </a:defRPr>
+            </a:lvl5pPr>
+            <a:lvl6pPr marL="2438400" indent="-228600" fontAlgn="base">
+              <a:spcBef>
+                <a:spcPct val="20000"/>
+              </a:spcBef>
+              <a:spcAft>
+                <a:spcPct val="0"/>
+              </a:spcAft>
+              <a:buChar char="»"/>
+              <a:defRPr sz="1400"/>
+            </a:lvl6pPr>
+            <a:lvl7pPr marL="2895600" indent="-228600" fontAlgn="base">
+              <a:spcBef>
+                <a:spcPct val="20000"/>
+              </a:spcBef>
+              <a:spcAft>
+                <a:spcPct val="0"/>
+              </a:spcAft>
+              <a:buChar char="»"/>
+              <a:defRPr sz="1400"/>
+            </a:lvl7pPr>
+            <a:lvl8pPr marL="3352800" indent="-228600" fontAlgn="base">
+              <a:spcBef>
+                <a:spcPct val="20000"/>
+              </a:spcBef>
+              <a:spcAft>
+                <a:spcPct val="0"/>
+              </a:spcAft>
+              <a:buChar char="»"/>
+              <a:defRPr sz="1400"/>
+            </a:lvl8pPr>
+            <a:lvl9pPr marL="3810000" indent="-228600" fontAlgn="base">
+              <a:spcBef>
+                <a:spcPct val="20000"/>
+              </a:spcBef>
+              <a:spcAft>
+                <a:spcPct val="0"/>
+              </a:spcAft>
+              <a:buChar char="»"/>
+              <a:defRPr sz="1400"/>
+            </a:lvl9pPr>
+          </a:lstStyle>
+          <a:p>
+            <a:r>
+              <a:rPr lang="de-DE" sz="2000" smtClean="0"/>
+              <a:t>index: </a:t>
+            </a:r>
+            <a:r>
+              <a:rPr lang="de-DE" sz="2000" smtClean="0">
+                <a:solidFill>
+                  <a:srgbClr val="FF9900"/>
+                </a:solidFill>
+              </a:rPr>
+              <a:t>View</a:t>
+            </a:r>
+            <a:r>
+              <a:rPr lang="de-DE" sz="2000" smtClean="0"/>
+              <a:t> for the main interface</a:t>
+            </a:r>
+          </a:p>
+          <a:p>
+            <a:r>
+              <a:rPr lang="de-DE" sz="2000" smtClean="0"/>
+              <a:t>ConquerController: </a:t>
+            </a:r>
+            <a:r>
+              <a:rPr lang="de-DE" sz="2000" smtClean="0">
+                <a:solidFill>
+                  <a:srgbClr val="FF9900"/>
+                </a:solidFill>
+              </a:rPr>
+              <a:t>Delegates</a:t>
+            </a:r>
+            <a:r>
+              <a:rPr lang="de-DE" sz="2000" smtClean="0"/>
+              <a:t> calls from the UI to the services</a:t>
+            </a:r>
+          </a:p>
+          <a:p>
+            <a:pPr>
+              <a:lnSpc>
+                <a:spcPct val="150000"/>
+              </a:lnSpc>
+            </a:pPr>
+            <a:r>
+              <a:rPr lang="de-DE" sz="2000" smtClean="0"/>
+              <a:t>NotificationService: Sends </a:t>
+            </a:r>
+            <a:r>
+              <a:rPr lang="de-DE" sz="2000" smtClean="0">
+                <a:solidFill>
+                  <a:srgbClr val="FF9900"/>
+                </a:solidFill>
+              </a:rPr>
+              <a:t>notifications</a:t>
+            </a:r>
+            <a:r>
+              <a:rPr lang="de-DE" sz="2000" smtClean="0"/>
+              <a:t> to possible participants</a:t>
+            </a:r>
+          </a:p>
+          <a:p>
+            <a:r>
+              <a:rPr lang="de-DE" sz="2000" smtClean="0"/>
+              <a:t>AuthenticationService: </a:t>
+            </a:r>
+            <a:r>
+              <a:rPr lang="de-DE" sz="2000" smtClean="0">
+                <a:solidFill>
+                  <a:srgbClr val="FF9900"/>
+                </a:solidFill>
+              </a:rPr>
+              <a:t>Retrieves</a:t>
+            </a:r>
+            <a:r>
+              <a:rPr lang="de-DE" sz="2000" smtClean="0"/>
+              <a:t> the player currently logged in</a:t>
+            </a:r>
+          </a:p>
+          <a:p>
+            <a:r>
+              <a:rPr lang="de-DE" sz="2000" smtClean="0"/>
+              <a:t>ConqueringService: Manages </a:t>
+            </a:r>
+            <a:r>
+              <a:rPr lang="de-DE" sz="2000" smtClean="0">
+                <a:solidFill>
+                  <a:srgbClr val="FF9900"/>
+                </a:solidFill>
+              </a:rPr>
+              <a:t>conquering</a:t>
+            </a:r>
+            <a:r>
+              <a:rPr lang="de-DE" sz="2000" smtClean="0"/>
+              <a:t> attempts, calculates result</a:t>
+            </a:r>
+          </a:p>
+          <a:p>
+            <a:r>
+              <a:rPr lang="de-DE" sz="2000" smtClean="0"/>
+              <a:t>PlayerDAO: Responsible for retrieving </a:t>
+            </a:r>
+            <a:r>
+              <a:rPr lang="de-DE" sz="2000" smtClean="0">
+                <a:solidFill>
+                  <a:srgbClr val="FF9900"/>
+                </a:solidFill>
+              </a:rPr>
+              <a:t>player-objects</a:t>
+            </a:r>
+            <a:r>
+              <a:rPr lang="de-DE" sz="2000" smtClean="0"/>
+              <a:t> from the DB</a:t>
+            </a:r>
+            <a:endParaRPr lang="de-DE" sz="2000" dirty="0"/>
+          </a:p>
+        </p:txBody>
+      </p:sp>
+    </p:spTree>
+    <p:extLst>
+      <p:ext uri="{BB962C8B-B14F-4D97-AF65-F5344CB8AC3E}">
+        <p14:creationId xmlns:p14="http://schemas.microsoft.com/office/powerpoint/2010/main" xmlns="" val="1759617674"/>
+      </p:ext>
+    </p:extLst>
+  </p:cSld>
+  <p:clrMapOvr>
+    <a:masterClrMapping/>
+  </p:clrMapOvr>
+  <p:timing>
+    <p:tnLst>
+      <p:par>
+        <p:cTn id="1" dur="indefinite" restart="never" nodeType="tmRoot"/>
+      </p:par>
+    </p:tnLst>
+  </p:timing>
+</p:sld>
+</file>
+
+<file path=ppt/slides/slide9.xml><?xml version="1.0" encoding="utf-8"?>
+<p:sld xmlns:a="http://schemas.openxmlformats.org/drawingml/2006/main" xmlns:r="http://schemas.openxmlformats.org/officeDocument/2006/relationships" xmlns:p="http://schemas.openxmlformats.org/presentationml/2006/main">
+  <p:cSld>
+    <p:spTree>
+      <p:nvGrpSpPr>
+        <p:cNvPr id="1" name=""/>
+        <p:cNvGrpSpPr/>
+        <p:nvPr/>
+      </p:nvGrpSpPr>
+      <p:grpSpPr>
+        <a:xfrm>
+          <a:off x="0" y="0"/>
+          <a:ext cx="0" cy="0"/>
+          <a:chOff x="0" y="0"/>
+          <a:chExt cx="0" cy="0"/>
+        </a:xfrm>
+      </p:grpSpPr>
+      <p:sp>
+        <p:nvSpPr>
           <p:cNvPr id="2" name="Tytuł 1"/>
           <p:cNvSpPr>
             <a:spLocks noGrp="1"/>
@@ -9287,7 +12697,7 @@
             <a:fld id="{121E5A8C-2088-45D2-9D84-10B3EA412A4C}" type="slidenum">
               <a:rPr lang="de-DE" smtClean="0"/>
               <a:pPr/>
-              <a:t>7</a:t>
+              <a:t>9</a:t>
             </a:fld>
             <a:endParaRPr lang="de-DE" dirty="0"/>
           </a:p>
@@ -9333,7 +12743,7 @@
           <a:blip r:embed="rId2" cstate="print">
             <a:extLst>
               <a:ext uri="{28A0092B-C50C-407E-A947-70E740481C1C}">
-                <a14:useLocalDpi xmlns="" xmlns:a14="http://schemas.microsoft.com/office/drawing/2010/main" val="0"/>
+                <a14:useLocalDpi xmlns:a14="http://schemas.microsoft.com/office/drawing/2010/main" xmlns="" val="0"/>
               </a:ext>
             </a:extLst>
           </a:blip>
@@ -9358,14 +12768,14 @@
           </a:effectLst>
           <a:extLst>
             <a:ext uri="{909E8E84-426E-40DD-AFC4-6F175D3DCCD1}">
-              <a14:hiddenFill xmlns="" xmlns:a14="http://schemas.microsoft.com/office/drawing/2010/main">
+              <a14:hiddenFill xmlns:a14="http://schemas.microsoft.com/office/drawing/2010/main" xmlns="">
                 <a:solidFill>
                   <a:schemeClr val="accent1"/>
                 </a:solidFill>
               </a14:hiddenFill>
             </a:ext>
             <a:ext uri="{91240B29-F687-4F45-9708-019B960494DF}">
-              <a14:hiddenLine xmlns="" xmlns:a14="http://schemas.microsoft.com/office/drawing/2010/main" w="9525">
+              <a14:hiddenLine xmlns:a14="http://schemas.microsoft.com/office/drawing/2010/main" xmlns="" w="9525">
                 <a:solidFill>
                   <a:schemeClr val="tx1"/>
                 </a:solidFill>
@@ -9375,7 +12785,7 @@
               </a14:hiddenLine>
             </a:ext>
             <a:ext uri="{AF507438-7753-43E0-B8FC-AC1667EBCBE1}">
-              <a14:hiddenEffects xmlns="" xmlns:a14="http://schemas.microsoft.com/office/drawing/2010/main">
+              <a14:hiddenEffects xmlns:a14="http://schemas.microsoft.com/office/drawing/2010/main" xmlns="">
                 <a:effectLst>
                   <a:outerShdw dist="35921" dir="2700000" algn="ctr" rotWithShape="0">
                     <a:schemeClr val="bg2"/>
@@ -9398,7 +12808,7 @@
           <a:blip r:embed="rId3" cstate="print">
             <a:extLst>
               <a:ext uri="{28A0092B-C50C-407E-A947-70E740481C1C}">
-                <a14:useLocalDpi xmlns="" xmlns:a14="http://schemas.microsoft.com/office/drawing/2010/main" val="0"/>
+                <a14:useLocalDpi xmlns:a14="http://schemas.microsoft.com/office/drawing/2010/main" xmlns="" val="0"/>
               </a:ext>
             </a:extLst>
           </a:blip>
@@ -9423,14 +12833,14 @@
           </a:effectLst>
           <a:extLst>
             <a:ext uri="{909E8E84-426E-40DD-AFC4-6F175D3DCCD1}">
-              <a14:hiddenFill xmlns="" xmlns:a14="http://schemas.microsoft.com/office/drawing/2010/main">
+              <a14:hiddenFill xmlns:a14="http://schemas.microsoft.com/office/drawing/2010/main" xmlns="">
                 <a:solidFill>
                   <a:schemeClr val="accent1"/>
                 </a:solidFill>
               </a14:hiddenFill>
             </a:ext>
             <a:ext uri="{91240B29-F687-4F45-9708-019B960494DF}">
-              <a14:hiddenLine xmlns="" xmlns:a14="http://schemas.microsoft.com/office/drawing/2010/main" w="9525">
+              <a14:hiddenLine xmlns:a14="http://schemas.microsoft.com/office/drawing/2010/main" xmlns="" w="9525">
                 <a:solidFill>
                   <a:schemeClr val="tx1"/>
                 </a:solidFill>
@@ -9440,7 +12850,7 @@
               </a14:hiddenLine>
             </a:ext>
             <a:ext uri="{AF507438-7753-43E0-B8FC-AC1667EBCBE1}">
-              <a14:hiddenEffects xmlns="" xmlns:a14="http://schemas.microsoft.com/office/drawing/2010/main">
+              <a14:hiddenEffects xmlns:a14="http://schemas.microsoft.com/office/drawing/2010/main" xmlns="">
                 <a:effectLst>
                   <a:outerShdw dist="35921" dir="2700000" algn="ctr" rotWithShape="0">
                     <a:schemeClr val="bg2"/>
@@ -9527,14 +12937,14 @@
           </a:ln>
           <a:extLst>
             <a:ext uri="{909E8E84-426E-40DD-AFC4-6F175D3DCCD1}">
-              <a14:hiddenFill xmlns="" xmlns:a14="http://schemas.microsoft.com/office/drawing/2010/main">
+              <a14:hiddenFill xmlns:a14="http://schemas.microsoft.com/office/drawing/2010/main" xmlns="">
                 <a:solidFill>
                   <a:srgbClr val="FFFFFF"/>
                 </a:solidFill>
               </a14:hiddenFill>
             </a:ext>
             <a:ext uri="{91240B29-F687-4F45-9708-019B960494DF}">
-              <a14:hiddenLine xmlns="" xmlns:a14="http://schemas.microsoft.com/office/drawing/2010/main" w="9525">
+              <a14:hiddenLine xmlns:a14="http://schemas.microsoft.com/office/drawing/2010/main" xmlns="" w="9525">
                 <a:solidFill>
                   <a:srgbClr val="000000"/>
                 </a:solidFill>
@@ -9812,567 +13222,6 @@
           </a:p>
         </p:txBody>
       </p:sp>
-    </p:spTree>
-  </p:cSld>
-  <p:clrMapOvr>
-    <a:masterClrMapping/>
-  </p:clrMapOvr>
-  <p:timing>
-    <p:tnLst>
-      <p:par>
-        <p:cTn id="1" dur="indefinite" restart="never" nodeType="tmRoot"/>
-      </p:par>
-    </p:tnLst>
-  </p:timing>
-</p:sld>
-</file>
-
-<file path=ppt/slides/slide8.xml><?xml version="1.0" encoding="utf-8"?>
-<p:sld xmlns:a="http://schemas.openxmlformats.org/drawingml/2006/main" xmlns:r="http://schemas.openxmlformats.org/officeDocument/2006/relationships" xmlns:p="http://schemas.openxmlformats.org/presentationml/2006/main">
-  <p:cSld>
-    <p:spTree>
-      <p:nvGrpSpPr>
-        <p:cNvPr id="1" name=""/>
-        <p:cNvGrpSpPr/>
-        <p:nvPr/>
-      </p:nvGrpSpPr>
-      <p:grpSpPr>
-        <a:xfrm>
-          <a:off x="0" y="0"/>
-          <a:ext cx="0" cy="0"/>
-          <a:chOff x="0" y="0"/>
-          <a:chExt cx="0" cy="0"/>
-        </a:xfrm>
-      </p:grpSpPr>
-      <p:sp>
-        <p:nvSpPr>
-          <p:cNvPr id="2" name="Tytuł 1"/>
-          <p:cNvSpPr>
-            <a:spLocks noGrp="1"/>
-          </p:cNvSpPr>
-          <p:nvPr>
-            <p:ph type="title"/>
-          </p:nvPr>
-        </p:nvSpPr>
-        <p:spPr>
-          <a:xfrm>
-            <a:off x="508000" y="914400"/>
-            <a:ext cx="7993090" cy="585774"/>
-          </a:xfrm>
-        </p:spPr>
-        <p:txBody>
-          <a:bodyPr/>
-          <a:lstStyle/>
-          <a:p>
-            <a:r>
-              <a:rPr lang="de-DE" dirty="0" err="1" smtClean="0">
-                <a:solidFill>
-                  <a:schemeClr val="bg1"/>
-                </a:solidFill>
-              </a:rPr>
-              <a:t>Use</a:t>
-            </a:r>
-            <a:r>
-              <a:rPr lang="de-DE" dirty="0" smtClean="0">
-                <a:solidFill>
-                  <a:schemeClr val="bg1"/>
-                </a:solidFill>
-              </a:rPr>
-              <a:t> Case </a:t>
-            </a:r>
-            <a:r>
-              <a:rPr lang="de-DE" smtClean="0">
-                <a:solidFill>
-                  <a:schemeClr val="bg1"/>
-                </a:solidFill>
-              </a:rPr>
-              <a:t>– Build Units</a:t>
-            </a:r>
-            <a:endParaRPr lang="pl-PL" dirty="0">
-              <a:solidFill>
-                <a:schemeClr val="bg1"/>
-              </a:solidFill>
-            </a:endParaRPr>
-          </a:p>
-        </p:txBody>
-      </p:sp>
-      <p:sp>
-        <p:nvSpPr>
-          <p:cNvPr id="5" name="Symbol zastępczy stopki 4"/>
-          <p:cNvSpPr>
-            <a:spLocks noGrp="1"/>
-          </p:cNvSpPr>
-          <p:nvPr>
-            <p:ph type="ftr" sz="quarter" idx="11"/>
-          </p:nvPr>
-        </p:nvSpPr>
-        <p:spPr/>
-        <p:txBody>
-          <a:bodyPr/>
-          <a:lstStyle/>
-          <a:p>
-            <a:r>
-              <a:rPr lang="de-DE" smtClean="0"/>
-              <a:t>Master Lab Course Web Applications</a:t>
-            </a:r>
-            <a:endParaRPr lang="de-DE" dirty="0"/>
-          </a:p>
-        </p:txBody>
-      </p:sp>
-      <p:sp>
-        <p:nvSpPr>
-          <p:cNvPr id="6" name="Symbol zastępczy numeru slajdu 5"/>
-          <p:cNvSpPr>
-            <a:spLocks noGrp="1"/>
-          </p:cNvSpPr>
-          <p:nvPr>
-            <p:ph type="sldNum" sz="quarter" idx="12"/>
-          </p:nvPr>
-        </p:nvSpPr>
-        <p:spPr/>
-        <p:txBody>
-          <a:bodyPr/>
-          <a:lstStyle/>
-          <a:p>
-            <a:fld id="{121E5A8C-2088-45D2-9D84-10B3EA412A4C}" type="slidenum">
-              <a:rPr lang="de-DE" smtClean="0"/>
-              <a:pPr/>
-              <a:t>8</a:t>
-            </a:fld>
-            <a:endParaRPr lang="de-DE" dirty="0"/>
-          </a:p>
-        </p:txBody>
-      </p:sp>
-      <p:sp>
-        <p:nvSpPr>
-          <p:cNvPr id="8" name="Symbol zastępczy daty 3"/>
-          <p:cNvSpPr>
-            <a:spLocks noGrp="1"/>
-          </p:cNvSpPr>
-          <p:nvPr>
-            <p:ph type="dt" sz="half" idx="10"/>
-          </p:nvPr>
-        </p:nvSpPr>
-        <p:spPr>
-          <a:xfrm>
-            <a:off x="508000" y="6400800"/>
-            <a:ext cx="1905000" cy="304800"/>
-          </a:xfrm>
-        </p:spPr>
-        <p:txBody>
-          <a:bodyPr/>
-          <a:lstStyle/>
-          <a:p>
-            <a:r>
-              <a:rPr lang="de-DE" smtClean="0"/>
-              <a:t>25.02.2013</a:t>
-            </a:r>
-            <a:endParaRPr lang="de-DE" dirty="0"/>
-          </a:p>
-        </p:txBody>
-      </p:sp>
-      <p:sp>
-        <p:nvSpPr>
-          <p:cNvPr id="9" name="Rounded Rectangle 8"/>
-          <p:cNvSpPr/>
-          <p:nvPr/>
-        </p:nvSpPr>
-        <p:spPr bwMode="auto">
-          <a:xfrm>
-            <a:off x="395536" y="1556792"/>
-            <a:ext cx="8136904" cy="1513639"/>
-          </a:xfrm>
-          <a:prstGeom prst="roundRect">
-            <a:avLst>
-              <a:gd name="adj" fmla="val 13985"/>
-            </a:avLst>
-          </a:prstGeom>
-          <a:solidFill>
-            <a:srgbClr val="292929"/>
-          </a:solidFill>
-          <a:ln w="9525" cap="flat" cmpd="sng" algn="ctr">
-            <a:noFill/>
-            <a:prstDash val="solid"/>
-            <a:round/>
-            <a:headEnd type="none" w="med" len="med"/>
-            <a:tailEnd type="none" w="med" len="med"/>
-          </a:ln>
-          <a:effectLst>
-            <a:innerShdw blurRad="114300">
-              <a:prstClr val="black"/>
-            </a:innerShdw>
-          </a:effectLst>
-        </p:spPr>
-        <p:txBody>
-          <a:bodyPr vert="horz" wrap="square" lIns="91440" tIns="45720" rIns="91440" bIns="45720" numCol="1" rtlCol="0" anchor="t" anchorCtr="0" compatLnSpc="1">
-            <a:prstTxWarp prst="textNoShape">
-              <a:avLst/>
-            </a:prstTxWarp>
-          </a:bodyPr>
-          <a:lstStyle/>
-          <a:p>
-            <a:pPr algn="r" eaLnBrk="0" fontAlgn="base" hangingPunct="0">
-              <a:spcBef>
-                <a:spcPct val="0"/>
-              </a:spcBef>
-              <a:spcAft>
-                <a:spcPct val="0"/>
-              </a:spcAft>
-            </a:pPr>
-            <a:endParaRPr lang="de-DE" sz="2000">
-              <a:latin typeface="Arial" pitchFamily="34" charset="0"/>
-            </a:endParaRPr>
-          </a:p>
-        </p:txBody>
-      </p:sp>
-      <p:sp>
-        <p:nvSpPr>
-          <p:cNvPr id="10" name="Symbol zastępczy zawartości 2"/>
-          <p:cNvSpPr txBox="1">
-            <a:spLocks/>
-          </p:cNvSpPr>
-          <p:nvPr/>
-        </p:nvSpPr>
-        <p:spPr bwMode="auto">
-          <a:xfrm>
-            <a:off x="430968" y="1809555"/>
-            <a:ext cx="8101472" cy="1008112"/>
-          </a:xfrm>
-          <a:prstGeom prst="rect">
-            <a:avLst/>
-          </a:prstGeom>
-          <a:noFill/>
-          <a:ln>
-            <a:noFill/>
-          </a:ln>
-          <a:extLst>
-            <a:ext uri="{909E8E84-426E-40DD-AFC4-6F175D3DCCD1}">
-              <a14:hiddenFill xmlns="" xmlns:a14="http://schemas.microsoft.com/office/drawing/2010/main">
-                <a:solidFill>
-                  <a:srgbClr val="FFFFFF"/>
-                </a:solidFill>
-              </a14:hiddenFill>
-            </a:ext>
-            <a:ext uri="{91240B29-F687-4F45-9708-019B960494DF}">
-              <a14:hiddenLine xmlns="" xmlns:a14="http://schemas.microsoft.com/office/drawing/2010/main" w="9525">
-                <a:solidFill>
-                  <a:srgbClr val="000000"/>
-                </a:solidFill>
-                <a:miter lim="800000"/>
-                <a:headEnd/>
-                <a:tailEnd/>
-              </a14:hiddenLine>
-            </a:ext>
-          </a:extLst>
-        </p:spPr>
-        <p:txBody>
-          <a:bodyPr vert="horz" wrap="square" lIns="91440" tIns="45720" rIns="91440" bIns="45720" numCol="1" anchor="t" anchorCtr="0" compatLnSpc="1">
-            <a:prstTxWarp prst="textNoShape">
-              <a:avLst/>
-            </a:prstTxWarp>
-          </a:bodyPr>
-          <a:lstStyle>
-            <a:lvl1pPr marL="342900" indent="-342900" algn="l" rtl="0" eaLnBrk="1" fontAlgn="base" hangingPunct="1">
-              <a:spcBef>
-                <a:spcPct val="20000"/>
-              </a:spcBef>
-              <a:spcAft>
-                <a:spcPct val="0"/>
-              </a:spcAft>
-              <a:buChar char="•"/>
-              <a:defRPr sz="2400">
-                <a:solidFill>
-                  <a:schemeClr val="bg1"/>
-                </a:solidFill>
-                <a:latin typeface="+mn-lt"/>
-                <a:ea typeface="ＭＳ Ｐゴシック" pitchFamily="-65" charset="-128"/>
-                <a:cs typeface="ＭＳ Ｐゴシック" pitchFamily="18" charset="-128"/>
-              </a:defRPr>
-            </a:lvl1pPr>
-            <a:lvl2pPr marL="742950" indent="-285750" algn="l" rtl="0" eaLnBrk="1" fontAlgn="base" hangingPunct="1">
-              <a:spcBef>
-                <a:spcPct val="20000"/>
-              </a:spcBef>
-              <a:spcAft>
-                <a:spcPct val="0"/>
-              </a:spcAft>
-              <a:buChar char="–"/>
-              <a:defRPr sz="2000">
-                <a:solidFill>
-                  <a:schemeClr val="bg1"/>
-                </a:solidFill>
-                <a:latin typeface="+mn-lt"/>
-                <a:ea typeface="ＭＳ Ｐゴシック" pitchFamily="-65" charset="-128"/>
-              </a:defRPr>
-            </a:lvl2pPr>
-            <a:lvl3pPr marL="1143000" indent="-228600" algn="l" rtl="0" eaLnBrk="1" fontAlgn="base" hangingPunct="1">
-              <a:spcBef>
-                <a:spcPct val="20000"/>
-              </a:spcBef>
-              <a:spcAft>
-                <a:spcPct val="0"/>
-              </a:spcAft>
-              <a:buChar char="•"/>
-              <a:defRPr sz="2000">
-                <a:solidFill>
-                  <a:schemeClr val="bg1"/>
-                </a:solidFill>
-                <a:latin typeface="+mn-lt"/>
-                <a:ea typeface="ＭＳ Ｐゴシック" pitchFamily="-65" charset="-128"/>
-              </a:defRPr>
-            </a:lvl3pPr>
-            <a:lvl4pPr marL="1562100" indent="-228600" algn="l" rtl="0" eaLnBrk="1" fontAlgn="base" hangingPunct="1">
-              <a:spcBef>
-                <a:spcPct val="20000"/>
-              </a:spcBef>
-              <a:spcAft>
-                <a:spcPct val="0"/>
-              </a:spcAft>
-              <a:buChar char="–"/>
-              <a:defRPr sz="2000">
-                <a:solidFill>
-                  <a:schemeClr val="bg1"/>
-                </a:solidFill>
-                <a:latin typeface="+mn-lt"/>
-                <a:ea typeface="ＭＳ Ｐゴシック" pitchFamily="-65" charset="-128"/>
-              </a:defRPr>
-            </a:lvl4pPr>
-            <a:lvl5pPr marL="1981200" indent="-228600" algn="l" rtl="0" eaLnBrk="1" fontAlgn="base" hangingPunct="1">
-              <a:spcBef>
-                <a:spcPct val="20000"/>
-              </a:spcBef>
-              <a:spcAft>
-                <a:spcPct val="0"/>
-              </a:spcAft>
-              <a:buChar char="»"/>
-              <a:defRPr sz="2000">
-                <a:solidFill>
-                  <a:schemeClr val="bg1"/>
-                </a:solidFill>
-                <a:latin typeface="+mn-lt"/>
-                <a:ea typeface="ＭＳ Ｐゴシック" pitchFamily="-65" charset="-128"/>
-              </a:defRPr>
-            </a:lvl5pPr>
-            <a:lvl6pPr marL="2438400" indent="-228600" algn="l" rtl="0" eaLnBrk="1" fontAlgn="base" hangingPunct="1">
-              <a:spcBef>
-                <a:spcPct val="20000"/>
-              </a:spcBef>
-              <a:spcAft>
-                <a:spcPct val="0"/>
-              </a:spcAft>
-              <a:buChar char="»"/>
-              <a:defRPr sz="1400">
-                <a:solidFill>
-                  <a:schemeClr val="tx1"/>
-                </a:solidFill>
-                <a:latin typeface="+mn-lt"/>
-              </a:defRPr>
-            </a:lvl6pPr>
-            <a:lvl7pPr marL="2895600" indent="-228600" algn="l" rtl="0" eaLnBrk="1" fontAlgn="base" hangingPunct="1">
-              <a:spcBef>
-                <a:spcPct val="20000"/>
-              </a:spcBef>
-              <a:spcAft>
-                <a:spcPct val="0"/>
-              </a:spcAft>
-              <a:buChar char="»"/>
-              <a:defRPr sz="1400">
-                <a:solidFill>
-                  <a:schemeClr val="tx1"/>
-                </a:solidFill>
-                <a:latin typeface="+mn-lt"/>
-              </a:defRPr>
-            </a:lvl7pPr>
-            <a:lvl8pPr marL="3352800" indent="-228600" algn="l" rtl="0" eaLnBrk="1" fontAlgn="base" hangingPunct="1">
-              <a:spcBef>
-                <a:spcPct val="20000"/>
-              </a:spcBef>
-              <a:spcAft>
-                <a:spcPct val="0"/>
-              </a:spcAft>
-              <a:buChar char="»"/>
-              <a:defRPr sz="1400">
-                <a:solidFill>
-                  <a:schemeClr val="tx1"/>
-                </a:solidFill>
-                <a:latin typeface="+mn-lt"/>
-              </a:defRPr>
-            </a:lvl8pPr>
-            <a:lvl9pPr marL="3810000" indent="-228600" algn="l" rtl="0" eaLnBrk="1" fontAlgn="base" hangingPunct="1">
-              <a:spcBef>
-                <a:spcPct val="20000"/>
-              </a:spcBef>
-              <a:spcAft>
-                <a:spcPct val="0"/>
-              </a:spcAft>
-              <a:buChar char="»"/>
-              <a:defRPr sz="1400">
-                <a:solidFill>
-                  <a:schemeClr val="tx1"/>
-                </a:solidFill>
-                <a:latin typeface="+mn-lt"/>
-              </a:defRPr>
-            </a:lvl9pPr>
-          </a:lstStyle>
-          <a:p>
-            <a:pPr>
-              <a:lnSpc>
-                <a:spcPct val="115000"/>
-              </a:lnSpc>
-              <a:spcAft>
-                <a:spcPts val="0"/>
-              </a:spcAft>
-            </a:pPr>
-            <a:r>
-              <a:rPr lang="en-US" sz="1600" smtClean="0"/>
-              <a:t>Players can use their resources to </a:t>
-            </a:r>
-            <a:r>
-              <a:rPr lang="en-US" sz="1600" smtClean="0">
-                <a:solidFill>
-                  <a:srgbClr val="FF9900"/>
-                </a:solidFill>
-              </a:rPr>
-              <a:t>build</a:t>
-            </a:r>
-            <a:r>
-              <a:rPr lang="en-US" sz="1600" smtClean="0"/>
-              <a:t> units</a:t>
-            </a:r>
-          </a:p>
-          <a:p>
-            <a:pPr>
-              <a:lnSpc>
-                <a:spcPct val="115000"/>
-              </a:lnSpc>
-              <a:spcAft>
-                <a:spcPts val="0"/>
-              </a:spcAft>
-            </a:pPr>
-            <a:r>
-              <a:rPr lang="en-US" sz="1600" smtClean="0"/>
-              <a:t>Total amount of units is </a:t>
-            </a:r>
-            <a:r>
-              <a:rPr lang="en-US" sz="1600" smtClean="0">
-                <a:solidFill>
-                  <a:srgbClr val="FF9900"/>
-                </a:solidFill>
-              </a:rPr>
-              <a:t>limited</a:t>
-            </a:r>
-            <a:r>
-              <a:rPr lang="en-US" sz="1600" smtClean="0"/>
-              <a:t> by the </a:t>
-            </a:r>
-            <a:r>
-              <a:rPr lang="en-US" sz="1600" smtClean="0">
-                <a:solidFill>
-                  <a:srgbClr val="FF9900"/>
-                </a:solidFill>
-              </a:rPr>
-              <a:t>food</a:t>
-            </a:r>
-            <a:r>
-              <a:rPr lang="en-US" sz="1600" smtClean="0"/>
-              <a:t> resource</a:t>
-            </a:r>
-          </a:p>
-          <a:p>
-            <a:pPr>
-              <a:lnSpc>
-                <a:spcPct val="115000"/>
-              </a:lnSpc>
-              <a:spcAft>
-                <a:spcPts val="0"/>
-              </a:spcAft>
-            </a:pPr>
-            <a:r>
-              <a:rPr lang="en-US" sz="1600" smtClean="0"/>
-              <a:t>Units live until they </a:t>
-            </a:r>
-            <a:r>
-              <a:rPr lang="en-US" sz="1600" smtClean="0">
-                <a:solidFill>
-                  <a:srgbClr val="FF9900"/>
-                </a:solidFill>
-              </a:rPr>
-              <a:t>fail</a:t>
-            </a:r>
-            <a:r>
-              <a:rPr lang="en-US" sz="1600" smtClean="0"/>
-              <a:t> at a conquering attempt</a:t>
-            </a:r>
-            <a:endParaRPr lang="en-US" sz="1600" dirty="0" smtClean="0"/>
-          </a:p>
-        </p:txBody>
-      </p:sp>
-      <p:pic>
-        <p:nvPicPr>
-          <p:cNvPr id="1026" name="Picture 2" descr="G:\WebAppLab\pi-puppids\docs\buildUnits.png"/>
-          <p:cNvPicPr>
-            <a:picLocks noChangeAspect="1" noChangeArrowheads="1"/>
-          </p:cNvPicPr>
-          <p:nvPr/>
-        </p:nvPicPr>
-        <p:blipFill>
-          <a:blip r:embed="rId2" cstate="print"/>
-          <a:srcRect/>
-          <a:stretch>
-            <a:fillRect/>
-          </a:stretch>
-        </p:blipFill>
-        <p:spPr bwMode="auto">
-          <a:xfrm>
-            <a:off x="3347864" y="3212976"/>
-            <a:ext cx="5328592" cy="2961314"/>
-          </a:xfrm>
-          <a:prstGeom prst="rect">
-            <a:avLst/>
-          </a:prstGeom>
-          <a:ln>
-            <a:noFill/>
-          </a:ln>
-          <a:effectLst>
-            <a:softEdge rad="112500"/>
-          </a:effectLst>
-        </p:spPr>
-      </p:pic>
-      <p:pic>
-        <p:nvPicPr>
-          <p:cNvPr id="1028" name="Picture 4" descr="G:\WebAppLab\pi-puppids\docs\unitTab.png"/>
-          <p:cNvPicPr>
-            <a:picLocks noChangeAspect="1" noChangeArrowheads="1"/>
-          </p:cNvPicPr>
-          <p:nvPr/>
-        </p:nvPicPr>
-        <p:blipFill>
-          <a:blip r:embed="rId3" cstate="print"/>
-          <a:srcRect/>
-          <a:stretch>
-            <a:fillRect/>
-          </a:stretch>
-        </p:blipFill>
-        <p:spPr bwMode="auto">
-          <a:xfrm>
-            <a:off x="435124" y="3356992"/>
-            <a:ext cx="2552700" cy="2609850"/>
-          </a:xfrm>
-          <a:prstGeom prst="rect">
-            <a:avLst/>
-          </a:prstGeom>
-          <a:ln>
-            <a:noFill/>
-          </a:ln>
-          <a:effectLst>
-            <a:outerShdw blurRad="190500" algn="tl" rotWithShape="0">
-              <a:srgbClr val="000000">
-                <a:alpha val="70000"/>
-              </a:srgbClr>
-            </a:outerShdw>
-          </a:effectLst>
-        </p:spPr>
-      </p:pic>
     </p:spTree>
   </p:cSld>
   <p:clrMapOvr>

</xml_diff>

<commit_message>
Slide about team management and invitation schema added
</commit_message>
<xml_diff>
--- a/docs/group4_Final_Presentation.pptx
+++ b/docs/group4_Final_Presentation.pptx
@@ -5,10 +5,10 @@
     <p:sldMasterId id="2147483660" r:id="rId1"/>
   </p:sldMasterIdLst>
   <p:notesMasterIdLst>
-    <p:notesMasterId r:id="rId15"/>
+    <p:notesMasterId r:id="rId17"/>
   </p:notesMasterIdLst>
   <p:handoutMasterIdLst>
-    <p:handoutMasterId r:id="rId16"/>
+    <p:handoutMasterId r:id="rId18"/>
   </p:handoutMasterIdLst>
   <p:sldIdLst>
     <p:sldId id="256" r:id="rId2"/>
@@ -24,6 +24,8 @@
     <p:sldId id="289" r:id="rId12"/>
     <p:sldId id="263" r:id="rId13"/>
     <p:sldId id="284" r:id="rId14"/>
+    <p:sldId id="292" r:id="rId15"/>
+    <p:sldId id="293" r:id="rId16"/>
   </p:sldIdLst>
   <p:sldSz cx="9144000" cy="6858000" type="screen4x3"/>
   <p:notesSz cx="6858000" cy="9144000"/>
@@ -208,7 +210,7 @@
             <a:fld id="{B90D170F-C4DC-4970-8523-1EDF1DABFF2F}" type="datetimeFigureOut">
               <a:rPr lang="de-DE" smtClean="0"/>
               <a:pPr/>
-              <a:t>13.02.2013</a:t>
+              <a:t>14.02.2013</a:t>
             </a:fld>
             <a:endParaRPr lang="de-DE"/>
           </a:p>
@@ -275,7 +277,7 @@
             <a:fld id="{E9FE34E0-06B0-4097-BDB1-19F4CB9F3AF5}" type="slidenum">
               <a:rPr lang="de-DE" smtClean="0"/>
               <a:pPr/>
-              <a:t>‹Nr.›</a:t>
+              <a:t>‹#›</a:t>
             </a:fld>
             <a:endParaRPr lang="de-DE"/>
           </a:p>
@@ -284,7 +286,7 @@
     </p:spTree>
     <p:extLst>
       <p:ext uri="{BB962C8B-B14F-4D97-AF65-F5344CB8AC3E}">
-        <p14:creationId xmlns:p14="http://schemas.microsoft.com/office/powerpoint/2010/main" xmlns="" val="3507328673"/>
+        <p14:creationId xmlns="" xmlns:p14="http://schemas.microsoft.com/office/powerpoint/2010/main" val="3507328673"/>
       </p:ext>
     </p:extLst>
   </p:cSld>
@@ -375,7 +377,7 @@
             <a:fld id="{208B6049-45AF-4855-985C-185012BA219A}" type="datetimeFigureOut">
               <a:rPr lang="de-DE" smtClean="0"/>
               <a:pPr/>
-              <a:t>13.02.2013</a:t>
+              <a:t>14.02.2013</a:t>
             </a:fld>
             <a:endParaRPr lang="de-DE"/>
           </a:p>
@@ -535,7 +537,7 @@
             <a:fld id="{659CEC5D-4A85-40E8-8CE8-2BEB4B481F32}" type="slidenum">
               <a:rPr lang="de-DE" smtClean="0"/>
               <a:pPr/>
-              <a:t>‹Nr.›</a:t>
+              <a:t>‹#›</a:t>
             </a:fld>
             <a:endParaRPr lang="de-DE"/>
           </a:p>
@@ -544,7 +546,7 @@
     </p:spTree>
     <p:extLst>
       <p:ext uri="{BB962C8B-B14F-4D97-AF65-F5344CB8AC3E}">
-        <p14:creationId xmlns:p14="http://schemas.microsoft.com/office/powerpoint/2010/main" xmlns="" val="1095461984"/>
+        <p14:creationId xmlns="" xmlns:p14="http://schemas.microsoft.com/office/powerpoint/2010/main" val="1095461984"/>
       </p:ext>
     </p:extLst>
   </p:cSld>
@@ -719,7 +721,7 @@
     </p:spTree>
     <p:extLst>
       <p:ext uri="{BB962C8B-B14F-4D97-AF65-F5344CB8AC3E}">
-        <p14:creationId xmlns:p14="http://schemas.microsoft.com/office/powerpoint/2010/main" xmlns="" val="2394399261"/>
+        <p14:creationId xmlns="" xmlns:p14="http://schemas.microsoft.com/office/powerpoint/2010/main" val="2394399261"/>
       </p:ext>
     </p:extLst>
   </p:cSld>
@@ -999,7 +1001,7 @@
             <a:biLevel thresh="25000"/>
             <a:extLst>
               <a:ext uri="{28A0092B-C50C-407E-A947-70E740481C1C}">
-                <a14:useLocalDpi xmlns:a14="http://schemas.microsoft.com/office/drawing/2010/main" xmlns="" val="0"/>
+                <a14:useLocalDpi xmlns="" xmlns:a14="http://schemas.microsoft.com/office/drawing/2010/main" val="0"/>
               </a:ext>
             </a:extLst>
           </a:blip>
@@ -1022,14 +1024,14 @@
           </a:ln>
           <a:extLst>
             <a:ext uri="{909E8E84-426E-40DD-AFC4-6F175D3DCCD1}">
-              <a14:hiddenFill xmlns:a14="http://schemas.microsoft.com/office/drawing/2010/main" xmlns="">
+              <a14:hiddenFill xmlns="" xmlns:a14="http://schemas.microsoft.com/office/drawing/2010/main">
                 <a:solidFill>
                   <a:srgbClr val="FFFFFF"/>
                 </a:solidFill>
               </a14:hiddenFill>
             </a:ext>
             <a:ext uri="{91240B29-F687-4F45-9708-019B960494DF}">
-              <a14:hiddenLine xmlns:a14="http://schemas.microsoft.com/office/drawing/2010/main" xmlns="" w="9525">
+              <a14:hiddenLine xmlns="" xmlns:a14="http://schemas.microsoft.com/office/drawing/2010/main" w="9525">
                 <a:solidFill>
                   <a:srgbClr val="000000"/>
                 </a:solidFill>
@@ -1154,7 +1156,7 @@
     </p:spTree>
     <p:extLst>
       <p:ext uri="{BB962C8B-B14F-4D97-AF65-F5344CB8AC3E}">
-        <p14:creationId xmlns:p14="http://schemas.microsoft.com/office/powerpoint/2010/main" xmlns="" val="364360318"/>
+        <p14:creationId xmlns="" xmlns:p14="http://schemas.microsoft.com/office/powerpoint/2010/main" val="364360318"/>
       </p:ext>
     </p:extLst>
   </p:cSld>
@@ -1365,7 +1367,7 @@
             <a:fld id="{121E5A8C-2088-45D2-9D84-10B3EA412A4C}" type="slidenum">
               <a:rPr lang="de-DE" smtClean="0"/>
               <a:pPr/>
-              <a:t>‹Nr.›</a:t>
+              <a:t>‹#›</a:t>
             </a:fld>
             <a:endParaRPr lang="de-DE" dirty="0"/>
           </a:p>
@@ -1374,7 +1376,7 @@
     </p:spTree>
     <p:extLst>
       <p:ext uri="{BB962C8B-B14F-4D97-AF65-F5344CB8AC3E}">
-        <p14:creationId xmlns:p14="http://schemas.microsoft.com/office/powerpoint/2010/main" xmlns="" val="1803307076"/>
+        <p14:creationId xmlns="" xmlns:p14="http://schemas.microsoft.com/office/powerpoint/2010/main" val="1803307076"/>
       </p:ext>
     </p:extLst>
   </p:cSld>
@@ -1699,7 +1701,7 @@
             <a:fld id="{121E5A8C-2088-45D2-9D84-10B3EA412A4C}" type="slidenum">
               <a:rPr lang="de-DE" smtClean="0"/>
               <a:pPr/>
-              <a:t>‹Nr.›</a:t>
+              <a:t>‹#›</a:t>
             </a:fld>
             <a:endParaRPr lang="de-DE"/>
           </a:p>
@@ -1708,7 +1710,7 @@
     </p:spTree>
     <p:extLst>
       <p:ext uri="{BB962C8B-B14F-4D97-AF65-F5344CB8AC3E}">
-        <p14:creationId xmlns:p14="http://schemas.microsoft.com/office/powerpoint/2010/main" xmlns="" val="302666195"/>
+        <p14:creationId xmlns="" xmlns:p14="http://schemas.microsoft.com/office/powerpoint/2010/main" val="302666195"/>
       </p:ext>
     </p:extLst>
   </p:cSld>
@@ -1777,14 +1779,14 @@
           </a:ln>
           <a:extLst>
             <a:ext uri="{909E8E84-426E-40DD-AFC4-6F175D3DCCD1}">
-              <a14:hiddenFill xmlns:a14="http://schemas.microsoft.com/office/drawing/2010/main" xmlns="">
+              <a14:hiddenFill xmlns="" xmlns:a14="http://schemas.microsoft.com/office/drawing/2010/main">
                 <a:solidFill>
                   <a:srgbClr val="FFFFFF"/>
                 </a:solidFill>
               </a14:hiddenFill>
             </a:ext>
             <a:ext uri="{91240B29-F687-4F45-9708-019B960494DF}">
-              <a14:hiddenLine xmlns:a14="http://schemas.microsoft.com/office/drawing/2010/main" xmlns="" w="9525">
+              <a14:hiddenLine xmlns="" xmlns:a14="http://schemas.microsoft.com/office/drawing/2010/main" w="9525">
                 <a:solidFill>
                   <a:srgbClr val="000000"/>
                 </a:solidFill>
@@ -1835,14 +1837,14 @@
           </a:ln>
           <a:extLst>
             <a:ext uri="{909E8E84-426E-40DD-AFC4-6F175D3DCCD1}">
-              <a14:hiddenFill xmlns:a14="http://schemas.microsoft.com/office/drawing/2010/main" xmlns="">
+              <a14:hiddenFill xmlns="" xmlns:a14="http://schemas.microsoft.com/office/drawing/2010/main">
                 <a:solidFill>
                   <a:srgbClr val="FFFFFF"/>
                 </a:solidFill>
               </a14:hiddenFill>
             </a:ext>
             <a:ext uri="{91240B29-F687-4F45-9708-019B960494DF}">
-              <a14:hiddenLine xmlns:a14="http://schemas.microsoft.com/office/drawing/2010/main" xmlns="" w="9525">
+              <a14:hiddenLine xmlns="" xmlns:a14="http://schemas.microsoft.com/office/drawing/2010/main" w="9525">
                 <a:solidFill>
                   <a:srgbClr val="000000"/>
                 </a:solidFill>
@@ -2051,7 +2053,7 @@
             <a:fld id="{121E5A8C-2088-45D2-9D84-10B3EA412A4C}" type="slidenum">
               <a:rPr lang="de-DE" smtClean="0"/>
               <a:pPr/>
-              <a:t>‹Nr.›</a:t>
+              <a:t>‹#›</a:t>
             </a:fld>
             <a:endParaRPr lang="de-DE"/>
           </a:p>
@@ -2270,7 +2272,7 @@
             <a:biLevel thresh="25000"/>
             <a:extLst>
               <a:ext uri="{28A0092B-C50C-407E-A947-70E740481C1C}">
-                <a14:useLocalDpi xmlns:a14="http://schemas.microsoft.com/office/drawing/2010/main" xmlns="" val="0"/>
+                <a14:useLocalDpi xmlns="" xmlns:a14="http://schemas.microsoft.com/office/drawing/2010/main" val="0"/>
               </a:ext>
             </a:extLst>
           </a:blip>
@@ -2293,14 +2295,14 @@
           </a:ln>
           <a:extLst>
             <a:ext uri="{909E8E84-426E-40DD-AFC4-6F175D3DCCD1}">
-              <a14:hiddenFill xmlns:a14="http://schemas.microsoft.com/office/drawing/2010/main" xmlns="">
+              <a14:hiddenFill xmlns="" xmlns:a14="http://schemas.microsoft.com/office/drawing/2010/main">
                 <a:solidFill>
                   <a:srgbClr val="FFFFFF"/>
                 </a:solidFill>
               </a14:hiddenFill>
             </a:ext>
             <a:ext uri="{91240B29-F687-4F45-9708-019B960494DF}">
-              <a14:hiddenLine xmlns:a14="http://schemas.microsoft.com/office/drawing/2010/main" xmlns="" w="9525">
+              <a14:hiddenLine xmlns="" xmlns:a14="http://schemas.microsoft.com/office/drawing/2010/main" w="9525">
                 <a:solidFill>
                   <a:srgbClr val="000000"/>
                 </a:solidFill>
@@ -2369,7 +2371,7 @@
           <a:blip r:embed="rId6" cstate="print">
             <a:extLst>
               <a:ext uri="{28A0092B-C50C-407E-A947-70E740481C1C}">
-                <a14:useLocalDpi xmlns:a14="http://schemas.microsoft.com/office/drawing/2010/main" xmlns="" val="0"/>
+                <a14:useLocalDpi xmlns="" xmlns:a14="http://schemas.microsoft.com/office/drawing/2010/main" val="0"/>
               </a:ext>
             </a:extLst>
           </a:blip>
@@ -2389,7 +2391,7 @@
           <a:noFill/>
           <a:extLst>
             <a:ext uri="{909E8E84-426E-40DD-AFC4-6F175D3DCCD1}">
-              <a14:hiddenFill xmlns:a14="http://schemas.microsoft.com/office/drawing/2010/main" xmlns="">
+              <a14:hiddenFill xmlns="" xmlns:a14="http://schemas.microsoft.com/office/drawing/2010/main">
                 <a:solidFill>
                   <a:srgbClr val="FFFFFF"/>
                 </a:solidFill>
@@ -3168,7 +3170,7 @@
           <a:blip r:embed="rId2" cstate="print">
             <a:extLst>
               <a:ext uri="{28A0092B-C50C-407E-A947-70E740481C1C}">
-                <a14:useLocalDpi xmlns:a14="http://schemas.microsoft.com/office/drawing/2010/main" xmlns="" val="0"/>
+                <a14:useLocalDpi xmlns="" xmlns:a14="http://schemas.microsoft.com/office/drawing/2010/main" val="0"/>
               </a:ext>
             </a:extLst>
           </a:blip>
@@ -3188,7 +3190,7 @@
           <a:noFill/>
           <a:extLst>
             <a:ext uri="{909E8E84-426E-40DD-AFC4-6F175D3DCCD1}">
-              <a14:hiddenFill xmlns:a14="http://schemas.microsoft.com/office/drawing/2010/main" xmlns="">
+              <a14:hiddenFill xmlns="" xmlns:a14="http://schemas.microsoft.com/office/drawing/2010/main">
                 <a:solidFill>
                   <a:srgbClr val="FFFFFF"/>
                 </a:solidFill>
@@ -3200,7 +3202,7 @@
     </p:spTree>
     <p:extLst>
       <p:ext uri="{BB962C8B-B14F-4D97-AF65-F5344CB8AC3E}">
-        <p14:creationId xmlns:p14="http://schemas.microsoft.com/office/powerpoint/2010/main" xmlns="" val="2518694071"/>
+        <p14:creationId xmlns="" xmlns:p14="http://schemas.microsoft.com/office/powerpoint/2010/main" val="2518694071"/>
       </p:ext>
     </p:extLst>
   </p:cSld>
@@ -3264,25 +3266,6 @@
       </p:sp>
       <p:sp>
         <p:nvSpPr>
-          <p:cNvPr id="8" name="Untertitel 7"/>
-          <p:cNvSpPr>
-            <a:spLocks noGrp="1"/>
-          </p:cNvSpPr>
-          <p:nvPr>
-            <p:ph type="subTitle" idx="1"/>
-          </p:nvPr>
-        </p:nvSpPr>
-        <p:spPr/>
-        <p:txBody>
-          <a:bodyPr/>
-          <a:lstStyle/>
-          <a:p>
-            <a:endParaRPr lang="de-DE"/>
-          </a:p>
-        </p:txBody>
-      </p:sp>
-      <p:sp>
-        <p:nvSpPr>
           <p:cNvPr id="5" name="Fußzeilenplatzhalter 4"/>
           <p:cNvSpPr>
             <a:spLocks noGrp="1"/>
@@ -3364,7 +3347,7 @@
     </p:spTree>
     <p:extLst>
       <p:ext uri="{BB962C8B-B14F-4D97-AF65-F5344CB8AC3E}">
-        <p14:creationId xmlns:p14="http://schemas.microsoft.com/office/powerpoint/2010/main" xmlns="" val="898927123"/>
+        <p14:creationId xmlns="" xmlns:p14="http://schemas.microsoft.com/office/powerpoint/2010/main" val="898927123"/>
       </p:ext>
     </p:extLst>
   </p:cSld>
@@ -4812,7 +4795,7 @@
           <a:blip r:embed="rId2" cstate="print">
             <a:extLst>
               <a:ext uri="{28A0092B-C50C-407E-A947-70E740481C1C}">
-                <a14:useLocalDpi xmlns:a14="http://schemas.microsoft.com/office/drawing/2010/main" xmlns="" val="0"/>
+                <a14:useLocalDpi xmlns="" xmlns:a14="http://schemas.microsoft.com/office/drawing/2010/main" val="0"/>
               </a:ext>
             </a:extLst>
           </a:blip>
@@ -4832,7 +4815,7 @@
           <a:noFill/>
           <a:extLst>
             <a:ext uri="{909E8E84-426E-40DD-AFC4-6F175D3DCCD1}">
-              <a14:hiddenFill xmlns:a14="http://schemas.microsoft.com/office/drawing/2010/main" xmlns="">
+              <a14:hiddenFill xmlns="" xmlns:a14="http://schemas.microsoft.com/office/drawing/2010/main">
                 <a:solidFill>
                   <a:srgbClr val="FFFFFF"/>
                 </a:solidFill>
@@ -4844,7 +4827,7 @@
     </p:spTree>
     <p:extLst>
       <p:ext uri="{BB962C8B-B14F-4D97-AF65-F5344CB8AC3E}">
-        <p14:creationId xmlns:p14="http://schemas.microsoft.com/office/powerpoint/2010/main" xmlns="" val="183408080"/>
+        <p14:creationId xmlns="" xmlns:p14="http://schemas.microsoft.com/office/powerpoint/2010/main" val="183408080"/>
       </p:ext>
     </p:extLst>
   </p:cSld>
@@ -5009,7 +4992,7 @@
           <a:blip r:embed="rId2" cstate="print">
             <a:extLst>
               <a:ext uri="{28A0092B-C50C-407E-A947-70E740481C1C}">
-                <a14:useLocalDpi xmlns:a14="http://schemas.microsoft.com/office/drawing/2010/main" xmlns="" val="0"/>
+                <a14:useLocalDpi xmlns="" xmlns:a14="http://schemas.microsoft.com/office/drawing/2010/main" val="0"/>
               </a:ext>
             </a:extLst>
           </a:blip>
@@ -5034,14 +5017,14 @@
           </a:effectLst>
           <a:extLst>
             <a:ext uri="{909E8E84-426E-40DD-AFC4-6F175D3DCCD1}">
-              <a14:hiddenFill xmlns:a14="http://schemas.microsoft.com/office/drawing/2010/main" xmlns="">
+              <a14:hiddenFill xmlns="" xmlns:a14="http://schemas.microsoft.com/office/drawing/2010/main">
                 <a:solidFill>
                   <a:schemeClr val="accent1"/>
                 </a:solidFill>
               </a14:hiddenFill>
             </a:ext>
             <a:ext uri="{91240B29-F687-4F45-9708-019B960494DF}">
-              <a14:hiddenLine xmlns:a14="http://schemas.microsoft.com/office/drawing/2010/main" xmlns="" w="9525">
+              <a14:hiddenLine xmlns="" xmlns:a14="http://schemas.microsoft.com/office/drawing/2010/main" w="9525">
                 <a:solidFill>
                   <a:schemeClr val="tx1"/>
                 </a:solidFill>
@@ -5051,7 +5034,7 @@
               </a14:hiddenLine>
             </a:ext>
             <a:ext uri="{AF507438-7753-43E0-B8FC-AC1667EBCBE1}">
-              <a14:hiddenEffects xmlns:a14="http://schemas.microsoft.com/office/drawing/2010/main" xmlns="">
+              <a14:hiddenEffects xmlns="" xmlns:a14="http://schemas.microsoft.com/office/drawing/2010/main">
                 <a:effectLst>
                   <a:outerShdw dist="35921" dir="2700000" algn="ctr" rotWithShape="0">
                     <a:schemeClr val="bg2"/>
@@ -5074,7 +5057,7 @@
           <a:blip r:embed="rId3" cstate="print">
             <a:extLst>
               <a:ext uri="{28A0092B-C50C-407E-A947-70E740481C1C}">
-                <a14:useLocalDpi xmlns:a14="http://schemas.microsoft.com/office/drawing/2010/main" xmlns="" val="0"/>
+                <a14:useLocalDpi xmlns="" xmlns:a14="http://schemas.microsoft.com/office/drawing/2010/main" val="0"/>
               </a:ext>
             </a:extLst>
           </a:blip>
@@ -5099,14 +5082,14 @@
           </a:effectLst>
           <a:extLst>
             <a:ext uri="{909E8E84-426E-40DD-AFC4-6F175D3DCCD1}">
-              <a14:hiddenFill xmlns:a14="http://schemas.microsoft.com/office/drawing/2010/main" xmlns="">
+              <a14:hiddenFill xmlns="" xmlns:a14="http://schemas.microsoft.com/office/drawing/2010/main">
                 <a:solidFill>
                   <a:schemeClr val="accent1"/>
                 </a:solidFill>
               </a14:hiddenFill>
             </a:ext>
             <a:ext uri="{91240B29-F687-4F45-9708-019B960494DF}">
-              <a14:hiddenLine xmlns:a14="http://schemas.microsoft.com/office/drawing/2010/main" xmlns="" w="9525">
+              <a14:hiddenLine xmlns="" xmlns:a14="http://schemas.microsoft.com/office/drawing/2010/main" w="9525">
                 <a:solidFill>
                   <a:schemeClr val="tx1"/>
                 </a:solidFill>
@@ -5116,7 +5099,7 @@
               </a14:hiddenLine>
             </a:ext>
             <a:ext uri="{AF507438-7753-43E0-B8FC-AC1667EBCBE1}">
-              <a14:hiddenEffects xmlns:a14="http://schemas.microsoft.com/office/drawing/2010/main" xmlns="">
+              <a14:hiddenEffects xmlns="" xmlns:a14="http://schemas.microsoft.com/office/drawing/2010/main">
                 <a:effectLst>
                   <a:outerShdw dist="35921" dir="2700000" algn="ctr" rotWithShape="0">
                     <a:schemeClr val="bg2"/>
@@ -5203,14 +5186,14 @@
           </a:ln>
           <a:extLst>
             <a:ext uri="{909E8E84-426E-40DD-AFC4-6F175D3DCCD1}">
-              <a14:hiddenFill xmlns:a14="http://schemas.microsoft.com/office/drawing/2010/main" xmlns="">
+              <a14:hiddenFill xmlns="" xmlns:a14="http://schemas.microsoft.com/office/drawing/2010/main">
                 <a:solidFill>
                   <a:srgbClr val="FFFFFF"/>
                 </a:solidFill>
               </a14:hiddenFill>
             </a:ext>
             <a:ext uri="{91240B29-F687-4F45-9708-019B960494DF}">
-              <a14:hiddenLine xmlns:a14="http://schemas.microsoft.com/office/drawing/2010/main" xmlns="" w="9525">
+              <a14:hiddenLine xmlns="" xmlns:a14="http://schemas.microsoft.com/office/drawing/2010/main" w="9525">
                 <a:solidFill>
                   <a:srgbClr val="000000"/>
                 </a:solidFill>
@@ -5715,14 +5698,14 @@
           </a:ln>
           <a:extLst>
             <a:ext uri="{909E8E84-426E-40DD-AFC4-6F175D3DCCD1}">
-              <a14:hiddenFill xmlns:a14="http://schemas.microsoft.com/office/drawing/2010/main" xmlns="">
+              <a14:hiddenFill xmlns="" xmlns:a14="http://schemas.microsoft.com/office/drawing/2010/main">
                 <a:solidFill>
                   <a:srgbClr val="FFFFFF"/>
                 </a:solidFill>
               </a14:hiddenFill>
             </a:ext>
             <a:ext uri="{91240B29-F687-4F45-9708-019B960494DF}">
-              <a14:hiddenLine xmlns:a14="http://schemas.microsoft.com/office/drawing/2010/main" xmlns="" w="9525">
+              <a14:hiddenLine xmlns="" xmlns:a14="http://schemas.microsoft.com/office/drawing/2010/main" w="9525">
                 <a:solidFill>
                   <a:srgbClr val="000000"/>
                 </a:solidFill>
@@ -6056,6 +6039,2836 @@
 </p:sld>
 </file>
 
+<file path=ppt/slides/slide14.xml><?xml version="1.0" encoding="utf-8"?>
+<p:sld xmlns:a="http://schemas.openxmlformats.org/drawingml/2006/main" xmlns:r="http://schemas.openxmlformats.org/officeDocument/2006/relationships" xmlns:p="http://schemas.openxmlformats.org/presentationml/2006/main">
+  <p:cSld>
+    <p:spTree>
+      <p:nvGrpSpPr>
+        <p:cNvPr id="1" name=""/>
+        <p:cNvGrpSpPr/>
+        <p:nvPr/>
+      </p:nvGrpSpPr>
+      <p:grpSpPr>
+        <a:xfrm>
+          <a:off x="0" y="0"/>
+          <a:ext cx="0" cy="0"/>
+          <a:chOff x="0" y="0"/>
+          <a:chExt cx="0" cy="0"/>
+        </a:xfrm>
+      </p:grpSpPr>
+      <p:sp>
+        <p:nvSpPr>
+          <p:cNvPr id="2" name="Tytuł 1"/>
+          <p:cNvSpPr>
+            <a:spLocks noGrp="1"/>
+          </p:cNvSpPr>
+          <p:nvPr>
+            <p:ph type="title"/>
+          </p:nvPr>
+        </p:nvSpPr>
+        <p:spPr/>
+        <p:txBody>
+          <a:bodyPr/>
+          <a:lstStyle/>
+          <a:p>
+            <a:r>
+              <a:rPr lang="pl-PL" dirty="0" smtClean="0"/>
+              <a:t>Team management</a:t>
+            </a:r>
+            <a:endParaRPr lang="pl-PL" dirty="0"/>
+          </a:p>
+        </p:txBody>
+      </p:sp>
+      <p:sp>
+        <p:nvSpPr>
+          <p:cNvPr id="4" name="Symbol zastępczy daty 3"/>
+          <p:cNvSpPr>
+            <a:spLocks noGrp="1"/>
+          </p:cNvSpPr>
+          <p:nvPr>
+            <p:ph type="dt" sz="half" idx="10"/>
+          </p:nvPr>
+        </p:nvSpPr>
+        <p:spPr/>
+        <p:txBody>
+          <a:bodyPr/>
+          <a:lstStyle/>
+          <a:p>
+            <a:r>
+              <a:rPr lang="de-DE" smtClean="0"/>
+              <a:t>25.02.2013</a:t>
+            </a:r>
+            <a:endParaRPr lang="de-DE" dirty="0"/>
+          </a:p>
+        </p:txBody>
+      </p:sp>
+      <p:sp>
+        <p:nvSpPr>
+          <p:cNvPr id="5" name="Symbol zastępczy stopki 4"/>
+          <p:cNvSpPr>
+            <a:spLocks noGrp="1"/>
+          </p:cNvSpPr>
+          <p:nvPr>
+            <p:ph type="ftr" sz="quarter" idx="11"/>
+          </p:nvPr>
+        </p:nvSpPr>
+        <p:spPr/>
+        <p:txBody>
+          <a:bodyPr/>
+          <a:lstStyle/>
+          <a:p>
+            <a:r>
+              <a:rPr lang="de-DE" smtClean="0"/>
+              <a:t>Master Lab Course Web Applications</a:t>
+            </a:r>
+            <a:endParaRPr lang="de-DE" dirty="0"/>
+          </a:p>
+        </p:txBody>
+      </p:sp>
+      <p:sp>
+        <p:nvSpPr>
+          <p:cNvPr id="6" name="Symbol zastępczy numeru slajdu 5"/>
+          <p:cNvSpPr>
+            <a:spLocks noGrp="1"/>
+          </p:cNvSpPr>
+          <p:nvPr>
+            <p:ph type="sldNum" sz="quarter" idx="12"/>
+          </p:nvPr>
+        </p:nvSpPr>
+        <p:spPr/>
+        <p:txBody>
+          <a:bodyPr/>
+          <a:lstStyle/>
+          <a:p>
+            <a:fld id="{121E5A8C-2088-45D2-9D84-10B3EA412A4C}" type="slidenum">
+              <a:rPr lang="de-DE" smtClean="0"/>
+              <a:pPr/>
+              <a:t>14</a:t>
+            </a:fld>
+            <a:endParaRPr lang="de-DE" dirty="0"/>
+          </a:p>
+        </p:txBody>
+      </p:sp>
+      <p:sp>
+        <p:nvSpPr>
+          <p:cNvPr id="7" name="Rounded Rectangle 8"/>
+          <p:cNvSpPr>
+            <a:spLocks noGrp="1"/>
+          </p:cNvSpPr>
+          <p:nvPr>
+            <p:ph idx="1"/>
+          </p:nvPr>
+        </p:nvSpPr>
+        <p:spPr bwMode="auto">
+          <a:xfrm>
+            <a:off x="428596" y="3571876"/>
+            <a:ext cx="3778248" cy="2428892"/>
+          </a:xfrm>
+          <a:prstGeom prst="roundRect">
+            <a:avLst>
+              <a:gd name="adj" fmla="val 13985"/>
+            </a:avLst>
+          </a:prstGeom>
+          <a:solidFill>
+            <a:srgbClr val="292929"/>
+          </a:solidFill>
+          <a:ln w="9525" cap="flat" cmpd="sng" algn="ctr">
+            <a:noFill/>
+            <a:prstDash val="solid"/>
+            <a:round/>
+            <a:headEnd type="none" w="med" len="med"/>
+            <a:tailEnd type="none" w="med" len="med"/>
+          </a:ln>
+          <a:effectLst>
+            <a:innerShdw blurRad="114300">
+              <a:prstClr val="black"/>
+            </a:innerShdw>
+          </a:effectLst>
+        </p:spPr>
+        <p:txBody>
+          <a:bodyPr vert="horz" wrap="square" lIns="91440" tIns="45720" rIns="91440" bIns="45720" numCol="1" rtlCol="0" anchor="t" anchorCtr="0" compatLnSpc="1">
+            <a:prstTxWarp prst="textNoShape">
+              <a:avLst/>
+            </a:prstTxWarp>
+          </a:bodyPr>
+          <a:lstStyle/>
+          <a:p>
+            <a:pPr>
+              <a:buNone/>
+            </a:pPr>
+            <a:r>
+              <a:rPr lang="pl-PL" sz="2000" dirty="0" err="1" smtClean="0"/>
+              <a:t>Actions</a:t>
+            </a:r>
+            <a:endParaRPr lang="pl-PL" sz="2000" dirty="0" smtClean="0"/>
+          </a:p>
+          <a:p>
+            <a:r>
+              <a:rPr lang="pl-PL" sz="2000" dirty="0" err="1" smtClean="0"/>
+              <a:t>Inviting</a:t>
+            </a:r>
+            <a:r>
+              <a:rPr lang="pl-PL" sz="2000" dirty="0" smtClean="0"/>
+              <a:t> </a:t>
+            </a:r>
+            <a:r>
+              <a:rPr lang="pl-PL" sz="2000" dirty="0" err="1" smtClean="0"/>
+              <a:t>players</a:t>
+            </a:r>
+            <a:r>
+              <a:rPr lang="pl-PL" sz="2000" dirty="0" smtClean="0"/>
+              <a:t> to </a:t>
+            </a:r>
+            <a:r>
+              <a:rPr lang="pl-PL" sz="2000" dirty="0" err="1" smtClean="0"/>
+              <a:t>the</a:t>
+            </a:r>
+            <a:r>
+              <a:rPr lang="pl-PL" sz="2000" dirty="0" smtClean="0"/>
+              <a:t> team</a:t>
+            </a:r>
+          </a:p>
+          <a:p>
+            <a:r>
+              <a:rPr lang="pl-PL" sz="2000" dirty="0" err="1" smtClean="0"/>
+              <a:t>Inviting</a:t>
+            </a:r>
+            <a:r>
+              <a:rPr lang="pl-PL" sz="2000" dirty="0" smtClean="0"/>
+              <a:t> </a:t>
+            </a:r>
+            <a:r>
+              <a:rPr lang="pl-PL" sz="2000" dirty="0" err="1" smtClean="0"/>
+              <a:t>stragers</a:t>
+            </a:r>
+            <a:endParaRPr lang="pl-PL" sz="2000" dirty="0" smtClean="0"/>
+          </a:p>
+          <a:p>
+            <a:r>
+              <a:rPr lang="pl-PL" sz="2000" dirty="0" err="1" smtClean="0"/>
+              <a:t>Deleting</a:t>
+            </a:r>
+            <a:r>
+              <a:rPr lang="pl-PL" sz="2000" dirty="0" smtClean="0"/>
+              <a:t> </a:t>
+            </a:r>
+            <a:r>
+              <a:rPr lang="pl-PL" sz="2000" dirty="0" err="1" smtClean="0"/>
+              <a:t>players</a:t>
+            </a:r>
+            <a:endParaRPr lang="pl-PL" sz="2000" dirty="0" smtClean="0"/>
+          </a:p>
+          <a:p>
+            <a:r>
+              <a:rPr lang="pl-PL" sz="2000" dirty="0" err="1" smtClean="0"/>
+              <a:t>Changing</a:t>
+            </a:r>
+            <a:r>
+              <a:rPr lang="pl-PL" sz="2000" dirty="0" smtClean="0"/>
+              <a:t> team </a:t>
+            </a:r>
+            <a:r>
+              <a:rPr lang="pl-PL" sz="2000" dirty="0" err="1" smtClean="0"/>
+              <a:t>name</a:t>
+            </a:r>
+            <a:r>
+              <a:rPr lang="pl-PL" sz="2000" dirty="0" smtClean="0"/>
+              <a:t> and </a:t>
+            </a:r>
+            <a:r>
+              <a:rPr lang="pl-PL" sz="2000" dirty="0" err="1" smtClean="0"/>
+              <a:t>avatar</a:t>
+            </a:r>
+            <a:endParaRPr lang="pl-PL" sz="2000" dirty="0" smtClean="0"/>
+          </a:p>
+          <a:p>
+            <a:endParaRPr lang="pl-PL" dirty="0"/>
+          </a:p>
+        </p:txBody>
+      </p:sp>
+      <p:sp>
+        <p:nvSpPr>
+          <p:cNvPr id="8" name="Rounded Rectangle 8"/>
+          <p:cNvSpPr txBox="1">
+            <a:spLocks/>
+          </p:cNvSpPr>
+          <p:nvPr/>
+        </p:nvSpPr>
+        <p:spPr bwMode="auto">
+          <a:xfrm>
+            <a:off x="428596" y="1714488"/>
+            <a:ext cx="3786214" cy="1714512"/>
+          </a:xfrm>
+          <a:prstGeom prst="roundRect">
+            <a:avLst>
+              <a:gd name="adj" fmla="val 13985"/>
+            </a:avLst>
+          </a:prstGeom>
+          <a:solidFill>
+            <a:srgbClr val="292929"/>
+          </a:solidFill>
+          <a:ln w="9525" cap="flat" cmpd="sng" algn="ctr">
+            <a:noFill/>
+            <a:prstDash val="solid"/>
+            <a:round/>
+            <a:headEnd type="none" w="med" len="med"/>
+            <a:tailEnd type="none" w="med" len="med"/>
+          </a:ln>
+          <a:effectLst>
+            <a:innerShdw blurRad="114300">
+              <a:prstClr val="black"/>
+            </a:innerShdw>
+          </a:effectLst>
+          <a:extLst>
+            <a:ext uri="{909E8E84-426E-40DD-AFC4-6F175D3DCCD1}">
+              <a14:hiddenFill xmlns="" xmlns:a14="http://schemas.microsoft.com/office/drawing/2010/main">
+                <a:solidFill>
+                  <a:srgbClr val="FFFFFF"/>
+                </a:solidFill>
+              </a14:hiddenFill>
+            </a:ext>
+            <a:ext uri="{91240B29-F687-4F45-9708-019B960494DF}">
+              <a14:hiddenLine xmlns="" xmlns:a14="http://schemas.microsoft.com/office/drawing/2010/main" w="9525">
+                <a:solidFill>
+                  <a:srgbClr val="000000"/>
+                </a:solidFill>
+                <a:miter lim="800000"/>
+                <a:headEnd/>
+                <a:tailEnd/>
+              </a14:hiddenLine>
+            </a:ext>
+          </a:extLst>
+        </p:spPr>
+        <p:txBody>
+          <a:bodyPr vert="horz" wrap="square" lIns="91440" tIns="45720" rIns="91440" bIns="45720" numCol="1" rtlCol="0" anchor="t" anchorCtr="0" compatLnSpc="1">
+            <a:prstTxWarp prst="textNoShape">
+              <a:avLst/>
+            </a:prstTxWarp>
+          </a:bodyPr>
+          <a:lstStyle/>
+          <a:p>
+            <a:pPr marL="342900" marR="0" lvl="0" indent="-342900" algn="l" defTabSz="914400" rtl="0" eaLnBrk="1" fontAlgn="base" latinLnBrk="0" hangingPunct="1">
+              <a:lnSpc>
+                <a:spcPct val="100000"/>
+              </a:lnSpc>
+              <a:spcBef>
+                <a:spcPct val="20000"/>
+              </a:spcBef>
+              <a:spcAft>
+                <a:spcPct val="0"/>
+              </a:spcAft>
+              <a:buClrTx/>
+              <a:buSzTx/>
+              <a:buFontTx/>
+              <a:buNone/>
+              <a:tabLst/>
+              <a:defRPr/>
+            </a:pPr>
+            <a:r>
+              <a:rPr kumimoji="0" lang="pl-PL" sz="2000" b="0" i="0" u="none" strike="noStrike" kern="0" cap="none" spc="0" normalizeH="0" baseline="0" noProof="0" dirty="0" smtClean="0">
+                <a:ln>
+                  <a:noFill/>
+                </a:ln>
+                <a:solidFill>
+                  <a:schemeClr val="bg1"/>
+                </a:solidFill>
+                <a:effectLst/>
+                <a:uLnTx/>
+                <a:uFillTx/>
+                <a:latin typeface="+mn-lt"/>
+                <a:ea typeface="ＭＳ Ｐゴシック" pitchFamily="-65" charset="-128"/>
+                <a:cs typeface="ＭＳ Ｐゴシック" pitchFamily="18" charset="-128"/>
+              </a:rPr>
+              <a:t>Team master</a:t>
+            </a:r>
+          </a:p>
+          <a:p>
+            <a:pPr marL="342900" marR="0" lvl="0" indent="-342900" algn="l" defTabSz="914400" rtl="0" eaLnBrk="1" fontAlgn="base" latinLnBrk="0" hangingPunct="1">
+              <a:lnSpc>
+                <a:spcPct val="100000"/>
+              </a:lnSpc>
+              <a:spcBef>
+                <a:spcPct val="20000"/>
+              </a:spcBef>
+              <a:spcAft>
+                <a:spcPct val="0"/>
+              </a:spcAft>
+              <a:buClrTx/>
+              <a:buSzTx/>
+              <a:buFontTx/>
+              <a:buChar char="•"/>
+              <a:tabLst/>
+              <a:defRPr/>
+            </a:pPr>
+            <a:r>
+              <a:rPr lang="pl-PL" sz="2000" kern="0" dirty="0" err="1" smtClean="0">
+                <a:solidFill>
+                  <a:schemeClr val="bg1"/>
+                </a:solidFill>
+                <a:ea typeface="ＭＳ Ｐゴシック" pitchFamily="-65" charset="-128"/>
+                <a:cs typeface="ＭＳ Ｐゴシック" pitchFamily="18" charset="-128"/>
+              </a:rPr>
+              <a:t>Permissions</a:t>
+            </a:r>
+            <a:endParaRPr kumimoji="0" lang="pl-PL" sz="2000" b="0" i="0" u="none" strike="noStrike" kern="0" cap="none" spc="0" normalizeH="0" baseline="0" noProof="0" dirty="0" smtClean="0">
+              <a:ln>
+                <a:noFill/>
+              </a:ln>
+              <a:solidFill>
+                <a:schemeClr val="bg1"/>
+              </a:solidFill>
+              <a:effectLst/>
+              <a:uLnTx/>
+              <a:uFillTx/>
+              <a:latin typeface="+mn-lt"/>
+              <a:ea typeface="ＭＳ Ｐゴシック" pitchFamily="-65" charset="-128"/>
+              <a:cs typeface="ＭＳ Ｐゴシック" pitchFamily="18" charset="-128"/>
+            </a:endParaRPr>
+          </a:p>
+          <a:p>
+            <a:pPr marL="342900" marR="0" lvl="0" indent="-342900" algn="l" defTabSz="914400" rtl="0" eaLnBrk="1" fontAlgn="base" latinLnBrk="0" hangingPunct="1">
+              <a:lnSpc>
+                <a:spcPct val="100000"/>
+              </a:lnSpc>
+              <a:spcBef>
+                <a:spcPct val="20000"/>
+              </a:spcBef>
+              <a:spcAft>
+                <a:spcPct val="0"/>
+              </a:spcAft>
+              <a:buClrTx/>
+              <a:buSzTx/>
+              <a:buFontTx/>
+              <a:buChar char="•"/>
+              <a:tabLst/>
+              <a:defRPr/>
+            </a:pPr>
+            <a:r>
+              <a:rPr kumimoji="0" lang="pl-PL" sz="2000" b="0" i="0" u="none" strike="noStrike" kern="0" cap="none" spc="0" normalizeH="0" baseline="0" noProof="0" dirty="0" err="1" smtClean="0">
+                <a:ln>
+                  <a:noFill/>
+                </a:ln>
+                <a:solidFill>
+                  <a:schemeClr val="bg1"/>
+                </a:solidFill>
+                <a:effectLst/>
+                <a:uLnTx/>
+                <a:uFillTx/>
+                <a:latin typeface="+mn-lt"/>
+                <a:ea typeface="ＭＳ Ｐゴシック" pitchFamily="-65" charset="-128"/>
+                <a:cs typeface="ＭＳ Ｐゴシック" pitchFamily="18" charset="-128"/>
+              </a:rPr>
+              <a:t>Who</a:t>
+            </a:r>
+            <a:r>
+              <a:rPr kumimoji="0" lang="pl-PL" sz="2000" b="0" i="0" u="none" strike="noStrike" kern="0" cap="none" spc="0" normalizeH="0" baseline="0" noProof="0" dirty="0" smtClean="0">
+                <a:ln>
+                  <a:noFill/>
+                </a:ln>
+                <a:solidFill>
+                  <a:schemeClr val="bg1"/>
+                </a:solidFill>
+                <a:effectLst/>
+                <a:uLnTx/>
+                <a:uFillTx/>
+                <a:latin typeface="+mn-lt"/>
+                <a:ea typeface="ＭＳ Ｐゴシック" pitchFamily="-65" charset="-128"/>
+                <a:cs typeface="ＭＳ Ｐゴシック" pitchFamily="18" charset="-128"/>
+              </a:rPr>
+              <a:t> </a:t>
+            </a:r>
+            <a:r>
+              <a:rPr kumimoji="0" lang="pl-PL" sz="2000" b="0" i="0" u="none" strike="noStrike" kern="0" cap="none" spc="0" normalizeH="0" baseline="0" noProof="0" dirty="0" err="1" smtClean="0">
+                <a:ln>
+                  <a:noFill/>
+                </a:ln>
+                <a:solidFill>
+                  <a:schemeClr val="bg1"/>
+                </a:solidFill>
+                <a:effectLst/>
+                <a:uLnTx/>
+                <a:uFillTx/>
+                <a:latin typeface="+mn-lt"/>
+                <a:ea typeface="ＭＳ Ｐゴシック" pitchFamily="-65" charset="-128"/>
+                <a:cs typeface="ＭＳ Ｐゴシック" pitchFamily="18" charset="-128"/>
+              </a:rPr>
+              <a:t>becomes</a:t>
+            </a:r>
+            <a:r>
+              <a:rPr kumimoji="0" lang="pl-PL" sz="2000" b="0" i="0" u="none" strike="noStrike" kern="0" cap="none" spc="0" normalizeH="0" baseline="0" noProof="0" dirty="0" smtClean="0">
+                <a:ln>
+                  <a:noFill/>
+                </a:ln>
+                <a:solidFill>
+                  <a:schemeClr val="bg1"/>
+                </a:solidFill>
+                <a:effectLst/>
+                <a:uLnTx/>
+                <a:uFillTx/>
+                <a:latin typeface="+mn-lt"/>
+                <a:ea typeface="ＭＳ Ｐゴシック" pitchFamily="-65" charset="-128"/>
+                <a:cs typeface="ＭＳ Ｐゴシック" pitchFamily="18" charset="-128"/>
+              </a:rPr>
+              <a:t> a team master</a:t>
+            </a:r>
+          </a:p>
+          <a:p>
+            <a:pPr marL="342900" marR="0" lvl="0" indent="-342900" algn="l" defTabSz="914400" rtl="0" eaLnBrk="1" fontAlgn="base" latinLnBrk="0" hangingPunct="1">
+              <a:lnSpc>
+                <a:spcPct val="100000"/>
+              </a:lnSpc>
+              <a:spcBef>
+                <a:spcPct val="20000"/>
+              </a:spcBef>
+              <a:spcAft>
+                <a:spcPct val="0"/>
+              </a:spcAft>
+              <a:buClrTx/>
+              <a:buSzTx/>
+              <a:buFontTx/>
+              <a:buChar char="•"/>
+              <a:tabLst/>
+              <a:defRPr/>
+            </a:pPr>
+            <a:endParaRPr kumimoji="0" lang="pl-PL" sz="2400" b="0" i="0" u="none" strike="noStrike" kern="0" cap="none" spc="0" normalizeH="0" baseline="0" noProof="0" dirty="0">
+              <a:ln>
+                <a:noFill/>
+              </a:ln>
+              <a:solidFill>
+                <a:schemeClr val="bg1"/>
+              </a:solidFill>
+              <a:effectLst/>
+              <a:uLnTx/>
+              <a:uFillTx/>
+              <a:latin typeface="+mn-lt"/>
+              <a:ea typeface="ＭＳ Ｐゴシック" pitchFamily="-65" charset="-128"/>
+              <a:cs typeface="ＭＳ Ｐゴシック" pitchFamily="18" charset="-128"/>
+            </a:endParaRPr>
+          </a:p>
+        </p:txBody>
+      </p:sp>
+      <p:pic>
+        <p:nvPicPr>
+          <p:cNvPr id="1026" name="Picture 2"/>
+          <p:cNvPicPr>
+            <a:picLocks noChangeAspect="1" noChangeArrowheads="1"/>
+          </p:cNvPicPr>
+          <p:nvPr/>
+        </p:nvPicPr>
+        <p:blipFill>
+          <a:blip r:embed="rId2" cstate="print"/>
+          <a:srcRect/>
+          <a:stretch>
+            <a:fillRect/>
+          </a:stretch>
+        </p:blipFill>
+        <p:spPr bwMode="auto">
+          <a:xfrm>
+            <a:off x="4500562" y="1428736"/>
+            <a:ext cx="4400550" cy="4638675"/>
+          </a:xfrm>
+          <a:prstGeom prst="rect">
+            <a:avLst/>
+          </a:prstGeom>
+          <a:noFill/>
+          <a:ln w="9525">
+            <a:noFill/>
+            <a:miter lim="800000"/>
+            <a:headEnd/>
+            <a:tailEnd/>
+          </a:ln>
+          <a:effectLst/>
+        </p:spPr>
+      </p:pic>
+    </p:spTree>
+  </p:cSld>
+  <p:clrMapOvr>
+    <a:masterClrMapping/>
+  </p:clrMapOvr>
+</p:sld>
+</file>
+
+<file path=ppt/slides/slide15.xml><?xml version="1.0" encoding="utf-8"?>
+<p:sld xmlns:a="http://schemas.openxmlformats.org/drawingml/2006/main" xmlns:r="http://schemas.openxmlformats.org/officeDocument/2006/relationships" xmlns:p="http://schemas.openxmlformats.org/presentationml/2006/main">
+  <p:cSld>
+    <p:spTree>
+      <p:nvGrpSpPr>
+        <p:cNvPr id="1" name=""/>
+        <p:cNvGrpSpPr/>
+        <p:nvPr/>
+      </p:nvGrpSpPr>
+      <p:grpSpPr>
+        <a:xfrm>
+          <a:off x="0" y="0"/>
+          <a:ext cx="0" cy="0"/>
+          <a:chOff x="0" y="0"/>
+          <a:chExt cx="0" cy="0"/>
+        </a:xfrm>
+      </p:grpSpPr>
+      <p:sp>
+        <p:nvSpPr>
+          <p:cNvPr id="2" name="Tytuł 1"/>
+          <p:cNvSpPr>
+            <a:spLocks noGrp="1"/>
+          </p:cNvSpPr>
+          <p:nvPr>
+            <p:ph type="title"/>
+          </p:nvPr>
+        </p:nvSpPr>
+        <p:spPr/>
+        <p:txBody>
+          <a:bodyPr/>
+          <a:lstStyle/>
+          <a:p>
+            <a:r>
+              <a:rPr lang="pl-PL" dirty="0" err="1" smtClean="0"/>
+              <a:t>Acceptance</a:t>
+            </a:r>
+            <a:r>
+              <a:rPr lang="pl-PL" dirty="0" smtClean="0"/>
+              <a:t> of an </a:t>
+            </a:r>
+            <a:r>
+              <a:rPr lang="pl-PL" dirty="0" err="1" smtClean="0"/>
+              <a:t>invitation</a:t>
+            </a:r>
+            <a:r>
+              <a:rPr lang="pl-PL" dirty="0" smtClean="0"/>
+              <a:t> – </a:t>
+            </a:r>
+            <a:r>
+              <a:rPr lang="pl-PL" dirty="0" err="1" smtClean="0"/>
+              <a:t>schema</a:t>
+            </a:r>
+            <a:endParaRPr lang="pl-PL" dirty="0"/>
+          </a:p>
+        </p:txBody>
+      </p:sp>
+      <p:sp>
+        <p:nvSpPr>
+          <p:cNvPr id="4" name="Symbol zastępczy daty 3"/>
+          <p:cNvSpPr>
+            <a:spLocks noGrp="1"/>
+          </p:cNvSpPr>
+          <p:nvPr>
+            <p:ph type="dt" sz="half" idx="10"/>
+          </p:nvPr>
+        </p:nvSpPr>
+        <p:spPr/>
+        <p:txBody>
+          <a:bodyPr/>
+          <a:lstStyle/>
+          <a:p>
+            <a:r>
+              <a:rPr lang="de-DE" smtClean="0"/>
+              <a:t>25.02.2013</a:t>
+            </a:r>
+            <a:endParaRPr lang="de-DE" dirty="0"/>
+          </a:p>
+        </p:txBody>
+      </p:sp>
+      <p:sp>
+        <p:nvSpPr>
+          <p:cNvPr id="5" name="Symbol zastępczy stopki 4"/>
+          <p:cNvSpPr>
+            <a:spLocks noGrp="1"/>
+          </p:cNvSpPr>
+          <p:nvPr>
+            <p:ph type="ftr" sz="quarter" idx="11"/>
+          </p:nvPr>
+        </p:nvSpPr>
+        <p:spPr/>
+        <p:txBody>
+          <a:bodyPr/>
+          <a:lstStyle/>
+          <a:p>
+            <a:r>
+              <a:rPr lang="de-DE" smtClean="0"/>
+              <a:t>Master Lab Course Web Applications</a:t>
+            </a:r>
+            <a:endParaRPr lang="de-DE" dirty="0"/>
+          </a:p>
+        </p:txBody>
+      </p:sp>
+      <p:sp>
+        <p:nvSpPr>
+          <p:cNvPr id="6" name="Symbol zastępczy numeru slajdu 5"/>
+          <p:cNvSpPr>
+            <a:spLocks noGrp="1"/>
+          </p:cNvSpPr>
+          <p:nvPr>
+            <p:ph type="sldNum" sz="quarter" idx="12"/>
+          </p:nvPr>
+        </p:nvSpPr>
+        <p:spPr/>
+        <p:txBody>
+          <a:bodyPr/>
+          <a:lstStyle/>
+          <a:p>
+            <a:fld id="{121E5A8C-2088-45D2-9D84-10B3EA412A4C}" type="slidenum">
+              <a:rPr lang="de-DE" smtClean="0"/>
+              <a:pPr/>
+              <a:t>15</a:t>
+            </a:fld>
+            <a:endParaRPr lang="de-DE" dirty="0"/>
+          </a:p>
+        </p:txBody>
+      </p:sp>
+      <p:sp>
+        <p:nvSpPr>
+          <p:cNvPr id="8" name="Prostokąt 7"/>
+          <p:cNvSpPr/>
+          <p:nvPr/>
+        </p:nvSpPr>
+        <p:spPr bwMode="auto">
+          <a:xfrm>
+            <a:off x="785786" y="1928802"/>
+            <a:ext cx="7715304" cy="285752"/>
+          </a:xfrm>
+          <a:prstGeom prst="rect">
+            <a:avLst/>
+          </a:prstGeom>
+          <a:solidFill>
+            <a:schemeClr val="accent1"/>
+          </a:solidFill>
+          <a:ln w="9525" cap="flat" cmpd="sng" algn="ctr">
+            <a:solidFill>
+              <a:schemeClr val="tx1"/>
+            </a:solidFill>
+            <a:prstDash val="solid"/>
+            <a:round/>
+            <a:headEnd type="none" w="med" len="med"/>
+            <a:tailEnd type="none" w="med" len="med"/>
+          </a:ln>
+          <a:effectLst/>
+        </p:spPr>
+        <p:txBody>
+          <a:bodyPr vert="horz" wrap="square" lIns="91440" tIns="45720" rIns="91440" bIns="45720" numCol="1" rtlCol="0" anchor="t" anchorCtr="0" compatLnSpc="1">
+            <a:prstTxWarp prst="textNoShape">
+              <a:avLst/>
+            </a:prstTxWarp>
+          </a:bodyPr>
+          <a:lstStyle/>
+          <a:p>
+            <a:pPr marL="0" marR="0" indent="0" algn="ctr" defTabSz="914400" rtl="0" eaLnBrk="0" fontAlgn="base" latinLnBrk="0" hangingPunct="0">
+              <a:lnSpc>
+                <a:spcPct val="100000"/>
+              </a:lnSpc>
+              <a:spcBef>
+                <a:spcPct val="0"/>
+              </a:spcBef>
+              <a:spcAft>
+                <a:spcPct val="0"/>
+              </a:spcAft>
+              <a:buClrTx/>
+              <a:buSzTx/>
+              <a:buFontTx/>
+              <a:buNone/>
+              <a:tabLst/>
+            </a:pPr>
+            <a:r>
+              <a:rPr kumimoji="0" lang="pl-PL" sz="1400" b="0" i="0" u="none" strike="noStrike" cap="none" normalizeH="0" baseline="0" dirty="0" smtClean="0">
+                <a:ln>
+                  <a:noFill/>
+                </a:ln>
+                <a:solidFill>
+                  <a:schemeClr val="tx1"/>
+                </a:solidFill>
+                <a:effectLst/>
+                <a:latin typeface="Arial" pitchFamily="34" charset="0"/>
+              </a:rPr>
+              <a:t>Team</a:t>
+            </a:r>
+            <a:r>
+              <a:rPr kumimoji="0" lang="pl-PL" sz="1400" b="0" i="0" u="none" strike="noStrike" cap="none" normalizeH="0" dirty="0" smtClean="0">
+                <a:ln>
+                  <a:noFill/>
+                </a:ln>
+                <a:solidFill>
+                  <a:schemeClr val="tx1"/>
+                </a:solidFill>
+                <a:effectLst/>
+                <a:latin typeface="Arial" pitchFamily="34" charset="0"/>
+              </a:rPr>
+              <a:t> master </a:t>
+            </a:r>
+            <a:r>
+              <a:rPr kumimoji="0" lang="pl-PL" sz="1400" b="0" i="0" u="none" strike="noStrike" cap="none" normalizeH="0" dirty="0" err="1" smtClean="0">
+                <a:ln>
+                  <a:noFill/>
+                </a:ln>
+                <a:solidFill>
+                  <a:schemeClr val="tx1"/>
+                </a:solidFill>
+                <a:effectLst/>
+                <a:latin typeface="Arial" pitchFamily="34" charset="0"/>
+              </a:rPr>
+              <a:t>invites</a:t>
+            </a:r>
+            <a:r>
+              <a:rPr kumimoji="0" lang="pl-PL" sz="1400" b="0" i="0" u="none" strike="noStrike" cap="none" normalizeH="0" dirty="0" smtClean="0">
+                <a:ln>
+                  <a:noFill/>
+                </a:ln>
+                <a:solidFill>
+                  <a:schemeClr val="tx1"/>
+                </a:solidFill>
+                <a:effectLst/>
+                <a:latin typeface="Arial" pitchFamily="34" charset="0"/>
+              </a:rPr>
+              <a:t> </a:t>
+            </a:r>
+            <a:r>
+              <a:rPr kumimoji="0" lang="pl-PL" sz="1400" b="0" i="0" u="none" strike="noStrike" cap="none" normalizeH="0" dirty="0" err="1" smtClean="0">
+                <a:ln>
+                  <a:noFill/>
+                </a:ln>
+                <a:solidFill>
+                  <a:schemeClr val="tx1"/>
+                </a:solidFill>
+                <a:effectLst/>
+                <a:latin typeface="Arial" pitchFamily="34" charset="0"/>
+              </a:rPr>
+              <a:t>someone</a:t>
+            </a:r>
+            <a:endParaRPr kumimoji="0" lang="pl-PL" sz="1400" b="0" i="0" u="none" strike="noStrike" cap="none" normalizeH="0" baseline="0" dirty="0" smtClean="0">
+              <a:ln>
+                <a:noFill/>
+              </a:ln>
+              <a:solidFill>
+                <a:schemeClr val="tx1"/>
+              </a:solidFill>
+              <a:effectLst/>
+              <a:latin typeface="Arial" pitchFamily="34" charset="0"/>
+            </a:endParaRPr>
+          </a:p>
+        </p:txBody>
+      </p:sp>
+      <p:sp>
+        <p:nvSpPr>
+          <p:cNvPr id="9" name="Prostokąt 8"/>
+          <p:cNvSpPr/>
+          <p:nvPr/>
+        </p:nvSpPr>
+        <p:spPr bwMode="auto">
+          <a:xfrm>
+            <a:off x="785786" y="2285992"/>
+            <a:ext cx="2571768" cy="571504"/>
+          </a:xfrm>
+          <a:prstGeom prst="rect">
+            <a:avLst/>
+          </a:prstGeom>
+          <a:solidFill>
+            <a:schemeClr val="accent1"/>
+          </a:solidFill>
+          <a:ln w="9525" cap="flat" cmpd="sng" algn="ctr">
+            <a:solidFill>
+              <a:schemeClr val="tx1"/>
+            </a:solidFill>
+            <a:prstDash val="solid"/>
+            <a:round/>
+            <a:headEnd type="none" w="med" len="med"/>
+            <a:tailEnd type="none" w="med" len="med"/>
+          </a:ln>
+          <a:effectLst/>
+        </p:spPr>
+        <p:txBody>
+          <a:bodyPr vert="horz" wrap="square" lIns="91440" tIns="45720" rIns="91440" bIns="45720" numCol="1" rtlCol="0" anchor="t" anchorCtr="0" compatLnSpc="1">
+            <a:prstTxWarp prst="textNoShape">
+              <a:avLst/>
+            </a:prstTxWarp>
+          </a:bodyPr>
+          <a:lstStyle/>
+          <a:p>
+            <a:pPr marL="0" marR="0" indent="0" algn="ctr" defTabSz="914400" rtl="0" eaLnBrk="0" fontAlgn="base" latinLnBrk="0" hangingPunct="0">
+              <a:lnSpc>
+                <a:spcPct val="100000"/>
+              </a:lnSpc>
+              <a:spcBef>
+                <a:spcPct val="0"/>
+              </a:spcBef>
+              <a:spcAft>
+                <a:spcPct val="0"/>
+              </a:spcAft>
+              <a:buClrTx/>
+              <a:buSzTx/>
+              <a:buFontTx/>
+              <a:buNone/>
+              <a:tabLst/>
+            </a:pPr>
+            <a:r>
+              <a:rPr kumimoji="0" lang="pl-PL" sz="1400" b="0" i="0" u="none" strike="noStrike" cap="none" normalizeH="0" baseline="0" dirty="0" smtClean="0">
+                <a:ln>
+                  <a:noFill/>
+                </a:ln>
+                <a:solidFill>
+                  <a:schemeClr val="tx1"/>
+                </a:solidFill>
+                <a:effectLst/>
+                <a:latin typeface="Arial" pitchFamily="34" charset="0"/>
+              </a:rPr>
+              <a:t>A</a:t>
+            </a:r>
+            <a:r>
+              <a:rPr kumimoji="0" lang="pl-PL" sz="1400" b="0" i="0" u="none" strike="noStrike" cap="none" normalizeH="0" dirty="0" smtClean="0">
+                <a:ln>
+                  <a:noFill/>
+                </a:ln>
+                <a:solidFill>
+                  <a:schemeClr val="tx1"/>
+                </a:solidFill>
+                <a:effectLst/>
+                <a:latin typeface="Arial" pitchFamily="34" charset="0"/>
+              </a:rPr>
+              <a:t> </a:t>
+            </a:r>
+            <a:r>
+              <a:rPr kumimoji="0" lang="pl-PL" sz="1400" b="0" i="0" u="none" strike="noStrike" cap="none" normalizeH="0" dirty="0" err="1" smtClean="0">
+                <a:ln>
+                  <a:noFill/>
+                </a:ln>
+                <a:solidFill>
+                  <a:schemeClr val="tx1"/>
+                </a:solidFill>
+                <a:effectLst/>
+                <a:latin typeface="Arial" pitchFamily="34" charset="0"/>
+              </a:rPr>
+              <a:t>registred</a:t>
+            </a:r>
+            <a:r>
+              <a:rPr kumimoji="0" lang="pl-PL" sz="1400" b="0" i="0" u="none" strike="noStrike" cap="none" normalizeH="0" dirty="0" smtClean="0">
+                <a:ln>
+                  <a:noFill/>
+                </a:ln>
+                <a:solidFill>
+                  <a:schemeClr val="tx1"/>
+                </a:solidFill>
+                <a:effectLst/>
+                <a:latin typeface="Arial" pitchFamily="34" charset="0"/>
+              </a:rPr>
+              <a:t> player </a:t>
+            </a:r>
+            <a:r>
+              <a:rPr kumimoji="0" lang="pl-PL" sz="1400" b="0" i="0" u="none" strike="noStrike" cap="none" normalizeH="0" dirty="0" err="1" smtClean="0">
+                <a:ln>
+                  <a:noFill/>
+                </a:ln>
+                <a:solidFill>
+                  <a:schemeClr val="tx1"/>
+                </a:solidFill>
+                <a:effectLst/>
+                <a:latin typeface="Arial" pitchFamily="34" charset="0"/>
+              </a:rPr>
+              <a:t>already</a:t>
+            </a:r>
+            <a:r>
+              <a:rPr kumimoji="0" lang="pl-PL" sz="1400" b="0" i="0" u="none" strike="noStrike" cap="none" normalizeH="0" dirty="0" smtClean="0">
+                <a:ln>
+                  <a:noFill/>
+                </a:ln>
+                <a:solidFill>
+                  <a:schemeClr val="tx1"/>
+                </a:solidFill>
+                <a:effectLst/>
+                <a:latin typeface="Arial" pitchFamily="34" charset="0"/>
+              </a:rPr>
+              <a:t> </a:t>
+            </a:r>
+            <a:r>
+              <a:rPr kumimoji="0" lang="pl-PL" sz="1400" b="0" i="0" u="none" strike="noStrike" cap="none" normalizeH="0" dirty="0" err="1" smtClean="0">
+                <a:ln>
+                  <a:noFill/>
+                </a:ln>
+                <a:solidFill>
+                  <a:schemeClr val="tx1"/>
+                </a:solidFill>
+                <a:effectLst/>
+                <a:latin typeface="Arial" pitchFamily="34" charset="0"/>
+              </a:rPr>
+              <a:t>belonging</a:t>
+            </a:r>
+            <a:r>
+              <a:rPr kumimoji="0" lang="pl-PL" sz="1400" b="0" i="0" u="none" strike="noStrike" cap="none" normalizeH="0" dirty="0" smtClean="0">
+                <a:ln>
+                  <a:noFill/>
+                </a:ln>
+                <a:solidFill>
+                  <a:schemeClr val="tx1"/>
+                </a:solidFill>
+                <a:effectLst/>
+                <a:latin typeface="Arial" pitchFamily="34" charset="0"/>
+              </a:rPr>
+              <a:t> to a team</a:t>
+            </a:r>
+            <a:endParaRPr kumimoji="0" lang="pl-PL" sz="1400" b="0" i="0" u="none" strike="noStrike" cap="none" normalizeH="0" baseline="0" dirty="0" smtClean="0">
+              <a:ln>
+                <a:noFill/>
+              </a:ln>
+              <a:solidFill>
+                <a:schemeClr val="tx1"/>
+              </a:solidFill>
+              <a:effectLst/>
+              <a:latin typeface="Arial" pitchFamily="34" charset="0"/>
+            </a:endParaRPr>
+          </a:p>
+        </p:txBody>
+      </p:sp>
+      <p:sp>
+        <p:nvSpPr>
+          <p:cNvPr id="10" name="Prostokąt 9"/>
+          <p:cNvSpPr/>
+          <p:nvPr/>
+        </p:nvSpPr>
+        <p:spPr bwMode="auto">
+          <a:xfrm>
+            <a:off x="3428992" y="2285992"/>
+            <a:ext cx="2500330" cy="571504"/>
+          </a:xfrm>
+          <a:prstGeom prst="rect">
+            <a:avLst/>
+          </a:prstGeom>
+          <a:solidFill>
+            <a:schemeClr val="accent1"/>
+          </a:solidFill>
+          <a:ln w="9525" cap="flat" cmpd="sng" algn="ctr">
+            <a:solidFill>
+              <a:schemeClr val="tx1"/>
+            </a:solidFill>
+            <a:prstDash val="solid"/>
+            <a:round/>
+            <a:headEnd type="none" w="med" len="med"/>
+            <a:tailEnd type="none" w="med" len="med"/>
+          </a:ln>
+          <a:effectLst/>
+        </p:spPr>
+        <p:txBody>
+          <a:bodyPr vert="horz" wrap="square" lIns="91440" tIns="45720" rIns="91440" bIns="45720" numCol="1" rtlCol="0" anchor="t" anchorCtr="0" compatLnSpc="1">
+            <a:prstTxWarp prst="textNoShape">
+              <a:avLst/>
+            </a:prstTxWarp>
+          </a:bodyPr>
+          <a:lstStyle/>
+          <a:p>
+            <a:pPr marL="0" marR="0" indent="0" algn="ctr" defTabSz="914400" rtl="0" eaLnBrk="0" fontAlgn="base" latinLnBrk="0" hangingPunct="0">
+              <a:lnSpc>
+                <a:spcPct val="100000"/>
+              </a:lnSpc>
+              <a:spcBef>
+                <a:spcPct val="0"/>
+              </a:spcBef>
+              <a:spcAft>
+                <a:spcPct val="0"/>
+              </a:spcAft>
+              <a:buClrTx/>
+              <a:buSzTx/>
+              <a:buFontTx/>
+              <a:buNone/>
+              <a:tabLst/>
+            </a:pPr>
+            <a:r>
+              <a:rPr kumimoji="0" lang="pl-PL" sz="1400" b="0" i="0" u="none" strike="noStrike" cap="none" normalizeH="0" baseline="0" dirty="0" smtClean="0">
+                <a:ln>
+                  <a:noFill/>
+                </a:ln>
+                <a:solidFill>
+                  <a:schemeClr val="tx1"/>
+                </a:solidFill>
+                <a:effectLst/>
+                <a:latin typeface="Arial" pitchFamily="34" charset="0"/>
+              </a:rPr>
+              <a:t>A</a:t>
+            </a:r>
+            <a:r>
+              <a:rPr kumimoji="0" lang="pl-PL" sz="1400" b="0" i="0" u="none" strike="noStrike" cap="none" normalizeH="0" dirty="0" smtClean="0">
+                <a:ln>
+                  <a:noFill/>
+                </a:ln>
+                <a:solidFill>
+                  <a:schemeClr val="tx1"/>
+                </a:solidFill>
+                <a:effectLst/>
+                <a:latin typeface="Arial" pitchFamily="34" charset="0"/>
+              </a:rPr>
+              <a:t> </a:t>
+            </a:r>
+            <a:r>
+              <a:rPr kumimoji="0" lang="pl-PL" sz="1400" b="0" i="0" u="none" strike="noStrike" cap="none" normalizeH="0" dirty="0" err="1" smtClean="0">
+                <a:ln>
+                  <a:noFill/>
+                </a:ln>
+                <a:solidFill>
+                  <a:schemeClr val="tx1"/>
+                </a:solidFill>
+                <a:effectLst/>
+                <a:latin typeface="Arial" pitchFamily="34" charset="0"/>
+              </a:rPr>
+              <a:t>registred</a:t>
+            </a:r>
+            <a:r>
+              <a:rPr kumimoji="0" lang="pl-PL" sz="1400" b="0" i="0" u="none" strike="noStrike" cap="none" normalizeH="0" dirty="0" smtClean="0">
+                <a:ln>
+                  <a:noFill/>
+                </a:ln>
+                <a:solidFill>
+                  <a:schemeClr val="tx1"/>
+                </a:solidFill>
+                <a:effectLst/>
+                <a:latin typeface="Arial" pitchFamily="34" charset="0"/>
+              </a:rPr>
+              <a:t> player</a:t>
+            </a:r>
+          </a:p>
+          <a:p>
+            <a:pPr marL="0" marR="0" indent="0" algn="ctr" defTabSz="914400" rtl="0" eaLnBrk="0" fontAlgn="base" latinLnBrk="0" hangingPunct="0">
+              <a:lnSpc>
+                <a:spcPct val="100000"/>
+              </a:lnSpc>
+              <a:spcBef>
+                <a:spcPct val="0"/>
+              </a:spcBef>
+              <a:spcAft>
+                <a:spcPct val="0"/>
+              </a:spcAft>
+              <a:buClrTx/>
+              <a:buSzTx/>
+              <a:buFontTx/>
+              <a:buNone/>
+              <a:tabLst/>
+            </a:pPr>
+            <a:r>
+              <a:rPr lang="pl-PL" sz="1400" baseline="0" dirty="0" err="1" smtClean="0">
+                <a:latin typeface="Arial" pitchFamily="34" charset="0"/>
+              </a:rPr>
+              <a:t>before</a:t>
+            </a:r>
+            <a:r>
+              <a:rPr lang="pl-PL" sz="1400" dirty="0" smtClean="0">
+                <a:latin typeface="Arial" pitchFamily="34" charset="0"/>
+              </a:rPr>
+              <a:t> first </a:t>
+            </a:r>
+            <a:r>
+              <a:rPr lang="pl-PL" sz="1400" dirty="0" err="1" smtClean="0">
+                <a:latin typeface="Arial" pitchFamily="34" charset="0"/>
+              </a:rPr>
+              <a:t>logging</a:t>
+            </a:r>
+            <a:r>
+              <a:rPr lang="pl-PL" sz="1400" dirty="0" smtClean="0">
+                <a:latin typeface="Arial" pitchFamily="34" charset="0"/>
+              </a:rPr>
+              <a:t> </a:t>
+            </a:r>
+            <a:r>
+              <a:rPr lang="pl-PL" sz="1400" dirty="0" err="1" smtClean="0">
+                <a:latin typeface="Arial" pitchFamily="34" charset="0"/>
+              </a:rPr>
+              <a:t>in</a:t>
+            </a:r>
+            <a:endParaRPr kumimoji="0" lang="pl-PL" sz="1400" b="0" i="0" u="none" strike="noStrike" cap="none" normalizeH="0" baseline="0" dirty="0" smtClean="0">
+              <a:ln>
+                <a:noFill/>
+              </a:ln>
+              <a:solidFill>
+                <a:schemeClr val="tx1"/>
+              </a:solidFill>
+              <a:effectLst/>
+              <a:latin typeface="Arial" pitchFamily="34" charset="0"/>
+            </a:endParaRPr>
+          </a:p>
+        </p:txBody>
+      </p:sp>
+      <p:sp>
+        <p:nvSpPr>
+          <p:cNvPr id="11" name="Prostokąt 10"/>
+          <p:cNvSpPr/>
+          <p:nvPr/>
+        </p:nvSpPr>
+        <p:spPr bwMode="auto">
+          <a:xfrm>
+            <a:off x="6000760" y="2285992"/>
+            <a:ext cx="2500330" cy="571504"/>
+          </a:xfrm>
+          <a:prstGeom prst="rect">
+            <a:avLst/>
+          </a:prstGeom>
+          <a:solidFill>
+            <a:schemeClr val="accent1"/>
+          </a:solidFill>
+          <a:ln w="9525" cap="flat" cmpd="sng" algn="ctr">
+            <a:solidFill>
+              <a:schemeClr val="tx1"/>
+            </a:solidFill>
+            <a:prstDash val="solid"/>
+            <a:round/>
+            <a:headEnd type="none" w="med" len="med"/>
+            <a:tailEnd type="none" w="med" len="med"/>
+          </a:ln>
+          <a:effectLst/>
+        </p:spPr>
+        <p:txBody>
+          <a:bodyPr vert="horz" wrap="square" lIns="91440" tIns="45720" rIns="91440" bIns="45720" numCol="1" rtlCol="0" anchor="t" anchorCtr="0" compatLnSpc="1">
+            <a:prstTxWarp prst="textNoShape">
+              <a:avLst/>
+            </a:prstTxWarp>
+          </a:bodyPr>
+          <a:lstStyle/>
+          <a:p>
+            <a:pPr marL="0" marR="0" indent="0" algn="ctr" defTabSz="914400" rtl="0" eaLnBrk="0" fontAlgn="base" latinLnBrk="0" hangingPunct="0">
+              <a:lnSpc>
+                <a:spcPct val="100000"/>
+              </a:lnSpc>
+              <a:spcBef>
+                <a:spcPct val="0"/>
+              </a:spcBef>
+              <a:spcAft>
+                <a:spcPct val="0"/>
+              </a:spcAft>
+              <a:buClrTx/>
+              <a:buSzTx/>
+              <a:buFontTx/>
+              <a:buNone/>
+              <a:tabLst/>
+            </a:pPr>
+            <a:r>
+              <a:rPr kumimoji="0" lang="pl-PL" sz="1400" b="0" i="0" u="none" strike="noStrike" cap="none" normalizeH="0" baseline="0" dirty="0" smtClean="0">
+                <a:ln>
+                  <a:noFill/>
+                </a:ln>
+                <a:solidFill>
+                  <a:schemeClr val="tx1"/>
+                </a:solidFill>
+                <a:effectLst/>
+                <a:latin typeface="Arial" pitchFamily="34" charset="0"/>
+              </a:rPr>
+              <a:t>Not </a:t>
+            </a:r>
+            <a:r>
+              <a:rPr kumimoji="0" lang="pl-PL" sz="1400" b="0" i="0" u="none" strike="noStrike" cap="none" normalizeH="0" baseline="0" dirty="0" err="1" smtClean="0">
+                <a:ln>
+                  <a:noFill/>
+                </a:ln>
+                <a:solidFill>
+                  <a:schemeClr val="tx1"/>
+                </a:solidFill>
+                <a:effectLst/>
+                <a:latin typeface="Arial" pitchFamily="34" charset="0"/>
+              </a:rPr>
+              <a:t>registered</a:t>
+            </a:r>
+            <a:r>
+              <a:rPr kumimoji="0" lang="pl-PL" sz="1400" b="0" i="0" u="none" strike="noStrike" cap="none" normalizeH="0" baseline="0" dirty="0" smtClean="0">
+                <a:ln>
+                  <a:noFill/>
+                </a:ln>
+                <a:solidFill>
+                  <a:schemeClr val="tx1"/>
+                </a:solidFill>
+                <a:effectLst/>
+                <a:latin typeface="Arial" pitchFamily="34" charset="0"/>
+              </a:rPr>
+              <a:t> person by email</a:t>
+            </a:r>
+            <a:endParaRPr kumimoji="0" lang="pl-PL" sz="1400" b="0" i="0" u="none" strike="noStrike" cap="none" normalizeH="0" baseline="0" dirty="0" smtClean="0">
+              <a:ln>
+                <a:noFill/>
+              </a:ln>
+              <a:solidFill>
+                <a:schemeClr val="tx1"/>
+              </a:solidFill>
+              <a:effectLst/>
+              <a:latin typeface="Arial" pitchFamily="34" charset="0"/>
+            </a:endParaRPr>
+          </a:p>
+        </p:txBody>
+      </p:sp>
+      <p:sp>
+        <p:nvSpPr>
+          <p:cNvPr id="12" name="Prostokąt 11"/>
+          <p:cNvSpPr/>
+          <p:nvPr/>
+        </p:nvSpPr>
+        <p:spPr bwMode="auto">
+          <a:xfrm>
+            <a:off x="785786" y="2928934"/>
+            <a:ext cx="5143536" cy="500066"/>
+          </a:xfrm>
+          <a:prstGeom prst="rect">
+            <a:avLst/>
+          </a:prstGeom>
+          <a:solidFill>
+            <a:schemeClr val="accent1"/>
+          </a:solidFill>
+          <a:ln w="9525" cap="flat" cmpd="sng" algn="ctr">
+            <a:solidFill>
+              <a:schemeClr val="tx1"/>
+            </a:solidFill>
+            <a:prstDash val="solid"/>
+            <a:round/>
+            <a:headEnd type="none" w="med" len="med"/>
+            <a:tailEnd type="none" w="med" len="med"/>
+          </a:ln>
+          <a:effectLst/>
+        </p:spPr>
+        <p:txBody>
+          <a:bodyPr vert="horz" wrap="square" lIns="91440" tIns="45720" rIns="91440" bIns="45720" numCol="1" rtlCol="0" anchor="t" anchorCtr="0" compatLnSpc="1">
+            <a:prstTxWarp prst="textNoShape">
+              <a:avLst/>
+            </a:prstTxWarp>
+          </a:bodyPr>
+          <a:lstStyle/>
+          <a:p>
+            <a:pPr marL="0" marR="0" indent="0" algn="ctr" defTabSz="914400" rtl="0" eaLnBrk="0" fontAlgn="base" latinLnBrk="0" hangingPunct="0">
+              <a:lnSpc>
+                <a:spcPct val="100000"/>
+              </a:lnSpc>
+              <a:spcBef>
+                <a:spcPct val="0"/>
+              </a:spcBef>
+              <a:spcAft>
+                <a:spcPct val="0"/>
+              </a:spcAft>
+              <a:buClrTx/>
+              <a:buSzTx/>
+              <a:buFontTx/>
+              <a:buNone/>
+              <a:tabLst/>
+            </a:pPr>
+            <a:r>
+              <a:rPr kumimoji="0" lang="pl-PL" sz="1400" b="0" i="0" u="none" strike="noStrike" cap="none" normalizeH="0" baseline="0" dirty="0" err="1" smtClean="0">
+                <a:ln>
+                  <a:noFill/>
+                </a:ln>
+                <a:solidFill>
+                  <a:schemeClr val="tx1"/>
+                </a:solidFill>
+                <a:effectLst/>
+                <a:latin typeface="Arial" pitchFamily="34" charset="0"/>
+              </a:rPr>
+              <a:t>Invitation</a:t>
+            </a:r>
+            <a:r>
+              <a:rPr kumimoji="0" lang="pl-PL" sz="1400" b="0" i="0" u="none" strike="noStrike" cap="none" normalizeH="0" baseline="0" dirty="0" smtClean="0">
+                <a:ln>
+                  <a:noFill/>
+                </a:ln>
+                <a:solidFill>
+                  <a:schemeClr val="tx1"/>
+                </a:solidFill>
+                <a:effectLst/>
+                <a:latin typeface="Arial" pitchFamily="34" charset="0"/>
+              </a:rPr>
+              <a:t> </a:t>
+            </a:r>
+            <a:r>
+              <a:rPr kumimoji="0" lang="pl-PL" sz="1400" b="0" i="0" u="none" strike="noStrike" cap="none" normalizeH="0" baseline="0" dirty="0" err="1" smtClean="0">
+                <a:ln>
+                  <a:noFill/>
+                </a:ln>
+                <a:solidFill>
+                  <a:schemeClr val="tx1"/>
+                </a:solidFill>
+                <a:effectLst/>
+                <a:latin typeface="Arial" pitchFamily="34" charset="0"/>
+              </a:rPr>
+              <a:t>is</a:t>
+            </a:r>
+            <a:r>
+              <a:rPr kumimoji="0" lang="pl-PL" sz="1400" b="0" i="0" u="none" strike="noStrike" cap="none" normalizeH="0" baseline="0" dirty="0" smtClean="0">
+                <a:ln>
+                  <a:noFill/>
+                </a:ln>
+                <a:solidFill>
+                  <a:schemeClr val="tx1"/>
+                </a:solidFill>
+                <a:effectLst/>
+                <a:latin typeface="Arial" pitchFamily="34" charset="0"/>
+              </a:rPr>
+              <a:t> </a:t>
+            </a:r>
+            <a:r>
+              <a:rPr kumimoji="0" lang="pl-PL" sz="1400" b="0" i="0" u="none" strike="noStrike" cap="none" normalizeH="0" baseline="0" dirty="0" err="1" smtClean="0">
+                <a:ln>
+                  <a:noFill/>
+                </a:ln>
+                <a:solidFill>
+                  <a:schemeClr val="tx1"/>
+                </a:solidFill>
+                <a:effectLst/>
+                <a:latin typeface="Arial" pitchFamily="34" charset="0"/>
+              </a:rPr>
+              <a:t>sent</a:t>
+            </a:r>
+            <a:r>
+              <a:rPr kumimoji="0" lang="pl-PL" sz="1400" b="0" i="0" u="none" strike="noStrike" cap="none" normalizeH="0" baseline="0" dirty="0" smtClean="0">
+                <a:ln>
+                  <a:noFill/>
+                </a:ln>
+                <a:solidFill>
+                  <a:schemeClr val="tx1"/>
+                </a:solidFill>
+                <a:effectLst/>
+                <a:latin typeface="Arial" pitchFamily="34" charset="0"/>
+              </a:rPr>
+              <a:t> to </a:t>
+            </a:r>
+            <a:r>
+              <a:rPr kumimoji="0" lang="pl-PL" sz="1400" b="0" i="0" u="none" strike="noStrike" cap="none" normalizeH="0" baseline="0" dirty="0" err="1" smtClean="0">
+                <a:ln>
+                  <a:noFill/>
+                </a:ln>
+                <a:solidFill>
+                  <a:schemeClr val="tx1"/>
+                </a:solidFill>
+                <a:effectLst/>
+                <a:latin typeface="Arial" pitchFamily="34" charset="0"/>
+              </a:rPr>
+              <a:t>the</a:t>
+            </a:r>
+            <a:r>
+              <a:rPr kumimoji="0" lang="pl-PL" sz="1400" b="0" i="0" u="none" strike="noStrike" cap="none" normalizeH="0" baseline="0" dirty="0" smtClean="0">
+                <a:ln>
+                  <a:noFill/>
+                </a:ln>
+                <a:solidFill>
+                  <a:schemeClr val="tx1"/>
+                </a:solidFill>
+                <a:effectLst/>
+                <a:latin typeface="Arial" pitchFamily="34" charset="0"/>
+              </a:rPr>
+              <a:t> </a:t>
+            </a:r>
+            <a:r>
+              <a:rPr kumimoji="0" lang="pl-PL" sz="1400" b="0" i="0" u="none" strike="noStrike" cap="none" normalizeH="0" baseline="0" dirty="0" err="1" smtClean="0">
+                <a:ln>
+                  <a:noFill/>
+                </a:ln>
+                <a:solidFill>
+                  <a:schemeClr val="tx1"/>
+                </a:solidFill>
+                <a:effectLst/>
+                <a:latin typeface="Arial" pitchFamily="34" charset="0"/>
+              </a:rPr>
+              <a:t>player’s</a:t>
+            </a:r>
+            <a:r>
+              <a:rPr kumimoji="0" lang="pl-PL" sz="1400" b="0" i="0" u="none" strike="noStrike" cap="none" normalizeH="0" baseline="0" dirty="0" smtClean="0">
+                <a:ln>
+                  <a:noFill/>
+                </a:ln>
+                <a:solidFill>
+                  <a:schemeClr val="tx1"/>
+                </a:solidFill>
+                <a:effectLst/>
+                <a:latin typeface="Arial" pitchFamily="34" charset="0"/>
+              </a:rPr>
+              <a:t> email</a:t>
+            </a:r>
+            <a:r>
+              <a:rPr kumimoji="0" lang="pl-PL" sz="1400" b="0" i="0" u="none" strike="noStrike" cap="none" normalizeH="0" dirty="0" smtClean="0">
+                <a:ln>
+                  <a:noFill/>
+                </a:ln>
+                <a:solidFill>
+                  <a:schemeClr val="tx1"/>
+                </a:solidFill>
+                <a:effectLst/>
+                <a:latin typeface="Arial" pitchFamily="34" charset="0"/>
+              </a:rPr>
+              <a:t> </a:t>
+            </a:r>
+            <a:r>
+              <a:rPr kumimoji="0" lang="pl-PL" sz="1400" b="0" i="0" u="none" strike="noStrike" cap="none" normalizeH="0" dirty="0" err="1" smtClean="0">
+                <a:ln>
+                  <a:noFill/>
+                </a:ln>
+                <a:solidFill>
+                  <a:schemeClr val="tx1"/>
+                </a:solidFill>
+                <a:effectLst/>
+                <a:latin typeface="Arial" pitchFamily="34" charset="0"/>
+              </a:rPr>
+              <a:t>address</a:t>
+            </a:r>
+            <a:endParaRPr kumimoji="0" lang="pl-PL" sz="1400" b="0" i="0" u="none" strike="noStrike" cap="none" normalizeH="0" baseline="0" dirty="0" smtClean="0">
+              <a:ln>
+                <a:noFill/>
+              </a:ln>
+              <a:solidFill>
+                <a:schemeClr val="tx1"/>
+              </a:solidFill>
+              <a:effectLst/>
+              <a:latin typeface="Arial" pitchFamily="34" charset="0"/>
+            </a:endParaRPr>
+          </a:p>
+        </p:txBody>
+      </p:sp>
+      <p:sp>
+        <p:nvSpPr>
+          <p:cNvPr id="14" name="Prostokąt 13"/>
+          <p:cNvSpPr/>
+          <p:nvPr/>
+        </p:nvSpPr>
+        <p:spPr bwMode="auto">
+          <a:xfrm>
+            <a:off x="6000760" y="2928934"/>
+            <a:ext cx="2500330" cy="500066"/>
+          </a:xfrm>
+          <a:prstGeom prst="rect">
+            <a:avLst/>
+          </a:prstGeom>
+          <a:solidFill>
+            <a:schemeClr val="accent1"/>
+          </a:solidFill>
+          <a:ln w="9525" cap="flat" cmpd="sng" algn="ctr">
+            <a:solidFill>
+              <a:schemeClr val="tx1"/>
+            </a:solidFill>
+            <a:prstDash val="solid"/>
+            <a:round/>
+            <a:headEnd type="none" w="med" len="med"/>
+            <a:tailEnd type="none" w="med" len="med"/>
+          </a:ln>
+          <a:effectLst/>
+        </p:spPr>
+        <p:txBody>
+          <a:bodyPr vert="horz" wrap="square" lIns="91440" tIns="45720" rIns="91440" bIns="45720" numCol="1" rtlCol="0" anchor="t" anchorCtr="0" compatLnSpc="1">
+            <a:prstTxWarp prst="textNoShape">
+              <a:avLst/>
+            </a:prstTxWarp>
+          </a:bodyPr>
+          <a:lstStyle/>
+          <a:p>
+            <a:pPr marL="0" marR="0" indent="0" algn="ctr" defTabSz="914400" rtl="0" eaLnBrk="0" fontAlgn="base" latinLnBrk="0" hangingPunct="0">
+              <a:lnSpc>
+                <a:spcPct val="100000"/>
+              </a:lnSpc>
+              <a:spcBef>
+                <a:spcPct val="0"/>
+              </a:spcBef>
+              <a:spcAft>
+                <a:spcPct val="0"/>
+              </a:spcAft>
+              <a:buClrTx/>
+              <a:buSzTx/>
+              <a:buFontTx/>
+              <a:buNone/>
+              <a:tabLst/>
+            </a:pPr>
+            <a:r>
+              <a:rPr kumimoji="0" lang="pl-PL" sz="1400" b="0" i="0" u="none" strike="noStrike" cap="none" normalizeH="0" baseline="0" dirty="0" err="1" smtClean="0">
+                <a:ln>
+                  <a:noFill/>
+                </a:ln>
+                <a:solidFill>
+                  <a:schemeClr val="tx1"/>
+                </a:solidFill>
+                <a:effectLst/>
+                <a:latin typeface="Arial" pitchFamily="34" charset="0"/>
+              </a:rPr>
+              <a:t>Invitation</a:t>
+            </a:r>
+            <a:r>
+              <a:rPr kumimoji="0" lang="pl-PL" sz="1400" b="0" i="0" u="none" strike="noStrike" cap="none" normalizeH="0" baseline="0" dirty="0" smtClean="0">
+                <a:ln>
+                  <a:noFill/>
+                </a:ln>
+                <a:solidFill>
+                  <a:schemeClr val="tx1"/>
+                </a:solidFill>
+                <a:effectLst/>
+                <a:latin typeface="Arial" pitchFamily="34" charset="0"/>
+              </a:rPr>
+              <a:t> </a:t>
+            </a:r>
+            <a:r>
+              <a:rPr kumimoji="0" lang="pl-PL" sz="1400" b="0" i="0" u="none" strike="noStrike" cap="none" normalizeH="0" baseline="0" dirty="0" err="1" smtClean="0">
+                <a:ln>
+                  <a:noFill/>
+                </a:ln>
+                <a:solidFill>
+                  <a:schemeClr val="tx1"/>
+                </a:solidFill>
+                <a:effectLst/>
+                <a:latin typeface="Arial" pitchFamily="34" charset="0"/>
+              </a:rPr>
+              <a:t>is</a:t>
+            </a:r>
+            <a:r>
+              <a:rPr kumimoji="0" lang="pl-PL" sz="1400" b="0" i="0" u="none" strike="noStrike" cap="none" normalizeH="0" baseline="0" dirty="0" smtClean="0">
+                <a:ln>
+                  <a:noFill/>
+                </a:ln>
+                <a:solidFill>
+                  <a:schemeClr val="tx1"/>
+                </a:solidFill>
+                <a:effectLst/>
+                <a:latin typeface="Arial" pitchFamily="34" charset="0"/>
+              </a:rPr>
+              <a:t> </a:t>
+            </a:r>
+            <a:r>
+              <a:rPr kumimoji="0" lang="pl-PL" sz="1400" b="0" i="0" u="none" strike="noStrike" cap="none" normalizeH="0" baseline="0" dirty="0" err="1" smtClean="0">
+                <a:ln>
+                  <a:noFill/>
+                </a:ln>
+                <a:solidFill>
+                  <a:schemeClr val="tx1"/>
+                </a:solidFill>
+                <a:effectLst/>
+                <a:latin typeface="Arial" pitchFamily="34" charset="0"/>
+              </a:rPr>
+              <a:t>sent</a:t>
+            </a:r>
+            <a:r>
+              <a:rPr kumimoji="0" lang="pl-PL" sz="1400" b="0" i="0" u="none" strike="noStrike" cap="none" normalizeH="0" baseline="0" dirty="0" smtClean="0">
+                <a:ln>
+                  <a:noFill/>
+                </a:ln>
+                <a:solidFill>
+                  <a:schemeClr val="tx1"/>
+                </a:solidFill>
+                <a:effectLst/>
+                <a:latin typeface="Arial" pitchFamily="34" charset="0"/>
+              </a:rPr>
+              <a:t> to </a:t>
+            </a:r>
+            <a:r>
+              <a:rPr kumimoji="0" lang="pl-PL" sz="1400" b="0" i="0" u="none" strike="noStrike" cap="none" normalizeH="0" baseline="0" dirty="0" err="1" smtClean="0">
+                <a:ln>
+                  <a:noFill/>
+                </a:ln>
+                <a:solidFill>
+                  <a:schemeClr val="tx1"/>
+                </a:solidFill>
+                <a:effectLst/>
+                <a:latin typeface="Arial" pitchFamily="34" charset="0"/>
+              </a:rPr>
+              <a:t>the</a:t>
+            </a:r>
+            <a:r>
+              <a:rPr kumimoji="0" lang="pl-PL" sz="1400" b="0" i="0" u="none" strike="noStrike" cap="none" normalizeH="0" baseline="0" dirty="0" smtClean="0">
+                <a:ln>
+                  <a:noFill/>
+                </a:ln>
+                <a:solidFill>
+                  <a:schemeClr val="tx1"/>
+                </a:solidFill>
+                <a:effectLst/>
+                <a:latin typeface="Arial" pitchFamily="34" charset="0"/>
+              </a:rPr>
+              <a:t> </a:t>
+            </a:r>
+            <a:r>
+              <a:rPr kumimoji="0" lang="pl-PL" sz="1400" b="0" i="0" u="none" strike="noStrike" cap="none" normalizeH="0" baseline="0" dirty="0" err="1" smtClean="0">
+                <a:ln>
+                  <a:noFill/>
+                </a:ln>
+                <a:solidFill>
+                  <a:schemeClr val="tx1"/>
+                </a:solidFill>
+                <a:effectLst/>
+                <a:latin typeface="Arial" pitchFamily="34" charset="0"/>
+              </a:rPr>
+              <a:t>given</a:t>
+            </a:r>
+            <a:r>
+              <a:rPr kumimoji="0" lang="pl-PL" sz="1400" b="0" i="0" u="none" strike="noStrike" cap="none" normalizeH="0" baseline="0" dirty="0" smtClean="0">
+                <a:ln>
+                  <a:noFill/>
+                </a:ln>
+                <a:solidFill>
+                  <a:schemeClr val="tx1"/>
+                </a:solidFill>
+                <a:effectLst/>
+                <a:latin typeface="Arial" pitchFamily="34" charset="0"/>
+              </a:rPr>
+              <a:t> email</a:t>
+            </a:r>
+            <a:r>
+              <a:rPr kumimoji="0" lang="pl-PL" sz="1400" b="0" i="0" u="none" strike="noStrike" cap="none" normalizeH="0" dirty="0" smtClean="0">
+                <a:ln>
+                  <a:noFill/>
+                </a:ln>
+                <a:solidFill>
+                  <a:schemeClr val="tx1"/>
+                </a:solidFill>
+                <a:effectLst/>
+                <a:latin typeface="Arial" pitchFamily="34" charset="0"/>
+              </a:rPr>
+              <a:t> </a:t>
+            </a:r>
+            <a:r>
+              <a:rPr kumimoji="0" lang="pl-PL" sz="1400" b="0" i="0" u="none" strike="noStrike" cap="none" normalizeH="0" dirty="0" err="1" smtClean="0">
+                <a:ln>
+                  <a:noFill/>
+                </a:ln>
+                <a:solidFill>
+                  <a:schemeClr val="tx1"/>
+                </a:solidFill>
+                <a:effectLst/>
+                <a:latin typeface="Arial" pitchFamily="34" charset="0"/>
+              </a:rPr>
+              <a:t>address</a:t>
+            </a:r>
+            <a:endParaRPr kumimoji="0" lang="pl-PL" sz="1400" b="0" i="0" u="none" strike="noStrike" cap="none" normalizeH="0" baseline="0" dirty="0" smtClean="0">
+              <a:ln>
+                <a:noFill/>
+              </a:ln>
+              <a:solidFill>
+                <a:schemeClr val="tx1"/>
+              </a:solidFill>
+              <a:effectLst/>
+              <a:latin typeface="Arial" pitchFamily="34" charset="0"/>
+            </a:endParaRPr>
+          </a:p>
+        </p:txBody>
+      </p:sp>
+      <p:sp>
+        <p:nvSpPr>
+          <p:cNvPr id="15" name="Prostokąt 14"/>
+          <p:cNvSpPr/>
+          <p:nvPr/>
+        </p:nvSpPr>
+        <p:spPr bwMode="auto">
+          <a:xfrm>
+            <a:off x="785786" y="3500438"/>
+            <a:ext cx="7715304" cy="285752"/>
+          </a:xfrm>
+          <a:prstGeom prst="rect">
+            <a:avLst/>
+          </a:prstGeom>
+          <a:solidFill>
+            <a:schemeClr val="accent1"/>
+          </a:solidFill>
+          <a:ln w="9525" cap="flat" cmpd="sng" algn="ctr">
+            <a:solidFill>
+              <a:schemeClr val="tx1"/>
+            </a:solidFill>
+            <a:prstDash val="solid"/>
+            <a:round/>
+            <a:headEnd type="none" w="med" len="med"/>
+            <a:tailEnd type="none" w="med" len="med"/>
+          </a:ln>
+          <a:effectLst/>
+        </p:spPr>
+        <p:txBody>
+          <a:bodyPr vert="horz" wrap="square" lIns="91440" tIns="45720" rIns="91440" bIns="45720" numCol="1" rtlCol="0" anchor="t" anchorCtr="0" compatLnSpc="1">
+            <a:prstTxWarp prst="textNoShape">
+              <a:avLst/>
+            </a:prstTxWarp>
+          </a:bodyPr>
+          <a:lstStyle/>
+          <a:p>
+            <a:pPr marL="0" marR="0" indent="0" algn="ctr" defTabSz="914400" rtl="0" eaLnBrk="0" fontAlgn="base" latinLnBrk="0" hangingPunct="0">
+              <a:lnSpc>
+                <a:spcPct val="100000"/>
+              </a:lnSpc>
+              <a:spcBef>
+                <a:spcPct val="0"/>
+              </a:spcBef>
+              <a:spcAft>
+                <a:spcPct val="0"/>
+              </a:spcAft>
+              <a:buClrTx/>
+              <a:buSzTx/>
+              <a:buFontTx/>
+              <a:buNone/>
+              <a:tabLst/>
+            </a:pPr>
+            <a:r>
+              <a:rPr kumimoji="0" lang="pl-PL" sz="1400" b="0" i="0" u="none" strike="noStrike" cap="none" normalizeH="0" baseline="0" dirty="0" err="1" smtClean="0">
+                <a:ln>
+                  <a:noFill/>
+                </a:ln>
+                <a:solidFill>
+                  <a:schemeClr val="tx1"/>
+                </a:solidFill>
+                <a:effectLst/>
+                <a:latin typeface="Arial" pitchFamily="34" charset="0"/>
+              </a:rPr>
+              <a:t>The</a:t>
+            </a:r>
+            <a:r>
+              <a:rPr kumimoji="0" lang="pl-PL" sz="1400" b="0" i="0" u="none" strike="noStrike" cap="none" normalizeH="0" baseline="0" dirty="0" smtClean="0">
+                <a:ln>
+                  <a:noFill/>
+                </a:ln>
+                <a:solidFill>
+                  <a:schemeClr val="tx1"/>
+                </a:solidFill>
+                <a:effectLst/>
+                <a:latin typeface="Arial" pitchFamily="34" charset="0"/>
+              </a:rPr>
+              <a:t> perso</a:t>
+            </a:r>
+            <a:r>
+              <a:rPr lang="pl-PL" sz="1400" dirty="0" smtClean="0">
+                <a:latin typeface="Arial" pitchFamily="34" charset="0"/>
+              </a:rPr>
+              <a:t>n </a:t>
+            </a:r>
+            <a:r>
+              <a:rPr lang="pl-PL" sz="1400" dirty="0" err="1" smtClean="0">
+                <a:latin typeface="Arial" pitchFamily="34" charset="0"/>
+              </a:rPr>
+              <a:t>clicks</a:t>
+            </a:r>
+            <a:r>
+              <a:rPr lang="pl-PL" sz="1400" dirty="0" smtClean="0">
+                <a:latin typeface="Arial" pitchFamily="34" charset="0"/>
+              </a:rPr>
+              <a:t> on </a:t>
+            </a:r>
+            <a:r>
+              <a:rPr lang="pl-PL" sz="1400" dirty="0" err="1" smtClean="0">
+                <a:latin typeface="Arial" pitchFamily="34" charset="0"/>
+              </a:rPr>
+              <a:t>the</a:t>
+            </a:r>
+            <a:r>
+              <a:rPr lang="pl-PL" sz="1400" dirty="0" smtClean="0">
+                <a:latin typeface="Arial" pitchFamily="34" charset="0"/>
+              </a:rPr>
+              <a:t> </a:t>
+            </a:r>
+            <a:r>
+              <a:rPr lang="pl-PL" sz="1400" dirty="0" err="1" smtClean="0">
+                <a:latin typeface="Arial" pitchFamily="34" charset="0"/>
+              </a:rPr>
+              <a:t>confirmation</a:t>
+            </a:r>
+            <a:r>
+              <a:rPr lang="pl-PL" sz="1400" dirty="0" smtClean="0">
+                <a:latin typeface="Arial" pitchFamily="34" charset="0"/>
+              </a:rPr>
+              <a:t> link </a:t>
+            </a:r>
+            <a:r>
+              <a:rPr lang="pl-PL" sz="1400" dirty="0" err="1" smtClean="0">
+                <a:latin typeface="Arial" pitchFamily="34" charset="0"/>
+              </a:rPr>
+              <a:t>in</a:t>
+            </a:r>
+            <a:r>
+              <a:rPr lang="pl-PL" sz="1400" dirty="0" smtClean="0">
+                <a:latin typeface="Arial" pitchFamily="34" charset="0"/>
+              </a:rPr>
+              <a:t> </a:t>
+            </a:r>
+            <a:r>
+              <a:rPr lang="pl-PL" sz="1400" dirty="0" err="1" smtClean="0">
+                <a:latin typeface="Arial" pitchFamily="34" charset="0"/>
+              </a:rPr>
+              <a:t>the</a:t>
+            </a:r>
+            <a:r>
+              <a:rPr lang="pl-PL" sz="1400" dirty="0" smtClean="0">
+                <a:latin typeface="Arial" pitchFamily="34" charset="0"/>
+              </a:rPr>
+              <a:t> email to </a:t>
+            </a:r>
+            <a:r>
+              <a:rPr lang="pl-PL" sz="1400" dirty="0" err="1" smtClean="0">
+                <a:latin typeface="Arial" pitchFamily="34" charset="0"/>
+              </a:rPr>
+              <a:t>proceed</a:t>
+            </a:r>
+            <a:endParaRPr kumimoji="0" lang="pl-PL" sz="1400" b="0" i="0" u="none" strike="noStrike" cap="none" normalizeH="0" baseline="0" dirty="0" smtClean="0">
+              <a:ln>
+                <a:noFill/>
+              </a:ln>
+              <a:solidFill>
+                <a:schemeClr val="tx1"/>
+              </a:solidFill>
+              <a:effectLst/>
+              <a:latin typeface="Arial" pitchFamily="34" charset="0"/>
+            </a:endParaRPr>
+          </a:p>
+        </p:txBody>
+      </p:sp>
+      <p:sp>
+        <p:nvSpPr>
+          <p:cNvPr id="16" name="Prostokąt 15"/>
+          <p:cNvSpPr/>
+          <p:nvPr/>
+        </p:nvSpPr>
+        <p:spPr bwMode="auto">
+          <a:xfrm>
+            <a:off x="6000760" y="3857628"/>
+            <a:ext cx="2500330" cy="500066"/>
+          </a:xfrm>
+          <a:prstGeom prst="rect">
+            <a:avLst/>
+          </a:prstGeom>
+          <a:solidFill>
+            <a:schemeClr val="accent1"/>
+          </a:solidFill>
+          <a:ln w="9525" cap="flat" cmpd="sng" algn="ctr">
+            <a:solidFill>
+              <a:schemeClr val="tx1"/>
+            </a:solidFill>
+            <a:prstDash val="solid"/>
+            <a:round/>
+            <a:headEnd type="none" w="med" len="med"/>
+            <a:tailEnd type="none" w="med" len="med"/>
+          </a:ln>
+          <a:effectLst/>
+        </p:spPr>
+        <p:txBody>
+          <a:bodyPr vert="horz" wrap="square" lIns="91440" tIns="45720" rIns="91440" bIns="45720" numCol="1" rtlCol="0" anchor="t" anchorCtr="0" compatLnSpc="1">
+            <a:prstTxWarp prst="textNoShape">
+              <a:avLst/>
+            </a:prstTxWarp>
+          </a:bodyPr>
+          <a:lstStyle/>
+          <a:p>
+            <a:pPr marL="0" marR="0" indent="0" algn="ctr" defTabSz="914400" rtl="0" eaLnBrk="0" fontAlgn="base" latinLnBrk="0" hangingPunct="0">
+              <a:lnSpc>
+                <a:spcPct val="100000"/>
+              </a:lnSpc>
+              <a:spcBef>
+                <a:spcPct val="0"/>
+              </a:spcBef>
+              <a:spcAft>
+                <a:spcPct val="0"/>
+              </a:spcAft>
+              <a:buClrTx/>
+              <a:buSzTx/>
+              <a:buFontTx/>
+              <a:buNone/>
+              <a:tabLst/>
+            </a:pPr>
+            <a:r>
+              <a:rPr kumimoji="0" lang="pl-PL" sz="1400" b="0" i="0" u="none" strike="noStrike" cap="none" normalizeH="0" baseline="0" dirty="0" err="1" smtClean="0">
+                <a:ln>
+                  <a:noFill/>
+                </a:ln>
+                <a:solidFill>
+                  <a:schemeClr val="tx1"/>
+                </a:solidFill>
+                <a:effectLst/>
+                <a:latin typeface="Arial" pitchFamily="34" charset="0"/>
+              </a:rPr>
+              <a:t>Redirection</a:t>
+            </a:r>
+            <a:r>
+              <a:rPr kumimoji="0" lang="pl-PL" sz="1400" b="0" i="0" u="none" strike="noStrike" cap="none" normalizeH="0" baseline="0" dirty="0" smtClean="0">
+                <a:ln>
+                  <a:noFill/>
+                </a:ln>
+                <a:solidFill>
+                  <a:schemeClr val="tx1"/>
+                </a:solidFill>
+                <a:effectLst/>
+                <a:latin typeface="Arial" pitchFamily="34" charset="0"/>
+              </a:rPr>
+              <a:t> to </a:t>
+            </a:r>
+            <a:r>
+              <a:rPr kumimoji="0" lang="pl-PL" sz="1400" b="0" i="0" u="none" strike="noStrike" cap="none" normalizeH="0" baseline="0" dirty="0" err="1" smtClean="0">
+                <a:ln>
+                  <a:noFill/>
+                </a:ln>
+                <a:solidFill>
+                  <a:schemeClr val="tx1"/>
+                </a:solidFill>
+                <a:effectLst/>
+                <a:latin typeface="Arial" pitchFamily="34" charset="0"/>
+              </a:rPr>
+              <a:t>the</a:t>
+            </a:r>
+            <a:r>
+              <a:rPr kumimoji="0" lang="pl-PL" sz="1400" b="0" i="0" u="none" strike="noStrike" cap="none" normalizeH="0" baseline="0" dirty="0" smtClean="0">
+                <a:ln>
+                  <a:noFill/>
+                </a:ln>
+                <a:solidFill>
+                  <a:schemeClr val="tx1"/>
+                </a:solidFill>
+                <a:effectLst/>
+                <a:latin typeface="Arial" pitchFamily="34" charset="0"/>
+              </a:rPr>
+              <a:t> </a:t>
+            </a:r>
+            <a:r>
+              <a:rPr kumimoji="0" lang="pl-PL" sz="1400" b="0" i="0" u="none" strike="noStrike" cap="none" normalizeH="0" baseline="0" dirty="0" err="1" smtClean="0">
+                <a:ln>
+                  <a:noFill/>
+                </a:ln>
+                <a:solidFill>
+                  <a:schemeClr val="tx1"/>
+                </a:solidFill>
+                <a:effectLst/>
+                <a:latin typeface="Arial" pitchFamily="34" charset="0"/>
+              </a:rPr>
+              <a:t>registration</a:t>
+            </a:r>
+            <a:r>
+              <a:rPr kumimoji="0" lang="pl-PL" sz="1400" b="0" i="0" u="none" strike="noStrike" cap="none" normalizeH="0" baseline="0" dirty="0" smtClean="0">
+                <a:ln>
+                  <a:noFill/>
+                </a:ln>
+                <a:solidFill>
+                  <a:schemeClr val="tx1"/>
+                </a:solidFill>
+                <a:effectLst/>
+                <a:latin typeface="Arial" pitchFamily="34" charset="0"/>
+              </a:rPr>
+              <a:t> </a:t>
+            </a:r>
+            <a:r>
+              <a:rPr kumimoji="0" lang="pl-PL" sz="1400" b="0" i="0" u="none" strike="noStrike" cap="none" normalizeH="0" baseline="0" dirty="0" err="1" smtClean="0">
+                <a:ln>
+                  <a:noFill/>
+                </a:ln>
+                <a:solidFill>
+                  <a:schemeClr val="tx1"/>
+                </a:solidFill>
+                <a:effectLst/>
+                <a:latin typeface="Arial" pitchFamily="34" charset="0"/>
+              </a:rPr>
+              <a:t>page</a:t>
+            </a:r>
+            <a:endParaRPr kumimoji="0" lang="pl-PL" sz="1400" b="0" i="0" u="none" strike="noStrike" cap="none" normalizeH="0" baseline="0" dirty="0" smtClean="0">
+              <a:ln>
+                <a:noFill/>
+              </a:ln>
+              <a:solidFill>
+                <a:schemeClr val="tx1"/>
+              </a:solidFill>
+              <a:effectLst/>
+              <a:latin typeface="Arial" pitchFamily="34" charset="0"/>
+            </a:endParaRPr>
+          </a:p>
+        </p:txBody>
+      </p:sp>
+      <p:sp>
+        <p:nvSpPr>
+          <p:cNvPr id="17" name="Prostokąt 16"/>
+          <p:cNvSpPr/>
+          <p:nvPr/>
+        </p:nvSpPr>
+        <p:spPr bwMode="auto">
+          <a:xfrm>
+            <a:off x="785786" y="3857628"/>
+            <a:ext cx="5143536" cy="500066"/>
+          </a:xfrm>
+          <a:prstGeom prst="rect">
+            <a:avLst/>
+          </a:prstGeom>
+          <a:solidFill>
+            <a:schemeClr val="accent1"/>
+          </a:solidFill>
+          <a:ln w="9525" cap="flat" cmpd="sng" algn="ctr">
+            <a:solidFill>
+              <a:schemeClr val="tx1"/>
+            </a:solidFill>
+            <a:prstDash val="solid"/>
+            <a:round/>
+            <a:headEnd type="none" w="med" len="med"/>
+            <a:tailEnd type="none" w="med" len="med"/>
+          </a:ln>
+          <a:effectLst/>
+        </p:spPr>
+        <p:txBody>
+          <a:bodyPr vert="horz" wrap="square" lIns="91440" tIns="45720" rIns="91440" bIns="45720" numCol="1" rtlCol="0" anchor="t" anchorCtr="0" compatLnSpc="1">
+            <a:prstTxWarp prst="textNoShape">
+              <a:avLst/>
+            </a:prstTxWarp>
+          </a:bodyPr>
+          <a:lstStyle/>
+          <a:p>
+            <a:pPr marL="0" marR="0" indent="0" algn="ctr" defTabSz="914400" rtl="0" eaLnBrk="0" fontAlgn="base" latinLnBrk="0" hangingPunct="0">
+              <a:lnSpc>
+                <a:spcPct val="100000"/>
+              </a:lnSpc>
+              <a:spcBef>
+                <a:spcPct val="0"/>
+              </a:spcBef>
+              <a:spcAft>
+                <a:spcPct val="0"/>
+              </a:spcAft>
+              <a:buClrTx/>
+              <a:buSzTx/>
+              <a:buFontTx/>
+              <a:buNone/>
+              <a:tabLst/>
+            </a:pPr>
+            <a:r>
+              <a:rPr kumimoji="0" lang="pl-PL" sz="1400" b="0" i="0" u="none" strike="noStrike" cap="none" normalizeH="0" baseline="0" dirty="0" err="1" smtClean="0">
+                <a:ln>
+                  <a:noFill/>
+                </a:ln>
+                <a:solidFill>
+                  <a:schemeClr val="tx1"/>
+                </a:solidFill>
+                <a:effectLst/>
+                <a:latin typeface="Arial" pitchFamily="34" charset="0"/>
+              </a:rPr>
+              <a:t>Redirection</a:t>
+            </a:r>
+            <a:r>
+              <a:rPr kumimoji="0" lang="pl-PL" sz="1400" b="0" i="0" u="none" strike="noStrike" cap="none" normalizeH="0" baseline="0" dirty="0" smtClean="0">
+                <a:ln>
+                  <a:noFill/>
+                </a:ln>
+                <a:solidFill>
+                  <a:schemeClr val="tx1"/>
+                </a:solidFill>
+                <a:effectLst/>
+                <a:latin typeface="Arial" pitchFamily="34" charset="0"/>
+              </a:rPr>
+              <a:t> to </a:t>
+            </a:r>
+            <a:r>
+              <a:rPr kumimoji="0" lang="pl-PL" sz="1400" b="0" i="0" u="none" strike="noStrike" cap="none" normalizeH="0" baseline="0" dirty="0" err="1" smtClean="0">
+                <a:ln>
+                  <a:noFill/>
+                </a:ln>
+                <a:solidFill>
+                  <a:schemeClr val="tx1"/>
+                </a:solidFill>
+                <a:effectLst/>
+                <a:latin typeface="Arial" pitchFamily="34" charset="0"/>
+              </a:rPr>
+              <a:t>the</a:t>
+            </a:r>
+            <a:r>
+              <a:rPr kumimoji="0" lang="pl-PL" sz="1400" b="0" i="0" u="none" strike="noStrike" cap="none" normalizeH="0" baseline="0" dirty="0" smtClean="0">
+                <a:ln>
+                  <a:noFill/>
+                </a:ln>
+                <a:solidFill>
+                  <a:schemeClr val="tx1"/>
+                </a:solidFill>
+                <a:effectLst/>
+                <a:latin typeface="Arial" pitchFamily="34" charset="0"/>
+              </a:rPr>
+              <a:t> </a:t>
+            </a:r>
+            <a:r>
+              <a:rPr kumimoji="0" lang="pl-PL" sz="1400" b="0" i="0" u="none" strike="noStrike" cap="none" normalizeH="0" baseline="0" dirty="0" err="1" smtClean="0">
+                <a:ln>
+                  <a:noFill/>
+                </a:ln>
+                <a:solidFill>
+                  <a:schemeClr val="tx1"/>
+                </a:solidFill>
+                <a:effectLst/>
+                <a:latin typeface="Arial" pitchFamily="34" charset="0"/>
+              </a:rPr>
+              <a:t>log-in</a:t>
+            </a:r>
+            <a:r>
+              <a:rPr kumimoji="0" lang="pl-PL" sz="1400" b="0" i="0" u="none" strike="noStrike" cap="none" normalizeH="0" dirty="0" smtClean="0">
+                <a:ln>
+                  <a:noFill/>
+                </a:ln>
+                <a:solidFill>
+                  <a:schemeClr val="tx1"/>
+                </a:solidFill>
+                <a:effectLst/>
+                <a:latin typeface="Arial" pitchFamily="34" charset="0"/>
+              </a:rPr>
+              <a:t> </a:t>
+            </a:r>
+            <a:r>
+              <a:rPr kumimoji="0" lang="pl-PL" sz="1400" b="0" i="0" u="none" strike="noStrike" cap="none" normalizeH="0" dirty="0" err="1" smtClean="0">
+                <a:ln>
+                  <a:noFill/>
+                </a:ln>
+                <a:solidFill>
+                  <a:schemeClr val="tx1"/>
+                </a:solidFill>
+                <a:effectLst/>
+                <a:latin typeface="Arial" pitchFamily="34" charset="0"/>
+              </a:rPr>
+              <a:t>page</a:t>
+            </a:r>
+            <a:r>
+              <a:rPr kumimoji="0" lang="pl-PL" sz="1400" b="0" i="0" u="none" strike="noStrike" cap="none" normalizeH="0" dirty="0" smtClean="0">
+                <a:ln>
+                  <a:noFill/>
+                </a:ln>
+                <a:solidFill>
+                  <a:schemeClr val="tx1"/>
+                </a:solidFill>
+                <a:effectLst/>
+                <a:latin typeface="Arial" pitchFamily="34" charset="0"/>
+              </a:rPr>
+              <a:t> </a:t>
+            </a:r>
+            <a:r>
+              <a:rPr kumimoji="0" lang="pl-PL" sz="1400" b="0" i="0" u="none" strike="noStrike" cap="none" normalizeH="0" dirty="0" err="1" smtClean="0">
+                <a:ln>
+                  <a:noFill/>
+                </a:ln>
+                <a:solidFill>
+                  <a:schemeClr val="tx1"/>
+                </a:solidFill>
+                <a:effectLst/>
+                <a:latin typeface="Arial" pitchFamily="34" charset="0"/>
+              </a:rPr>
+              <a:t>if</a:t>
+            </a:r>
+            <a:r>
+              <a:rPr kumimoji="0" lang="pl-PL" sz="1400" b="0" i="0" u="none" strike="noStrike" cap="none" normalizeH="0" dirty="0" smtClean="0">
+                <a:ln>
+                  <a:noFill/>
+                </a:ln>
+                <a:solidFill>
+                  <a:schemeClr val="tx1"/>
+                </a:solidFill>
+                <a:effectLst/>
+                <a:latin typeface="Arial" pitchFamily="34" charset="0"/>
+              </a:rPr>
+              <a:t> not </a:t>
+            </a:r>
+            <a:r>
+              <a:rPr kumimoji="0" lang="pl-PL" sz="1400" b="0" i="0" u="none" strike="noStrike" cap="none" normalizeH="0" dirty="0" err="1" smtClean="0">
+                <a:ln>
+                  <a:noFill/>
+                </a:ln>
+                <a:solidFill>
+                  <a:schemeClr val="tx1"/>
+                </a:solidFill>
+                <a:effectLst/>
+                <a:latin typeface="Arial" pitchFamily="34" charset="0"/>
+              </a:rPr>
+              <a:t>logged</a:t>
+            </a:r>
+            <a:r>
+              <a:rPr kumimoji="0" lang="pl-PL" sz="1400" b="0" i="0" u="none" strike="noStrike" cap="none" normalizeH="0" dirty="0" smtClean="0">
+                <a:ln>
+                  <a:noFill/>
+                </a:ln>
+                <a:solidFill>
+                  <a:schemeClr val="tx1"/>
+                </a:solidFill>
+                <a:effectLst/>
+                <a:latin typeface="Arial" pitchFamily="34" charset="0"/>
+              </a:rPr>
+              <a:t> </a:t>
+            </a:r>
+            <a:r>
+              <a:rPr kumimoji="0" lang="pl-PL" sz="1400" b="0" i="0" u="none" strike="noStrike" cap="none" normalizeH="0" dirty="0" err="1" smtClean="0">
+                <a:ln>
+                  <a:noFill/>
+                </a:ln>
+                <a:solidFill>
+                  <a:schemeClr val="tx1"/>
+                </a:solidFill>
+                <a:effectLst/>
+                <a:latin typeface="Arial" pitchFamily="34" charset="0"/>
+              </a:rPr>
+              <a:t>in</a:t>
+            </a:r>
+            <a:endParaRPr kumimoji="0" lang="pl-PL" sz="1400" b="0" i="0" u="none" strike="noStrike" cap="none" normalizeH="0" baseline="0" dirty="0" smtClean="0">
+              <a:ln>
+                <a:noFill/>
+              </a:ln>
+              <a:solidFill>
+                <a:schemeClr val="tx1"/>
+              </a:solidFill>
+              <a:effectLst/>
+              <a:latin typeface="Arial" pitchFamily="34" charset="0"/>
+            </a:endParaRPr>
+          </a:p>
+        </p:txBody>
+      </p:sp>
+      <p:sp>
+        <p:nvSpPr>
+          <p:cNvPr id="18" name="Prostokąt 17"/>
+          <p:cNvSpPr/>
+          <p:nvPr/>
+        </p:nvSpPr>
+        <p:spPr bwMode="auto">
+          <a:xfrm>
+            <a:off x="785786" y="5214950"/>
+            <a:ext cx="7715304" cy="285752"/>
+          </a:xfrm>
+          <a:prstGeom prst="rect">
+            <a:avLst/>
+          </a:prstGeom>
+          <a:solidFill>
+            <a:schemeClr val="accent1"/>
+          </a:solidFill>
+          <a:ln w="9525" cap="flat" cmpd="sng" algn="ctr">
+            <a:solidFill>
+              <a:schemeClr val="tx1"/>
+            </a:solidFill>
+            <a:prstDash val="solid"/>
+            <a:round/>
+            <a:headEnd type="none" w="med" len="med"/>
+            <a:tailEnd type="none" w="med" len="med"/>
+          </a:ln>
+          <a:effectLst/>
+        </p:spPr>
+        <p:txBody>
+          <a:bodyPr vert="horz" wrap="square" lIns="91440" tIns="45720" rIns="91440" bIns="45720" numCol="1" rtlCol="0" anchor="t" anchorCtr="0" compatLnSpc="1">
+            <a:prstTxWarp prst="textNoShape">
+              <a:avLst/>
+            </a:prstTxWarp>
+          </a:bodyPr>
+          <a:lstStyle/>
+          <a:p>
+            <a:pPr marL="0" marR="0" indent="0" algn="ctr" defTabSz="914400" rtl="0" eaLnBrk="0" fontAlgn="base" latinLnBrk="0" hangingPunct="0">
+              <a:lnSpc>
+                <a:spcPct val="100000"/>
+              </a:lnSpc>
+              <a:spcBef>
+                <a:spcPct val="0"/>
+              </a:spcBef>
+              <a:spcAft>
+                <a:spcPct val="0"/>
+              </a:spcAft>
+              <a:buClrTx/>
+              <a:buSzTx/>
+              <a:buFontTx/>
+              <a:buNone/>
+              <a:tabLst/>
+            </a:pPr>
+            <a:r>
+              <a:rPr kumimoji="0" lang="pl-PL" sz="1400" b="0" i="0" u="none" strike="noStrike" cap="none" normalizeH="0" baseline="0" dirty="0" err="1" smtClean="0">
+                <a:ln>
+                  <a:noFill/>
+                </a:ln>
+                <a:solidFill>
+                  <a:schemeClr val="tx1"/>
+                </a:solidFill>
+                <a:effectLst/>
+                <a:latin typeface="Arial" pitchFamily="34" charset="0"/>
+              </a:rPr>
+              <a:t>The</a:t>
+            </a:r>
+            <a:r>
+              <a:rPr kumimoji="0" lang="pl-PL" sz="1400" b="0" i="0" u="none" strike="noStrike" cap="none" normalizeH="0" baseline="0" dirty="0" smtClean="0">
+                <a:ln>
+                  <a:noFill/>
+                </a:ln>
+                <a:solidFill>
+                  <a:schemeClr val="tx1"/>
+                </a:solidFill>
+                <a:effectLst/>
+                <a:latin typeface="Arial" pitchFamily="34" charset="0"/>
+              </a:rPr>
+              <a:t> player </a:t>
+            </a:r>
+            <a:r>
+              <a:rPr kumimoji="0" lang="pl-PL" sz="1400" b="0" i="0" u="none" strike="noStrike" cap="none" normalizeH="0" baseline="0" dirty="0" err="1" smtClean="0">
+                <a:ln>
+                  <a:noFill/>
+                </a:ln>
+                <a:solidFill>
+                  <a:schemeClr val="tx1"/>
+                </a:solidFill>
+                <a:effectLst/>
+                <a:latin typeface="Arial" pitchFamily="34" charset="0"/>
+              </a:rPr>
+              <a:t>joins</a:t>
+            </a:r>
+            <a:r>
+              <a:rPr kumimoji="0" lang="pl-PL" sz="1400" b="0" i="0" u="none" strike="noStrike" cap="none" normalizeH="0" baseline="0" dirty="0" smtClean="0">
+                <a:ln>
+                  <a:noFill/>
+                </a:ln>
+                <a:solidFill>
+                  <a:schemeClr val="tx1"/>
+                </a:solidFill>
+                <a:effectLst/>
+                <a:latin typeface="Arial" pitchFamily="34" charset="0"/>
+              </a:rPr>
+              <a:t> </a:t>
+            </a:r>
+            <a:r>
+              <a:rPr kumimoji="0" lang="pl-PL" sz="1400" b="0" i="0" u="none" strike="noStrike" cap="none" normalizeH="0" baseline="0" dirty="0" err="1" smtClean="0">
+                <a:ln>
+                  <a:noFill/>
+                </a:ln>
+                <a:solidFill>
+                  <a:schemeClr val="tx1"/>
+                </a:solidFill>
+                <a:effectLst/>
+                <a:latin typeface="Arial" pitchFamily="34" charset="0"/>
+              </a:rPr>
+              <a:t>the</a:t>
+            </a:r>
+            <a:r>
+              <a:rPr kumimoji="0" lang="pl-PL" sz="1400" b="0" i="0" u="none" strike="noStrike" cap="none" normalizeH="0" baseline="0" dirty="0" smtClean="0">
+                <a:ln>
+                  <a:noFill/>
+                </a:ln>
+                <a:solidFill>
+                  <a:schemeClr val="tx1"/>
+                </a:solidFill>
+                <a:effectLst/>
+                <a:latin typeface="Arial" pitchFamily="34" charset="0"/>
+              </a:rPr>
+              <a:t> </a:t>
+            </a:r>
+            <a:r>
+              <a:rPr kumimoji="0" lang="pl-PL" sz="1400" b="0" i="0" u="none" strike="noStrike" cap="none" normalizeH="0" baseline="0" dirty="0" err="1" smtClean="0">
+                <a:ln>
+                  <a:noFill/>
+                </a:ln>
+                <a:solidFill>
+                  <a:schemeClr val="tx1"/>
+                </a:solidFill>
+                <a:effectLst/>
+                <a:latin typeface="Arial" pitchFamily="34" charset="0"/>
+              </a:rPr>
+              <a:t>new</a:t>
+            </a:r>
+            <a:r>
+              <a:rPr kumimoji="0" lang="pl-PL" sz="1400" b="0" i="0" u="none" strike="noStrike" cap="none" normalizeH="0" baseline="0" dirty="0" smtClean="0">
+                <a:ln>
+                  <a:noFill/>
+                </a:ln>
+                <a:solidFill>
+                  <a:schemeClr val="tx1"/>
+                </a:solidFill>
+                <a:effectLst/>
+                <a:latin typeface="Arial" pitchFamily="34" charset="0"/>
+              </a:rPr>
+              <a:t> team</a:t>
+            </a:r>
+            <a:endParaRPr kumimoji="0" lang="pl-PL" sz="1400" b="0" i="0" u="none" strike="noStrike" cap="none" normalizeH="0" baseline="0" dirty="0" smtClean="0">
+              <a:ln>
+                <a:noFill/>
+              </a:ln>
+              <a:solidFill>
+                <a:schemeClr val="tx1"/>
+              </a:solidFill>
+              <a:effectLst/>
+              <a:latin typeface="Arial" pitchFamily="34" charset="0"/>
+            </a:endParaRPr>
+          </a:p>
+        </p:txBody>
+      </p:sp>
+      <p:sp>
+        <p:nvSpPr>
+          <p:cNvPr id="21" name="Prostokąt 20"/>
+          <p:cNvSpPr/>
+          <p:nvPr/>
+        </p:nvSpPr>
+        <p:spPr bwMode="auto">
+          <a:xfrm>
+            <a:off x="785786" y="4429132"/>
+            <a:ext cx="2571768" cy="714380"/>
+          </a:xfrm>
+          <a:prstGeom prst="rect">
+            <a:avLst/>
+          </a:prstGeom>
+          <a:solidFill>
+            <a:schemeClr val="accent1"/>
+          </a:solidFill>
+          <a:ln w="9525" cap="flat" cmpd="sng" algn="ctr">
+            <a:solidFill>
+              <a:schemeClr val="tx1"/>
+            </a:solidFill>
+            <a:prstDash val="solid"/>
+            <a:round/>
+            <a:headEnd type="none" w="med" len="med"/>
+            <a:tailEnd type="none" w="med" len="med"/>
+          </a:ln>
+          <a:effectLst/>
+        </p:spPr>
+        <p:txBody>
+          <a:bodyPr vert="horz" wrap="square" lIns="91440" tIns="45720" rIns="91440" bIns="45720" numCol="1" rtlCol="0" anchor="t" anchorCtr="0" compatLnSpc="1">
+            <a:prstTxWarp prst="textNoShape">
+              <a:avLst/>
+            </a:prstTxWarp>
+          </a:bodyPr>
+          <a:lstStyle/>
+          <a:p>
+            <a:pPr marL="0" marR="0" indent="0" algn="ctr" defTabSz="914400" rtl="0" eaLnBrk="0" fontAlgn="base" latinLnBrk="0" hangingPunct="0">
+              <a:lnSpc>
+                <a:spcPct val="100000"/>
+              </a:lnSpc>
+              <a:spcBef>
+                <a:spcPct val="0"/>
+              </a:spcBef>
+              <a:spcAft>
+                <a:spcPct val="0"/>
+              </a:spcAft>
+              <a:buClrTx/>
+              <a:buSzTx/>
+              <a:buFontTx/>
+              <a:buNone/>
+              <a:tabLst/>
+            </a:pPr>
+            <a:r>
+              <a:rPr kumimoji="0" lang="pl-PL" sz="1400" b="0" i="0" u="none" strike="noStrike" cap="none" normalizeH="0" baseline="0" dirty="0" err="1" smtClean="0">
+                <a:ln>
+                  <a:noFill/>
+                </a:ln>
+                <a:solidFill>
+                  <a:schemeClr val="tx1"/>
+                </a:solidFill>
+                <a:effectLst/>
+                <a:latin typeface="Arial" pitchFamily="34" charset="0"/>
+              </a:rPr>
+              <a:t>If</a:t>
+            </a:r>
+            <a:r>
+              <a:rPr kumimoji="0" lang="pl-PL" sz="1400" b="0" i="0" u="none" strike="noStrike" cap="none" normalizeH="0" baseline="0" dirty="0" smtClean="0">
+                <a:ln>
+                  <a:noFill/>
+                </a:ln>
+                <a:solidFill>
+                  <a:schemeClr val="tx1"/>
+                </a:solidFill>
+                <a:effectLst/>
+                <a:latin typeface="Arial" pitchFamily="34" charset="0"/>
+              </a:rPr>
+              <a:t> </a:t>
+            </a:r>
+            <a:r>
+              <a:rPr kumimoji="0" lang="pl-PL" sz="1400" b="0" i="0" u="none" strike="noStrike" cap="none" normalizeH="0" baseline="0" dirty="0" err="1" smtClean="0">
+                <a:ln>
+                  <a:noFill/>
+                </a:ln>
+                <a:solidFill>
+                  <a:schemeClr val="tx1"/>
+                </a:solidFill>
+                <a:effectLst/>
+                <a:latin typeface="Arial" pitchFamily="34" charset="0"/>
+              </a:rPr>
+              <a:t>faction</a:t>
+            </a:r>
+            <a:r>
+              <a:rPr lang="pl-PL" sz="1400" dirty="0" smtClean="0">
+                <a:latin typeface="Arial" pitchFamily="34" charset="0"/>
+              </a:rPr>
+              <a:t> </a:t>
+            </a:r>
+            <a:r>
+              <a:rPr lang="pl-PL" sz="1400" dirty="0" smtClean="0">
+                <a:latin typeface="Arial" pitchFamily="34" charset="0"/>
+              </a:rPr>
+              <a:t>and/</a:t>
+            </a:r>
+            <a:r>
+              <a:rPr lang="pl-PL" sz="1400" dirty="0" err="1" smtClean="0">
+                <a:latin typeface="Arial" pitchFamily="34" charset="0"/>
+              </a:rPr>
+              <a:t>or</a:t>
+            </a:r>
+            <a:r>
+              <a:rPr lang="pl-PL" sz="1400" dirty="0" smtClean="0">
+                <a:latin typeface="Arial" pitchFamily="34" charset="0"/>
+              </a:rPr>
+              <a:t> city </a:t>
+            </a:r>
+            <a:r>
+              <a:rPr lang="pl-PL" sz="1400" dirty="0" err="1" smtClean="0">
+                <a:latin typeface="Arial" pitchFamily="34" charset="0"/>
+              </a:rPr>
+              <a:t>differs</a:t>
+            </a:r>
+            <a:r>
+              <a:rPr lang="pl-PL" sz="1400" dirty="0" smtClean="0">
+                <a:latin typeface="Arial" pitchFamily="34" charset="0"/>
+              </a:rPr>
+              <a:t> </a:t>
+            </a:r>
+            <a:r>
+              <a:rPr lang="pl-PL" sz="1400" dirty="0" err="1" smtClean="0">
+                <a:latin typeface="Arial" pitchFamily="34" charset="0"/>
+              </a:rPr>
+              <a:t>the</a:t>
+            </a:r>
+            <a:r>
+              <a:rPr lang="pl-PL" sz="1400" dirty="0" smtClean="0">
+                <a:latin typeface="Arial" pitchFamily="34" charset="0"/>
+              </a:rPr>
+              <a:t> player </a:t>
+            </a:r>
+            <a:r>
+              <a:rPr lang="pl-PL" sz="1400" dirty="0" err="1" smtClean="0">
+                <a:latin typeface="Arial" pitchFamily="34" charset="0"/>
+              </a:rPr>
+              <a:t>is</a:t>
+            </a:r>
+            <a:r>
+              <a:rPr lang="pl-PL" sz="1400" dirty="0" smtClean="0">
+                <a:latin typeface="Arial" pitchFamily="34" charset="0"/>
+              </a:rPr>
+              <a:t> </a:t>
+            </a:r>
+            <a:r>
+              <a:rPr lang="pl-PL" sz="1400" dirty="0" err="1" smtClean="0">
+                <a:latin typeface="Arial" pitchFamily="34" charset="0"/>
+              </a:rPr>
+              <a:t>asked</a:t>
+            </a:r>
+            <a:r>
+              <a:rPr lang="pl-PL" sz="1400" dirty="0" smtClean="0">
+                <a:latin typeface="Arial" pitchFamily="34" charset="0"/>
+              </a:rPr>
+              <a:t> to </a:t>
+            </a:r>
+            <a:r>
+              <a:rPr lang="pl-PL" sz="1400" dirty="0" err="1" smtClean="0">
+                <a:latin typeface="Arial" pitchFamily="34" charset="0"/>
+              </a:rPr>
+              <a:t>pay</a:t>
+            </a:r>
+            <a:r>
+              <a:rPr lang="pl-PL" sz="1400" dirty="0" smtClean="0">
+                <a:latin typeface="Arial" pitchFamily="34" charset="0"/>
+              </a:rPr>
+              <a:t> for </a:t>
+            </a:r>
+            <a:r>
+              <a:rPr lang="pl-PL" sz="1400" dirty="0" err="1" smtClean="0">
+                <a:latin typeface="Arial" pitchFamily="34" charset="0"/>
+              </a:rPr>
+              <a:t>the</a:t>
+            </a:r>
+            <a:r>
+              <a:rPr lang="pl-PL" sz="1400" dirty="0" smtClean="0">
+                <a:latin typeface="Arial" pitchFamily="34" charset="0"/>
+              </a:rPr>
+              <a:t> </a:t>
+            </a:r>
+            <a:r>
+              <a:rPr lang="pl-PL" sz="1400" dirty="0" err="1" smtClean="0">
+                <a:latin typeface="Arial" pitchFamily="34" charset="0"/>
+              </a:rPr>
+              <a:t>change</a:t>
+            </a:r>
+            <a:endParaRPr kumimoji="0" lang="pl-PL" sz="1400" b="0" i="0" u="none" strike="noStrike" cap="none" normalizeH="0" baseline="0" dirty="0" smtClean="0">
+              <a:ln>
+                <a:noFill/>
+              </a:ln>
+              <a:solidFill>
+                <a:schemeClr val="tx1"/>
+              </a:solidFill>
+              <a:effectLst/>
+              <a:latin typeface="Arial" pitchFamily="34" charset="0"/>
+            </a:endParaRPr>
+          </a:p>
+        </p:txBody>
+      </p:sp>
+      <p:sp>
+        <p:nvSpPr>
+          <p:cNvPr id="22" name="Prostokąt 21"/>
+          <p:cNvSpPr/>
+          <p:nvPr/>
+        </p:nvSpPr>
+        <p:spPr bwMode="auto">
+          <a:xfrm>
+            <a:off x="3428992" y="4429132"/>
+            <a:ext cx="5072098" cy="714380"/>
+          </a:xfrm>
+          <a:prstGeom prst="rect">
+            <a:avLst/>
+          </a:prstGeom>
+          <a:solidFill>
+            <a:schemeClr val="accent1"/>
+          </a:solidFill>
+          <a:ln w="9525" cap="flat" cmpd="sng" algn="ctr">
+            <a:solidFill>
+              <a:schemeClr val="tx1"/>
+            </a:solidFill>
+            <a:prstDash val="solid"/>
+            <a:round/>
+            <a:headEnd type="none" w="med" len="med"/>
+            <a:tailEnd type="none" w="med" len="med"/>
+          </a:ln>
+          <a:effectLst/>
+        </p:spPr>
+        <p:txBody>
+          <a:bodyPr vert="horz" wrap="square" lIns="91440" tIns="45720" rIns="91440" bIns="45720" numCol="1" rtlCol="0" anchor="t" anchorCtr="0" compatLnSpc="1">
+            <a:prstTxWarp prst="textNoShape">
+              <a:avLst/>
+            </a:prstTxWarp>
+          </a:bodyPr>
+          <a:lstStyle/>
+          <a:p>
+            <a:pPr marL="0" marR="0" indent="0" algn="ctr" defTabSz="914400" rtl="0" eaLnBrk="0" fontAlgn="base" latinLnBrk="0" hangingPunct="0">
+              <a:lnSpc>
+                <a:spcPct val="100000"/>
+              </a:lnSpc>
+              <a:spcBef>
+                <a:spcPct val="0"/>
+              </a:spcBef>
+              <a:spcAft>
+                <a:spcPct val="0"/>
+              </a:spcAft>
+              <a:buClrTx/>
+              <a:buSzTx/>
+              <a:buFontTx/>
+              <a:buNone/>
+              <a:tabLst/>
+            </a:pPr>
+            <a:r>
+              <a:rPr lang="pl-PL" sz="1400" dirty="0" err="1" smtClean="0">
+                <a:latin typeface="Arial" pitchFamily="34" charset="0"/>
+              </a:rPr>
+              <a:t>If</a:t>
+            </a:r>
+            <a:r>
+              <a:rPr lang="pl-PL" sz="1400" dirty="0" smtClean="0">
+                <a:latin typeface="Arial" pitchFamily="34" charset="0"/>
+              </a:rPr>
+              <a:t> log </a:t>
+            </a:r>
+            <a:r>
+              <a:rPr lang="pl-PL" sz="1400" dirty="0" err="1" smtClean="0">
+                <a:latin typeface="Arial" pitchFamily="34" charset="0"/>
+              </a:rPr>
+              <a:t>in</a:t>
+            </a:r>
+            <a:r>
+              <a:rPr lang="pl-PL" sz="1400" dirty="0" smtClean="0">
+                <a:latin typeface="Arial" pitchFamily="34" charset="0"/>
+              </a:rPr>
+              <a:t> </a:t>
+            </a:r>
+            <a:r>
+              <a:rPr lang="pl-PL" sz="1400" dirty="0" err="1" smtClean="0">
+                <a:latin typeface="Arial" pitchFamily="34" charset="0"/>
+              </a:rPr>
+              <a:t>before</a:t>
+            </a:r>
+            <a:r>
+              <a:rPr lang="pl-PL" sz="1400" dirty="0" smtClean="0">
+                <a:latin typeface="Arial" pitchFamily="34" charset="0"/>
+              </a:rPr>
+              <a:t> </a:t>
+            </a:r>
+            <a:r>
+              <a:rPr lang="pl-PL" sz="1400" dirty="0" err="1" smtClean="0">
+                <a:latin typeface="Arial" pitchFamily="34" charset="0"/>
+              </a:rPr>
+              <a:t>clicking</a:t>
+            </a:r>
+            <a:r>
+              <a:rPr lang="pl-PL" sz="1400" dirty="0" smtClean="0">
+                <a:latin typeface="Arial" pitchFamily="34" charset="0"/>
+              </a:rPr>
+              <a:t>, </a:t>
+            </a:r>
+            <a:r>
+              <a:rPr lang="pl-PL" sz="1400" dirty="0" err="1" smtClean="0">
+                <a:latin typeface="Arial" pitchFamily="34" charset="0"/>
+              </a:rPr>
+              <a:t>the</a:t>
+            </a:r>
+            <a:r>
+              <a:rPr lang="pl-PL" sz="1400" dirty="0" smtClean="0">
+                <a:latin typeface="Arial" pitchFamily="34" charset="0"/>
+              </a:rPr>
+              <a:t> </a:t>
+            </a:r>
+            <a:r>
+              <a:rPr lang="pl-PL" sz="1400" dirty="0" err="1" smtClean="0">
+                <a:latin typeface="Arial" pitchFamily="34" charset="0"/>
+              </a:rPr>
+              <a:t>confirmation</a:t>
+            </a:r>
+            <a:r>
+              <a:rPr lang="pl-PL" sz="1400" dirty="0" smtClean="0">
+                <a:latin typeface="Arial" pitchFamily="34" charset="0"/>
+              </a:rPr>
+              <a:t> link </a:t>
+            </a:r>
+            <a:r>
+              <a:rPr lang="pl-PL" sz="1400" dirty="0" err="1" smtClean="0">
+                <a:latin typeface="Arial" pitchFamily="34" charset="0"/>
+              </a:rPr>
+              <a:t>the</a:t>
+            </a:r>
+            <a:r>
+              <a:rPr lang="pl-PL" sz="1400" dirty="0" smtClean="0">
+                <a:latin typeface="Arial" pitchFamily="34" charset="0"/>
+              </a:rPr>
+              <a:t> </a:t>
+            </a:r>
+            <a:r>
+              <a:rPr lang="pl-PL" sz="1400" dirty="0" err="1" smtClean="0">
+                <a:latin typeface="Arial" pitchFamily="34" charset="0"/>
+              </a:rPr>
+              <a:t>invitation</a:t>
+            </a:r>
+            <a:r>
+              <a:rPr lang="pl-PL" sz="1400" dirty="0" smtClean="0">
+                <a:latin typeface="Arial" pitchFamily="34" charset="0"/>
+              </a:rPr>
+              <a:t> </a:t>
+            </a:r>
+            <a:r>
+              <a:rPr lang="pl-PL" sz="1400" dirty="0" err="1" smtClean="0">
+                <a:latin typeface="Arial" pitchFamily="34" charset="0"/>
+              </a:rPr>
+              <a:t>can</a:t>
+            </a:r>
+            <a:r>
+              <a:rPr lang="pl-PL" sz="1400" dirty="0" smtClean="0">
+                <a:latin typeface="Arial" pitchFamily="34" charset="0"/>
+              </a:rPr>
+              <a:t> be </a:t>
+            </a:r>
+            <a:r>
+              <a:rPr lang="pl-PL" sz="1400" dirty="0" err="1" smtClean="0">
+                <a:latin typeface="Arial" pitchFamily="34" charset="0"/>
+              </a:rPr>
+              <a:t>accepted</a:t>
+            </a:r>
+            <a:r>
+              <a:rPr lang="pl-PL" sz="1400" dirty="0" smtClean="0">
+                <a:latin typeface="Arial" pitchFamily="34" charset="0"/>
+              </a:rPr>
+              <a:t> </a:t>
+            </a:r>
+            <a:r>
+              <a:rPr lang="pl-PL" sz="1400" dirty="0" err="1" smtClean="0">
+                <a:latin typeface="Arial" pitchFamily="34" charset="0"/>
+              </a:rPr>
+              <a:t>from</a:t>
+            </a:r>
+            <a:r>
+              <a:rPr lang="pl-PL" sz="1400" dirty="0" smtClean="0">
+                <a:latin typeface="Arial" pitchFamily="34" charset="0"/>
+              </a:rPr>
+              <a:t> first </a:t>
+            </a:r>
+            <a:r>
+              <a:rPr lang="pl-PL" sz="1400" dirty="0" err="1" smtClean="0">
+                <a:latin typeface="Arial" pitchFamily="34" charset="0"/>
+              </a:rPr>
+              <a:t>logging</a:t>
+            </a:r>
+            <a:r>
+              <a:rPr lang="pl-PL" sz="1400" dirty="0" smtClean="0">
+                <a:latin typeface="Arial" pitchFamily="34" charset="0"/>
+              </a:rPr>
+              <a:t> dialog</a:t>
+            </a:r>
+            <a:endParaRPr kumimoji="0" lang="pl-PL" sz="1400" b="0" i="0" u="none" strike="noStrike" cap="none" normalizeH="0" baseline="0" dirty="0" smtClean="0">
+              <a:ln>
+                <a:noFill/>
+              </a:ln>
+              <a:solidFill>
+                <a:schemeClr val="tx1"/>
+              </a:solidFill>
+              <a:effectLst/>
+              <a:latin typeface="Arial" pitchFamily="34" charset="0"/>
+            </a:endParaRPr>
+          </a:p>
+        </p:txBody>
+      </p:sp>
+    </p:spTree>
+  </p:cSld>
+  <p:clrMapOvr>
+    <a:masterClrMapping/>
+  </p:clrMapOvr>
+</p:sld>
+</file>
+
 <file path=ppt/slides/slide2.xml><?xml version="1.0" encoding="utf-8"?>
 <p:sld xmlns:a="http://schemas.openxmlformats.org/drawingml/2006/main" xmlns:r="http://schemas.openxmlformats.org/officeDocument/2006/relationships" xmlns:p="http://schemas.openxmlformats.org/presentationml/2006/main">
   <p:cSld>
@@ -6872,14 +9685,14 @@
           </a:ln>
           <a:extLst>
             <a:ext uri="{909E8E84-426E-40DD-AFC4-6F175D3DCCD1}">
-              <a14:hiddenFill xmlns:a14="http://schemas.microsoft.com/office/drawing/2010/main" xmlns="">
+              <a14:hiddenFill xmlns="" xmlns:a14="http://schemas.microsoft.com/office/drawing/2010/main">
                 <a:solidFill>
                   <a:srgbClr val="FFFFFF"/>
                 </a:solidFill>
               </a14:hiddenFill>
             </a:ext>
             <a:ext uri="{91240B29-F687-4F45-9708-019B960494DF}">
-              <a14:hiddenLine xmlns:a14="http://schemas.microsoft.com/office/drawing/2010/main" xmlns="" w="9525">
+              <a14:hiddenLine xmlns="" xmlns:a14="http://schemas.microsoft.com/office/drawing/2010/main" w="9525">
                 <a:solidFill>
                   <a:srgbClr val="000000"/>
                 </a:solidFill>
@@ -7623,14 +10436,14 @@
           </a:ln>
           <a:extLst>
             <a:ext uri="{909E8E84-426E-40DD-AFC4-6F175D3DCCD1}">
-              <a14:hiddenFill xmlns:a14="http://schemas.microsoft.com/office/drawing/2010/main" xmlns="">
+              <a14:hiddenFill xmlns="" xmlns:a14="http://schemas.microsoft.com/office/drawing/2010/main">
                 <a:solidFill>
                   <a:srgbClr val="FFFFFF"/>
                 </a:solidFill>
               </a14:hiddenFill>
             </a:ext>
             <a:ext uri="{91240B29-F687-4F45-9708-019B960494DF}">
-              <a14:hiddenLine xmlns:a14="http://schemas.microsoft.com/office/drawing/2010/main" xmlns="" w="9525">
+              <a14:hiddenLine xmlns="" xmlns:a14="http://schemas.microsoft.com/office/drawing/2010/main" w="9525">
                 <a:solidFill>
                   <a:srgbClr val="000000"/>
                 </a:solidFill>
@@ -7715,7 +10528,7 @@
     </p:spTree>
     <p:extLst>
       <p:ext uri="{BB962C8B-B14F-4D97-AF65-F5344CB8AC3E}">
-        <p14:creationId xmlns:p14="http://schemas.microsoft.com/office/powerpoint/2010/main" xmlns="" val="514872292"/>
+        <p14:creationId xmlns="" xmlns:p14="http://schemas.microsoft.com/office/powerpoint/2010/main" val="514872292"/>
       </p:ext>
     </p:extLst>
   </p:cSld>
@@ -7855,14 +10668,14 @@
           </a:ln>
           <a:extLst>
             <a:ext uri="{909E8E84-426E-40DD-AFC4-6F175D3DCCD1}">
-              <a14:hiddenFill xmlns:a14="http://schemas.microsoft.com/office/drawing/2010/main" xmlns="">
+              <a14:hiddenFill xmlns="" xmlns:a14="http://schemas.microsoft.com/office/drawing/2010/main">
                 <a:solidFill>
                   <a:srgbClr val="FFFFFF"/>
                 </a:solidFill>
               </a14:hiddenFill>
             </a:ext>
             <a:ext uri="{91240B29-F687-4F45-9708-019B960494DF}">
-              <a14:hiddenLine xmlns:a14="http://schemas.microsoft.com/office/drawing/2010/main" xmlns="" w="9525">
+              <a14:hiddenLine xmlns="" xmlns:a14="http://schemas.microsoft.com/office/drawing/2010/main" w="9525">
                 <a:solidFill>
                   <a:srgbClr val="000000"/>
                 </a:solidFill>
@@ -9197,7 +12010,7 @@
             </a:duotone>
             <a:extLst>
               <a:ext uri="{BEBA8EAE-BF5A-486C-A8C5-ECC9F3942E4B}">
-                <a14:imgProps xmlns:a14="http://schemas.microsoft.com/office/drawing/2010/main" xmlns="">
+                <a14:imgProps xmlns="" xmlns:a14="http://schemas.microsoft.com/office/drawing/2010/main">
                   <a14:imgLayer r:embed="rId3">
                     <a14:imgEffect>
                       <a14:backgroundRemoval t="0" b="99474" l="0" r="100000"/>
@@ -9206,7 +12019,7 @@
                 </a14:imgProps>
               </a:ext>
               <a:ext uri="{28A0092B-C50C-407E-A947-70E740481C1C}">
-                <a14:useLocalDpi xmlns:a14="http://schemas.microsoft.com/office/drawing/2010/main" xmlns="" val="0"/>
+                <a14:useLocalDpi xmlns="" xmlns:a14="http://schemas.microsoft.com/office/drawing/2010/main" val="0"/>
               </a:ext>
             </a:extLst>
           </a:blip>
@@ -9224,7 +12037,7 @@
           <a:noFill/>
           <a:extLst>
             <a:ext uri="{909E8E84-426E-40DD-AFC4-6F175D3DCCD1}">
-              <a14:hiddenFill xmlns:a14="http://schemas.microsoft.com/office/drawing/2010/main" xmlns="">
+              <a14:hiddenFill xmlns="" xmlns:a14="http://schemas.microsoft.com/office/drawing/2010/main">
                 <a:solidFill>
                   <a:srgbClr val="FFFFFF"/>
                 </a:solidFill>
@@ -9236,7 +12049,7 @@
     </p:spTree>
     <p:extLst>
       <p:ext uri="{BB962C8B-B14F-4D97-AF65-F5344CB8AC3E}">
-        <p14:creationId xmlns:p14="http://schemas.microsoft.com/office/powerpoint/2010/main" xmlns="" val="599510323"/>
+        <p14:creationId xmlns="" xmlns:p14="http://schemas.microsoft.com/office/powerpoint/2010/main" val="599510323"/>
       </p:ext>
     </p:extLst>
   </p:cSld>
@@ -9438,14 +12251,14 @@
           </a:ln>
           <a:extLst>
             <a:ext uri="{909E8E84-426E-40DD-AFC4-6F175D3DCCD1}">
-              <a14:hiddenFill xmlns:a14="http://schemas.microsoft.com/office/drawing/2010/main" xmlns="">
+              <a14:hiddenFill xmlns="" xmlns:a14="http://schemas.microsoft.com/office/drawing/2010/main">
                 <a:solidFill>
                   <a:srgbClr val="FFFFFF"/>
                 </a:solidFill>
               </a14:hiddenFill>
             </a:ext>
             <a:ext uri="{91240B29-F687-4F45-9708-019B960494DF}">
-              <a14:hiddenLine xmlns:a14="http://schemas.microsoft.com/office/drawing/2010/main" xmlns="" w="9525">
+              <a14:hiddenLine xmlns="" xmlns:a14="http://schemas.microsoft.com/office/drawing/2010/main" w="9525">
                 <a:solidFill>
                   <a:srgbClr val="000000"/>
                 </a:solidFill>
@@ -9784,14 +12597,14 @@
           </a:ln>
           <a:extLst>
             <a:ext uri="{909E8E84-426E-40DD-AFC4-6F175D3DCCD1}">
-              <a14:hiddenFill xmlns:a14="http://schemas.microsoft.com/office/drawing/2010/main" xmlns="">
+              <a14:hiddenFill xmlns="" xmlns:a14="http://schemas.microsoft.com/office/drawing/2010/main">
                 <a:solidFill>
                   <a:srgbClr val="FFFFFF"/>
                 </a:solidFill>
               </a14:hiddenFill>
             </a:ext>
             <a:ext uri="{91240B29-F687-4F45-9708-019B960494DF}">
-              <a14:hiddenLine xmlns:a14="http://schemas.microsoft.com/office/drawing/2010/main" xmlns="" w="9525">
+              <a14:hiddenLine xmlns="" xmlns:a14="http://schemas.microsoft.com/office/drawing/2010/main" w="9525">
                 <a:solidFill>
                   <a:srgbClr val="000000"/>
                 </a:solidFill>
@@ -10155,14 +12968,14 @@
           </a:ln>
           <a:extLst>
             <a:ext uri="{909E8E84-426E-40DD-AFC4-6F175D3DCCD1}">
-              <a14:hiddenFill xmlns:a14="http://schemas.microsoft.com/office/drawing/2010/main" xmlns="">
+              <a14:hiddenFill xmlns="" xmlns:a14="http://schemas.microsoft.com/office/drawing/2010/main">
                 <a:solidFill>
                   <a:srgbClr val="FFFFFF"/>
                 </a:solidFill>
               </a14:hiddenFill>
             </a:ext>
             <a:ext uri="{91240B29-F687-4F45-9708-019B960494DF}">
-              <a14:hiddenLine xmlns:a14="http://schemas.microsoft.com/office/drawing/2010/main" xmlns="" w="9525">
+              <a14:hiddenLine xmlns="" xmlns:a14="http://schemas.microsoft.com/office/drawing/2010/main" w="9525">
                 <a:solidFill>
                   <a:srgbClr val="000000"/>
                 </a:solidFill>
@@ -10337,7 +13150,7 @@
     </p:spTree>
     <p:extLst>
       <p:ext uri="{BB962C8B-B14F-4D97-AF65-F5344CB8AC3E}">
-        <p14:creationId xmlns:p14="http://schemas.microsoft.com/office/powerpoint/2010/main" xmlns="" val="1759617674"/>
+        <p14:creationId xmlns="" xmlns:p14="http://schemas.microsoft.com/office/powerpoint/2010/main" val="1759617674"/>
       </p:ext>
     </p:extLst>
   </p:cSld>
@@ -10446,15 +13259,7 @@
                   <a:schemeClr val="bg1"/>
                 </a:solidFill>
               </a:rPr>
-              <a:t>Technology </a:t>
-            </a:r>
-            <a:r>
-              <a:rPr lang="de-DE" smtClean="0">
-                <a:solidFill>
-                  <a:schemeClr val="bg1"/>
-                </a:solidFill>
-              </a:rPr>
-              <a:t>Stack 1/3</a:t>
+              <a:t>Technology Stack 1/3</a:t>
             </a:r>
             <a:endParaRPr lang="pl-PL" dirty="0">
               <a:solidFill>
@@ -11526,20 +14331,6 @@
               </a:rPr>
               <a:t>WebSocket</a:t>
             </a:r>
-            <a:endParaRPr lang="de-DE" sz="2000" smtClean="0">
-              <a:solidFill>
-                <a:srgbClr val="FF9900"/>
-              </a:solidFill>
-              <a:effectLst>
-                <a:outerShdw blurRad="50800" dist="50800" dir="5400000" algn="t" rotWithShape="0">
-                  <a:schemeClr val="tx1">
-                    <a:alpha val="50000"/>
-                  </a:schemeClr>
-                </a:outerShdw>
-              </a:effectLst>
-              <a:ea typeface="ＭＳ Ｐゴシック" pitchFamily="-65" charset="-128"/>
-              <a:cs typeface="ＭＳ Ｐゴシック" pitchFamily="18" charset="-128"/>
-            </a:endParaRPr>
           </a:p>
         </p:txBody>
       </p:sp>
@@ -11738,7 +14529,7 @@
     </p:spTree>
     <p:extLst>
       <p:ext uri="{BB962C8B-B14F-4D97-AF65-F5344CB8AC3E}">
-        <p14:creationId xmlns:p14="http://schemas.microsoft.com/office/powerpoint/2010/main" xmlns="" val="1759617674"/>
+        <p14:creationId xmlns="" xmlns:p14="http://schemas.microsoft.com/office/powerpoint/2010/main" val="1759617674"/>
       </p:ext>
     </p:extLst>
   </p:cSld>
@@ -11847,15 +14638,7 @@
                   <a:schemeClr val="bg1"/>
                 </a:solidFill>
               </a:rPr>
-              <a:t>Technology </a:t>
-            </a:r>
-            <a:r>
-              <a:rPr lang="de-DE" smtClean="0">
-                <a:solidFill>
-                  <a:schemeClr val="bg1"/>
-                </a:solidFill>
-              </a:rPr>
-              <a:t>Stack 2/3</a:t>
+              <a:t>Technology Stack 2/3</a:t>
             </a:r>
             <a:endParaRPr lang="pl-PL" dirty="0">
               <a:solidFill>
@@ -11973,14 +14756,14 @@
           </a:ln>
           <a:extLst>
             <a:ext uri="{909E8E84-426E-40DD-AFC4-6F175D3DCCD1}">
-              <a14:hiddenFill xmlns:a14="http://schemas.microsoft.com/office/drawing/2010/main" xmlns="">
+              <a14:hiddenFill xmlns="" xmlns:a14="http://schemas.microsoft.com/office/drawing/2010/main">
                 <a:solidFill>
                   <a:srgbClr val="FFFFFF"/>
                 </a:solidFill>
               </a14:hiddenFill>
             </a:ext>
             <a:ext uri="{91240B29-F687-4F45-9708-019B960494DF}">
-              <a14:hiddenLine xmlns:a14="http://schemas.microsoft.com/office/drawing/2010/main" xmlns="" w="9525">
+              <a14:hiddenLine xmlns="" xmlns:a14="http://schemas.microsoft.com/office/drawing/2010/main" w="9525">
                 <a:solidFill>
                   <a:srgbClr val="000000"/>
                 </a:solidFill>
@@ -12257,7 +15040,7 @@
     </p:spTree>
     <p:extLst>
       <p:ext uri="{BB962C8B-B14F-4D97-AF65-F5344CB8AC3E}">
-        <p14:creationId xmlns:p14="http://schemas.microsoft.com/office/powerpoint/2010/main" xmlns="" val="1759617674"/>
+        <p14:creationId xmlns="" xmlns:p14="http://schemas.microsoft.com/office/powerpoint/2010/main" val="1759617674"/>
       </p:ext>
     </p:extLst>
   </p:cSld>
@@ -12366,15 +15149,7 @@
                   <a:schemeClr val="bg1"/>
                 </a:solidFill>
               </a:rPr>
-              <a:t>Technology </a:t>
-            </a:r>
-            <a:r>
-              <a:rPr lang="de-DE" smtClean="0">
-                <a:solidFill>
-                  <a:schemeClr val="bg1"/>
-                </a:solidFill>
-              </a:rPr>
-              <a:t>Stack 3/3</a:t>
+              <a:t>Technology Stack 3/3</a:t>
             </a:r>
             <a:endParaRPr lang="pl-PL" dirty="0">
               <a:solidFill>
@@ -12492,14 +15267,14 @@
           </a:ln>
           <a:extLst>
             <a:ext uri="{909E8E84-426E-40DD-AFC4-6F175D3DCCD1}">
-              <a14:hiddenFill xmlns:a14="http://schemas.microsoft.com/office/drawing/2010/main" xmlns="">
+              <a14:hiddenFill xmlns="" xmlns:a14="http://schemas.microsoft.com/office/drawing/2010/main">
                 <a:solidFill>
                   <a:srgbClr val="FFFFFF"/>
                 </a:solidFill>
               </a14:hiddenFill>
             </a:ext>
             <a:ext uri="{91240B29-F687-4F45-9708-019B960494DF}">
-              <a14:hiddenLine xmlns:a14="http://schemas.microsoft.com/office/drawing/2010/main" xmlns="" w="9525">
+              <a14:hiddenLine xmlns="" xmlns:a14="http://schemas.microsoft.com/office/drawing/2010/main" w="9525">
                 <a:solidFill>
                   <a:srgbClr val="000000"/>
                 </a:solidFill>
@@ -12637,11 +15412,7 @@
             </a:pPr>
             <a:r>
               <a:rPr lang="en-US" smtClean="0"/>
-              <a:t>jQueryUI</a:t>
-            </a:r>
-            <a:r>
-              <a:rPr lang="en-US" smtClean="0"/>
-              <a:t>: JavaScript </a:t>
+              <a:t>jQueryUI: JavaScript </a:t>
             </a:r>
             <a:r>
               <a:rPr lang="en-US" smtClean="0">
@@ -12676,11 +15447,7 @@
             </a:r>
             <a:r>
               <a:rPr lang="en-US" smtClean="0"/>
-              <a:t> for </a:t>
-            </a:r>
-            <a:r>
-              <a:rPr lang="en-US" smtClean="0"/>
-              <a:t>Bootstrap</a:t>
+              <a:t> for Bootstrap</a:t>
             </a:r>
           </a:p>
           <a:p>
@@ -12705,7 +15472,6 @@
               <a:rPr lang="en-US" smtClean="0"/>
               <a:t> from the browser</a:t>
             </a:r>
-            <a:endParaRPr lang="en-US" smtClean="0"/>
           </a:p>
           <a:p>
             <a:pPr>
@@ -12759,7 +15525,7 @@
     </p:spTree>
     <p:extLst>
       <p:ext uri="{BB962C8B-B14F-4D97-AF65-F5344CB8AC3E}">
-        <p14:creationId xmlns:p14="http://schemas.microsoft.com/office/powerpoint/2010/main" xmlns="" val="1759617674"/>
+        <p14:creationId xmlns="" xmlns:p14="http://schemas.microsoft.com/office/powerpoint/2010/main" val="1759617674"/>
       </p:ext>
     </p:extLst>
   </p:cSld>
@@ -13791,14 +16557,14 @@
           </a:ln>
           <a:extLst>
             <a:ext uri="{909E8E84-426E-40DD-AFC4-6F175D3DCCD1}">
-              <a14:hiddenFill xmlns:a14="http://schemas.microsoft.com/office/drawing/2010/main" xmlns="">
+              <a14:hiddenFill xmlns="" xmlns:a14="http://schemas.microsoft.com/office/drawing/2010/main">
                 <a:solidFill>
                   <a:srgbClr val="FFFFFF"/>
                 </a:solidFill>
               </a14:hiddenFill>
             </a:ext>
             <a:ext uri="{91240B29-F687-4F45-9708-019B960494DF}">
-              <a14:hiddenLine xmlns:a14="http://schemas.microsoft.com/office/drawing/2010/main" xmlns="" w="9525">
+              <a14:hiddenLine xmlns="" xmlns:a14="http://schemas.microsoft.com/office/drawing/2010/main" w="9525">
                 <a:solidFill>
                   <a:srgbClr val="000000"/>
                 </a:solidFill>
@@ -14042,7 +16808,7 @@
     </p:spTree>
     <p:extLst>
       <p:ext uri="{BB962C8B-B14F-4D97-AF65-F5344CB8AC3E}">
-        <p14:creationId xmlns:p14="http://schemas.microsoft.com/office/powerpoint/2010/main" xmlns="" val="1759617674"/>
+        <p14:creationId xmlns="" xmlns:p14="http://schemas.microsoft.com/office/powerpoint/2010/main" val="1759617674"/>
       </p:ext>
     </p:extLst>
   </p:cSld>
@@ -14485,14 +17251,14 @@
           </a:ln>
           <a:extLst>
             <a:ext uri="{909E8E84-426E-40DD-AFC4-6F175D3DCCD1}">
-              <a14:hiddenFill xmlns:a14="http://schemas.microsoft.com/office/drawing/2010/main" xmlns="">
+              <a14:hiddenFill xmlns="" xmlns:a14="http://schemas.microsoft.com/office/drawing/2010/main">
                 <a:solidFill>
                   <a:srgbClr val="FFFFFF"/>
                 </a:solidFill>
               </a14:hiddenFill>
             </a:ext>
             <a:ext uri="{91240B29-F687-4F45-9708-019B960494DF}">
-              <a14:hiddenLine xmlns:a14="http://schemas.microsoft.com/office/drawing/2010/main" xmlns="" w="9525">
+              <a14:hiddenLine xmlns="" xmlns:a14="http://schemas.microsoft.com/office/drawing/2010/main" w="9525">
                 <a:solidFill>
                   <a:srgbClr val="000000"/>
                 </a:solidFill>
@@ -15370,14 +18136,14 @@
           </a:ln>
           <a:extLst>
             <a:ext uri="{909E8E84-426E-40DD-AFC4-6F175D3DCCD1}">
-              <a14:hiddenFill xmlns:a14="http://schemas.microsoft.com/office/drawing/2010/main" xmlns="">
+              <a14:hiddenFill xmlns="" xmlns:a14="http://schemas.microsoft.com/office/drawing/2010/main">
                 <a:solidFill>
                   <a:srgbClr val="FFFFFF"/>
                 </a:solidFill>
               </a14:hiddenFill>
             </a:ext>
             <a:ext uri="{91240B29-F687-4F45-9708-019B960494DF}">
-              <a14:hiddenLine xmlns:a14="http://schemas.microsoft.com/office/drawing/2010/main" xmlns="" w="9525">
+              <a14:hiddenLine xmlns="" xmlns:a14="http://schemas.microsoft.com/office/drawing/2010/main" w="9525">
                 <a:solidFill>
                   <a:srgbClr val="000000"/>
                 </a:solidFill>
@@ -15846,7 +18612,7 @@
     </p:spTree>
     <p:extLst>
       <p:ext uri="{BB962C8B-B14F-4D97-AF65-F5344CB8AC3E}">
-        <p14:creationId xmlns:p14="http://schemas.microsoft.com/office/powerpoint/2010/main" xmlns="" val="1759617674"/>
+        <p14:creationId xmlns="" xmlns:p14="http://schemas.microsoft.com/office/powerpoint/2010/main" val="1759617674"/>
       </p:ext>
     </p:extLst>
   </p:cSld>

</xml_diff>

<commit_message>
Screenshot + small changes in the presentation
</commit_message>
<xml_diff>
--- a/docs/group4_Final_Presentation.pptx
+++ b/docs/group4_Final_Presentation.pptx
@@ -5,10 +5,10 @@
     <p:sldMasterId id="2147483660" r:id="rId1"/>
   </p:sldMasterIdLst>
   <p:notesMasterIdLst>
-    <p:notesMasterId r:id="rId17"/>
+    <p:notesMasterId r:id="rId18"/>
   </p:notesMasterIdLst>
   <p:handoutMasterIdLst>
-    <p:handoutMasterId r:id="rId18"/>
+    <p:handoutMasterId r:id="rId19"/>
   </p:handoutMasterIdLst>
   <p:sldIdLst>
     <p:sldId id="256" r:id="rId2"/>
@@ -21,11 +21,12 @@
     <p:sldId id="287" r:id="rId9"/>
     <p:sldId id="288" r:id="rId10"/>
     <p:sldId id="290" r:id="rId11"/>
-    <p:sldId id="289" r:id="rId12"/>
-    <p:sldId id="263" r:id="rId13"/>
-    <p:sldId id="284" r:id="rId14"/>
-    <p:sldId id="292" r:id="rId15"/>
-    <p:sldId id="293" r:id="rId16"/>
+    <p:sldId id="294" r:id="rId12"/>
+    <p:sldId id="289" r:id="rId13"/>
+    <p:sldId id="263" r:id="rId14"/>
+    <p:sldId id="284" r:id="rId15"/>
+    <p:sldId id="292" r:id="rId16"/>
+    <p:sldId id="293" r:id="rId17"/>
   </p:sldIdLst>
   <p:sldSz cx="9144000" cy="6858000" type="screen4x3"/>
   <p:notesSz cx="6858000" cy="9144000"/>
@@ -3376,6 +3377,177 @@
       </p:grpSpPr>
       <p:sp>
         <p:nvSpPr>
+          <p:cNvPr id="2" name="Tytuł 1"/>
+          <p:cNvSpPr>
+            <a:spLocks noGrp="1"/>
+          </p:cNvSpPr>
+          <p:nvPr>
+            <p:ph type="title"/>
+          </p:nvPr>
+        </p:nvSpPr>
+        <p:spPr/>
+        <p:txBody>
+          <a:bodyPr/>
+          <a:lstStyle/>
+          <a:p>
+            <a:r>
+              <a:rPr lang="pl-PL" dirty="0" err="1" smtClean="0"/>
+              <a:t>Main</a:t>
+            </a:r>
+            <a:r>
+              <a:rPr lang="pl-PL" dirty="0" smtClean="0"/>
+              <a:t> </a:t>
+            </a:r>
+            <a:r>
+              <a:rPr lang="pl-PL" dirty="0" err="1" smtClean="0"/>
+              <a:t>window</a:t>
+            </a:r>
+            <a:endParaRPr lang="pl-PL" dirty="0"/>
+          </a:p>
+        </p:txBody>
+      </p:sp>
+      <p:sp>
+        <p:nvSpPr>
+          <p:cNvPr id="3" name="Symbol zastępczy zawartości 2"/>
+          <p:cNvSpPr>
+            <a:spLocks noGrp="1"/>
+          </p:cNvSpPr>
+          <p:nvPr>
+            <p:ph idx="1"/>
+          </p:nvPr>
+        </p:nvSpPr>
+        <p:spPr/>
+        <p:txBody>
+          <a:bodyPr/>
+          <a:lstStyle/>
+          <a:p>
+            <a:endParaRPr lang="pl-PL" dirty="0"/>
+          </a:p>
+        </p:txBody>
+      </p:sp>
+      <p:sp>
+        <p:nvSpPr>
+          <p:cNvPr id="4" name="Symbol zastępczy daty 3"/>
+          <p:cNvSpPr>
+            <a:spLocks noGrp="1"/>
+          </p:cNvSpPr>
+          <p:nvPr>
+            <p:ph type="dt" sz="half" idx="10"/>
+          </p:nvPr>
+        </p:nvSpPr>
+        <p:spPr/>
+        <p:txBody>
+          <a:bodyPr/>
+          <a:lstStyle/>
+          <a:p>
+            <a:r>
+              <a:rPr lang="de-DE" smtClean="0"/>
+              <a:t>25.02.2013</a:t>
+            </a:r>
+            <a:endParaRPr lang="de-DE" dirty="0"/>
+          </a:p>
+        </p:txBody>
+      </p:sp>
+      <p:sp>
+        <p:nvSpPr>
+          <p:cNvPr id="5" name="Symbol zastępczy stopki 4"/>
+          <p:cNvSpPr>
+            <a:spLocks noGrp="1"/>
+          </p:cNvSpPr>
+          <p:nvPr>
+            <p:ph type="ftr" sz="quarter" idx="11"/>
+          </p:nvPr>
+        </p:nvSpPr>
+        <p:spPr/>
+        <p:txBody>
+          <a:bodyPr/>
+          <a:lstStyle/>
+          <a:p>
+            <a:r>
+              <a:rPr lang="de-DE" smtClean="0"/>
+              <a:t>Master Lab Course Web Applications</a:t>
+            </a:r>
+            <a:endParaRPr lang="de-DE" dirty="0"/>
+          </a:p>
+        </p:txBody>
+      </p:sp>
+      <p:sp>
+        <p:nvSpPr>
+          <p:cNvPr id="6" name="Symbol zastępczy numeru slajdu 5"/>
+          <p:cNvSpPr>
+            <a:spLocks noGrp="1"/>
+          </p:cNvSpPr>
+          <p:nvPr>
+            <p:ph type="sldNum" sz="quarter" idx="12"/>
+          </p:nvPr>
+        </p:nvSpPr>
+        <p:spPr/>
+        <p:txBody>
+          <a:bodyPr/>
+          <a:lstStyle/>
+          <a:p>
+            <a:fld id="{121E5A8C-2088-45D2-9D84-10B3EA412A4C}" type="slidenum">
+              <a:rPr lang="de-DE" smtClean="0"/>
+              <a:pPr/>
+              <a:t>11</a:t>
+            </a:fld>
+            <a:endParaRPr lang="de-DE" dirty="0"/>
+          </a:p>
+        </p:txBody>
+      </p:sp>
+      <p:pic>
+        <p:nvPicPr>
+          <p:cNvPr id="2050" name="Picture 2" descr="E:\Studia\webapp2\docs\Screenshot_MainWindow.PNG"/>
+          <p:cNvPicPr>
+            <a:picLocks noChangeAspect="1" noChangeArrowheads="1"/>
+          </p:cNvPicPr>
+          <p:nvPr/>
+        </p:nvPicPr>
+        <p:blipFill>
+          <a:blip r:embed="rId2" cstate="print"/>
+          <a:srcRect/>
+          <a:stretch>
+            <a:fillRect/>
+          </a:stretch>
+        </p:blipFill>
+        <p:spPr bwMode="auto">
+          <a:xfrm>
+            <a:off x="71406" y="1571612"/>
+            <a:ext cx="8929750" cy="4621867"/>
+          </a:xfrm>
+          <a:prstGeom prst="rect">
+            <a:avLst/>
+          </a:prstGeom>
+          <a:noFill/>
+        </p:spPr>
+      </p:pic>
+    </p:spTree>
+  </p:cSld>
+  <p:clrMapOvr>
+    <a:masterClrMapping/>
+  </p:clrMapOvr>
+</p:sld>
+</file>
+
+<file path=ppt/slides/slide12.xml><?xml version="1.0" encoding="utf-8"?>
+<p:sld xmlns:a="http://schemas.openxmlformats.org/drawingml/2006/main" xmlns:r="http://schemas.openxmlformats.org/officeDocument/2006/relationships" xmlns:p="http://schemas.openxmlformats.org/presentationml/2006/main">
+  <p:cSld>
+    <p:spTree>
+      <p:nvGrpSpPr>
+        <p:cNvPr id="1" name=""/>
+        <p:cNvGrpSpPr/>
+        <p:nvPr/>
+      </p:nvGrpSpPr>
+      <p:grpSpPr>
+        <a:xfrm>
+          <a:off x="0" y="0"/>
+          <a:ext cx="0" cy="0"/>
+          <a:chOff x="0" y="0"/>
+          <a:chExt cx="0" cy="0"/>
+        </a:xfrm>
+      </p:grpSpPr>
+      <p:sp>
+        <p:nvSpPr>
           <p:cNvPr id="2" name="Titel 1"/>
           <p:cNvSpPr>
             <a:spLocks noGrp="1"/>
@@ -4777,7 +4949,7 @@
             <a:fld id="{121E5A8C-2088-45D2-9D84-10B3EA412A4C}" type="slidenum">
               <a:rPr lang="de-DE" smtClean="0"/>
               <a:pPr/>
-              <a:t>11</a:t>
+              <a:t>12</a:t>
             </a:fld>
             <a:endParaRPr lang="de-DE" dirty="0"/>
           </a:p>
@@ -4830,648 +5002,6 @@
         <p14:creationId xmlns="" xmlns:p14="http://schemas.microsoft.com/office/powerpoint/2010/main" val="183408080"/>
       </p:ext>
     </p:extLst>
-  </p:cSld>
-  <p:clrMapOvr>
-    <a:masterClrMapping/>
-  </p:clrMapOvr>
-  <p:timing>
-    <p:tnLst>
-      <p:par>
-        <p:cTn id="1" dur="indefinite" restart="never" nodeType="tmRoot"/>
-      </p:par>
-    </p:tnLst>
-  </p:timing>
-</p:sld>
-</file>
-
-<file path=ppt/slides/slide12.xml><?xml version="1.0" encoding="utf-8"?>
-<p:sld xmlns:a="http://schemas.openxmlformats.org/drawingml/2006/main" xmlns:r="http://schemas.openxmlformats.org/officeDocument/2006/relationships" xmlns:p="http://schemas.openxmlformats.org/presentationml/2006/main">
-  <p:cSld>
-    <p:spTree>
-      <p:nvGrpSpPr>
-        <p:cNvPr id="1" name=""/>
-        <p:cNvGrpSpPr/>
-        <p:nvPr/>
-      </p:nvGrpSpPr>
-      <p:grpSpPr>
-        <a:xfrm>
-          <a:off x="0" y="0"/>
-          <a:ext cx="0" cy="0"/>
-          <a:chOff x="0" y="0"/>
-          <a:chExt cx="0" cy="0"/>
-        </a:xfrm>
-      </p:grpSpPr>
-      <p:sp>
-        <p:nvSpPr>
-          <p:cNvPr id="2" name="Tytuł 1"/>
-          <p:cNvSpPr>
-            <a:spLocks noGrp="1"/>
-          </p:cNvSpPr>
-          <p:nvPr>
-            <p:ph type="title"/>
-          </p:nvPr>
-        </p:nvSpPr>
-        <p:spPr>
-          <a:xfrm>
-            <a:off x="508000" y="914400"/>
-            <a:ext cx="7993090" cy="585774"/>
-          </a:xfrm>
-        </p:spPr>
-        <p:txBody>
-          <a:bodyPr/>
-          <a:lstStyle/>
-          <a:p>
-            <a:r>
-              <a:rPr lang="de-DE" dirty="0" err="1" smtClean="0">
-                <a:solidFill>
-                  <a:schemeClr val="bg1"/>
-                </a:solidFill>
-              </a:rPr>
-              <a:t>Deploying</a:t>
-            </a:r>
-            <a:r>
-              <a:rPr lang="de-DE" dirty="0" smtClean="0">
-                <a:solidFill>
-                  <a:schemeClr val="bg1"/>
-                </a:solidFill>
-              </a:rPr>
-              <a:t> Units</a:t>
-            </a:r>
-            <a:endParaRPr lang="pl-PL" dirty="0">
-              <a:solidFill>
-                <a:schemeClr val="bg1"/>
-              </a:solidFill>
-            </a:endParaRPr>
-          </a:p>
-        </p:txBody>
-      </p:sp>
-      <p:sp>
-        <p:nvSpPr>
-          <p:cNvPr id="5" name="Symbol zastępczy stopki 4"/>
-          <p:cNvSpPr>
-            <a:spLocks noGrp="1"/>
-          </p:cNvSpPr>
-          <p:nvPr>
-            <p:ph type="ftr" sz="quarter" idx="11"/>
-          </p:nvPr>
-        </p:nvSpPr>
-        <p:spPr/>
-        <p:txBody>
-          <a:bodyPr/>
-          <a:lstStyle/>
-          <a:p>
-            <a:r>
-              <a:rPr lang="de-DE" smtClean="0"/>
-              <a:t>Master Lab Course Web Applications</a:t>
-            </a:r>
-            <a:endParaRPr lang="de-DE" dirty="0"/>
-          </a:p>
-        </p:txBody>
-      </p:sp>
-      <p:sp>
-        <p:nvSpPr>
-          <p:cNvPr id="6" name="Symbol zastępczy numeru slajdu 5"/>
-          <p:cNvSpPr>
-            <a:spLocks noGrp="1"/>
-          </p:cNvSpPr>
-          <p:nvPr>
-            <p:ph type="sldNum" sz="quarter" idx="12"/>
-          </p:nvPr>
-        </p:nvSpPr>
-        <p:spPr/>
-        <p:txBody>
-          <a:bodyPr/>
-          <a:lstStyle/>
-          <a:p>
-            <a:fld id="{121E5A8C-2088-45D2-9D84-10B3EA412A4C}" type="slidenum">
-              <a:rPr lang="de-DE" smtClean="0"/>
-              <a:pPr/>
-              <a:t>12</a:t>
-            </a:fld>
-            <a:endParaRPr lang="de-DE" dirty="0"/>
-          </a:p>
-        </p:txBody>
-      </p:sp>
-      <p:sp>
-        <p:nvSpPr>
-          <p:cNvPr id="8" name="Symbol zastępczy daty 3"/>
-          <p:cNvSpPr>
-            <a:spLocks noGrp="1"/>
-          </p:cNvSpPr>
-          <p:nvPr>
-            <p:ph type="dt" sz="half" idx="10"/>
-          </p:nvPr>
-        </p:nvSpPr>
-        <p:spPr>
-          <a:xfrm>
-            <a:off x="508000" y="6400800"/>
-            <a:ext cx="1905000" cy="304800"/>
-          </a:xfrm>
-        </p:spPr>
-        <p:txBody>
-          <a:bodyPr/>
-          <a:lstStyle/>
-          <a:p>
-            <a:r>
-              <a:rPr lang="de-DE" smtClean="0"/>
-              <a:t>25.02.2013</a:t>
-            </a:r>
-            <a:endParaRPr lang="de-DE" dirty="0"/>
-          </a:p>
-        </p:txBody>
-      </p:sp>
-      <p:pic>
-        <p:nvPicPr>
-          <p:cNvPr id="7170" name="Picture 2"/>
-          <p:cNvPicPr>
-            <a:picLocks noChangeAspect="1" noChangeArrowheads="1"/>
-          </p:cNvPicPr>
-          <p:nvPr/>
-        </p:nvPicPr>
-        <p:blipFill>
-          <a:blip r:embed="rId2" cstate="print">
-            <a:extLst>
-              <a:ext uri="{28A0092B-C50C-407E-A947-70E740481C1C}">
-                <a14:useLocalDpi xmlns="" xmlns:a14="http://schemas.microsoft.com/office/drawing/2010/main" val="0"/>
-              </a:ext>
-            </a:extLst>
-          </a:blip>
-          <a:srcRect/>
-          <a:stretch>
-            <a:fillRect/>
-          </a:stretch>
-        </p:blipFill>
-        <p:spPr bwMode="auto">
-          <a:xfrm>
-            <a:off x="323528" y="3142439"/>
-            <a:ext cx="4824536" cy="3094526"/>
-          </a:xfrm>
-          <a:prstGeom prst="rect">
-            <a:avLst/>
-          </a:prstGeom>
-          <a:ln>
-            <a:noFill/>
-          </a:ln>
-          <a:effectLst>
-            <a:softEdge rad="112500"/>
-          </a:effectLst>
-          <a:extLst>
-            <a:ext uri="{909E8E84-426E-40DD-AFC4-6F175D3DCCD1}">
-              <a14:hiddenFill xmlns="" xmlns:a14="http://schemas.microsoft.com/office/drawing/2010/main">
-                <a:solidFill>
-                  <a:schemeClr val="accent1"/>
-                </a:solidFill>
-              </a14:hiddenFill>
-            </a:ext>
-            <a:ext uri="{91240B29-F687-4F45-9708-019B960494DF}">
-              <a14:hiddenLine xmlns="" xmlns:a14="http://schemas.microsoft.com/office/drawing/2010/main" w="9525">
-                <a:solidFill>
-                  <a:schemeClr val="tx1"/>
-                </a:solidFill>
-                <a:miter lim="800000"/>
-                <a:headEnd/>
-                <a:tailEnd/>
-              </a14:hiddenLine>
-            </a:ext>
-            <a:ext uri="{AF507438-7753-43E0-B8FC-AC1667EBCBE1}">
-              <a14:hiddenEffects xmlns="" xmlns:a14="http://schemas.microsoft.com/office/drawing/2010/main">
-                <a:effectLst>
-                  <a:outerShdw dist="35921" dir="2700000" algn="ctr" rotWithShape="0">
-                    <a:schemeClr val="bg2"/>
-                  </a:outerShdw>
-                </a:effectLst>
-              </a14:hiddenEffects>
-            </a:ext>
-          </a:extLst>
-        </p:spPr>
-      </p:pic>
-      <p:pic>
-        <p:nvPicPr>
-          <p:cNvPr id="7171" name="Picture 3"/>
-          <p:cNvPicPr>
-            <a:picLocks noChangeAspect="1" noChangeArrowheads="1"/>
-          </p:cNvPicPr>
-          <p:nvPr/>
-        </p:nvPicPr>
-        <p:blipFill>
-          <a:blip r:embed="rId3" cstate="print">
-            <a:extLst>
-              <a:ext uri="{28A0092B-C50C-407E-A947-70E740481C1C}">
-                <a14:useLocalDpi xmlns="" xmlns:a14="http://schemas.microsoft.com/office/drawing/2010/main" val="0"/>
-              </a:ext>
-            </a:extLst>
-          </a:blip>
-          <a:srcRect/>
-          <a:stretch>
-            <a:fillRect/>
-          </a:stretch>
-        </p:blipFill>
-        <p:spPr bwMode="auto">
-          <a:xfrm>
-            <a:off x="5277417" y="3142439"/>
-            <a:ext cx="3458149" cy="3113973"/>
-          </a:xfrm>
-          <a:prstGeom prst="rect">
-            <a:avLst/>
-          </a:prstGeom>
-          <a:ln>
-            <a:noFill/>
-          </a:ln>
-          <a:effectLst>
-            <a:softEdge rad="112500"/>
-          </a:effectLst>
-          <a:extLst>
-            <a:ext uri="{909E8E84-426E-40DD-AFC4-6F175D3DCCD1}">
-              <a14:hiddenFill xmlns="" xmlns:a14="http://schemas.microsoft.com/office/drawing/2010/main">
-                <a:solidFill>
-                  <a:schemeClr val="accent1"/>
-                </a:solidFill>
-              </a14:hiddenFill>
-            </a:ext>
-            <a:ext uri="{91240B29-F687-4F45-9708-019B960494DF}">
-              <a14:hiddenLine xmlns="" xmlns:a14="http://schemas.microsoft.com/office/drawing/2010/main" w="9525">
-                <a:solidFill>
-                  <a:schemeClr val="tx1"/>
-                </a:solidFill>
-                <a:miter lim="800000"/>
-                <a:headEnd/>
-                <a:tailEnd/>
-              </a14:hiddenLine>
-            </a:ext>
-            <a:ext uri="{AF507438-7753-43E0-B8FC-AC1667EBCBE1}">
-              <a14:hiddenEffects xmlns="" xmlns:a14="http://schemas.microsoft.com/office/drawing/2010/main">
-                <a:effectLst>
-                  <a:outerShdw dist="35921" dir="2700000" algn="ctr" rotWithShape="0">
-                    <a:schemeClr val="bg2"/>
-                  </a:outerShdw>
-                </a:effectLst>
-              </a14:hiddenEffects>
-            </a:ext>
-          </a:extLst>
-        </p:spPr>
-      </p:pic>
-      <p:sp>
-        <p:nvSpPr>
-          <p:cNvPr id="9" name="Rounded Rectangle 8"/>
-          <p:cNvSpPr/>
-          <p:nvPr/>
-        </p:nvSpPr>
-        <p:spPr bwMode="auto">
-          <a:xfrm>
-            <a:off x="395536" y="1556792"/>
-            <a:ext cx="8136904" cy="1513639"/>
-          </a:xfrm>
-          <a:prstGeom prst="roundRect">
-            <a:avLst>
-              <a:gd name="adj" fmla="val 13985"/>
-            </a:avLst>
-          </a:prstGeom>
-          <a:solidFill>
-            <a:srgbClr val="292929"/>
-          </a:solidFill>
-          <a:ln w="9525" cap="flat" cmpd="sng" algn="ctr">
-            <a:noFill/>
-            <a:prstDash val="solid"/>
-            <a:round/>
-            <a:headEnd type="none" w="med" len="med"/>
-            <a:tailEnd type="none" w="med" len="med"/>
-          </a:ln>
-          <a:effectLst>
-            <a:innerShdw blurRad="114300">
-              <a:prstClr val="black"/>
-            </a:innerShdw>
-          </a:effectLst>
-        </p:spPr>
-        <p:txBody>
-          <a:bodyPr vert="horz" wrap="square" lIns="91440" tIns="45720" rIns="91440" bIns="45720" numCol="1" rtlCol="0" anchor="t" anchorCtr="0" compatLnSpc="1">
-            <a:prstTxWarp prst="textNoShape">
-              <a:avLst/>
-            </a:prstTxWarp>
-          </a:bodyPr>
-          <a:lstStyle/>
-          <a:p>
-            <a:pPr algn="r" eaLnBrk="0" fontAlgn="base" hangingPunct="0">
-              <a:spcBef>
-                <a:spcPct val="0"/>
-              </a:spcBef>
-              <a:spcAft>
-                <a:spcPct val="0"/>
-              </a:spcAft>
-            </a:pPr>
-            <a:endParaRPr lang="de-DE" sz="2000">
-              <a:latin typeface="Arial" pitchFamily="34" charset="0"/>
-            </a:endParaRPr>
-          </a:p>
-        </p:txBody>
-      </p:sp>
-      <p:sp>
-        <p:nvSpPr>
-          <p:cNvPr id="10" name="Symbol zastępczy zawartości 2"/>
-          <p:cNvSpPr txBox="1">
-            <a:spLocks/>
-          </p:cNvSpPr>
-          <p:nvPr/>
-        </p:nvSpPr>
-        <p:spPr bwMode="auto">
-          <a:xfrm>
-            <a:off x="430968" y="1628800"/>
-            <a:ext cx="8101472" cy="1671068"/>
-          </a:xfrm>
-          <a:prstGeom prst="rect">
-            <a:avLst/>
-          </a:prstGeom>
-          <a:noFill/>
-          <a:ln>
-            <a:noFill/>
-          </a:ln>
-          <a:extLst>
-            <a:ext uri="{909E8E84-426E-40DD-AFC4-6F175D3DCCD1}">
-              <a14:hiddenFill xmlns="" xmlns:a14="http://schemas.microsoft.com/office/drawing/2010/main">
-                <a:solidFill>
-                  <a:srgbClr val="FFFFFF"/>
-                </a:solidFill>
-              </a14:hiddenFill>
-            </a:ext>
-            <a:ext uri="{91240B29-F687-4F45-9708-019B960494DF}">
-              <a14:hiddenLine xmlns="" xmlns:a14="http://schemas.microsoft.com/office/drawing/2010/main" w="9525">
-                <a:solidFill>
-                  <a:srgbClr val="000000"/>
-                </a:solidFill>
-                <a:miter lim="800000"/>
-                <a:headEnd/>
-                <a:tailEnd/>
-              </a14:hiddenLine>
-            </a:ext>
-          </a:extLst>
-        </p:spPr>
-        <p:txBody>
-          <a:bodyPr vert="horz" wrap="square" lIns="91440" tIns="45720" rIns="91440" bIns="45720" numCol="1" anchor="t" anchorCtr="0" compatLnSpc="1">
-            <a:prstTxWarp prst="textNoShape">
-              <a:avLst/>
-            </a:prstTxWarp>
-          </a:bodyPr>
-          <a:lstStyle>
-            <a:lvl1pPr marL="342900" indent="-342900" algn="l" rtl="0" eaLnBrk="1" fontAlgn="base" hangingPunct="1">
-              <a:spcBef>
-                <a:spcPct val="20000"/>
-              </a:spcBef>
-              <a:spcAft>
-                <a:spcPct val="0"/>
-              </a:spcAft>
-              <a:buChar char="•"/>
-              <a:defRPr sz="2400">
-                <a:solidFill>
-                  <a:schemeClr val="bg1"/>
-                </a:solidFill>
-                <a:latin typeface="+mn-lt"/>
-                <a:ea typeface="ＭＳ Ｐゴシック" pitchFamily="-65" charset="-128"/>
-                <a:cs typeface="ＭＳ Ｐゴシック" pitchFamily="18" charset="-128"/>
-              </a:defRPr>
-            </a:lvl1pPr>
-            <a:lvl2pPr marL="742950" indent="-285750" algn="l" rtl="0" eaLnBrk="1" fontAlgn="base" hangingPunct="1">
-              <a:spcBef>
-                <a:spcPct val="20000"/>
-              </a:spcBef>
-              <a:spcAft>
-                <a:spcPct val="0"/>
-              </a:spcAft>
-              <a:buChar char="–"/>
-              <a:defRPr sz="2000">
-                <a:solidFill>
-                  <a:schemeClr val="bg1"/>
-                </a:solidFill>
-                <a:latin typeface="+mn-lt"/>
-                <a:ea typeface="ＭＳ Ｐゴシック" pitchFamily="-65" charset="-128"/>
-              </a:defRPr>
-            </a:lvl2pPr>
-            <a:lvl3pPr marL="1143000" indent="-228600" algn="l" rtl="0" eaLnBrk="1" fontAlgn="base" hangingPunct="1">
-              <a:spcBef>
-                <a:spcPct val="20000"/>
-              </a:spcBef>
-              <a:spcAft>
-                <a:spcPct val="0"/>
-              </a:spcAft>
-              <a:buChar char="•"/>
-              <a:defRPr sz="2000">
-                <a:solidFill>
-                  <a:schemeClr val="bg1"/>
-                </a:solidFill>
-                <a:latin typeface="+mn-lt"/>
-                <a:ea typeface="ＭＳ Ｐゴシック" pitchFamily="-65" charset="-128"/>
-              </a:defRPr>
-            </a:lvl3pPr>
-            <a:lvl4pPr marL="1562100" indent="-228600" algn="l" rtl="0" eaLnBrk="1" fontAlgn="base" hangingPunct="1">
-              <a:spcBef>
-                <a:spcPct val="20000"/>
-              </a:spcBef>
-              <a:spcAft>
-                <a:spcPct val="0"/>
-              </a:spcAft>
-              <a:buChar char="–"/>
-              <a:defRPr sz="2000">
-                <a:solidFill>
-                  <a:schemeClr val="bg1"/>
-                </a:solidFill>
-                <a:latin typeface="+mn-lt"/>
-                <a:ea typeface="ＭＳ Ｐゴシック" pitchFamily="-65" charset="-128"/>
-              </a:defRPr>
-            </a:lvl4pPr>
-            <a:lvl5pPr marL="1981200" indent="-228600" algn="l" rtl="0" eaLnBrk="1" fontAlgn="base" hangingPunct="1">
-              <a:spcBef>
-                <a:spcPct val="20000"/>
-              </a:spcBef>
-              <a:spcAft>
-                <a:spcPct val="0"/>
-              </a:spcAft>
-              <a:buChar char="»"/>
-              <a:defRPr sz="2000">
-                <a:solidFill>
-                  <a:schemeClr val="bg1"/>
-                </a:solidFill>
-                <a:latin typeface="+mn-lt"/>
-                <a:ea typeface="ＭＳ Ｐゴシック" pitchFamily="-65" charset="-128"/>
-              </a:defRPr>
-            </a:lvl5pPr>
-            <a:lvl6pPr marL="2438400" indent="-228600" algn="l" rtl="0" eaLnBrk="1" fontAlgn="base" hangingPunct="1">
-              <a:spcBef>
-                <a:spcPct val="20000"/>
-              </a:spcBef>
-              <a:spcAft>
-                <a:spcPct val="0"/>
-              </a:spcAft>
-              <a:buChar char="»"/>
-              <a:defRPr sz="1400">
-                <a:solidFill>
-                  <a:schemeClr val="tx1"/>
-                </a:solidFill>
-                <a:latin typeface="+mn-lt"/>
-              </a:defRPr>
-            </a:lvl6pPr>
-            <a:lvl7pPr marL="2895600" indent="-228600" algn="l" rtl="0" eaLnBrk="1" fontAlgn="base" hangingPunct="1">
-              <a:spcBef>
-                <a:spcPct val="20000"/>
-              </a:spcBef>
-              <a:spcAft>
-                <a:spcPct val="0"/>
-              </a:spcAft>
-              <a:buChar char="»"/>
-              <a:defRPr sz="1400">
-                <a:solidFill>
-                  <a:schemeClr val="tx1"/>
-                </a:solidFill>
-                <a:latin typeface="+mn-lt"/>
-              </a:defRPr>
-            </a:lvl7pPr>
-            <a:lvl8pPr marL="3352800" indent="-228600" algn="l" rtl="0" eaLnBrk="1" fontAlgn="base" hangingPunct="1">
-              <a:spcBef>
-                <a:spcPct val="20000"/>
-              </a:spcBef>
-              <a:spcAft>
-                <a:spcPct val="0"/>
-              </a:spcAft>
-              <a:buChar char="»"/>
-              <a:defRPr sz="1400">
-                <a:solidFill>
-                  <a:schemeClr val="tx1"/>
-                </a:solidFill>
-                <a:latin typeface="+mn-lt"/>
-              </a:defRPr>
-            </a:lvl8pPr>
-            <a:lvl9pPr marL="3810000" indent="-228600" algn="l" rtl="0" eaLnBrk="1" fontAlgn="base" hangingPunct="1">
-              <a:spcBef>
-                <a:spcPct val="20000"/>
-              </a:spcBef>
-              <a:spcAft>
-                <a:spcPct val="0"/>
-              </a:spcAft>
-              <a:buChar char="»"/>
-              <a:defRPr sz="1400">
-                <a:solidFill>
-                  <a:schemeClr val="tx1"/>
-                </a:solidFill>
-                <a:latin typeface="+mn-lt"/>
-              </a:defRPr>
-            </a:lvl9pPr>
-          </a:lstStyle>
-          <a:p>
-            <a:pPr>
-              <a:lnSpc>
-                <a:spcPct val="115000"/>
-              </a:lnSpc>
-              <a:spcAft>
-                <a:spcPts val="0"/>
-              </a:spcAft>
-            </a:pPr>
-            <a:r>
-              <a:rPr lang="en-US" sz="1600" dirty="0"/>
-              <a:t>P</a:t>
-            </a:r>
-            <a:r>
-              <a:rPr lang="en-US" sz="1600" dirty="0" smtClean="0"/>
-              <a:t>layer </a:t>
-            </a:r>
-            <a:r>
-              <a:rPr lang="en-US" sz="1600" dirty="0"/>
-              <a:t>can deploy units to his conquered places to </a:t>
-            </a:r>
-            <a:r>
-              <a:rPr lang="en-US" sz="1600" dirty="0">
-                <a:solidFill>
-                  <a:srgbClr val="FF9900"/>
-                </a:solidFill>
-              </a:rPr>
-              <a:t>defend</a:t>
-            </a:r>
-            <a:r>
-              <a:rPr lang="en-US" sz="1600" dirty="0"/>
-              <a:t> </a:t>
-            </a:r>
-            <a:r>
-              <a:rPr lang="en-US" sz="1600" dirty="0" smtClean="0"/>
-              <a:t>them</a:t>
-            </a:r>
-          </a:p>
-          <a:p>
-            <a:pPr>
-              <a:lnSpc>
-                <a:spcPct val="115000"/>
-              </a:lnSpc>
-              <a:spcAft>
-                <a:spcPts val="0"/>
-              </a:spcAft>
-            </a:pPr>
-            <a:r>
-              <a:rPr lang="en-US" sz="1600" dirty="0" smtClean="0"/>
-              <a:t>Deploy </a:t>
-            </a:r>
-            <a:r>
-              <a:rPr lang="en-US" sz="1600" dirty="0" smtClean="0">
-                <a:solidFill>
-                  <a:srgbClr val="FF9900"/>
-                </a:solidFill>
-              </a:rPr>
-              <a:t>menu</a:t>
-            </a:r>
-            <a:r>
-              <a:rPr lang="en-US" sz="1600" dirty="0" smtClean="0"/>
-              <a:t> can be invoked </a:t>
-            </a:r>
-          </a:p>
-          <a:p>
-            <a:pPr lvl="1">
-              <a:lnSpc>
-                <a:spcPct val="115000"/>
-              </a:lnSpc>
-              <a:spcAft>
-                <a:spcPts val="0"/>
-              </a:spcAft>
-            </a:pPr>
-            <a:r>
-              <a:rPr lang="en-US" sz="1600" dirty="0" smtClean="0"/>
-              <a:t>from </a:t>
-            </a:r>
-            <a:r>
-              <a:rPr lang="en-US" sz="1600" dirty="0" smtClean="0">
-                <a:solidFill>
-                  <a:srgbClr val="FF9900"/>
-                </a:solidFill>
-              </a:rPr>
-              <a:t>sidebar</a:t>
-            </a:r>
-            <a:r>
-              <a:rPr lang="en-US" sz="1600" dirty="0" smtClean="0"/>
-              <a:t> (where the conquered places of the player are listed) or</a:t>
-            </a:r>
-          </a:p>
-          <a:p>
-            <a:pPr lvl="1">
-              <a:lnSpc>
-                <a:spcPct val="115000"/>
-              </a:lnSpc>
-              <a:spcAft>
-                <a:spcPts val="0"/>
-              </a:spcAft>
-            </a:pPr>
-            <a:r>
-              <a:rPr lang="en-US" sz="1600" dirty="0" smtClean="0"/>
-              <a:t>directly from the place </a:t>
-            </a:r>
-            <a:r>
-              <a:rPr lang="en-US" sz="1600" dirty="0" smtClean="0">
-                <a:solidFill>
-                  <a:srgbClr val="FF9900"/>
-                </a:solidFill>
-              </a:rPr>
-              <a:t>popup window </a:t>
-            </a:r>
-            <a:r>
-              <a:rPr lang="en-US" sz="1600" dirty="0" smtClean="0"/>
-              <a:t>on the map</a:t>
-            </a:r>
-          </a:p>
-        </p:txBody>
-      </p:sp>
-    </p:spTree>
   </p:cSld>
   <p:clrMapOvr>
     <a:masterClrMapping/>
@@ -5529,7 +5059,7 @@
                   <a:schemeClr val="bg1"/>
                 </a:solidFill>
               </a:rPr>
-              <a:t>Building</a:t>
+              <a:t>Deploying</a:t>
             </a:r>
             <a:r>
               <a:rPr lang="de-DE" dirty="0" smtClean="0">
@@ -5589,6 +5119,648 @@
               <a:rPr lang="de-DE" smtClean="0"/>
               <a:pPr/>
               <a:t>13</a:t>
+            </a:fld>
+            <a:endParaRPr lang="de-DE" dirty="0"/>
+          </a:p>
+        </p:txBody>
+      </p:sp>
+      <p:sp>
+        <p:nvSpPr>
+          <p:cNvPr id="8" name="Symbol zastępczy daty 3"/>
+          <p:cNvSpPr>
+            <a:spLocks noGrp="1"/>
+          </p:cNvSpPr>
+          <p:nvPr>
+            <p:ph type="dt" sz="half" idx="10"/>
+          </p:nvPr>
+        </p:nvSpPr>
+        <p:spPr>
+          <a:xfrm>
+            <a:off x="508000" y="6400800"/>
+            <a:ext cx="1905000" cy="304800"/>
+          </a:xfrm>
+        </p:spPr>
+        <p:txBody>
+          <a:bodyPr/>
+          <a:lstStyle/>
+          <a:p>
+            <a:r>
+              <a:rPr lang="de-DE" smtClean="0"/>
+              <a:t>25.02.2013</a:t>
+            </a:r>
+            <a:endParaRPr lang="de-DE" dirty="0"/>
+          </a:p>
+        </p:txBody>
+      </p:sp>
+      <p:pic>
+        <p:nvPicPr>
+          <p:cNvPr id="7170" name="Picture 2"/>
+          <p:cNvPicPr>
+            <a:picLocks noChangeAspect="1" noChangeArrowheads="1"/>
+          </p:cNvPicPr>
+          <p:nvPr/>
+        </p:nvPicPr>
+        <p:blipFill>
+          <a:blip r:embed="rId2" cstate="print">
+            <a:extLst>
+              <a:ext uri="{28A0092B-C50C-407E-A947-70E740481C1C}">
+                <a14:useLocalDpi xmlns="" xmlns:a14="http://schemas.microsoft.com/office/drawing/2010/main" val="0"/>
+              </a:ext>
+            </a:extLst>
+          </a:blip>
+          <a:srcRect/>
+          <a:stretch>
+            <a:fillRect/>
+          </a:stretch>
+        </p:blipFill>
+        <p:spPr bwMode="auto">
+          <a:xfrm>
+            <a:off x="323528" y="3142439"/>
+            <a:ext cx="4824536" cy="3094526"/>
+          </a:xfrm>
+          <a:prstGeom prst="rect">
+            <a:avLst/>
+          </a:prstGeom>
+          <a:ln>
+            <a:noFill/>
+          </a:ln>
+          <a:effectLst>
+            <a:softEdge rad="112500"/>
+          </a:effectLst>
+          <a:extLst>
+            <a:ext uri="{909E8E84-426E-40DD-AFC4-6F175D3DCCD1}">
+              <a14:hiddenFill xmlns="" xmlns:a14="http://schemas.microsoft.com/office/drawing/2010/main">
+                <a:solidFill>
+                  <a:schemeClr val="accent1"/>
+                </a:solidFill>
+              </a14:hiddenFill>
+            </a:ext>
+            <a:ext uri="{91240B29-F687-4F45-9708-019B960494DF}">
+              <a14:hiddenLine xmlns="" xmlns:a14="http://schemas.microsoft.com/office/drawing/2010/main" w="9525">
+                <a:solidFill>
+                  <a:schemeClr val="tx1"/>
+                </a:solidFill>
+                <a:miter lim="800000"/>
+                <a:headEnd/>
+                <a:tailEnd/>
+              </a14:hiddenLine>
+            </a:ext>
+            <a:ext uri="{AF507438-7753-43E0-B8FC-AC1667EBCBE1}">
+              <a14:hiddenEffects xmlns="" xmlns:a14="http://schemas.microsoft.com/office/drawing/2010/main">
+                <a:effectLst>
+                  <a:outerShdw dist="35921" dir="2700000" algn="ctr" rotWithShape="0">
+                    <a:schemeClr val="bg2"/>
+                  </a:outerShdw>
+                </a:effectLst>
+              </a14:hiddenEffects>
+            </a:ext>
+          </a:extLst>
+        </p:spPr>
+      </p:pic>
+      <p:pic>
+        <p:nvPicPr>
+          <p:cNvPr id="7171" name="Picture 3"/>
+          <p:cNvPicPr>
+            <a:picLocks noChangeAspect="1" noChangeArrowheads="1"/>
+          </p:cNvPicPr>
+          <p:nvPr/>
+        </p:nvPicPr>
+        <p:blipFill>
+          <a:blip r:embed="rId3" cstate="print">
+            <a:extLst>
+              <a:ext uri="{28A0092B-C50C-407E-A947-70E740481C1C}">
+                <a14:useLocalDpi xmlns="" xmlns:a14="http://schemas.microsoft.com/office/drawing/2010/main" val="0"/>
+              </a:ext>
+            </a:extLst>
+          </a:blip>
+          <a:srcRect/>
+          <a:stretch>
+            <a:fillRect/>
+          </a:stretch>
+        </p:blipFill>
+        <p:spPr bwMode="auto">
+          <a:xfrm>
+            <a:off x="5277417" y="3142439"/>
+            <a:ext cx="3458149" cy="3113973"/>
+          </a:xfrm>
+          <a:prstGeom prst="rect">
+            <a:avLst/>
+          </a:prstGeom>
+          <a:ln>
+            <a:noFill/>
+          </a:ln>
+          <a:effectLst>
+            <a:softEdge rad="112500"/>
+          </a:effectLst>
+          <a:extLst>
+            <a:ext uri="{909E8E84-426E-40DD-AFC4-6F175D3DCCD1}">
+              <a14:hiddenFill xmlns="" xmlns:a14="http://schemas.microsoft.com/office/drawing/2010/main">
+                <a:solidFill>
+                  <a:schemeClr val="accent1"/>
+                </a:solidFill>
+              </a14:hiddenFill>
+            </a:ext>
+            <a:ext uri="{91240B29-F687-4F45-9708-019B960494DF}">
+              <a14:hiddenLine xmlns="" xmlns:a14="http://schemas.microsoft.com/office/drawing/2010/main" w="9525">
+                <a:solidFill>
+                  <a:schemeClr val="tx1"/>
+                </a:solidFill>
+                <a:miter lim="800000"/>
+                <a:headEnd/>
+                <a:tailEnd/>
+              </a14:hiddenLine>
+            </a:ext>
+            <a:ext uri="{AF507438-7753-43E0-B8FC-AC1667EBCBE1}">
+              <a14:hiddenEffects xmlns="" xmlns:a14="http://schemas.microsoft.com/office/drawing/2010/main">
+                <a:effectLst>
+                  <a:outerShdw dist="35921" dir="2700000" algn="ctr" rotWithShape="0">
+                    <a:schemeClr val="bg2"/>
+                  </a:outerShdw>
+                </a:effectLst>
+              </a14:hiddenEffects>
+            </a:ext>
+          </a:extLst>
+        </p:spPr>
+      </p:pic>
+      <p:sp>
+        <p:nvSpPr>
+          <p:cNvPr id="9" name="Rounded Rectangle 8"/>
+          <p:cNvSpPr/>
+          <p:nvPr/>
+        </p:nvSpPr>
+        <p:spPr bwMode="auto">
+          <a:xfrm>
+            <a:off x="395536" y="1556792"/>
+            <a:ext cx="8136904" cy="1513639"/>
+          </a:xfrm>
+          <a:prstGeom prst="roundRect">
+            <a:avLst>
+              <a:gd name="adj" fmla="val 13985"/>
+            </a:avLst>
+          </a:prstGeom>
+          <a:solidFill>
+            <a:srgbClr val="292929"/>
+          </a:solidFill>
+          <a:ln w="9525" cap="flat" cmpd="sng" algn="ctr">
+            <a:noFill/>
+            <a:prstDash val="solid"/>
+            <a:round/>
+            <a:headEnd type="none" w="med" len="med"/>
+            <a:tailEnd type="none" w="med" len="med"/>
+          </a:ln>
+          <a:effectLst>
+            <a:innerShdw blurRad="114300">
+              <a:prstClr val="black"/>
+            </a:innerShdw>
+          </a:effectLst>
+        </p:spPr>
+        <p:txBody>
+          <a:bodyPr vert="horz" wrap="square" lIns="91440" tIns="45720" rIns="91440" bIns="45720" numCol="1" rtlCol="0" anchor="t" anchorCtr="0" compatLnSpc="1">
+            <a:prstTxWarp prst="textNoShape">
+              <a:avLst/>
+            </a:prstTxWarp>
+          </a:bodyPr>
+          <a:lstStyle/>
+          <a:p>
+            <a:pPr algn="r" eaLnBrk="0" fontAlgn="base" hangingPunct="0">
+              <a:spcBef>
+                <a:spcPct val="0"/>
+              </a:spcBef>
+              <a:spcAft>
+                <a:spcPct val="0"/>
+              </a:spcAft>
+            </a:pPr>
+            <a:endParaRPr lang="de-DE" sz="2000">
+              <a:latin typeface="Arial" pitchFamily="34" charset="0"/>
+            </a:endParaRPr>
+          </a:p>
+        </p:txBody>
+      </p:sp>
+      <p:sp>
+        <p:nvSpPr>
+          <p:cNvPr id="10" name="Symbol zastępczy zawartości 2"/>
+          <p:cNvSpPr txBox="1">
+            <a:spLocks/>
+          </p:cNvSpPr>
+          <p:nvPr/>
+        </p:nvSpPr>
+        <p:spPr bwMode="auto">
+          <a:xfrm>
+            <a:off x="430968" y="1628800"/>
+            <a:ext cx="8101472" cy="1671068"/>
+          </a:xfrm>
+          <a:prstGeom prst="rect">
+            <a:avLst/>
+          </a:prstGeom>
+          <a:noFill/>
+          <a:ln>
+            <a:noFill/>
+          </a:ln>
+          <a:extLst>
+            <a:ext uri="{909E8E84-426E-40DD-AFC4-6F175D3DCCD1}">
+              <a14:hiddenFill xmlns="" xmlns:a14="http://schemas.microsoft.com/office/drawing/2010/main">
+                <a:solidFill>
+                  <a:srgbClr val="FFFFFF"/>
+                </a:solidFill>
+              </a14:hiddenFill>
+            </a:ext>
+            <a:ext uri="{91240B29-F687-4F45-9708-019B960494DF}">
+              <a14:hiddenLine xmlns="" xmlns:a14="http://schemas.microsoft.com/office/drawing/2010/main" w="9525">
+                <a:solidFill>
+                  <a:srgbClr val="000000"/>
+                </a:solidFill>
+                <a:miter lim="800000"/>
+                <a:headEnd/>
+                <a:tailEnd/>
+              </a14:hiddenLine>
+            </a:ext>
+          </a:extLst>
+        </p:spPr>
+        <p:txBody>
+          <a:bodyPr vert="horz" wrap="square" lIns="91440" tIns="45720" rIns="91440" bIns="45720" numCol="1" anchor="t" anchorCtr="0" compatLnSpc="1">
+            <a:prstTxWarp prst="textNoShape">
+              <a:avLst/>
+            </a:prstTxWarp>
+          </a:bodyPr>
+          <a:lstStyle>
+            <a:lvl1pPr marL="342900" indent="-342900" algn="l" rtl="0" eaLnBrk="1" fontAlgn="base" hangingPunct="1">
+              <a:spcBef>
+                <a:spcPct val="20000"/>
+              </a:spcBef>
+              <a:spcAft>
+                <a:spcPct val="0"/>
+              </a:spcAft>
+              <a:buChar char="•"/>
+              <a:defRPr sz="2400">
+                <a:solidFill>
+                  <a:schemeClr val="bg1"/>
+                </a:solidFill>
+                <a:latin typeface="+mn-lt"/>
+                <a:ea typeface="ＭＳ Ｐゴシック" pitchFamily="-65" charset="-128"/>
+                <a:cs typeface="ＭＳ Ｐゴシック" pitchFamily="18" charset="-128"/>
+              </a:defRPr>
+            </a:lvl1pPr>
+            <a:lvl2pPr marL="742950" indent="-285750" algn="l" rtl="0" eaLnBrk="1" fontAlgn="base" hangingPunct="1">
+              <a:spcBef>
+                <a:spcPct val="20000"/>
+              </a:spcBef>
+              <a:spcAft>
+                <a:spcPct val="0"/>
+              </a:spcAft>
+              <a:buChar char="–"/>
+              <a:defRPr sz="2000">
+                <a:solidFill>
+                  <a:schemeClr val="bg1"/>
+                </a:solidFill>
+                <a:latin typeface="+mn-lt"/>
+                <a:ea typeface="ＭＳ Ｐゴシック" pitchFamily="-65" charset="-128"/>
+              </a:defRPr>
+            </a:lvl2pPr>
+            <a:lvl3pPr marL="1143000" indent="-228600" algn="l" rtl="0" eaLnBrk="1" fontAlgn="base" hangingPunct="1">
+              <a:spcBef>
+                <a:spcPct val="20000"/>
+              </a:spcBef>
+              <a:spcAft>
+                <a:spcPct val="0"/>
+              </a:spcAft>
+              <a:buChar char="•"/>
+              <a:defRPr sz="2000">
+                <a:solidFill>
+                  <a:schemeClr val="bg1"/>
+                </a:solidFill>
+                <a:latin typeface="+mn-lt"/>
+                <a:ea typeface="ＭＳ Ｐゴシック" pitchFamily="-65" charset="-128"/>
+              </a:defRPr>
+            </a:lvl3pPr>
+            <a:lvl4pPr marL="1562100" indent="-228600" algn="l" rtl="0" eaLnBrk="1" fontAlgn="base" hangingPunct="1">
+              <a:spcBef>
+                <a:spcPct val="20000"/>
+              </a:spcBef>
+              <a:spcAft>
+                <a:spcPct val="0"/>
+              </a:spcAft>
+              <a:buChar char="–"/>
+              <a:defRPr sz="2000">
+                <a:solidFill>
+                  <a:schemeClr val="bg1"/>
+                </a:solidFill>
+                <a:latin typeface="+mn-lt"/>
+                <a:ea typeface="ＭＳ Ｐゴシック" pitchFamily="-65" charset="-128"/>
+              </a:defRPr>
+            </a:lvl4pPr>
+            <a:lvl5pPr marL="1981200" indent="-228600" algn="l" rtl="0" eaLnBrk="1" fontAlgn="base" hangingPunct="1">
+              <a:spcBef>
+                <a:spcPct val="20000"/>
+              </a:spcBef>
+              <a:spcAft>
+                <a:spcPct val="0"/>
+              </a:spcAft>
+              <a:buChar char="»"/>
+              <a:defRPr sz="2000">
+                <a:solidFill>
+                  <a:schemeClr val="bg1"/>
+                </a:solidFill>
+                <a:latin typeface="+mn-lt"/>
+                <a:ea typeface="ＭＳ Ｐゴシック" pitchFamily="-65" charset="-128"/>
+              </a:defRPr>
+            </a:lvl5pPr>
+            <a:lvl6pPr marL="2438400" indent="-228600" algn="l" rtl="0" eaLnBrk="1" fontAlgn="base" hangingPunct="1">
+              <a:spcBef>
+                <a:spcPct val="20000"/>
+              </a:spcBef>
+              <a:spcAft>
+                <a:spcPct val="0"/>
+              </a:spcAft>
+              <a:buChar char="»"/>
+              <a:defRPr sz="1400">
+                <a:solidFill>
+                  <a:schemeClr val="tx1"/>
+                </a:solidFill>
+                <a:latin typeface="+mn-lt"/>
+              </a:defRPr>
+            </a:lvl6pPr>
+            <a:lvl7pPr marL="2895600" indent="-228600" algn="l" rtl="0" eaLnBrk="1" fontAlgn="base" hangingPunct="1">
+              <a:spcBef>
+                <a:spcPct val="20000"/>
+              </a:spcBef>
+              <a:spcAft>
+                <a:spcPct val="0"/>
+              </a:spcAft>
+              <a:buChar char="»"/>
+              <a:defRPr sz="1400">
+                <a:solidFill>
+                  <a:schemeClr val="tx1"/>
+                </a:solidFill>
+                <a:latin typeface="+mn-lt"/>
+              </a:defRPr>
+            </a:lvl7pPr>
+            <a:lvl8pPr marL="3352800" indent="-228600" algn="l" rtl="0" eaLnBrk="1" fontAlgn="base" hangingPunct="1">
+              <a:spcBef>
+                <a:spcPct val="20000"/>
+              </a:spcBef>
+              <a:spcAft>
+                <a:spcPct val="0"/>
+              </a:spcAft>
+              <a:buChar char="»"/>
+              <a:defRPr sz="1400">
+                <a:solidFill>
+                  <a:schemeClr val="tx1"/>
+                </a:solidFill>
+                <a:latin typeface="+mn-lt"/>
+              </a:defRPr>
+            </a:lvl8pPr>
+            <a:lvl9pPr marL="3810000" indent="-228600" algn="l" rtl="0" eaLnBrk="1" fontAlgn="base" hangingPunct="1">
+              <a:spcBef>
+                <a:spcPct val="20000"/>
+              </a:spcBef>
+              <a:spcAft>
+                <a:spcPct val="0"/>
+              </a:spcAft>
+              <a:buChar char="»"/>
+              <a:defRPr sz="1400">
+                <a:solidFill>
+                  <a:schemeClr val="tx1"/>
+                </a:solidFill>
+                <a:latin typeface="+mn-lt"/>
+              </a:defRPr>
+            </a:lvl9pPr>
+          </a:lstStyle>
+          <a:p>
+            <a:pPr>
+              <a:lnSpc>
+                <a:spcPct val="115000"/>
+              </a:lnSpc>
+              <a:spcAft>
+                <a:spcPts val="0"/>
+              </a:spcAft>
+            </a:pPr>
+            <a:r>
+              <a:rPr lang="en-US" sz="1600" dirty="0"/>
+              <a:t>P</a:t>
+            </a:r>
+            <a:r>
+              <a:rPr lang="en-US" sz="1600" dirty="0" smtClean="0"/>
+              <a:t>layer </a:t>
+            </a:r>
+            <a:r>
+              <a:rPr lang="en-US" sz="1600" dirty="0"/>
+              <a:t>can deploy units to his conquered places to </a:t>
+            </a:r>
+            <a:r>
+              <a:rPr lang="en-US" sz="1600" dirty="0">
+                <a:solidFill>
+                  <a:srgbClr val="FF9900"/>
+                </a:solidFill>
+              </a:rPr>
+              <a:t>defend</a:t>
+            </a:r>
+            <a:r>
+              <a:rPr lang="en-US" sz="1600" dirty="0"/>
+              <a:t> </a:t>
+            </a:r>
+            <a:r>
+              <a:rPr lang="en-US" sz="1600" dirty="0" smtClean="0"/>
+              <a:t>them</a:t>
+            </a:r>
+          </a:p>
+          <a:p>
+            <a:pPr>
+              <a:lnSpc>
+                <a:spcPct val="115000"/>
+              </a:lnSpc>
+              <a:spcAft>
+                <a:spcPts val="0"/>
+              </a:spcAft>
+            </a:pPr>
+            <a:r>
+              <a:rPr lang="en-US" sz="1600" dirty="0" smtClean="0"/>
+              <a:t>Deploy </a:t>
+            </a:r>
+            <a:r>
+              <a:rPr lang="en-US" sz="1600" dirty="0" smtClean="0">
+                <a:solidFill>
+                  <a:srgbClr val="FF9900"/>
+                </a:solidFill>
+              </a:rPr>
+              <a:t>menu</a:t>
+            </a:r>
+            <a:r>
+              <a:rPr lang="en-US" sz="1600" dirty="0" smtClean="0"/>
+              <a:t> can be invoked </a:t>
+            </a:r>
+          </a:p>
+          <a:p>
+            <a:pPr lvl="1">
+              <a:lnSpc>
+                <a:spcPct val="115000"/>
+              </a:lnSpc>
+              <a:spcAft>
+                <a:spcPts val="0"/>
+              </a:spcAft>
+            </a:pPr>
+            <a:r>
+              <a:rPr lang="en-US" sz="1600" dirty="0" smtClean="0"/>
+              <a:t>from </a:t>
+            </a:r>
+            <a:r>
+              <a:rPr lang="en-US" sz="1600" dirty="0" smtClean="0">
+                <a:solidFill>
+                  <a:srgbClr val="FF9900"/>
+                </a:solidFill>
+              </a:rPr>
+              <a:t>sidebar</a:t>
+            </a:r>
+            <a:r>
+              <a:rPr lang="en-US" sz="1600" dirty="0" smtClean="0"/>
+              <a:t> (where the conquered places of the player are listed) or</a:t>
+            </a:r>
+          </a:p>
+          <a:p>
+            <a:pPr lvl="1">
+              <a:lnSpc>
+                <a:spcPct val="115000"/>
+              </a:lnSpc>
+              <a:spcAft>
+                <a:spcPts val="0"/>
+              </a:spcAft>
+            </a:pPr>
+            <a:r>
+              <a:rPr lang="en-US" sz="1600" dirty="0" smtClean="0"/>
+              <a:t>directly from the place </a:t>
+            </a:r>
+            <a:r>
+              <a:rPr lang="en-US" sz="1600" dirty="0" smtClean="0">
+                <a:solidFill>
+                  <a:srgbClr val="FF9900"/>
+                </a:solidFill>
+              </a:rPr>
+              <a:t>popup window </a:t>
+            </a:r>
+            <a:r>
+              <a:rPr lang="en-US" sz="1600" dirty="0" smtClean="0"/>
+              <a:t>on the map</a:t>
+            </a:r>
+          </a:p>
+        </p:txBody>
+      </p:sp>
+    </p:spTree>
+  </p:cSld>
+  <p:clrMapOvr>
+    <a:masterClrMapping/>
+  </p:clrMapOvr>
+  <p:timing>
+    <p:tnLst>
+      <p:par>
+        <p:cTn id="1" dur="indefinite" restart="never" nodeType="tmRoot"/>
+      </p:par>
+    </p:tnLst>
+  </p:timing>
+</p:sld>
+</file>
+
+<file path=ppt/slides/slide14.xml><?xml version="1.0" encoding="utf-8"?>
+<p:sld xmlns:a="http://schemas.openxmlformats.org/drawingml/2006/main" xmlns:r="http://schemas.openxmlformats.org/officeDocument/2006/relationships" xmlns:p="http://schemas.openxmlformats.org/presentationml/2006/main">
+  <p:cSld>
+    <p:spTree>
+      <p:nvGrpSpPr>
+        <p:cNvPr id="1" name=""/>
+        <p:cNvGrpSpPr/>
+        <p:nvPr/>
+      </p:nvGrpSpPr>
+      <p:grpSpPr>
+        <a:xfrm>
+          <a:off x="0" y="0"/>
+          <a:ext cx="0" cy="0"/>
+          <a:chOff x="0" y="0"/>
+          <a:chExt cx="0" cy="0"/>
+        </a:xfrm>
+      </p:grpSpPr>
+      <p:sp>
+        <p:nvSpPr>
+          <p:cNvPr id="2" name="Tytuł 1"/>
+          <p:cNvSpPr>
+            <a:spLocks noGrp="1"/>
+          </p:cNvSpPr>
+          <p:nvPr>
+            <p:ph type="title"/>
+          </p:nvPr>
+        </p:nvSpPr>
+        <p:spPr>
+          <a:xfrm>
+            <a:off x="508000" y="914400"/>
+            <a:ext cx="7993090" cy="585774"/>
+          </a:xfrm>
+        </p:spPr>
+        <p:txBody>
+          <a:bodyPr/>
+          <a:lstStyle/>
+          <a:p>
+            <a:r>
+              <a:rPr lang="de-DE" dirty="0" err="1" smtClean="0">
+                <a:solidFill>
+                  <a:schemeClr val="bg1"/>
+                </a:solidFill>
+              </a:rPr>
+              <a:t>Building</a:t>
+            </a:r>
+            <a:r>
+              <a:rPr lang="de-DE" dirty="0" smtClean="0">
+                <a:solidFill>
+                  <a:schemeClr val="bg1"/>
+                </a:solidFill>
+              </a:rPr>
+              <a:t> Units</a:t>
+            </a:r>
+            <a:endParaRPr lang="pl-PL" dirty="0">
+              <a:solidFill>
+                <a:schemeClr val="bg1"/>
+              </a:solidFill>
+            </a:endParaRPr>
+          </a:p>
+        </p:txBody>
+      </p:sp>
+      <p:sp>
+        <p:nvSpPr>
+          <p:cNvPr id="5" name="Symbol zastępczy stopki 4"/>
+          <p:cNvSpPr>
+            <a:spLocks noGrp="1"/>
+          </p:cNvSpPr>
+          <p:nvPr>
+            <p:ph type="ftr" sz="quarter" idx="11"/>
+          </p:nvPr>
+        </p:nvSpPr>
+        <p:spPr/>
+        <p:txBody>
+          <a:bodyPr/>
+          <a:lstStyle/>
+          <a:p>
+            <a:r>
+              <a:rPr lang="de-DE" smtClean="0"/>
+              <a:t>Master Lab Course Web Applications</a:t>
+            </a:r>
+            <a:endParaRPr lang="de-DE" dirty="0"/>
+          </a:p>
+        </p:txBody>
+      </p:sp>
+      <p:sp>
+        <p:nvSpPr>
+          <p:cNvPr id="6" name="Symbol zastępczy numeru slajdu 5"/>
+          <p:cNvSpPr>
+            <a:spLocks noGrp="1"/>
+          </p:cNvSpPr>
+          <p:nvPr>
+            <p:ph type="sldNum" sz="quarter" idx="12"/>
+          </p:nvPr>
+        </p:nvSpPr>
+        <p:spPr/>
+        <p:txBody>
+          <a:bodyPr/>
+          <a:lstStyle/>
+          <a:p>
+            <a:fld id="{121E5A8C-2088-45D2-9D84-10B3EA412A4C}" type="slidenum">
+              <a:rPr lang="de-DE" smtClean="0"/>
+              <a:pPr/>
+              <a:t>14</a:t>
             </a:fld>
             <a:endParaRPr lang="de-DE" dirty="0"/>
           </a:p>
@@ -6039,7 +6211,7 @@
 </p:sld>
 </file>
 
-<file path=ppt/slides/slide14.xml><?xml version="1.0" encoding="utf-8"?>
+<file path=ppt/slides/slide15.xml><?xml version="1.0" encoding="utf-8"?>
 <p:sld xmlns:a="http://schemas.openxmlformats.org/drawingml/2006/main" xmlns:r="http://schemas.openxmlformats.org/officeDocument/2006/relationships" xmlns:p="http://schemas.openxmlformats.org/presentationml/2006/main">
   <p:cSld>
     <p:spTree>
@@ -6143,7 +6315,7 @@
             <a:fld id="{121E5A8C-2088-45D2-9D84-10B3EA412A4C}" type="slidenum">
               <a:rPr lang="de-DE" smtClean="0"/>
               <a:pPr/>
-              <a:t>14</a:t>
+              <a:t>15</a:t>
             </a:fld>
             <a:endParaRPr lang="de-DE" dirty="0"/>
           </a:p>
@@ -6588,7 +6760,7 @@
 </p:sld>
 </file>
 
-<file path=ppt/slides/slide15.xml><?xml version="1.0" encoding="utf-8"?>
+<file path=ppt/slides/slide16.xml><?xml version="1.0" encoding="utf-8"?>
 <p:sld xmlns:a="http://schemas.openxmlformats.org/drawingml/2006/main" xmlns:r="http://schemas.openxmlformats.org/officeDocument/2006/relationships" xmlns:p="http://schemas.openxmlformats.org/presentationml/2006/main">
   <p:cSld>
     <p:spTree>
@@ -6708,7 +6880,7 @@
             <a:fld id="{121E5A8C-2088-45D2-9D84-10B3EA412A4C}" type="slidenum">
               <a:rPr lang="de-DE" smtClean="0"/>
               <a:pPr/>
-              <a:t>15</a:t>
+              <a:t>16</a:t>
             </a:fld>
             <a:endParaRPr lang="de-DE" dirty="0"/>
           </a:p>
@@ -7895,8 +8067,8 @@
         </p:nvSpPr>
         <p:spPr bwMode="auto">
           <a:xfrm>
-            <a:off x="6000760" y="3857628"/>
-            <a:ext cx="2500330" cy="500066"/>
+            <a:off x="6572264" y="3857628"/>
+            <a:ext cx="1928826" cy="500066"/>
           </a:xfrm>
           <a:prstGeom prst="rect">
             <a:avLst/>
@@ -8052,7 +8224,7 @@
         <p:spPr bwMode="auto">
           <a:xfrm>
             <a:off x="785786" y="3857628"/>
-            <a:ext cx="5143536" cy="500066"/>
+            <a:ext cx="4929222" cy="500066"/>
           </a:xfrm>
           <a:prstGeom prst="rect">
             <a:avLst/>
@@ -8861,6 +9033,40 @@
           </a:p>
         </p:txBody>
       </p:sp>
+      <p:cxnSp>
+        <p:nvCxnSpPr>
+          <p:cNvPr id="25" name="Łącznik prosty ze strzałką 24"/>
+          <p:cNvCxnSpPr/>
+          <p:nvPr/>
+        </p:nvCxnSpPr>
+        <p:spPr bwMode="auto">
+          <a:xfrm rot="10800000">
+            <a:off x="5857884" y="3857628"/>
+            <a:ext cx="642942" cy="357190"/>
+          </a:xfrm>
+          <a:prstGeom prst="straightConnector1">
+            <a:avLst/>
+          </a:prstGeom>
+          <a:ln w="31750" cap="sq">
+            <a:headEnd type="none" w="med" len="med"/>
+            <a:tailEnd type="triangle" w="lg" len="lg"/>
+          </a:ln>
+        </p:spPr>
+        <p:style>
+          <a:lnRef idx="1">
+            <a:schemeClr val="accent1"/>
+          </a:lnRef>
+          <a:fillRef idx="0">
+            <a:schemeClr val="accent1"/>
+          </a:fillRef>
+          <a:effectRef idx="0">
+            <a:schemeClr val="accent1"/>
+          </a:effectRef>
+          <a:fontRef idx="minor">
+            <a:schemeClr val="tx1"/>
+          </a:fontRef>
+        </p:style>
+      </p:cxnSp>
     </p:spTree>
   </p:cSld>
   <p:clrMapOvr>

</xml_diff>

<commit_message>
end slide + export to ppt, pdf
</commit_message>
<xml_diff>
--- a/docs/group4_Final_Presentation.pptx
+++ b/docs/group4_Final_Presentation.pptx
@@ -5,10 +5,10 @@
     <p:sldMasterId id="2147483660" r:id="rId1"/>
   </p:sldMasterIdLst>
   <p:notesMasterIdLst>
-    <p:notesMasterId r:id="rId18"/>
+    <p:notesMasterId r:id="rId19"/>
   </p:notesMasterIdLst>
   <p:handoutMasterIdLst>
-    <p:handoutMasterId r:id="rId19"/>
+    <p:handoutMasterId r:id="rId20"/>
   </p:handoutMasterIdLst>
   <p:sldIdLst>
     <p:sldId id="256" r:id="rId2"/>
@@ -27,6 +27,7 @@
     <p:sldId id="284" r:id="rId15"/>
     <p:sldId id="292" r:id="rId16"/>
     <p:sldId id="293" r:id="rId17"/>
+    <p:sldId id="295" r:id="rId18"/>
   </p:sldIdLst>
   <p:sldSz cx="9144000" cy="6858000" type="screen4x3"/>
   <p:notesSz cx="6858000" cy="9144000"/>
@@ -9068,6 +9069,169 @@
         </p:style>
       </p:cxnSp>
     </p:spTree>
+  </p:cSld>
+  <p:clrMapOvr>
+    <a:masterClrMapping/>
+  </p:clrMapOvr>
+</p:sld>
+</file>
+
+<file path=ppt/slides/slide17.xml><?xml version="1.0" encoding="utf-8"?>
+<p:sld xmlns:a="http://schemas.openxmlformats.org/drawingml/2006/main" xmlns:r="http://schemas.openxmlformats.org/officeDocument/2006/relationships" xmlns:p="http://schemas.openxmlformats.org/presentationml/2006/main">
+  <p:cSld>
+    <p:spTree>
+      <p:nvGrpSpPr>
+        <p:cNvPr id="1" name=""/>
+        <p:cNvGrpSpPr/>
+        <p:nvPr/>
+      </p:nvGrpSpPr>
+      <p:grpSpPr>
+        <a:xfrm>
+          <a:off x="0" y="0"/>
+          <a:ext cx="0" cy="0"/>
+          <a:chOff x="0" y="0"/>
+          <a:chExt cx="0" cy="0"/>
+        </a:xfrm>
+      </p:grpSpPr>
+      <p:sp>
+        <p:nvSpPr>
+          <p:cNvPr id="7" name="Titel 6"/>
+          <p:cNvSpPr>
+            <a:spLocks noGrp="1"/>
+          </p:cNvSpPr>
+          <p:nvPr>
+            <p:ph type="ctrTitle"/>
+          </p:nvPr>
+        </p:nvSpPr>
+        <p:spPr>
+          <a:xfrm>
+            <a:off x="495300" y="2493640"/>
+            <a:ext cx="8128000" cy="1295400"/>
+          </a:xfrm>
+        </p:spPr>
+        <p:txBody>
+          <a:bodyPr/>
+          <a:lstStyle/>
+          <a:p>
+            <a:r>
+              <a:rPr lang="pl-PL" sz="5400" dirty="0" err="1" smtClean="0"/>
+              <a:t>The</a:t>
+            </a:r>
+            <a:r>
+              <a:rPr lang="pl-PL" sz="5400" dirty="0" smtClean="0"/>
+              <a:t> </a:t>
+            </a:r>
+            <a:r>
+              <a:rPr lang="pl-PL" sz="5400" dirty="0" err="1" smtClean="0"/>
+              <a:t>end</a:t>
+            </a:r>
+            <a:endParaRPr lang="de-DE" sz="5400" dirty="0"/>
+          </a:p>
+        </p:txBody>
+      </p:sp>
+      <p:sp>
+        <p:nvSpPr>
+          <p:cNvPr id="5" name="Fußzeilenplatzhalter 4"/>
+          <p:cNvSpPr>
+            <a:spLocks noGrp="1"/>
+          </p:cNvSpPr>
+          <p:nvPr>
+            <p:ph type="ftr" sz="quarter" idx="10"/>
+          </p:nvPr>
+        </p:nvSpPr>
+        <p:spPr>
+          <a:xfrm>
+            <a:off x="2428860" y="6400800"/>
+            <a:ext cx="6232540" cy="304800"/>
+          </a:xfrm>
+        </p:spPr>
+        <p:txBody>
+          <a:bodyPr/>
+          <a:lstStyle/>
+          <a:p>
+            <a:r>
+              <a:rPr lang="de-DE" dirty="0" smtClean="0"/>
+              <a:t>Master Lab </a:t>
+            </a:r>
+            <a:r>
+              <a:rPr lang="de-DE" dirty="0" err="1" smtClean="0"/>
+              <a:t>Course</a:t>
+            </a:r>
+            <a:r>
+              <a:rPr lang="de-DE" dirty="0" smtClean="0"/>
+              <a:t> Web </a:t>
+            </a:r>
+            <a:r>
+              <a:rPr lang="de-DE" dirty="0" err="1" smtClean="0"/>
+              <a:t>Applications</a:t>
+            </a:r>
+            <a:endParaRPr lang="de-DE" dirty="0"/>
+          </a:p>
+        </p:txBody>
+      </p:sp>
+      <p:sp>
+        <p:nvSpPr>
+          <p:cNvPr id="4" name="Datumsplatzhalter 3"/>
+          <p:cNvSpPr>
+            <a:spLocks noGrp="1"/>
+          </p:cNvSpPr>
+          <p:nvPr>
+            <p:ph type="dt" sz="half" idx="4294967295"/>
+          </p:nvPr>
+        </p:nvSpPr>
+        <p:spPr>
+          <a:xfrm>
+            <a:off x="0" y="6400800"/>
+            <a:ext cx="1905000" cy="304800"/>
+          </a:xfrm>
+        </p:spPr>
+        <p:txBody>
+          <a:bodyPr/>
+          <a:lstStyle/>
+          <a:p>
+            <a:r>
+              <a:rPr lang="de-DE" smtClean="0"/>
+              <a:t>25.02.2013</a:t>
+            </a:r>
+            <a:endParaRPr lang="de-DE" dirty="0"/>
+          </a:p>
+        </p:txBody>
+      </p:sp>
+      <p:sp>
+        <p:nvSpPr>
+          <p:cNvPr id="6" name="Foliennummernplatzhalter 5"/>
+          <p:cNvSpPr>
+            <a:spLocks noGrp="1"/>
+          </p:cNvSpPr>
+          <p:nvPr>
+            <p:ph type="sldNum" sz="quarter" idx="4294967295"/>
+          </p:nvPr>
+        </p:nvSpPr>
+        <p:spPr>
+          <a:xfrm>
+            <a:off x="7239000" y="6400800"/>
+            <a:ext cx="1905000" cy="304800"/>
+          </a:xfrm>
+        </p:spPr>
+        <p:txBody>
+          <a:bodyPr/>
+          <a:lstStyle/>
+          <a:p>
+            <a:fld id="{121E5A8C-2088-45D2-9D84-10B3EA412A4C}" type="slidenum">
+              <a:rPr lang="de-DE" smtClean="0"/>
+              <a:pPr/>
+              <a:t>17</a:t>
+            </a:fld>
+            <a:endParaRPr lang="de-DE" dirty="0"/>
+          </a:p>
+        </p:txBody>
+      </p:sp>
+    </p:spTree>
+    <p:extLst>
+      <p:ext uri="{BB962C8B-B14F-4D97-AF65-F5344CB8AC3E}">
+        <p14:creationId xmlns="" xmlns:p14="http://schemas.microsoft.com/office/powerpoint/2010/main" val="898927123"/>
+      </p:ext>
+    </p:extLst>
   </p:cSld>
   <p:clrMapOvr>
     <a:masterClrMapping/>

</xml_diff>